<commit_message>
added discussion of containers
</commit_message>
<xml_diff>
--- a/computational_reproducibility/lecture/2018_ComputationalReproducibility_Bruhwiler_USPAS.pptx
+++ b/computational_reproducibility/lecture/2018_ComputationalReproducibility_Bruhwiler_USPAS.pptx
@@ -5,7 +5,7 @@
     <p:sldMasterId id="2147483696" r:id="rId1"/>
   </p:sldMasterIdLst>
   <p:notesMasterIdLst>
-    <p:notesMasterId r:id="rId20"/>
+    <p:notesMasterId r:id="rId25"/>
   </p:notesMasterIdLst>
   <p:sldIdLst>
     <p:sldId id="297" r:id="rId2"/>
@@ -21,11 +21,16 @@
     <p:sldId id="402" r:id="rId12"/>
     <p:sldId id="412" r:id="rId13"/>
     <p:sldId id="401" r:id="rId14"/>
-    <p:sldId id="394" r:id="rId15"/>
-    <p:sldId id="395" r:id="rId16"/>
-    <p:sldId id="396" r:id="rId17"/>
-    <p:sldId id="397" r:id="rId18"/>
-    <p:sldId id="400" r:id="rId19"/>
+    <p:sldId id="420" r:id="rId15"/>
+    <p:sldId id="421" r:id="rId16"/>
+    <p:sldId id="413" r:id="rId17"/>
+    <p:sldId id="423" r:id="rId18"/>
+    <p:sldId id="422" r:id="rId19"/>
+    <p:sldId id="394" r:id="rId20"/>
+    <p:sldId id="395" r:id="rId21"/>
+    <p:sldId id="414" r:id="rId22"/>
+    <p:sldId id="396" r:id="rId23"/>
+    <p:sldId id="416" r:id="rId24"/>
   </p:sldIdLst>
   <p:sldSz cx="9144000" cy="6858000" type="screen4x3"/>
   <p:notesSz cx="6858000" cy="9144000"/>
@@ -1002,7 +1007,7 @@
     </p:spTree>
     <p:extLst>
       <p:ext uri="{BB962C8B-B14F-4D97-AF65-F5344CB8AC3E}">
-        <p14:creationId xmlns:p14="http://schemas.microsoft.com/office/powerpoint/2010/main" val="384814357"/>
+        <p14:creationId xmlns:p14="http://schemas.microsoft.com/office/powerpoint/2010/main" val="1320116291"/>
       </p:ext>
     </p:extLst>
   </p:cSld>
@@ -1086,7 +1091,7 @@
     </p:spTree>
     <p:extLst>
       <p:ext uri="{BB962C8B-B14F-4D97-AF65-F5344CB8AC3E}">
-        <p14:creationId xmlns:p14="http://schemas.microsoft.com/office/powerpoint/2010/main" val="2620879761"/>
+        <p14:creationId xmlns:p14="http://schemas.microsoft.com/office/powerpoint/2010/main" val="3758923356"/>
       </p:ext>
     </p:extLst>
   </p:cSld>
@@ -1170,7 +1175,7 @@
     </p:spTree>
     <p:extLst>
       <p:ext uri="{BB962C8B-B14F-4D97-AF65-F5344CB8AC3E}">
-        <p14:creationId xmlns:p14="http://schemas.microsoft.com/office/powerpoint/2010/main" val="2480711367"/>
+        <p14:creationId xmlns:p14="http://schemas.microsoft.com/office/powerpoint/2010/main" val="1265170844"/>
       </p:ext>
     </p:extLst>
   </p:cSld>
@@ -1254,7 +1259,7 @@
     </p:spTree>
     <p:extLst>
       <p:ext uri="{BB962C8B-B14F-4D97-AF65-F5344CB8AC3E}">
-        <p14:creationId xmlns:p14="http://schemas.microsoft.com/office/powerpoint/2010/main" val="720764118"/>
+        <p14:creationId xmlns:p14="http://schemas.microsoft.com/office/powerpoint/2010/main" val="1361812418"/>
       </p:ext>
     </p:extLst>
   </p:cSld>
@@ -1338,7 +1343,91 @@
     </p:spTree>
     <p:extLst>
       <p:ext uri="{BB962C8B-B14F-4D97-AF65-F5344CB8AC3E}">
-        <p14:creationId xmlns:p14="http://schemas.microsoft.com/office/powerpoint/2010/main" val="2789813802"/>
+        <p14:creationId xmlns:p14="http://schemas.microsoft.com/office/powerpoint/2010/main" val="3182110801"/>
+      </p:ext>
+    </p:extLst>
+  </p:cSld>
+  <p:clrMapOvr>
+    <a:masterClrMapping/>
+  </p:clrMapOvr>
+</p:notes>
+</file>
+
+<file path=ppt/notesSlides/notesSlide19.xml><?xml version="1.0" encoding="utf-8"?>
+<p:notes xmlns:a="http://schemas.openxmlformats.org/drawingml/2006/main" xmlns:r="http://schemas.openxmlformats.org/officeDocument/2006/relationships" xmlns:p="http://schemas.openxmlformats.org/presentationml/2006/main">
+  <p:cSld>
+    <p:spTree>
+      <p:nvGrpSpPr>
+        <p:cNvPr id="1" name=""/>
+        <p:cNvGrpSpPr/>
+        <p:nvPr/>
+      </p:nvGrpSpPr>
+      <p:grpSpPr>
+        <a:xfrm>
+          <a:off x="0" y="0"/>
+          <a:ext cx="0" cy="0"/>
+          <a:chOff x="0" y="0"/>
+          <a:chExt cx="0" cy="0"/>
+        </a:xfrm>
+      </p:grpSpPr>
+      <p:sp>
+        <p:nvSpPr>
+          <p:cNvPr id="2" name="Slide Image Placeholder 1"/>
+          <p:cNvSpPr>
+            <a:spLocks noGrp="1" noRot="1" noChangeAspect="1"/>
+          </p:cNvSpPr>
+          <p:nvPr>
+            <p:ph type="sldImg"/>
+          </p:nvPr>
+        </p:nvSpPr>
+        <p:spPr/>
+      </p:sp>
+      <p:sp>
+        <p:nvSpPr>
+          <p:cNvPr id="3" name="Notes Placeholder 2"/>
+          <p:cNvSpPr>
+            <a:spLocks noGrp="1"/>
+          </p:cNvSpPr>
+          <p:nvPr>
+            <p:ph type="body" idx="1"/>
+          </p:nvPr>
+        </p:nvSpPr>
+        <p:spPr/>
+        <p:txBody>
+          <a:bodyPr/>
+          <a:lstStyle/>
+          <a:p>
+            <a:endParaRPr lang="en-US"/>
+          </a:p>
+        </p:txBody>
+      </p:sp>
+      <p:sp>
+        <p:nvSpPr>
+          <p:cNvPr id="4" name="Slide Number Placeholder 3"/>
+          <p:cNvSpPr>
+            <a:spLocks noGrp="1"/>
+          </p:cNvSpPr>
+          <p:nvPr>
+            <p:ph type="sldNum" sz="quarter" idx="10"/>
+          </p:nvPr>
+        </p:nvSpPr>
+        <p:spPr/>
+        <p:txBody>
+          <a:bodyPr/>
+          <a:lstStyle/>
+          <a:p>
+            <a:fld id="{4E0E9D85-81CD-44C8-8F15-3AA06C34AF8C}" type="slidenum">
+              <a:rPr lang="en-US" smtClean="0"/>
+              <a:t>19</a:t>
+            </a:fld>
+            <a:endParaRPr lang="en-US"/>
+          </a:p>
+        </p:txBody>
+      </p:sp>
+    </p:spTree>
+    <p:extLst>
+      <p:ext uri="{BB962C8B-B14F-4D97-AF65-F5344CB8AC3E}">
+        <p14:creationId xmlns:p14="http://schemas.microsoft.com/office/powerpoint/2010/main" val="384814357"/>
       </p:ext>
     </p:extLst>
   </p:cSld>
@@ -1423,6 +1512,342 @@
     <p:extLst>
       <p:ext uri="{BB962C8B-B14F-4D97-AF65-F5344CB8AC3E}">
         <p14:creationId xmlns:p14="http://schemas.microsoft.com/office/powerpoint/2010/main" val="4195196041"/>
+      </p:ext>
+    </p:extLst>
+  </p:cSld>
+  <p:clrMapOvr>
+    <a:masterClrMapping/>
+  </p:clrMapOvr>
+</p:notes>
+</file>
+
+<file path=ppt/notesSlides/notesSlide20.xml><?xml version="1.0" encoding="utf-8"?>
+<p:notes xmlns:a="http://schemas.openxmlformats.org/drawingml/2006/main" xmlns:r="http://schemas.openxmlformats.org/officeDocument/2006/relationships" xmlns:p="http://schemas.openxmlformats.org/presentationml/2006/main">
+  <p:cSld>
+    <p:spTree>
+      <p:nvGrpSpPr>
+        <p:cNvPr id="1" name=""/>
+        <p:cNvGrpSpPr/>
+        <p:nvPr/>
+      </p:nvGrpSpPr>
+      <p:grpSpPr>
+        <a:xfrm>
+          <a:off x="0" y="0"/>
+          <a:ext cx="0" cy="0"/>
+          <a:chOff x="0" y="0"/>
+          <a:chExt cx="0" cy="0"/>
+        </a:xfrm>
+      </p:grpSpPr>
+      <p:sp>
+        <p:nvSpPr>
+          <p:cNvPr id="2" name="Slide Image Placeholder 1"/>
+          <p:cNvSpPr>
+            <a:spLocks noGrp="1" noRot="1" noChangeAspect="1"/>
+          </p:cNvSpPr>
+          <p:nvPr>
+            <p:ph type="sldImg"/>
+          </p:nvPr>
+        </p:nvSpPr>
+        <p:spPr/>
+      </p:sp>
+      <p:sp>
+        <p:nvSpPr>
+          <p:cNvPr id="3" name="Notes Placeholder 2"/>
+          <p:cNvSpPr>
+            <a:spLocks noGrp="1"/>
+          </p:cNvSpPr>
+          <p:nvPr>
+            <p:ph type="body" idx="1"/>
+          </p:nvPr>
+        </p:nvSpPr>
+        <p:spPr/>
+        <p:txBody>
+          <a:bodyPr/>
+          <a:lstStyle/>
+          <a:p>
+            <a:endParaRPr lang="en-US"/>
+          </a:p>
+        </p:txBody>
+      </p:sp>
+      <p:sp>
+        <p:nvSpPr>
+          <p:cNvPr id="4" name="Slide Number Placeholder 3"/>
+          <p:cNvSpPr>
+            <a:spLocks noGrp="1"/>
+          </p:cNvSpPr>
+          <p:nvPr>
+            <p:ph type="sldNum" sz="quarter" idx="10"/>
+          </p:nvPr>
+        </p:nvSpPr>
+        <p:spPr/>
+        <p:txBody>
+          <a:bodyPr/>
+          <a:lstStyle/>
+          <a:p>
+            <a:fld id="{4E0E9D85-81CD-44C8-8F15-3AA06C34AF8C}" type="slidenum">
+              <a:rPr lang="en-US" smtClean="0"/>
+              <a:t>20</a:t>
+            </a:fld>
+            <a:endParaRPr lang="en-US"/>
+          </a:p>
+        </p:txBody>
+      </p:sp>
+    </p:spTree>
+    <p:extLst>
+      <p:ext uri="{BB962C8B-B14F-4D97-AF65-F5344CB8AC3E}">
+        <p14:creationId xmlns:p14="http://schemas.microsoft.com/office/powerpoint/2010/main" val="2620879761"/>
+      </p:ext>
+    </p:extLst>
+  </p:cSld>
+  <p:clrMapOvr>
+    <a:masterClrMapping/>
+  </p:clrMapOvr>
+</p:notes>
+</file>
+
+<file path=ppt/notesSlides/notesSlide21.xml><?xml version="1.0" encoding="utf-8"?>
+<p:notes xmlns:a="http://schemas.openxmlformats.org/drawingml/2006/main" xmlns:r="http://schemas.openxmlformats.org/officeDocument/2006/relationships" xmlns:p="http://schemas.openxmlformats.org/presentationml/2006/main">
+  <p:cSld>
+    <p:spTree>
+      <p:nvGrpSpPr>
+        <p:cNvPr id="1" name=""/>
+        <p:cNvGrpSpPr/>
+        <p:nvPr/>
+      </p:nvGrpSpPr>
+      <p:grpSpPr>
+        <a:xfrm>
+          <a:off x="0" y="0"/>
+          <a:ext cx="0" cy="0"/>
+          <a:chOff x="0" y="0"/>
+          <a:chExt cx="0" cy="0"/>
+        </a:xfrm>
+      </p:grpSpPr>
+      <p:sp>
+        <p:nvSpPr>
+          <p:cNvPr id="2" name="Slide Image Placeholder 1"/>
+          <p:cNvSpPr>
+            <a:spLocks noGrp="1" noRot="1" noChangeAspect="1"/>
+          </p:cNvSpPr>
+          <p:nvPr>
+            <p:ph type="sldImg"/>
+          </p:nvPr>
+        </p:nvSpPr>
+        <p:spPr/>
+      </p:sp>
+      <p:sp>
+        <p:nvSpPr>
+          <p:cNvPr id="3" name="Notes Placeholder 2"/>
+          <p:cNvSpPr>
+            <a:spLocks noGrp="1"/>
+          </p:cNvSpPr>
+          <p:nvPr>
+            <p:ph type="body" idx="1"/>
+          </p:nvPr>
+        </p:nvSpPr>
+        <p:spPr/>
+        <p:txBody>
+          <a:bodyPr/>
+          <a:lstStyle/>
+          <a:p>
+            <a:endParaRPr lang="en-US"/>
+          </a:p>
+        </p:txBody>
+      </p:sp>
+      <p:sp>
+        <p:nvSpPr>
+          <p:cNvPr id="4" name="Slide Number Placeholder 3"/>
+          <p:cNvSpPr>
+            <a:spLocks noGrp="1"/>
+          </p:cNvSpPr>
+          <p:nvPr>
+            <p:ph type="sldNum" sz="quarter" idx="10"/>
+          </p:nvPr>
+        </p:nvSpPr>
+        <p:spPr/>
+        <p:txBody>
+          <a:bodyPr/>
+          <a:lstStyle/>
+          <a:p>
+            <a:fld id="{4E0E9D85-81CD-44C8-8F15-3AA06C34AF8C}" type="slidenum">
+              <a:rPr lang="en-US" smtClean="0"/>
+              <a:t>21</a:t>
+            </a:fld>
+            <a:endParaRPr lang="en-US"/>
+          </a:p>
+        </p:txBody>
+      </p:sp>
+    </p:spTree>
+    <p:extLst>
+      <p:ext uri="{BB962C8B-B14F-4D97-AF65-F5344CB8AC3E}">
+        <p14:creationId xmlns:p14="http://schemas.microsoft.com/office/powerpoint/2010/main" val="2375859216"/>
+      </p:ext>
+    </p:extLst>
+  </p:cSld>
+  <p:clrMapOvr>
+    <a:masterClrMapping/>
+  </p:clrMapOvr>
+</p:notes>
+</file>
+
+<file path=ppt/notesSlides/notesSlide22.xml><?xml version="1.0" encoding="utf-8"?>
+<p:notes xmlns:a="http://schemas.openxmlformats.org/drawingml/2006/main" xmlns:r="http://schemas.openxmlformats.org/officeDocument/2006/relationships" xmlns:p="http://schemas.openxmlformats.org/presentationml/2006/main">
+  <p:cSld>
+    <p:spTree>
+      <p:nvGrpSpPr>
+        <p:cNvPr id="1" name=""/>
+        <p:cNvGrpSpPr/>
+        <p:nvPr/>
+      </p:nvGrpSpPr>
+      <p:grpSpPr>
+        <a:xfrm>
+          <a:off x="0" y="0"/>
+          <a:ext cx="0" cy="0"/>
+          <a:chOff x="0" y="0"/>
+          <a:chExt cx="0" cy="0"/>
+        </a:xfrm>
+      </p:grpSpPr>
+      <p:sp>
+        <p:nvSpPr>
+          <p:cNvPr id="2" name="Slide Image Placeholder 1"/>
+          <p:cNvSpPr>
+            <a:spLocks noGrp="1" noRot="1" noChangeAspect="1"/>
+          </p:cNvSpPr>
+          <p:nvPr>
+            <p:ph type="sldImg"/>
+          </p:nvPr>
+        </p:nvSpPr>
+        <p:spPr/>
+      </p:sp>
+      <p:sp>
+        <p:nvSpPr>
+          <p:cNvPr id="3" name="Notes Placeholder 2"/>
+          <p:cNvSpPr>
+            <a:spLocks noGrp="1"/>
+          </p:cNvSpPr>
+          <p:nvPr>
+            <p:ph type="body" idx="1"/>
+          </p:nvPr>
+        </p:nvSpPr>
+        <p:spPr/>
+        <p:txBody>
+          <a:bodyPr/>
+          <a:lstStyle/>
+          <a:p>
+            <a:endParaRPr lang="en-US"/>
+          </a:p>
+        </p:txBody>
+      </p:sp>
+      <p:sp>
+        <p:nvSpPr>
+          <p:cNvPr id="4" name="Slide Number Placeholder 3"/>
+          <p:cNvSpPr>
+            <a:spLocks noGrp="1"/>
+          </p:cNvSpPr>
+          <p:nvPr>
+            <p:ph type="sldNum" sz="quarter" idx="10"/>
+          </p:nvPr>
+        </p:nvSpPr>
+        <p:spPr/>
+        <p:txBody>
+          <a:bodyPr/>
+          <a:lstStyle/>
+          <a:p>
+            <a:fld id="{4E0E9D85-81CD-44C8-8F15-3AA06C34AF8C}" type="slidenum">
+              <a:rPr lang="en-US" smtClean="0"/>
+              <a:t>22</a:t>
+            </a:fld>
+            <a:endParaRPr lang="en-US"/>
+          </a:p>
+        </p:txBody>
+      </p:sp>
+    </p:spTree>
+    <p:extLst>
+      <p:ext uri="{BB962C8B-B14F-4D97-AF65-F5344CB8AC3E}">
+        <p14:creationId xmlns:p14="http://schemas.microsoft.com/office/powerpoint/2010/main" val="2480711367"/>
+      </p:ext>
+    </p:extLst>
+  </p:cSld>
+  <p:clrMapOvr>
+    <a:masterClrMapping/>
+  </p:clrMapOvr>
+</p:notes>
+</file>
+
+<file path=ppt/notesSlides/notesSlide23.xml><?xml version="1.0" encoding="utf-8"?>
+<p:notes xmlns:a="http://schemas.openxmlformats.org/drawingml/2006/main" xmlns:r="http://schemas.openxmlformats.org/officeDocument/2006/relationships" xmlns:p="http://schemas.openxmlformats.org/presentationml/2006/main">
+  <p:cSld>
+    <p:spTree>
+      <p:nvGrpSpPr>
+        <p:cNvPr id="1" name=""/>
+        <p:cNvGrpSpPr/>
+        <p:nvPr/>
+      </p:nvGrpSpPr>
+      <p:grpSpPr>
+        <a:xfrm>
+          <a:off x="0" y="0"/>
+          <a:ext cx="0" cy="0"/>
+          <a:chOff x="0" y="0"/>
+          <a:chExt cx="0" cy="0"/>
+        </a:xfrm>
+      </p:grpSpPr>
+      <p:sp>
+        <p:nvSpPr>
+          <p:cNvPr id="2" name="Slide Image Placeholder 1"/>
+          <p:cNvSpPr>
+            <a:spLocks noGrp="1" noRot="1" noChangeAspect="1"/>
+          </p:cNvSpPr>
+          <p:nvPr>
+            <p:ph type="sldImg"/>
+          </p:nvPr>
+        </p:nvSpPr>
+        <p:spPr/>
+      </p:sp>
+      <p:sp>
+        <p:nvSpPr>
+          <p:cNvPr id="3" name="Notes Placeholder 2"/>
+          <p:cNvSpPr>
+            <a:spLocks noGrp="1"/>
+          </p:cNvSpPr>
+          <p:nvPr>
+            <p:ph type="body" idx="1"/>
+          </p:nvPr>
+        </p:nvSpPr>
+        <p:spPr/>
+        <p:txBody>
+          <a:bodyPr/>
+          <a:lstStyle/>
+          <a:p>
+            <a:endParaRPr lang="en-US"/>
+          </a:p>
+        </p:txBody>
+      </p:sp>
+      <p:sp>
+        <p:nvSpPr>
+          <p:cNvPr id="4" name="Slide Number Placeholder 3"/>
+          <p:cNvSpPr>
+            <a:spLocks noGrp="1"/>
+          </p:cNvSpPr>
+          <p:nvPr>
+            <p:ph type="sldNum" sz="quarter" idx="10"/>
+          </p:nvPr>
+        </p:nvSpPr>
+        <p:spPr/>
+        <p:txBody>
+          <a:bodyPr/>
+          <a:lstStyle/>
+          <a:p>
+            <a:fld id="{4E0E9D85-81CD-44C8-8F15-3AA06C34AF8C}" type="slidenum">
+              <a:rPr lang="en-US" smtClean="0"/>
+              <a:t>23</a:t>
+            </a:fld>
+            <a:endParaRPr lang="en-US"/>
+          </a:p>
+        </p:txBody>
+      </p:sp>
+    </p:spTree>
+    <p:extLst>
+      <p:ext uri="{BB962C8B-B14F-4D97-AF65-F5344CB8AC3E}">
+        <p14:creationId xmlns:p14="http://schemas.microsoft.com/office/powerpoint/2010/main" val="1943231743"/>
       </p:ext>
     </p:extLst>
   </p:cSld>
@@ -5452,6 +5877,1351 @@
           <a:chExt cx="0" cy="0"/>
         </a:xfrm>
       </p:grpSpPr>
+      <p:sp>
+        <p:nvSpPr>
+          <p:cNvPr id="2" name="Title 1"/>
+          <p:cNvSpPr>
+            <a:spLocks noGrp="1"/>
+          </p:cNvSpPr>
+          <p:nvPr>
+            <p:ph type="title"/>
+          </p:nvPr>
+        </p:nvSpPr>
+        <p:spPr>
+          <a:xfrm>
+            <a:off x="0" y="6946"/>
+            <a:ext cx="9144000" cy="589085"/>
+          </a:xfrm>
+        </p:spPr>
+        <p:txBody>
+          <a:bodyPr>
+            <a:normAutofit/>
+          </a:bodyPr>
+          <a:lstStyle/>
+          <a:p>
+            <a:r>
+              <a:rPr lang="en-US" dirty="0"/>
+              <a:t>What do containers do?    How are they used?</a:t>
+            </a:r>
+            <a:endParaRPr lang="en-US" b="0" dirty="0"/>
+          </a:p>
+        </p:txBody>
+      </p:sp>
+      <p:sp>
+        <p:nvSpPr>
+          <p:cNvPr id="3" name="Content Placeholder 2"/>
+          <p:cNvSpPr>
+            <a:spLocks noGrp="1"/>
+          </p:cNvSpPr>
+          <p:nvPr>
+            <p:ph idx="1"/>
+          </p:nvPr>
+        </p:nvSpPr>
+        <p:spPr>
+          <a:xfrm>
+            <a:off x="476250" y="596032"/>
+            <a:ext cx="8191500" cy="5447718"/>
+          </a:xfrm>
+        </p:spPr>
+        <p:txBody>
+          <a:bodyPr>
+            <a:normAutofit/>
+          </a:bodyPr>
+          <a:lstStyle/>
+          <a:p>
+            <a:r>
+              <a:rPr lang="en-US" dirty="0"/>
+              <a:t>Application containers provide OS-level virtualization</a:t>
+            </a:r>
+          </a:p>
+          <a:p>
+            <a:pPr lvl="1"/>
+            <a:r>
+              <a:rPr lang="en-US" dirty="0"/>
+              <a:t>deploy and run distributed applications</a:t>
+            </a:r>
+          </a:p>
+          <a:p>
+            <a:pPr lvl="2"/>
+            <a:r>
+              <a:rPr lang="en-US" dirty="0"/>
+              <a:t>most use cases involve small, serial apps and very short run-times</a:t>
+            </a:r>
+          </a:p>
+          <a:p>
+            <a:pPr lvl="2"/>
+            <a:r>
+              <a:rPr lang="en-US" dirty="0"/>
+              <a:t>no need for an entire virtual machine (VM) for each app</a:t>
+            </a:r>
+          </a:p>
+          <a:p>
+            <a:r>
+              <a:rPr lang="en-US" dirty="0"/>
+              <a:t>Multiple isolated applications or services run on a single host</a:t>
+            </a:r>
+          </a:p>
+          <a:p>
+            <a:pPr lvl="1"/>
+            <a:r>
+              <a:rPr lang="en-US" dirty="0"/>
+              <a:t>each accesses the same OS kernel</a:t>
+            </a:r>
+          </a:p>
+          <a:p>
+            <a:pPr lvl="1"/>
+            <a:r>
+              <a:rPr lang="en-US" dirty="0"/>
+              <a:t>multiple containers compete for available resources</a:t>
+            </a:r>
+          </a:p>
+          <a:p>
+            <a:r>
+              <a:rPr lang="en-US" dirty="0"/>
+              <a:t>Containers can be deployed on any computer system</a:t>
+            </a:r>
+          </a:p>
+          <a:p>
+            <a:pPr lvl="1"/>
+            <a:r>
+              <a:rPr lang="en-US" dirty="0"/>
+              <a:t>bare-metal;  cloud instances;  virtual machines</a:t>
+            </a:r>
+          </a:p>
+          <a:p>
+            <a:r>
+              <a:rPr lang="en-US" dirty="0"/>
+              <a:t>Containers are available on every OS</a:t>
+            </a:r>
+          </a:p>
+          <a:p>
+            <a:pPr lvl="1"/>
+            <a:r>
+              <a:rPr lang="en-US" dirty="0"/>
+              <a:t>multiple flavors of Linux, with essentially no run-time overhead</a:t>
+            </a:r>
+          </a:p>
+          <a:p>
+            <a:pPr lvl="1"/>
+            <a:r>
+              <a:rPr lang="en-US" dirty="0"/>
+              <a:t>MacOS and Windows (limited, with some computational overhead)</a:t>
+            </a:r>
+          </a:p>
+          <a:p>
+            <a:pPr lvl="2"/>
+            <a:endParaRPr lang="en-US" dirty="0"/>
+          </a:p>
+          <a:p>
+            <a:r>
+              <a:rPr lang="en-US" dirty="0"/>
+              <a:t>HPC presents a fundamentally different use case</a:t>
+            </a:r>
+          </a:p>
+          <a:p>
+            <a:pPr lvl="1"/>
+            <a:r>
+              <a:rPr lang="en-US" dirty="0"/>
+              <a:t>large apps:  physics code, dependencies, viz &amp; post-processing tools...</a:t>
+            </a:r>
+          </a:p>
+          <a:p>
+            <a:pPr lvl="1"/>
+            <a:r>
+              <a:rPr lang="en-US" dirty="0"/>
+              <a:t>highly variable run-times (seconds to days) on multiple processors</a:t>
+            </a:r>
+          </a:p>
+          <a:p>
+            <a:pPr lvl="1"/>
+            <a:r>
+              <a:rPr lang="en-US" dirty="0"/>
+              <a:t>data generation</a:t>
+            </a:r>
+          </a:p>
+          <a:p>
+            <a:pPr lvl="2"/>
+            <a:r>
+              <a:rPr lang="en-US" dirty="0"/>
+              <a:t>subdirs can be mounted to write files outside of the container</a:t>
+            </a:r>
+          </a:p>
+          <a:p>
+            <a:pPr lvl="1"/>
+            <a:endParaRPr lang="en-US" dirty="0"/>
+          </a:p>
+        </p:txBody>
+      </p:sp>
+    </p:spTree>
+    <p:extLst>
+      <p:ext uri="{BB962C8B-B14F-4D97-AF65-F5344CB8AC3E}">
+        <p14:creationId xmlns:p14="http://schemas.microsoft.com/office/powerpoint/2010/main" val="1140441989"/>
+      </p:ext>
+    </p:extLst>
+  </p:cSld>
+  <p:clrMapOvr>
+    <a:masterClrMapping/>
+  </p:clrMapOvr>
+</p:sld>
+</file>
+
+<file path=ppt/slides/slide15.xml><?xml version="1.0" encoding="utf-8"?>
+<p:sld xmlns:a="http://schemas.openxmlformats.org/drawingml/2006/main" xmlns:r="http://schemas.openxmlformats.org/officeDocument/2006/relationships" xmlns:p="http://schemas.openxmlformats.org/presentationml/2006/main">
+  <p:cSld>
+    <p:spTree>
+      <p:nvGrpSpPr>
+        <p:cNvPr id="1" name=""/>
+        <p:cNvGrpSpPr/>
+        <p:nvPr/>
+      </p:nvGrpSpPr>
+      <p:grpSpPr>
+        <a:xfrm>
+          <a:off x="0" y="0"/>
+          <a:ext cx="0" cy="0"/>
+          <a:chOff x="0" y="0"/>
+          <a:chExt cx="0" cy="0"/>
+        </a:xfrm>
+      </p:grpSpPr>
+      <p:sp>
+        <p:nvSpPr>
+          <p:cNvPr id="2" name="Title 1"/>
+          <p:cNvSpPr>
+            <a:spLocks noGrp="1"/>
+          </p:cNvSpPr>
+          <p:nvPr>
+            <p:ph type="title"/>
+          </p:nvPr>
+        </p:nvSpPr>
+        <p:spPr>
+          <a:xfrm>
+            <a:off x="0" y="6946"/>
+            <a:ext cx="9144000" cy="589085"/>
+          </a:xfrm>
+        </p:spPr>
+        <p:txBody>
+          <a:bodyPr>
+            <a:normAutofit/>
+          </a:bodyPr>
+          <a:lstStyle/>
+          <a:p>
+            <a:r>
+              <a:rPr lang="en-US" dirty="0"/>
+              <a:t>Partial History of Containerization</a:t>
+            </a:r>
+            <a:endParaRPr lang="en-US" b="0" dirty="0"/>
+          </a:p>
+        </p:txBody>
+      </p:sp>
+      <p:sp>
+        <p:nvSpPr>
+          <p:cNvPr id="3" name="Content Placeholder 2"/>
+          <p:cNvSpPr>
+            <a:spLocks noGrp="1"/>
+          </p:cNvSpPr>
+          <p:nvPr>
+            <p:ph idx="1"/>
+          </p:nvPr>
+        </p:nvSpPr>
+        <p:spPr>
+          <a:xfrm>
+            <a:off x="476250" y="596032"/>
+            <a:ext cx="8191500" cy="5447718"/>
+          </a:xfrm>
+        </p:spPr>
+        <p:txBody>
+          <a:bodyPr>
+            <a:normAutofit lnSpcReduction="10000"/>
+          </a:bodyPr>
+          <a:lstStyle/>
+          <a:p>
+            <a:r>
+              <a:rPr lang="en-US" dirty="0"/>
+              <a:t>1979:  the </a:t>
+            </a:r>
+            <a:r>
+              <a:rPr lang="en-US" dirty="0">
+                <a:latin typeface="Courier New" panose="02070309020205020404" pitchFamily="49" charset="0"/>
+                <a:cs typeface="Courier New" panose="02070309020205020404" pitchFamily="49" charset="0"/>
+              </a:rPr>
+              <a:t>chroot</a:t>
+            </a:r>
+            <a:r>
+              <a:rPr lang="en-US" dirty="0"/>
+              <a:t> system call is added to Unix V7     </a:t>
+            </a:r>
+          </a:p>
+          <a:p>
+            <a:pPr lvl="1"/>
+            <a:r>
+              <a:rPr lang="en-US" dirty="0"/>
+              <a:t>changes root directory of a process and its children</a:t>
+            </a:r>
+          </a:p>
+          <a:p>
+            <a:pPr lvl="1"/>
+            <a:r>
+              <a:rPr lang="en-US" dirty="0"/>
+              <a:t>the beginning of process isolation:</a:t>
+            </a:r>
+          </a:p>
+          <a:p>
+            <a:pPr lvl="2"/>
+            <a:r>
+              <a:rPr lang="en-US" dirty="0"/>
+              <a:t>segregating file access for each process</a:t>
+            </a:r>
+          </a:p>
+          <a:p>
+            <a:pPr lvl="1"/>
+            <a:r>
+              <a:rPr lang="en-US" dirty="0">
+                <a:solidFill>
+                  <a:schemeClr val="tx1"/>
+                </a:solidFill>
+                <a:latin typeface="Courier New" panose="02070309020205020404" pitchFamily="49" charset="0"/>
+                <a:cs typeface="Courier New" panose="02070309020205020404" pitchFamily="49" charset="0"/>
+              </a:rPr>
+              <a:t>chroot</a:t>
+            </a:r>
+            <a:r>
+              <a:rPr lang="en-US" dirty="0"/>
+              <a:t> was added to BSD in 1982</a:t>
+            </a:r>
+          </a:p>
+          <a:p>
+            <a:r>
+              <a:rPr lang="en-US" dirty="0"/>
+              <a:t>2006:  process containers (Google)</a:t>
+            </a:r>
+          </a:p>
+          <a:p>
+            <a:pPr lvl="1"/>
+            <a:r>
+              <a:rPr lang="en-US" dirty="0"/>
+              <a:t>limits and isolates resource usage of a collection of processes</a:t>
+            </a:r>
+          </a:p>
+          <a:p>
+            <a:pPr lvl="1"/>
+            <a:r>
+              <a:rPr lang="en-US" dirty="0"/>
+              <a:t>renamed “Control Groups” or </a:t>
+            </a:r>
+            <a:r>
+              <a:rPr lang="en-US" dirty="0">
+                <a:solidFill>
+                  <a:schemeClr val="tx1"/>
+                </a:solidFill>
+                <a:latin typeface="Courier New" panose="02070309020205020404" pitchFamily="49" charset="0"/>
+                <a:cs typeface="Courier New" panose="02070309020205020404" pitchFamily="49" charset="0"/>
+              </a:rPr>
+              <a:t>cgroups</a:t>
+            </a:r>
+            <a:r>
+              <a:rPr lang="en-US" dirty="0"/>
+              <a:t> in 2007</a:t>
+            </a:r>
+          </a:p>
+          <a:p>
+            <a:pPr lvl="1"/>
+            <a:r>
+              <a:rPr lang="en-US" dirty="0"/>
+              <a:t>merged into Linux kernel 2.6.24</a:t>
+            </a:r>
+          </a:p>
+          <a:p>
+            <a:r>
+              <a:rPr lang="en-US" dirty="0"/>
+              <a:t>2008:  LXC (LinuX Containers) </a:t>
+            </a:r>
+          </a:p>
+          <a:p>
+            <a:pPr lvl="1"/>
+            <a:r>
+              <a:rPr lang="en-US" dirty="0"/>
+              <a:t>first, most complete implementation of a Linux container manager</a:t>
+            </a:r>
+          </a:p>
+          <a:p>
+            <a:pPr lvl="1"/>
+            <a:r>
+              <a:rPr lang="en-US" dirty="0"/>
+              <a:t>uses </a:t>
+            </a:r>
+            <a:r>
+              <a:rPr lang="en-US" dirty="0">
+                <a:solidFill>
+                  <a:schemeClr val="tx1"/>
+                </a:solidFill>
+                <a:latin typeface="Courier New" panose="02070309020205020404" pitchFamily="49" charset="0"/>
+                <a:cs typeface="Courier New" panose="02070309020205020404" pitchFamily="49" charset="0"/>
+              </a:rPr>
+              <a:t>cgroups</a:t>
+            </a:r>
+            <a:r>
+              <a:rPr lang="en-US" dirty="0"/>
+              <a:t> and Linux namespaces</a:t>
+            </a:r>
+          </a:p>
+          <a:p>
+            <a:pPr lvl="1"/>
+            <a:r>
+              <a:rPr lang="en-US" dirty="0"/>
+              <a:t>works on a single Linux kernel with no patches</a:t>
+            </a:r>
+          </a:p>
+          <a:p>
+            <a:r>
+              <a:rPr lang="en-US" dirty="0"/>
+              <a:t>2013:  Docker</a:t>
+            </a:r>
+          </a:p>
+          <a:p>
+            <a:pPr lvl="1"/>
+            <a:r>
+              <a:rPr lang="en-US" dirty="0"/>
+              <a:t>used LXC originally, but now uses its own </a:t>
+            </a:r>
+            <a:r>
+              <a:rPr lang="en-US" dirty="0">
+                <a:solidFill>
+                  <a:schemeClr val="tx1"/>
+                </a:solidFill>
+                <a:latin typeface="Courier New" panose="02070309020205020404" pitchFamily="49" charset="0"/>
+                <a:cs typeface="Courier New" panose="02070309020205020404" pitchFamily="49" charset="0"/>
+              </a:rPr>
+              <a:t>libcontainer</a:t>
+            </a:r>
+            <a:endParaRPr lang="en-US" dirty="0"/>
+          </a:p>
+          <a:p>
+            <a:pPr lvl="1"/>
+            <a:r>
+              <a:rPr lang="en-US" dirty="0"/>
+              <a:t>offers an entire ecosystem for container management</a:t>
+            </a:r>
+          </a:p>
+          <a:p>
+            <a:pPr lvl="2"/>
+            <a:r>
+              <a:rPr lang="en-US" dirty="0"/>
+              <a:t>resulted in widespread adoption of containerization</a:t>
+            </a:r>
+          </a:p>
+          <a:p>
+            <a:pPr lvl="2"/>
+            <a:r>
+              <a:rPr lang="en-US" dirty="0"/>
+              <a:t>developers can create and run application containers quickly</a:t>
+            </a:r>
+          </a:p>
+          <a:p>
+            <a:pPr lvl="1"/>
+            <a:r>
+              <a:rPr lang="en-US" dirty="0"/>
+              <a:t>DockerHub enables rapid distribution of containers</a:t>
+            </a:r>
+          </a:p>
+        </p:txBody>
+      </p:sp>
+      <p:sp>
+        <p:nvSpPr>
+          <p:cNvPr id="4" name="TextBox 3">
+            <a:extLst>
+              <a:ext uri="{FF2B5EF4-FFF2-40B4-BE49-F238E27FC236}">
+                <a16:creationId xmlns:a16="http://schemas.microsoft.com/office/drawing/2014/main" id="{FE4820D9-EBD7-4753-BD2A-404C67F2A4D8}"/>
+              </a:ext>
+            </a:extLst>
+          </p:cNvPr>
+          <p:cNvSpPr txBox="1"/>
+          <p:nvPr/>
+        </p:nvSpPr>
+        <p:spPr>
+          <a:xfrm>
+            <a:off x="3980125" y="5861254"/>
+            <a:ext cx="5163875" cy="523220"/>
+          </a:xfrm>
+          <a:prstGeom prst="rect">
+            <a:avLst/>
+          </a:prstGeom>
+          <a:noFill/>
+        </p:spPr>
+        <p:txBody>
+          <a:bodyPr wrap="square" rtlCol="0">
+            <a:spAutoFit/>
+          </a:bodyPr>
+          <a:lstStyle/>
+          <a:p>
+            <a:pPr marL="227013" indent="-227013"/>
+            <a:r>
+              <a:rPr lang="en-US" sz="1400" dirty="0">
+                <a:latin typeface="Times New Roman" panose="02020603050405020304" pitchFamily="18" charset="0"/>
+                <a:cs typeface="Times New Roman" panose="02020603050405020304" pitchFamily="18" charset="0"/>
+              </a:rPr>
+              <a:t>Material taken from R. Osnat (2016), </a:t>
+            </a:r>
+            <a:r>
+              <a:rPr lang="en-US" sz="1400" dirty="0">
+                <a:latin typeface="Times New Roman" panose="02020603050405020304" pitchFamily="18" charset="0"/>
+                <a:cs typeface="Times New Roman" panose="02020603050405020304" pitchFamily="18" charset="0"/>
+                <a:hlinkClick r:id="rId3"/>
+              </a:rPr>
+              <a:t>https://blog.aquasec.com/a-brief-history-of-containers-from-1970s-chroot-to-docker-2016</a:t>
+            </a:r>
+            <a:r>
+              <a:rPr lang="en-US" sz="1400" dirty="0">
+                <a:latin typeface="Times New Roman" panose="02020603050405020304" pitchFamily="18" charset="0"/>
+                <a:cs typeface="Times New Roman" panose="02020603050405020304" pitchFamily="18" charset="0"/>
+              </a:rPr>
+              <a:t> </a:t>
+            </a:r>
+          </a:p>
+        </p:txBody>
+      </p:sp>
+    </p:spTree>
+    <p:extLst>
+      <p:ext uri="{BB962C8B-B14F-4D97-AF65-F5344CB8AC3E}">
+        <p14:creationId xmlns:p14="http://schemas.microsoft.com/office/powerpoint/2010/main" val="3112759213"/>
+      </p:ext>
+    </p:extLst>
+  </p:cSld>
+  <p:clrMapOvr>
+    <a:masterClrMapping/>
+  </p:clrMapOvr>
+</p:sld>
+</file>
+
+<file path=ppt/slides/slide16.xml><?xml version="1.0" encoding="utf-8"?>
+<p:sld xmlns:a="http://schemas.openxmlformats.org/drawingml/2006/main" xmlns:r="http://schemas.openxmlformats.org/officeDocument/2006/relationships" xmlns:p="http://schemas.openxmlformats.org/presentationml/2006/main">
+  <p:cSld>
+    <p:spTree>
+      <p:nvGrpSpPr>
+        <p:cNvPr id="1" name=""/>
+        <p:cNvGrpSpPr/>
+        <p:nvPr/>
+      </p:nvGrpSpPr>
+      <p:grpSpPr>
+        <a:xfrm>
+          <a:off x="0" y="0"/>
+          <a:ext cx="0" cy="0"/>
+          <a:chOff x="0" y="0"/>
+          <a:chExt cx="0" cy="0"/>
+        </a:xfrm>
+      </p:grpSpPr>
+      <p:sp>
+        <p:nvSpPr>
+          <p:cNvPr id="2" name="Title 1"/>
+          <p:cNvSpPr>
+            <a:spLocks noGrp="1"/>
+          </p:cNvSpPr>
+          <p:nvPr>
+            <p:ph type="title"/>
+          </p:nvPr>
+        </p:nvSpPr>
+        <p:spPr>
+          <a:xfrm>
+            <a:off x="0" y="6946"/>
+            <a:ext cx="9144000" cy="589085"/>
+          </a:xfrm>
+        </p:spPr>
+        <p:txBody>
+          <a:bodyPr>
+            <a:normAutofit/>
+          </a:bodyPr>
+          <a:lstStyle/>
+          <a:p>
+            <a:r>
+              <a:rPr lang="en-US" dirty="0"/>
+              <a:t>Container vs. Virtual Machine (VM)</a:t>
+            </a:r>
+            <a:endParaRPr lang="en-US" b="0" i="0" dirty="0"/>
+          </a:p>
+        </p:txBody>
+      </p:sp>
+      <p:sp>
+        <p:nvSpPr>
+          <p:cNvPr id="3" name="Content Placeholder 2"/>
+          <p:cNvSpPr>
+            <a:spLocks noGrp="1"/>
+          </p:cNvSpPr>
+          <p:nvPr>
+            <p:ph idx="1"/>
+          </p:nvPr>
+        </p:nvSpPr>
+        <p:spPr>
+          <a:xfrm>
+            <a:off x="352185" y="745677"/>
+            <a:ext cx="8191500" cy="2072012"/>
+          </a:xfrm>
+        </p:spPr>
+        <p:txBody>
+          <a:bodyPr>
+            <a:normAutofit/>
+          </a:bodyPr>
+          <a:lstStyle/>
+          <a:p>
+            <a:r>
+              <a:rPr lang="en-US" dirty="0"/>
+              <a:t>Containers and VMs are similar in their goal: </a:t>
+            </a:r>
+          </a:p>
+          <a:p>
+            <a:pPr lvl="1"/>
+            <a:r>
+              <a:rPr lang="en-US" dirty="0"/>
+              <a:t>to isolate an application and its dependencies</a:t>
+            </a:r>
+          </a:p>
+          <a:p>
+            <a:pPr lvl="1"/>
+            <a:r>
+              <a:rPr lang="en-US" dirty="0"/>
+              <a:t>in a self-contained unit that can run anywhere</a:t>
+            </a:r>
+          </a:p>
+          <a:p>
+            <a:pPr lvl="1"/>
+            <a:endParaRPr lang="en-US" dirty="0"/>
+          </a:p>
+          <a:p>
+            <a:r>
+              <a:rPr lang="en-US" dirty="0"/>
+              <a:t>The differences are important</a:t>
+            </a:r>
+          </a:p>
+        </p:txBody>
+      </p:sp>
+      <p:pic>
+        <p:nvPicPr>
+          <p:cNvPr id="4" name="Picture 3">
+            <a:extLst>
+              <a:ext uri="{FF2B5EF4-FFF2-40B4-BE49-F238E27FC236}">
+                <a16:creationId xmlns:a16="http://schemas.microsoft.com/office/drawing/2014/main" id="{6A8E0E4A-675D-4335-B1B6-0B78D0B7ADC8}"/>
+              </a:ext>
+            </a:extLst>
+          </p:cNvPr>
+          <p:cNvPicPr>
+            <a:picLocks noChangeAspect="1"/>
+          </p:cNvPicPr>
+          <p:nvPr/>
+        </p:nvPicPr>
+        <p:blipFill>
+          <a:blip r:embed="rId3"/>
+          <a:stretch>
+            <a:fillRect/>
+          </a:stretch>
+        </p:blipFill>
+        <p:spPr>
+          <a:xfrm>
+            <a:off x="4650397" y="2071407"/>
+            <a:ext cx="4440934" cy="4736102"/>
+          </a:xfrm>
+          <a:prstGeom prst="rect">
+            <a:avLst/>
+          </a:prstGeom>
+        </p:spPr>
+      </p:pic>
+      <p:pic>
+        <p:nvPicPr>
+          <p:cNvPr id="5" name="Picture 4">
+            <a:extLst>
+              <a:ext uri="{FF2B5EF4-FFF2-40B4-BE49-F238E27FC236}">
+                <a16:creationId xmlns:a16="http://schemas.microsoft.com/office/drawing/2014/main" id="{94974CB9-5BFD-42F0-8E4B-A8ECDFDFF4D2}"/>
+              </a:ext>
+            </a:extLst>
+          </p:cNvPr>
+          <p:cNvPicPr>
+            <a:picLocks noChangeAspect="1"/>
+          </p:cNvPicPr>
+          <p:nvPr/>
+        </p:nvPicPr>
+        <p:blipFill>
+          <a:blip r:embed="rId4"/>
+          <a:stretch>
+            <a:fillRect/>
+          </a:stretch>
+        </p:blipFill>
+        <p:spPr>
+          <a:xfrm>
+            <a:off x="41382" y="3429000"/>
+            <a:ext cx="4696065" cy="3422054"/>
+          </a:xfrm>
+          <a:prstGeom prst="rect">
+            <a:avLst/>
+          </a:prstGeom>
+        </p:spPr>
+      </p:pic>
+      <p:sp>
+        <p:nvSpPr>
+          <p:cNvPr id="6" name="TextBox 5">
+            <a:extLst>
+              <a:ext uri="{FF2B5EF4-FFF2-40B4-BE49-F238E27FC236}">
+                <a16:creationId xmlns:a16="http://schemas.microsoft.com/office/drawing/2014/main" id="{61328A6C-5F57-4BFC-984C-4E43AA9106BF}"/>
+              </a:ext>
+            </a:extLst>
+          </p:cNvPr>
+          <p:cNvSpPr txBox="1"/>
+          <p:nvPr/>
+        </p:nvSpPr>
+        <p:spPr>
+          <a:xfrm>
+            <a:off x="41383" y="2817689"/>
+            <a:ext cx="4696065" cy="461665"/>
+          </a:xfrm>
+          <a:prstGeom prst="rect">
+            <a:avLst/>
+          </a:prstGeom>
+          <a:noFill/>
+        </p:spPr>
+        <p:txBody>
+          <a:bodyPr wrap="square" rtlCol="0">
+            <a:spAutoFit/>
+          </a:bodyPr>
+          <a:lstStyle/>
+          <a:p>
+            <a:r>
+              <a:rPr lang="en-US" sz="1200" dirty="0">
+                <a:latin typeface="Times New Roman" panose="02020603050405020304" pitchFamily="18" charset="0"/>
+                <a:cs typeface="Times New Roman" panose="02020603050405020304" pitchFamily="18" charset="0"/>
+              </a:rPr>
+              <a:t>Schematics taken from  </a:t>
+            </a:r>
+            <a:r>
+              <a:rPr lang="en-US" sz="1200" dirty="0">
+                <a:latin typeface="Times New Roman" panose="02020603050405020304" pitchFamily="18" charset="0"/>
+                <a:cs typeface="Times New Roman" panose="02020603050405020304" pitchFamily="18" charset="0"/>
+                <a:hlinkClick r:id="rId5"/>
+              </a:rPr>
+              <a:t>https://medium.freecodecamp.org/a-beginner-friendly-introduction-to-containers-vms-and-docker-79a9e3e119b</a:t>
+            </a:r>
+            <a:r>
+              <a:rPr lang="en-US" sz="1200" dirty="0">
+                <a:latin typeface="Times New Roman" panose="02020603050405020304" pitchFamily="18" charset="0"/>
+                <a:cs typeface="Times New Roman" panose="02020603050405020304" pitchFamily="18" charset="0"/>
+              </a:rPr>
+              <a:t> </a:t>
+            </a:r>
+          </a:p>
+        </p:txBody>
+      </p:sp>
+    </p:spTree>
+    <p:extLst>
+      <p:ext uri="{BB962C8B-B14F-4D97-AF65-F5344CB8AC3E}">
+        <p14:creationId xmlns:p14="http://schemas.microsoft.com/office/powerpoint/2010/main" val="3108475844"/>
+      </p:ext>
+    </p:extLst>
+  </p:cSld>
+  <p:clrMapOvr>
+    <a:masterClrMapping/>
+  </p:clrMapOvr>
+</p:sld>
+</file>
+
+<file path=ppt/slides/slide17.xml><?xml version="1.0" encoding="utf-8"?>
+<p:sld xmlns:a="http://schemas.openxmlformats.org/drawingml/2006/main" xmlns:r="http://schemas.openxmlformats.org/officeDocument/2006/relationships" xmlns:p="http://schemas.openxmlformats.org/presentationml/2006/main">
+  <p:cSld>
+    <p:spTree>
+      <p:nvGrpSpPr>
+        <p:cNvPr id="1" name=""/>
+        <p:cNvGrpSpPr/>
+        <p:nvPr/>
+      </p:nvGrpSpPr>
+      <p:grpSpPr>
+        <a:xfrm>
+          <a:off x="0" y="0"/>
+          <a:ext cx="0" cy="0"/>
+          <a:chOff x="0" y="0"/>
+          <a:chExt cx="0" cy="0"/>
+        </a:xfrm>
+      </p:grpSpPr>
+      <p:sp>
+        <p:nvSpPr>
+          <p:cNvPr id="2" name="Title 1"/>
+          <p:cNvSpPr>
+            <a:spLocks noGrp="1"/>
+          </p:cNvSpPr>
+          <p:nvPr>
+            <p:ph type="title"/>
+          </p:nvPr>
+        </p:nvSpPr>
+        <p:spPr>
+          <a:xfrm>
+            <a:off x="0" y="6946"/>
+            <a:ext cx="9144000" cy="589085"/>
+          </a:xfrm>
+        </p:spPr>
+        <p:txBody>
+          <a:bodyPr>
+            <a:normAutofit/>
+          </a:bodyPr>
+          <a:lstStyle/>
+          <a:p>
+            <a:r>
+              <a:rPr lang="en-US" dirty="0"/>
+              <a:t>Application Containers for Reproducibility</a:t>
+            </a:r>
+          </a:p>
+        </p:txBody>
+      </p:sp>
+      <p:sp>
+        <p:nvSpPr>
+          <p:cNvPr id="3" name="Content Placeholder 2"/>
+          <p:cNvSpPr>
+            <a:spLocks noGrp="1"/>
+          </p:cNvSpPr>
+          <p:nvPr>
+            <p:ph idx="1"/>
+          </p:nvPr>
+        </p:nvSpPr>
+        <p:spPr>
+          <a:xfrm>
+            <a:off x="276639" y="791301"/>
+            <a:ext cx="8608944" cy="2396036"/>
+          </a:xfrm>
+        </p:spPr>
+        <p:txBody>
+          <a:bodyPr>
+            <a:normAutofit/>
+          </a:bodyPr>
+          <a:lstStyle/>
+          <a:p>
+            <a:r>
+              <a:rPr lang="en-US" i="0" dirty="0"/>
+              <a:t>Containerization has become a key technology for reproducibility</a:t>
+            </a:r>
+          </a:p>
+          <a:p>
+            <a:pPr lvl="1"/>
+            <a:r>
+              <a:rPr lang="en-US" i="0" dirty="0"/>
+              <a:t>it is the only practical approach for replicating a simulation result in the future</a:t>
+            </a:r>
+          </a:p>
+          <a:p>
+            <a:pPr lvl="1"/>
+            <a:r>
+              <a:rPr lang="en-US" dirty="0"/>
+              <a:t>the colleague you are sharing with could by yourself in 6 months or 6 years</a:t>
+            </a:r>
+          </a:p>
+          <a:p>
+            <a:pPr lvl="2"/>
+            <a:r>
+              <a:rPr lang="en-US" dirty="0"/>
+              <a:t>an application container can be archived indefinitely and then reused</a:t>
+            </a:r>
+          </a:p>
+          <a:p>
+            <a:pPr lvl="2"/>
+            <a:r>
+              <a:rPr lang="en-US" dirty="0"/>
+              <a:t>assuming Docker or a compatible technology is still supported</a:t>
+            </a:r>
+          </a:p>
+          <a:p>
+            <a:r>
+              <a:rPr lang="en-US" dirty="0"/>
+              <a:t>The topic cannot be covered completely in a single lecture…</a:t>
+            </a:r>
+          </a:p>
+          <a:p>
+            <a:pPr lvl="1"/>
+            <a:r>
+              <a:rPr lang="en-US" dirty="0"/>
+              <a:t>so we provide some pointers for further study</a:t>
+            </a:r>
+          </a:p>
+        </p:txBody>
+      </p:sp>
+      <p:sp>
+        <p:nvSpPr>
+          <p:cNvPr id="5" name="TextBox 4">
+            <a:extLst>
+              <a:ext uri="{FF2B5EF4-FFF2-40B4-BE49-F238E27FC236}">
+                <a16:creationId xmlns:a16="http://schemas.microsoft.com/office/drawing/2014/main" id="{019BFA61-21A0-4A72-801D-C7C00BAFA17D}"/>
+              </a:ext>
+            </a:extLst>
+          </p:cNvPr>
+          <p:cNvSpPr txBox="1"/>
+          <p:nvPr/>
+        </p:nvSpPr>
+        <p:spPr>
+          <a:xfrm>
+            <a:off x="601318" y="3058966"/>
+            <a:ext cx="8413474" cy="1577355"/>
+          </a:xfrm>
+          <a:prstGeom prst="rect">
+            <a:avLst/>
+          </a:prstGeom>
+          <a:noFill/>
+        </p:spPr>
+        <p:txBody>
+          <a:bodyPr wrap="square" rtlCol="0">
+            <a:spAutoFit/>
+          </a:bodyPr>
+          <a:lstStyle/>
+          <a:p>
+            <a:pPr marL="227013" indent="-227013">
+              <a:spcBef>
+                <a:spcPts val="300"/>
+              </a:spcBef>
+            </a:pPr>
+            <a:r>
+              <a:rPr lang="en-US" sz="1400" dirty="0">
+                <a:latin typeface="Times New Roman" panose="02020603050405020304" pitchFamily="18" charset="0"/>
+                <a:cs typeface="Times New Roman" panose="02020603050405020304" pitchFamily="18" charset="0"/>
+              </a:rPr>
+              <a:t>Docker Containers for Reproducible Research Workshop (2017), </a:t>
+            </a:r>
+            <a:r>
+              <a:rPr lang="en-US" sz="1400" dirty="0">
+                <a:latin typeface="Times New Roman" panose="02020603050405020304" pitchFamily="18" charset="0"/>
+                <a:cs typeface="Times New Roman" panose="02020603050405020304" pitchFamily="18" charset="0"/>
+                <a:hlinkClick r:id="rId3"/>
+              </a:rPr>
+              <a:t>https://www.software.ac.uk/c4rr</a:t>
+            </a:r>
+            <a:r>
+              <a:rPr lang="en-US" sz="1400" dirty="0">
+                <a:latin typeface="Times New Roman" panose="02020603050405020304" pitchFamily="18" charset="0"/>
+                <a:cs typeface="Times New Roman" panose="02020603050405020304" pitchFamily="18" charset="0"/>
+              </a:rPr>
+              <a:t> </a:t>
+            </a:r>
+          </a:p>
+          <a:p>
+            <a:pPr marL="227013" indent="-227013">
+              <a:spcBef>
+                <a:spcPts val="300"/>
+              </a:spcBef>
+            </a:pPr>
+            <a:r>
+              <a:rPr lang="en-US" sz="1400" dirty="0">
+                <a:latin typeface="Times New Roman" panose="02020603050405020304" pitchFamily="18" charset="0"/>
+                <a:cs typeface="Times New Roman" panose="02020603050405020304" pitchFamily="18" charset="0"/>
+              </a:rPr>
+              <a:t>D. Nüst &amp; M. Hinz (2017), </a:t>
+            </a:r>
+            <a:r>
+              <a:rPr lang="en-US" sz="1400" dirty="0">
+                <a:latin typeface="Times New Roman" panose="02020603050405020304" pitchFamily="18" charset="0"/>
+                <a:cs typeface="Times New Roman" panose="02020603050405020304" pitchFamily="18" charset="0"/>
+                <a:hlinkClick r:id="rId4"/>
+              </a:rPr>
+              <a:t>http://o2r.info/2017/05/30/containerit-package/</a:t>
+            </a:r>
+            <a:r>
+              <a:rPr lang="en-US" sz="1400" dirty="0">
+                <a:latin typeface="Times New Roman" panose="02020603050405020304" pitchFamily="18" charset="0"/>
+                <a:cs typeface="Times New Roman" panose="02020603050405020304" pitchFamily="18" charset="0"/>
+              </a:rPr>
+              <a:t> </a:t>
+            </a:r>
+          </a:p>
+          <a:p>
+            <a:pPr marL="227013" indent="-227013">
+              <a:spcBef>
+                <a:spcPts val="300"/>
+              </a:spcBef>
+            </a:pPr>
+            <a:r>
+              <a:rPr lang="en-US" sz="1400" dirty="0">
+                <a:latin typeface="Times New Roman" panose="02020603050405020304" pitchFamily="18" charset="0"/>
+                <a:cs typeface="Times New Roman" panose="02020603050405020304" pitchFamily="18" charset="0"/>
+              </a:rPr>
+              <a:t>J. </a:t>
+            </a:r>
+            <a:r>
+              <a:rPr lang="en-US" sz="1400" dirty="0" err="1">
+                <a:latin typeface="Times New Roman" panose="02020603050405020304" pitchFamily="18" charset="0"/>
+                <a:cs typeface="Times New Roman" panose="02020603050405020304" pitchFamily="18" charset="0"/>
+              </a:rPr>
+              <a:t>Cito</a:t>
+            </a:r>
+            <a:r>
+              <a:rPr lang="en-US" sz="1400" dirty="0">
+                <a:latin typeface="Times New Roman" panose="02020603050405020304" pitchFamily="18" charset="0"/>
+                <a:cs typeface="Times New Roman" panose="02020603050405020304" pitchFamily="18" charset="0"/>
+              </a:rPr>
+              <a:t>, V. </a:t>
+            </a:r>
+            <a:r>
+              <a:rPr lang="en-US" sz="1400" dirty="0" err="1">
+                <a:latin typeface="Times New Roman" panose="02020603050405020304" pitchFamily="18" charset="0"/>
+                <a:cs typeface="Times New Roman" panose="02020603050405020304" pitchFamily="18" charset="0"/>
+              </a:rPr>
+              <a:t>Ferme</a:t>
+            </a:r>
+            <a:r>
+              <a:rPr lang="en-US" sz="1400" dirty="0">
+                <a:latin typeface="Times New Roman" panose="02020603050405020304" pitchFamily="18" charset="0"/>
+                <a:cs typeface="Times New Roman" panose="02020603050405020304" pitchFamily="18" charset="0"/>
+              </a:rPr>
+              <a:t> and H.C. Gall (2016), </a:t>
+            </a:r>
+            <a:r>
+              <a:rPr lang="en-US" sz="1400" dirty="0">
+                <a:latin typeface="Times New Roman" panose="02020603050405020304" pitchFamily="18" charset="0"/>
+                <a:cs typeface="Times New Roman" panose="02020603050405020304" pitchFamily="18" charset="0"/>
+                <a:hlinkClick r:id="rId5"/>
+              </a:rPr>
+              <a:t>https://link.springer.com/chapter/10.1007/978-3-319-38791-8_58</a:t>
+            </a:r>
+            <a:r>
+              <a:rPr lang="en-US" sz="1400" dirty="0">
+                <a:latin typeface="Times New Roman" panose="02020603050405020304" pitchFamily="18" charset="0"/>
+                <a:cs typeface="Times New Roman" panose="02020603050405020304" pitchFamily="18" charset="0"/>
+              </a:rPr>
+              <a:t> </a:t>
+            </a:r>
+          </a:p>
+          <a:p>
+            <a:pPr marL="227013" indent="-227013">
+              <a:spcBef>
+                <a:spcPts val="300"/>
+              </a:spcBef>
+            </a:pPr>
+            <a:r>
+              <a:rPr lang="en-US" sz="1400" dirty="0">
+                <a:latin typeface="Times New Roman" panose="02020603050405020304" pitchFamily="18" charset="0"/>
+                <a:cs typeface="Times New Roman" panose="02020603050405020304" pitchFamily="18" charset="0"/>
+              </a:rPr>
+              <a:t>D.L. Bruhwiler, R. Nagler </a:t>
+            </a:r>
+            <a:r>
+              <a:rPr lang="en-US" sz="1400" i="1" dirty="0">
+                <a:latin typeface="Times New Roman" panose="02020603050405020304" pitchFamily="18" charset="0"/>
+                <a:cs typeface="Times New Roman" panose="02020603050405020304" pitchFamily="18" charset="0"/>
+              </a:rPr>
+              <a:t>et al</a:t>
+            </a:r>
+            <a:r>
+              <a:rPr lang="en-US" sz="1400" dirty="0">
+                <a:latin typeface="Times New Roman" panose="02020603050405020304" pitchFamily="18" charset="0"/>
+                <a:cs typeface="Times New Roman" panose="02020603050405020304" pitchFamily="18" charset="0"/>
+              </a:rPr>
+              <a:t>. (2015), </a:t>
+            </a:r>
+            <a:r>
+              <a:rPr lang="en-US" sz="1400" dirty="0">
+                <a:latin typeface="Times New Roman" panose="02020603050405020304" pitchFamily="18" charset="0"/>
+                <a:cs typeface="Times New Roman" panose="02020603050405020304" pitchFamily="18" charset="0"/>
+                <a:hlinkClick r:id="rId6"/>
+              </a:rPr>
+              <a:t>http://accelconf.web.cern.ch/AccelConf/IPAC2015/papers/mopmn009.pdf</a:t>
+            </a:r>
+            <a:r>
+              <a:rPr lang="en-US" sz="1400" dirty="0">
+                <a:latin typeface="Times New Roman" panose="02020603050405020304" pitchFamily="18" charset="0"/>
+                <a:cs typeface="Times New Roman" panose="02020603050405020304" pitchFamily="18" charset="0"/>
+              </a:rPr>
+              <a:t> </a:t>
+            </a:r>
+          </a:p>
+          <a:p>
+            <a:pPr marL="227013" indent="-227013">
+              <a:spcBef>
+                <a:spcPts val="300"/>
+              </a:spcBef>
+            </a:pPr>
+            <a:r>
+              <a:rPr lang="en-US" sz="1400" dirty="0">
+                <a:latin typeface="Times New Roman" panose="02020603050405020304" pitchFamily="18" charset="0"/>
+                <a:cs typeface="Times New Roman" panose="02020603050405020304" pitchFamily="18" charset="0"/>
+              </a:rPr>
+              <a:t>R. Nagler, D.L. Bruhwiler </a:t>
+            </a:r>
+            <a:r>
+              <a:rPr lang="en-US" sz="1400" i="1" dirty="0">
+                <a:latin typeface="Times New Roman" panose="02020603050405020304" pitchFamily="18" charset="0"/>
+                <a:cs typeface="Times New Roman" panose="02020603050405020304" pitchFamily="18" charset="0"/>
+              </a:rPr>
+              <a:t>et al</a:t>
+            </a:r>
+            <a:r>
+              <a:rPr lang="en-US" sz="1400" dirty="0">
+                <a:latin typeface="Times New Roman" panose="02020603050405020304" pitchFamily="18" charset="0"/>
+                <a:cs typeface="Times New Roman" panose="02020603050405020304" pitchFamily="18" charset="0"/>
+              </a:rPr>
+              <a:t>. (2015), </a:t>
+            </a:r>
+            <a:r>
+              <a:rPr lang="en-US" sz="1400" dirty="0">
+                <a:latin typeface="Times New Roman" panose="02020603050405020304" pitchFamily="18" charset="0"/>
+                <a:cs typeface="Times New Roman" panose="02020603050405020304" pitchFamily="18" charset="0"/>
+                <a:hlinkClick r:id="rId7"/>
+              </a:rPr>
+              <a:t>https://arxiv.org/abs/1509.08789</a:t>
+            </a:r>
+            <a:endParaRPr lang="en-US" sz="1400" dirty="0">
+              <a:latin typeface="Times New Roman" panose="02020603050405020304" pitchFamily="18" charset="0"/>
+              <a:cs typeface="Times New Roman" panose="02020603050405020304" pitchFamily="18" charset="0"/>
+            </a:endParaRPr>
+          </a:p>
+          <a:p>
+            <a:pPr marL="227013" indent="-227013">
+              <a:spcBef>
+                <a:spcPts val="300"/>
+              </a:spcBef>
+            </a:pPr>
+            <a:r>
+              <a:rPr lang="en-US" sz="1400" dirty="0">
+                <a:latin typeface="Times New Roman" panose="02020603050405020304" pitchFamily="18" charset="0"/>
+                <a:cs typeface="Times New Roman" panose="02020603050405020304" pitchFamily="18" charset="0"/>
+              </a:rPr>
+              <a:t>C. Boettiger (2014), </a:t>
+            </a:r>
+            <a:r>
+              <a:rPr lang="en-US" sz="1400" dirty="0">
+                <a:latin typeface="Times New Roman" panose="02020603050405020304" pitchFamily="18" charset="0"/>
+                <a:cs typeface="Times New Roman" panose="02020603050405020304" pitchFamily="18" charset="0"/>
+                <a:hlinkClick r:id="rId8"/>
+              </a:rPr>
+              <a:t>https://arxiv.org/abs/1410.0846</a:t>
+            </a:r>
+            <a:r>
+              <a:rPr lang="en-US" sz="1400" dirty="0">
+                <a:latin typeface="Times New Roman" panose="02020603050405020304" pitchFamily="18" charset="0"/>
+                <a:cs typeface="Times New Roman" panose="02020603050405020304" pitchFamily="18" charset="0"/>
+              </a:rPr>
+              <a:t> </a:t>
+            </a:r>
+          </a:p>
+        </p:txBody>
+      </p:sp>
+    </p:spTree>
+    <p:extLst>
+      <p:ext uri="{BB962C8B-B14F-4D97-AF65-F5344CB8AC3E}">
+        <p14:creationId xmlns:p14="http://schemas.microsoft.com/office/powerpoint/2010/main" val="4169432088"/>
+      </p:ext>
+    </p:extLst>
+  </p:cSld>
+  <p:clrMapOvr>
+    <a:masterClrMapping/>
+  </p:clrMapOvr>
+</p:sld>
+</file>
+
+<file path=ppt/slides/slide18.xml><?xml version="1.0" encoding="utf-8"?>
+<p:sld xmlns:a="http://schemas.openxmlformats.org/drawingml/2006/main" xmlns:r="http://schemas.openxmlformats.org/officeDocument/2006/relationships" xmlns:p="http://schemas.openxmlformats.org/presentationml/2006/main">
+  <p:cSld>
+    <p:spTree>
+      <p:nvGrpSpPr>
+        <p:cNvPr id="1" name=""/>
+        <p:cNvGrpSpPr/>
+        <p:nvPr/>
+      </p:nvGrpSpPr>
+      <p:grpSpPr>
+        <a:xfrm>
+          <a:off x="0" y="0"/>
+          <a:ext cx="0" cy="0"/>
+          <a:chOff x="0" y="0"/>
+          <a:chExt cx="0" cy="0"/>
+        </a:xfrm>
+      </p:grpSpPr>
+      <p:sp>
+        <p:nvSpPr>
+          <p:cNvPr id="2" name="Title 1"/>
+          <p:cNvSpPr>
+            <a:spLocks noGrp="1"/>
+          </p:cNvSpPr>
+          <p:nvPr>
+            <p:ph type="title"/>
+          </p:nvPr>
+        </p:nvSpPr>
+        <p:spPr>
+          <a:xfrm>
+            <a:off x="0" y="140672"/>
+            <a:ext cx="9144000" cy="589085"/>
+          </a:xfrm>
+        </p:spPr>
+        <p:txBody>
+          <a:bodyPr>
+            <a:normAutofit/>
+          </a:bodyPr>
+          <a:lstStyle/>
+          <a:p>
+            <a:r>
+              <a:rPr lang="en-US" dirty="0"/>
+              <a:t>Class discussion:</a:t>
+            </a:r>
+          </a:p>
+        </p:txBody>
+      </p:sp>
+      <p:sp>
+        <p:nvSpPr>
+          <p:cNvPr id="6" name="Content Placeholder 2">
+            <a:extLst>
+              <a:ext uri="{FF2B5EF4-FFF2-40B4-BE49-F238E27FC236}">
+                <a16:creationId xmlns:a16="http://schemas.microsoft.com/office/drawing/2014/main" id="{9081FF26-7AD5-4767-AF65-A27F1769E1FC}"/>
+              </a:ext>
+            </a:extLst>
+          </p:cNvPr>
+          <p:cNvSpPr>
+            <a:spLocks noGrp="1"/>
+          </p:cNvSpPr>
+          <p:nvPr>
+            <p:ph idx="1"/>
+          </p:nvPr>
+        </p:nvSpPr>
+        <p:spPr>
+          <a:xfrm>
+            <a:off x="152400" y="827314"/>
+            <a:ext cx="8839200" cy="5146766"/>
+          </a:xfrm>
+        </p:spPr>
+        <p:txBody>
+          <a:bodyPr>
+            <a:normAutofit/>
+          </a:bodyPr>
+          <a:lstStyle/>
+          <a:p>
+            <a:r>
+              <a:rPr lang="en-US" sz="1800" i="0" dirty="0"/>
+              <a:t>Do you have experience working with VMs?</a:t>
+            </a:r>
+          </a:p>
+          <a:p>
+            <a:pPr lvl="1"/>
+            <a:r>
+              <a:rPr lang="en-US" dirty="0"/>
+              <a:t>If so, what are the advantages and disadvantages?</a:t>
+            </a:r>
+          </a:p>
+          <a:p>
+            <a:r>
+              <a:rPr lang="en-US" i="0" dirty="0"/>
+              <a:t>Explain at least one difference between VMs and containers</a:t>
+            </a:r>
+          </a:p>
+          <a:p>
+            <a:r>
+              <a:rPr lang="en-US" i="0" dirty="0"/>
+              <a:t>A VM is to a house as a container is to an apartment:  explain the analogy</a:t>
+            </a:r>
+          </a:p>
+          <a:p>
+            <a:r>
+              <a:rPr lang="en-US" dirty="0"/>
+              <a:t>Reproducibility vs Replication:  which is more difficult?   …more important?</a:t>
+            </a:r>
+          </a:p>
+          <a:p>
+            <a:r>
+              <a:rPr lang="en-US" dirty="0"/>
+              <a:t>How does Docker help with replicating a physics simulation?</a:t>
+            </a:r>
+            <a:r>
+              <a:rPr lang="en-US" i="0" dirty="0"/>
+              <a:t> </a:t>
+            </a:r>
+          </a:p>
+          <a:p>
+            <a:pPr lvl="1"/>
+            <a:endParaRPr lang="en-US" i="0" dirty="0"/>
+          </a:p>
+          <a:p>
+            <a:r>
+              <a:rPr lang="en-US" dirty="0"/>
+              <a:t>Maybe revisit previous discussion points – </a:t>
+            </a:r>
+            <a:endParaRPr lang="en-US" i="0" dirty="0"/>
+          </a:p>
+          <a:p>
+            <a:pPr lvl="1"/>
+            <a:r>
+              <a:rPr lang="en-US" dirty="0"/>
+              <a:t>When you run a simulation how confident are you in the results?</a:t>
+            </a:r>
+          </a:p>
+          <a:p>
+            <a:pPr lvl="1"/>
+            <a:r>
+              <a:rPr lang="en-US" dirty="0"/>
+              <a:t>Are you skeptical of results presented by others in talks or papers?</a:t>
+            </a:r>
+          </a:p>
+          <a:p>
+            <a:pPr lvl="2"/>
+            <a:r>
+              <a:rPr lang="en-US" dirty="0"/>
+              <a:t>have you ever wanted to rerun someone else’s simulation?</a:t>
+            </a:r>
+          </a:p>
+          <a:p>
+            <a:pPr lvl="1"/>
+            <a:r>
+              <a:rPr lang="en-US" dirty="0"/>
+              <a:t>How do you validate your own results?</a:t>
+            </a:r>
+          </a:p>
+          <a:p>
+            <a:pPr lvl="2"/>
+            <a:r>
+              <a:rPr lang="en-US" dirty="0"/>
+              <a:t>compare with your physical intuition?</a:t>
+            </a:r>
+          </a:p>
+          <a:p>
+            <a:pPr lvl="2"/>
+            <a:r>
+              <a:rPr lang="en-US" dirty="0"/>
+              <a:t>compare with your previous work?</a:t>
+            </a:r>
+          </a:p>
+          <a:p>
+            <a:pPr lvl="2"/>
+            <a:r>
+              <a:rPr lang="en-US" dirty="0"/>
+              <a:t>compare with publicly available papers and presentations?</a:t>
+            </a:r>
+          </a:p>
+          <a:p>
+            <a:pPr lvl="2"/>
+            <a:r>
+              <a:rPr lang="en-US" dirty="0"/>
+              <a:t>rerun the same case with a different code (or ask a colleague to do it…)?</a:t>
+            </a:r>
+          </a:p>
+          <a:p>
+            <a:pPr lvl="2"/>
+            <a:r>
+              <a:rPr lang="en-US" dirty="0"/>
+              <a:t>discuss the plots with a colleague…?</a:t>
+            </a:r>
+          </a:p>
+        </p:txBody>
+      </p:sp>
+    </p:spTree>
+    <p:extLst>
+      <p:ext uri="{BB962C8B-B14F-4D97-AF65-F5344CB8AC3E}">
+        <p14:creationId xmlns:p14="http://schemas.microsoft.com/office/powerpoint/2010/main" val="163359359"/>
+      </p:ext>
+    </p:extLst>
+  </p:cSld>
+  <p:clrMapOvr>
+    <a:masterClrMapping/>
+  </p:clrMapOvr>
+</p:sld>
+</file>
+
+<file path=ppt/slides/slide19.xml><?xml version="1.0" encoding="utf-8"?>
+<p:sld xmlns:a="http://schemas.openxmlformats.org/drawingml/2006/main" xmlns:r="http://schemas.openxmlformats.org/officeDocument/2006/relationships" xmlns:p="http://schemas.openxmlformats.org/presentationml/2006/main">
+  <p:cSld>
+    <p:spTree>
+      <p:nvGrpSpPr>
+        <p:cNvPr id="1" name=""/>
+        <p:cNvGrpSpPr/>
+        <p:nvPr/>
+      </p:nvGrpSpPr>
+      <p:grpSpPr>
+        <a:xfrm>
+          <a:off x="0" y="0"/>
+          <a:ext cx="0" cy="0"/>
+          <a:chOff x="0" y="0"/>
+          <a:chExt cx="0" cy="0"/>
+        </a:xfrm>
+      </p:grpSpPr>
       <p:pic>
         <p:nvPicPr>
           <p:cNvPr id="7" name="Picture 6" descr="docker.png"/>
@@ -5638,895 +7408,6 @@
 </p:sld>
 </file>
 
-<file path=ppt/slides/slide15.xml><?xml version="1.0" encoding="utf-8"?>
-<p:sld xmlns:a="http://schemas.openxmlformats.org/drawingml/2006/main" xmlns:r="http://schemas.openxmlformats.org/officeDocument/2006/relationships" xmlns:p="http://schemas.openxmlformats.org/presentationml/2006/main">
-  <p:cSld>
-    <p:spTree>
-      <p:nvGrpSpPr>
-        <p:cNvPr id="1" name=""/>
-        <p:cNvGrpSpPr/>
-        <p:nvPr/>
-      </p:nvGrpSpPr>
-      <p:grpSpPr>
-        <a:xfrm>
-          <a:off x="0" y="0"/>
-          <a:ext cx="0" cy="0"/>
-          <a:chOff x="0" y="0"/>
-          <a:chExt cx="0" cy="0"/>
-        </a:xfrm>
-      </p:grpSpPr>
-      <p:sp>
-        <p:nvSpPr>
-          <p:cNvPr id="2" name="Title 1"/>
-          <p:cNvSpPr>
-            <a:spLocks noGrp="1"/>
-          </p:cNvSpPr>
-          <p:nvPr>
-            <p:ph type="title"/>
-          </p:nvPr>
-        </p:nvSpPr>
-        <p:spPr>
-          <a:xfrm>
-            <a:off x="0" y="70385"/>
-            <a:ext cx="9144000" cy="589085"/>
-          </a:xfrm>
-        </p:spPr>
-        <p:txBody>
-          <a:bodyPr>
-            <a:normAutofit/>
-          </a:bodyPr>
-          <a:lstStyle/>
-          <a:p>
-            <a:r>
-              <a:rPr lang="en-US" dirty="0"/>
-              <a:t>Delivering Codes via Docker Images</a:t>
-            </a:r>
-          </a:p>
-        </p:txBody>
-      </p:sp>
-      <p:sp>
-        <p:nvSpPr>
-          <p:cNvPr id="3" name="Content Placeholder 2"/>
-          <p:cNvSpPr>
-            <a:spLocks noGrp="1"/>
-          </p:cNvSpPr>
-          <p:nvPr>
-            <p:ph idx="1"/>
-          </p:nvPr>
-        </p:nvSpPr>
-        <p:spPr>
-          <a:xfrm>
-            <a:off x="152400" y="1292464"/>
-            <a:ext cx="8839200" cy="5011617"/>
-          </a:xfrm>
-        </p:spPr>
-        <p:txBody>
-          <a:bodyPr>
-            <a:normAutofit lnSpcReduction="10000"/>
-          </a:bodyPr>
-          <a:lstStyle/>
-          <a:p>
-            <a:r>
-              <a:rPr lang="en-US" sz="2000" i="0" dirty="0"/>
-              <a:t>Seven particle accelerator codes are available </a:t>
-            </a:r>
-            <a:r>
-              <a:rPr lang="en-US" sz="2000" i="0" dirty="0">
-                <a:solidFill>
-                  <a:srgbClr val="FF0000"/>
-                </a:solidFill>
-              </a:rPr>
-              <a:t>(more on the way)</a:t>
-            </a:r>
-          </a:p>
-          <a:p>
-            <a:pPr lvl="1"/>
-            <a:r>
-              <a:rPr lang="en-US" sz="1800" i="0" dirty="0"/>
-              <a:t>X-ray:      SRW, Shadow3</a:t>
-            </a:r>
-          </a:p>
-          <a:p>
-            <a:pPr lvl="1"/>
-            <a:r>
-              <a:rPr lang="en-US" sz="1800" i="0" dirty="0"/>
-              <a:t>Beams:   Synergia, Warp, Elegant/SDDS, Hellweg</a:t>
-            </a:r>
-          </a:p>
-          <a:p>
-            <a:pPr lvl="2"/>
-            <a:r>
-              <a:rPr lang="en-US" sz="1600" b="1" i="0" dirty="0"/>
-              <a:t>coming soon:  MAD-X, PTC</a:t>
-            </a:r>
-          </a:p>
-          <a:p>
-            <a:pPr lvl="1"/>
-            <a:r>
-              <a:rPr lang="en-US" sz="1800" i="0" dirty="0"/>
-              <a:t>FELs:        Genesis v.2</a:t>
-            </a:r>
-          </a:p>
-          <a:p>
-            <a:r>
-              <a:rPr lang="en-US" sz="2000" i="0" dirty="0"/>
-              <a:t>Three user interface (UI) modes are supported: </a:t>
-            </a:r>
-          </a:p>
-          <a:p>
-            <a:pPr lvl="1"/>
-            <a:r>
-              <a:rPr lang="en-US" sz="1800" i="0" dirty="0"/>
-              <a:t>Sirepo (GUI);  Jupyter (IPython notebooks);  command-line (CLI)</a:t>
-            </a:r>
-          </a:p>
-          <a:p>
-            <a:r>
-              <a:rPr lang="en-US" sz="2000" i="0" dirty="0"/>
-              <a:t>Automated build/test/release to Docker Hub and to PyPI</a:t>
-            </a:r>
-          </a:p>
-          <a:p>
-            <a:r>
-              <a:rPr lang="en-US" sz="2000" i="0" dirty="0"/>
-              <a:t>One command to download/install/run:</a:t>
-            </a:r>
-            <a:endParaRPr lang="en-US" i="0" dirty="0"/>
-          </a:p>
-          <a:p>
-            <a:pPr marL="0" indent="0">
-              <a:spcBef>
-                <a:spcPts val="600"/>
-              </a:spcBef>
-              <a:buNone/>
-            </a:pPr>
-            <a:r>
-              <a:rPr lang="en-US" sz="2000" i="0" dirty="0">
-                <a:latin typeface="Courier New" panose="02070309020205020404" pitchFamily="49" charset="0"/>
-                <a:cs typeface="Courier New" panose="02070309020205020404" pitchFamily="49" charset="0"/>
-              </a:rPr>
-              <a:t>         &gt;  docker run –p 8000:8000 radiasoft/sirepo</a:t>
-            </a:r>
-            <a:endParaRPr lang="en-US" i="0" dirty="0">
-              <a:latin typeface="Courier New" panose="02070309020205020404" pitchFamily="49" charset="0"/>
-              <a:cs typeface="Courier New" panose="02070309020205020404" pitchFamily="49" charset="0"/>
-            </a:endParaRPr>
-          </a:p>
-          <a:p>
-            <a:pPr lvl="2"/>
-            <a:endParaRPr lang="en-US" sz="1400" i="0" dirty="0"/>
-          </a:p>
-          <a:p>
-            <a:r>
-              <a:rPr lang="en-US" sz="2000" i="0" dirty="0"/>
-              <a:t>RadiaSoft code on GitHub:    </a:t>
-            </a:r>
-            <a:r>
-              <a:rPr lang="en-US" sz="1600" i="0" u="sng" dirty="0">
-                <a:solidFill>
-                  <a:srgbClr val="000000"/>
-                </a:solidFill>
-                <a:latin typeface="Courier New" panose="02070309020205020404" pitchFamily="49" charset="0"/>
-                <a:hlinkClick r:id="rId3"/>
-              </a:rPr>
-              <a:t>http://sirepo.com</a:t>
-            </a:r>
-            <a:r>
-              <a:rPr lang="en-US" sz="1600" i="0" dirty="0">
-                <a:solidFill>
-                  <a:srgbClr val="000000"/>
-                </a:solidFill>
-              </a:rPr>
-              <a:t>          </a:t>
-            </a:r>
-            <a:r>
-              <a:rPr lang="en-US" sz="1600" i="0" dirty="0">
-                <a:solidFill>
-                  <a:srgbClr val="0070C0"/>
-                </a:solidFill>
-              </a:rPr>
-              <a:t>(primary repo)</a:t>
-            </a:r>
-            <a:endParaRPr lang="en-US" sz="2000" i="0" dirty="0">
-              <a:solidFill>
-                <a:srgbClr val="0070C0"/>
-              </a:solidFill>
-            </a:endParaRPr>
-          </a:p>
-          <a:p>
-            <a:pPr marL="457200" lvl="1" indent="0">
-              <a:buNone/>
-            </a:pPr>
-            <a:r>
-              <a:rPr lang="en-US" sz="1600" i="0" dirty="0">
-                <a:cs typeface="Courier New" panose="02070309020205020404" pitchFamily="49" charset="0"/>
-              </a:rPr>
-              <a:t>                                                               </a:t>
-            </a:r>
-            <a:r>
-              <a:rPr lang="en-US" sz="1600" i="0" dirty="0">
-                <a:latin typeface="Courier New" panose="02070309020205020404" pitchFamily="49" charset="0"/>
-                <a:cs typeface="Courier New" panose="02070309020205020404" pitchFamily="49" charset="0"/>
-                <a:hlinkClick r:id="rId4"/>
-              </a:rPr>
-              <a:t>https://github.com/radiasoft</a:t>
-            </a:r>
-            <a:r>
-              <a:rPr lang="en-US" sz="1600" i="0" dirty="0">
-                <a:latin typeface="Courier New" panose="02070309020205020404" pitchFamily="49" charset="0"/>
-                <a:cs typeface="Courier New" panose="02070309020205020404" pitchFamily="49" charset="0"/>
-              </a:rPr>
-              <a:t>  </a:t>
-            </a:r>
-            <a:r>
-              <a:rPr lang="en-US" sz="1600" i="0" dirty="0">
-                <a:cs typeface="Courier New" panose="02070309020205020404" pitchFamily="49" charset="0"/>
-              </a:rPr>
-              <a:t>(all)</a:t>
-            </a:r>
-          </a:p>
-          <a:p>
-            <a:pPr lvl="3"/>
-            <a:endParaRPr lang="en-US" sz="1400" i="0" dirty="0">
-              <a:cs typeface="Courier New" panose="02070309020205020404" pitchFamily="49" charset="0"/>
-            </a:endParaRPr>
-          </a:p>
-          <a:p>
-            <a:r>
-              <a:rPr lang="en-US" sz="2000" i="0" dirty="0"/>
-              <a:t>Try it yourself on RadiaSoft servers:  </a:t>
-            </a:r>
-            <a:r>
-              <a:rPr lang="en-US" sz="1600" i="0" dirty="0">
-                <a:latin typeface="Courier New" panose="02070309020205020404" pitchFamily="49" charset="0"/>
-                <a:cs typeface="Courier New" panose="02070309020205020404" pitchFamily="49" charset="0"/>
-                <a:hlinkClick r:id="rId5"/>
-              </a:rPr>
-              <a:t>https://beta.sirepo.com</a:t>
-            </a:r>
-            <a:r>
-              <a:rPr lang="en-US" sz="1800" i="0" dirty="0">
-                <a:latin typeface="Courier New" panose="02070309020205020404" pitchFamily="49" charset="0"/>
-                <a:cs typeface="Courier New" panose="02070309020205020404" pitchFamily="49" charset="0"/>
-              </a:rPr>
-              <a:t> </a:t>
-            </a:r>
-            <a:endParaRPr lang="en-US" sz="2000" i="0" dirty="0"/>
-          </a:p>
-          <a:p>
-            <a:pPr marL="457200" lvl="1" indent="0">
-              <a:buNone/>
-            </a:pPr>
-            <a:r>
-              <a:rPr lang="en-US" sz="1600" i="0" dirty="0"/>
-              <a:t>                                                                           </a:t>
-            </a:r>
-            <a:r>
-              <a:rPr lang="en-US" sz="1600" i="0" dirty="0">
-                <a:latin typeface="Courier New" panose="02070309020205020404" pitchFamily="49" charset="0"/>
-                <a:cs typeface="Courier New" panose="02070309020205020404" pitchFamily="49" charset="0"/>
-                <a:hlinkClick r:id="rId6"/>
-              </a:rPr>
-              <a:t>https://jupyter.radiasoft.org</a:t>
-            </a:r>
-            <a:r>
-              <a:rPr lang="en-US" sz="1600" i="0" dirty="0"/>
-              <a:t> </a:t>
-            </a:r>
-            <a:endParaRPr lang="en-US" sz="1400" i="0" dirty="0">
-              <a:latin typeface="Courier New" panose="02070309020205020404" pitchFamily="49" charset="0"/>
-              <a:cs typeface="Courier New" panose="02070309020205020404" pitchFamily="49" charset="0"/>
-            </a:endParaRPr>
-          </a:p>
-        </p:txBody>
-      </p:sp>
-      <p:sp>
-        <p:nvSpPr>
-          <p:cNvPr id="4" name="TextBox 3"/>
-          <p:cNvSpPr txBox="1"/>
-          <p:nvPr/>
-        </p:nvSpPr>
-        <p:spPr>
-          <a:xfrm>
-            <a:off x="2822331" y="791301"/>
-            <a:ext cx="5284177" cy="369332"/>
-          </a:xfrm>
-          <a:prstGeom prst="rect">
-            <a:avLst/>
-          </a:prstGeom>
-          <a:noFill/>
-        </p:spPr>
-        <p:txBody>
-          <a:bodyPr wrap="square" rtlCol="0">
-            <a:spAutoFit/>
-          </a:bodyPr>
-          <a:lstStyle/>
-          <a:p>
-            <a:r>
-              <a:rPr lang="en-US" dirty="0">
-                <a:latin typeface="Courier New" panose="02070309020205020404" pitchFamily="49" charset="0"/>
-                <a:cs typeface="Courier New" panose="02070309020205020404" pitchFamily="49" charset="0"/>
-                <a:hlinkClick r:id="rId7"/>
-              </a:rPr>
-              <a:t>https://hub.docker.com/r/radiasoft/</a:t>
-            </a:r>
-            <a:r>
-              <a:rPr lang="en-US" dirty="0">
-                <a:latin typeface="Courier New" panose="02070309020205020404" pitchFamily="49" charset="0"/>
-                <a:cs typeface="Courier New" panose="02070309020205020404" pitchFamily="49" charset="0"/>
-              </a:rPr>
-              <a:t> </a:t>
-            </a:r>
-          </a:p>
-        </p:txBody>
-      </p:sp>
-    </p:spTree>
-    <p:extLst>
-      <p:ext uri="{BB962C8B-B14F-4D97-AF65-F5344CB8AC3E}">
-        <p14:creationId xmlns:p14="http://schemas.microsoft.com/office/powerpoint/2010/main" val="1528542507"/>
-      </p:ext>
-    </p:extLst>
-  </p:cSld>
-  <p:clrMapOvr>
-    <a:masterClrMapping/>
-  </p:clrMapOvr>
-</p:sld>
-</file>
-
-<file path=ppt/slides/slide16.xml><?xml version="1.0" encoding="utf-8"?>
-<p:sld xmlns:a="http://schemas.openxmlformats.org/drawingml/2006/main" xmlns:r="http://schemas.openxmlformats.org/officeDocument/2006/relationships" xmlns:p="http://schemas.openxmlformats.org/presentationml/2006/main">
-  <p:cSld>
-    <p:spTree>
-      <p:nvGrpSpPr>
-        <p:cNvPr id="1" name=""/>
-        <p:cNvGrpSpPr/>
-        <p:nvPr/>
-      </p:nvGrpSpPr>
-      <p:grpSpPr>
-        <a:xfrm>
-          <a:off x="0" y="0"/>
-          <a:ext cx="0" cy="0"/>
-          <a:chOff x="0" y="0"/>
-          <a:chExt cx="0" cy="0"/>
-        </a:xfrm>
-      </p:grpSpPr>
-      <p:sp>
-        <p:nvSpPr>
-          <p:cNvPr id="2" name="Title 1"/>
-          <p:cNvSpPr>
-            <a:spLocks noGrp="1"/>
-          </p:cNvSpPr>
-          <p:nvPr>
-            <p:ph type="title"/>
-          </p:nvPr>
-        </p:nvSpPr>
-        <p:spPr>
-          <a:xfrm>
-            <a:off x="975946" y="298936"/>
-            <a:ext cx="8015654" cy="589085"/>
-          </a:xfrm>
-        </p:spPr>
-        <p:txBody>
-          <a:bodyPr>
-            <a:normAutofit/>
-          </a:bodyPr>
-          <a:lstStyle/>
-          <a:p>
-            <a:r>
-              <a:rPr lang="en-US" dirty="0"/>
-              <a:t>Version Management</a:t>
-            </a:r>
-          </a:p>
-        </p:txBody>
-      </p:sp>
-      <p:sp>
-        <p:nvSpPr>
-          <p:cNvPr id="3" name="Content Placeholder 2"/>
-          <p:cNvSpPr>
-            <a:spLocks noGrp="1"/>
-          </p:cNvSpPr>
-          <p:nvPr>
-            <p:ph idx="1"/>
-          </p:nvPr>
-        </p:nvSpPr>
-        <p:spPr>
-          <a:xfrm>
-            <a:off x="152400" y="1002323"/>
-            <a:ext cx="8839200" cy="5161086"/>
-          </a:xfrm>
-        </p:spPr>
-        <p:txBody>
-          <a:bodyPr>
-            <a:normAutofit/>
-          </a:bodyPr>
-          <a:lstStyle/>
-          <a:p>
-            <a:r>
-              <a:rPr lang="en-US" i="0" dirty="0"/>
-              <a:t>Images are identified by chronological version</a:t>
-            </a:r>
-          </a:p>
-          <a:p>
-            <a:pPr lvl="1"/>
-            <a:r>
-              <a:rPr lang="en-US" i="0" dirty="0"/>
-              <a:t>does not interfere with systems used by the code developers</a:t>
-            </a:r>
-          </a:p>
-          <a:p>
-            <a:pPr lvl="1"/>
-            <a:r>
-              <a:rPr lang="en-US" i="0" dirty="0"/>
-              <a:t>provides meaningful versioning, as necessary for reproducibility</a:t>
-            </a:r>
-          </a:p>
-          <a:p>
-            <a:r>
-              <a:rPr lang="en-US" i="0" dirty="0"/>
-              <a:t>Channels are declared for the main git branch:</a:t>
-            </a:r>
-          </a:p>
-          <a:p>
-            <a:pPr lvl="1"/>
-            <a:r>
-              <a:rPr lang="en-US" i="0" dirty="0"/>
-              <a:t>dev    (latest, specified by default)</a:t>
-            </a:r>
-          </a:p>
-          <a:p>
-            <a:pPr lvl="1"/>
-            <a:r>
-              <a:rPr lang="en-US" i="0" dirty="0"/>
-              <a:t>alpha (internal testing)</a:t>
-            </a:r>
-          </a:p>
-          <a:p>
-            <a:pPr lvl="1"/>
-            <a:r>
-              <a:rPr lang="en-US" i="0" dirty="0"/>
-              <a:t>beta   (external testing)</a:t>
-            </a:r>
-          </a:p>
-          <a:p>
-            <a:pPr lvl="1"/>
-            <a:r>
-              <a:rPr lang="en-US" i="0" dirty="0"/>
-              <a:t>prod   (ready for production release)</a:t>
-            </a:r>
-          </a:p>
-          <a:p>
-            <a:r>
-              <a:rPr lang="en-US" i="0" dirty="0"/>
-              <a:t>Each container image includes a ‘manifest’</a:t>
-            </a:r>
-          </a:p>
-          <a:p>
-            <a:pPr lvl="1"/>
-            <a:r>
-              <a:rPr lang="en-US" i="0" dirty="0"/>
-              <a:t>describes the image &amp; codes,   rsmanifest.json</a:t>
-            </a:r>
-          </a:p>
-          <a:p>
-            <a:r>
-              <a:rPr lang="en-US" i="0" dirty="0"/>
-              <a:t>Source code for each application is stored in the image</a:t>
-            </a:r>
-          </a:p>
-          <a:p>
-            <a:r>
-              <a:rPr lang="en-US" i="0" dirty="0"/>
-              <a:t>Code versions/commits can be queried by simulations</a:t>
-            </a:r>
-          </a:p>
-        </p:txBody>
-      </p:sp>
-    </p:spTree>
-    <p:extLst>
-      <p:ext uri="{BB962C8B-B14F-4D97-AF65-F5344CB8AC3E}">
-        <p14:creationId xmlns:p14="http://schemas.microsoft.com/office/powerpoint/2010/main" val="2525692851"/>
-      </p:ext>
-    </p:extLst>
-  </p:cSld>
-  <p:clrMapOvr>
-    <a:masterClrMapping/>
-  </p:clrMapOvr>
-</p:sld>
-</file>
-
-<file path=ppt/slides/slide17.xml><?xml version="1.0" encoding="utf-8"?>
-<p:sld xmlns:a="http://schemas.openxmlformats.org/drawingml/2006/main" xmlns:r="http://schemas.openxmlformats.org/officeDocument/2006/relationships" xmlns:p="http://schemas.openxmlformats.org/presentationml/2006/main">
-  <p:cSld>
-    <p:spTree>
-      <p:nvGrpSpPr>
-        <p:cNvPr id="1" name=""/>
-        <p:cNvGrpSpPr/>
-        <p:nvPr/>
-      </p:nvGrpSpPr>
-      <p:grpSpPr>
-        <a:xfrm>
-          <a:off x="0" y="0"/>
-          <a:ext cx="0" cy="0"/>
-          <a:chOff x="0" y="0"/>
-          <a:chExt cx="0" cy="0"/>
-        </a:xfrm>
-      </p:grpSpPr>
-      <p:sp>
-        <p:nvSpPr>
-          <p:cNvPr id="2" name="Title 1"/>
-          <p:cNvSpPr>
-            <a:spLocks noGrp="1"/>
-          </p:cNvSpPr>
-          <p:nvPr>
-            <p:ph type="title"/>
-          </p:nvPr>
-        </p:nvSpPr>
-        <p:spPr>
-          <a:xfrm>
-            <a:off x="975946" y="172117"/>
-            <a:ext cx="8015654" cy="589085"/>
-          </a:xfrm>
-        </p:spPr>
-        <p:txBody>
-          <a:bodyPr>
-            <a:normAutofit/>
-          </a:bodyPr>
-          <a:lstStyle/>
-          <a:p>
-            <a:r>
-              <a:rPr lang="en-US" dirty="0"/>
-              <a:t>The Browser is the Scientific UI</a:t>
-            </a:r>
-          </a:p>
-        </p:txBody>
-      </p:sp>
-      <p:sp>
-        <p:nvSpPr>
-          <p:cNvPr id="3" name="Content Placeholder 2"/>
-          <p:cNvSpPr>
-            <a:spLocks noGrp="1"/>
-          </p:cNvSpPr>
-          <p:nvPr>
-            <p:ph idx="1"/>
-          </p:nvPr>
-        </p:nvSpPr>
-        <p:spPr>
-          <a:xfrm>
-            <a:off x="698242" y="2857500"/>
-            <a:ext cx="8120444" cy="3209184"/>
-          </a:xfrm>
-        </p:spPr>
-        <p:txBody>
-          <a:bodyPr>
-            <a:normAutofit/>
-          </a:bodyPr>
-          <a:lstStyle/>
-          <a:p>
-            <a:r>
-              <a:rPr lang="en-US" sz="2800" i="0" dirty="0"/>
-              <a:t>Easy sharing via links  (&amp; many other ways)</a:t>
-            </a:r>
-          </a:p>
-          <a:p>
-            <a:r>
-              <a:rPr lang="en-US" sz="2800" i="0" dirty="0"/>
-              <a:t>Nothing to </a:t>
-            </a:r>
-            <a:r>
-              <a:rPr lang="en-US" sz="2800" dirty="0"/>
-              <a:t>compile</a:t>
-            </a:r>
-            <a:r>
-              <a:rPr lang="en-US" sz="2800" i="0" dirty="0"/>
-              <a:t> or </a:t>
-            </a:r>
-            <a:r>
-              <a:rPr lang="en-US" sz="2800" dirty="0"/>
-              <a:t>build</a:t>
-            </a:r>
-            <a:r>
-              <a:rPr lang="en-US" sz="2800" i="0" dirty="0"/>
-              <a:t> or </a:t>
-            </a:r>
-            <a:r>
-              <a:rPr lang="en-US" sz="2800" dirty="0"/>
-              <a:t>install</a:t>
-            </a:r>
-          </a:p>
-          <a:p>
-            <a:r>
-              <a:rPr lang="en-US" sz="2800" i="0" dirty="0"/>
-              <a:t>Work from either your tablet &amp; desktop</a:t>
-            </a:r>
-          </a:p>
-          <a:p>
-            <a:r>
-              <a:rPr lang="en-US" sz="2800" i="0" dirty="0"/>
-              <a:t>Fast, interactive scientific plotting</a:t>
-            </a:r>
-          </a:p>
-          <a:p>
-            <a:r>
-              <a:rPr lang="en-US" sz="2800" i="0" dirty="0"/>
-              <a:t>Modern JavaScript:</a:t>
-            </a:r>
-          </a:p>
-          <a:p>
-            <a:pPr lvl="1"/>
-            <a:r>
-              <a:rPr lang="en-US" sz="2400" i="0" dirty="0"/>
-              <a:t>Angular, Bootstrap, D3.js</a:t>
-            </a:r>
-          </a:p>
-        </p:txBody>
-      </p:sp>
-      <p:pic>
-        <p:nvPicPr>
-          <p:cNvPr id="4" name="Picture 3" descr="bootstrap.png"/>
-          <p:cNvPicPr>
-            <a:picLocks noChangeAspect="1"/>
-          </p:cNvPicPr>
-          <p:nvPr/>
-        </p:nvPicPr>
-        <p:blipFill>
-          <a:blip r:embed="rId3" cstate="print">
-            <a:extLst>
-              <a:ext uri="{28A0092B-C50C-407E-A947-70E740481C1C}">
-                <a14:useLocalDpi xmlns:a14="http://schemas.microsoft.com/office/drawing/2010/main" val="0"/>
-              </a:ext>
-            </a:extLst>
-          </a:blip>
-          <a:stretch>
-            <a:fillRect/>
-          </a:stretch>
-        </p:blipFill>
-        <p:spPr>
-          <a:xfrm>
-            <a:off x="3692771" y="1028417"/>
-            <a:ext cx="1426862" cy="1426862"/>
-          </a:xfrm>
-          <a:prstGeom prst="rect">
-            <a:avLst/>
-          </a:prstGeom>
-        </p:spPr>
-      </p:pic>
-      <p:pic>
-        <p:nvPicPr>
-          <p:cNvPr id="5" name="Picture 4" descr="angular.png"/>
-          <p:cNvPicPr>
-            <a:picLocks noChangeAspect="1"/>
-          </p:cNvPicPr>
-          <p:nvPr/>
-        </p:nvPicPr>
-        <p:blipFill>
-          <a:blip r:embed="rId4">
-            <a:extLst>
-              <a:ext uri="{28A0092B-C50C-407E-A947-70E740481C1C}">
-                <a14:useLocalDpi xmlns:a14="http://schemas.microsoft.com/office/drawing/2010/main" val="0"/>
-              </a:ext>
-            </a:extLst>
-          </a:blip>
-          <a:stretch>
-            <a:fillRect/>
-          </a:stretch>
-        </p:blipFill>
-        <p:spPr>
-          <a:xfrm>
-            <a:off x="698241" y="805700"/>
-            <a:ext cx="1860321" cy="1860321"/>
-          </a:xfrm>
-          <a:prstGeom prst="rect">
-            <a:avLst/>
-          </a:prstGeom>
-        </p:spPr>
-      </p:pic>
-      <p:pic>
-        <p:nvPicPr>
-          <p:cNvPr id="6" name="Picture 5" descr="d3.png"/>
-          <p:cNvPicPr>
-            <a:picLocks noChangeAspect="1"/>
-          </p:cNvPicPr>
-          <p:nvPr/>
-        </p:nvPicPr>
-        <p:blipFill>
-          <a:blip r:embed="rId5" cstate="print">
-            <a:extLst>
-              <a:ext uri="{28A0092B-C50C-407E-A947-70E740481C1C}">
-                <a14:useLocalDpi xmlns:a14="http://schemas.microsoft.com/office/drawing/2010/main" val="0"/>
-              </a:ext>
-            </a:extLst>
-          </a:blip>
-          <a:stretch>
-            <a:fillRect/>
-          </a:stretch>
-        </p:blipFill>
-        <p:spPr>
-          <a:xfrm>
-            <a:off x="6418386" y="1028417"/>
-            <a:ext cx="1489358" cy="1414889"/>
-          </a:xfrm>
-          <a:prstGeom prst="rect">
-            <a:avLst/>
-          </a:prstGeom>
-        </p:spPr>
-      </p:pic>
-    </p:spTree>
-    <p:extLst>
-      <p:ext uri="{BB962C8B-B14F-4D97-AF65-F5344CB8AC3E}">
-        <p14:creationId xmlns:p14="http://schemas.microsoft.com/office/powerpoint/2010/main" val="205565935"/>
-      </p:ext>
-    </p:extLst>
-  </p:cSld>
-  <p:clrMapOvr>
-    <a:masterClrMapping/>
-  </p:clrMapOvr>
-</p:sld>
-</file>
-
-<file path=ppt/slides/slide18.xml><?xml version="1.0" encoding="utf-8"?>
-<p:sld xmlns:a="http://schemas.openxmlformats.org/drawingml/2006/main" xmlns:r="http://schemas.openxmlformats.org/officeDocument/2006/relationships" xmlns:p="http://schemas.openxmlformats.org/presentationml/2006/main">
-  <p:cSld>
-    <p:spTree>
-      <p:nvGrpSpPr>
-        <p:cNvPr id="1" name=""/>
-        <p:cNvGrpSpPr/>
-        <p:nvPr/>
-      </p:nvGrpSpPr>
-      <p:grpSpPr>
-        <a:xfrm>
-          <a:off x="0" y="0"/>
-          <a:ext cx="0" cy="0"/>
-          <a:chOff x="0" y="0"/>
-          <a:chExt cx="0" cy="0"/>
-        </a:xfrm>
-      </p:grpSpPr>
-      <p:sp>
-        <p:nvSpPr>
-          <p:cNvPr id="2" name="Title 1"/>
-          <p:cNvSpPr>
-            <a:spLocks noGrp="1"/>
-          </p:cNvSpPr>
-          <p:nvPr>
-            <p:ph type="title"/>
-          </p:nvPr>
-        </p:nvSpPr>
-        <p:spPr>
-          <a:xfrm>
-            <a:off x="975945" y="430821"/>
-            <a:ext cx="8015654" cy="589085"/>
-          </a:xfrm>
-        </p:spPr>
-        <p:txBody>
-          <a:bodyPr>
-            <a:normAutofit/>
-          </a:bodyPr>
-          <a:lstStyle/>
-          <a:p>
-            <a:r>
-              <a:rPr lang="en-US" dirty="0"/>
-              <a:t>Conclusion:  many ways to share</a:t>
-            </a:r>
-          </a:p>
-        </p:txBody>
-      </p:sp>
-      <p:sp>
-        <p:nvSpPr>
-          <p:cNvPr id="3" name="Content Placeholder 2"/>
-          <p:cNvSpPr>
-            <a:spLocks noGrp="1"/>
-          </p:cNvSpPr>
-          <p:nvPr>
-            <p:ph idx="1"/>
-          </p:nvPr>
-        </p:nvSpPr>
-        <p:spPr>
-          <a:xfrm>
-            <a:off x="773722" y="1213337"/>
-            <a:ext cx="8217877" cy="4950071"/>
-          </a:xfrm>
-        </p:spPr>
-        <p:txBody>
-          <a:bodyPr>
-            <a:normAutofit/>
-          </a:bodyPr>
-          <a:lstStyle/>
-          <a:p>
-            <a:r>
-              <a:rPr lang="en-US" i="0" dirty="0"/>
-              <a:t>Simple web link to run on the same server</a:t>
-            </a:r>
-          </a:p>
-          <a:p>
-            <a:pPr lvl="1"/>
-            <a:r>
-              <a:rPr lang="en-US" i="0" dirty="0"/>
-              <a:t>email or IM a URL to your colleague</a:t>
-            </a:r>
-          </a:p>
-          <a:p>
-            <a:r>
-              <a:rPr lang="en-US" i="0" dirty="0"/>
-              <a:t>Self-extracting simulations</a:t>
-            </a:r>
-          </a:p>
-          <a:p>
-            <a:pPr lvl="1"/>
-            <a:r>
-              <a:rPr lang="en-US" i="0" dirty="0"/>
-              <a:t>alternative to URL when colleague uses different server</a:t>
-            </a:r>
-          </a:p>
-          <a:p>
-            <a:pPr lvl="1"/>
-            <a:r>
-              <a:rPr lang="en-US" i="0" dirty="0"/>
-              <a:t>put (potentially large) HTML file on Dropbox (for example)</a:t>
-            </a:r>
-          </a:p>
-          <a:p>
-            <a:pPr lvl="1"/>
-            <a:r>
-              <a:rPr lang="en-US" i="0" dirty="0"/>
-              <a:t>colleague double-clicks and specifies Sirepo server to use</a:t>
-            </a:r>
-          </a:p>
-          <a:p>
-            <a:r>
-              <a:rPr lang="en-US" i="0" dirty="0"/>
-              <a:t>Zipped archive (used for self-extracting feature)</a:t>
-            </a:r>
-          </a:p>
-          <a:p>
-            <a:r>
-              <a:rPr lang="en-US" i="0" dirty="0"/>
-              <a:t>Python source for CLI</a:t>
-            </a:r>
-          </a:p>
-          <a:p>
-            <a:pPr lvl="1"/>
-            <a:r>
-              <a:rPr lang="en-US" i="0" dirty="0"/>
-              <a:t>the Sirepo GUI never constrains power users</a:t>
-            </a:r>
-          </a:p>
-          <a:p>
-            <a:pPr lvl="1"/>
-            <a:r>
-              <a:rPr lang="en-US" i="0" dirty="0"/>
-              <a:t>easy interaction between new users and expert</a:t>
-            </a:r>
-          </a:p>
-          <a:p>
-            <a:r>
-              <a:rPr lang="en-US" i="0" dirty="0"/>
-              <a:t>IPython/Jupyter compatible</a:t>
-            </a:r>
-          </a:p>
-          <a:p>
-            <a:pPr lvl="1"/>
-            <a:r>
-              <a:rPr lang="en-US" i="0" dirty="0"/>
-              <a:t>manual now, but will be automated in the future</a:t>
-            </a:r>
-          </a:p>
-          <a:p>
-            <a:endParaRPr lang="en-US" i="0" dirty="0"/>
-          </a:p>
-        </p:txBody>
-      </p:sp>
-    </p:spTree>
-    <p:extLst>
-      <p:ext uri="{BB962C8B-B14F-4D97-AF65-F5344CB8AC3E}">
-        <p14:creationId xmlns:p14="http://schemas.microsoft.com/office/powerpoint/2010/main" val="1656982388"/>
-      </p:ext>
-    </p:extLst>
-  </p:cSld>
-  <p:clrMapOvr>
-    <a:masterClrMapping/>
-  </p:clrMapOvr>
-</p:sld>
-</file>
-
 <file path=ppt/slides/slide2.xml><?xml version="1.0" encoding="utf-8"?>
 <p:sld xmlns:a="http://schemas.openxmlformats.org/drawingml/2006/main" xmlns:r="http://schemas.openxmlformats.org/officeDocument/2006/relationships" xmlns:p="http://schemas.openxmlformats.org/presentationml/2006/main">
   <p:cSld>
@@ -6740,6 +7621,738 @@
     <p:extLst>
       <p:ext uri="{BB962C8B-B14F-4D97-AF65-F5344CB8AC3E}">
         <p14:creationId xmlns:p14="http://schemas.microsoft.com/office/powerpoint/2010/main" val="1148129030"/>
+      </p:ext>
+    </p:extLst>
+  </p:cSld>
+  <p:clrMapOvr>
+    <a:masterClrMapping/>
+  </p:clrMapOvr>
+</p:sld>
+</file>
+
+<file path=ppt/slides/slide20.xml><?xml version="1.0" encoding="utf-8"?>
+<p:sld xmlns:a="http://schemas.openxmlformats.org/drawingml/2006/main" xmlns:r="http://schemas.openxmlformats.org/officeDocument/2006/relationships" xmlns:p="http://schemas.openxmlformats.org/presentationml/2006/main">
+  <p:cSld>
+    <p:spTree>
+      <p:nvGrpSpPr>
+        <p:cNvPr id="1" name=""/>
+        <p:cNvGrpSpPr/>
+        <p:nvPr/>
+      </p:nvGrpSpPr>
+      <p:grpSpPr>
+        <a:xfrm>
+          <a:off x="0" y="0"/>
+          <a:ext cx="0" cy="0"/>
+          <a:chOff x="0" y="0"/>
+          <a:chExt cx="0" cy="0"/>
+        </a:xfrm>
+      </p:grpSpPr>
+      <p:sp>
+        <p:nvSpPr>
+          <p:cNvPr id="2" name="Title 1"/>
+          <p:cNvSpPr>
+            <a:spLocks noGrp="1"/>
+          </p:cNvSpPr>
+          <p:nvPr>
+            <p:ph type="title"/>
+          </p:nvPr>
+        </p:nvSpPr>
+        <p:spPr>
+          <a:xfrm>
+            <a:off x="0" y="70385"/>
+            <a:ext cx="9144000" cy="589085"/>
+          </a:xfrm>
+        </p:spPr>
+        <p:txBody>
+          <a:bodyPr>
+            <a:normAutofit/>
+          </a:bodyPr>
+          <a:lstStyle/>
+          <a:p>
+            <a:r>
+              <a:rPr lang="en-US" dirty="0"/>
+              <a:t>Delivering Codes via Docker Images</a:t>
+            </a:r>
+          </a:p>
+        </p:txBody>
+      </p:sp>
+      <p:sp>
+        <p:nvSpPr>
+          <p:cNvPr id="3" name="Content Placeholder 2"/>
+          <p:cNvSpPr>
+            <a:spLocks noGrp="1"/>
+          </p:cNvSpPr>
+          <p:nvPr>
+            <p:ph idx="1"/>
+          </p:nvPr>
+        </p:nvSpPr>
+        <p:spPr>
+          <a:xfrm>
+            <a:off x="152400" y="1292464"/>
+            <a:ext cx="8839200" cy="5011617"/>
+          </a:xfrm>
+        </p:spPr>
+        <p:txBody>
+          <a:bodyPr>
+            <a:normAutofit lnSpcReduction="10000"/>
+          </a:bodyPr>
+          <a:lstStyle/>
+          <a:p>
+            <a:r>
+              <a:rPr lang="en-US" sz="2000" i="0" dirty="0"/>
+              <a:t>Seven particle accelerator codes are available </a:t>
+            </a:r>
+            <a:r>
+              <a:rPr lang="en-US" sz="2000" i="0" dirty="0">
+                <a:solidFill>
+                  <a:srgbClr val="FF0000"/>
+                </a:solidFill>
+              </a:rPr>
+              <a:t>(more on the way)</a:t>
+            </a:r>
+          </a:p>
+          <a:p>
+            <a:pPr lvl="1"/>
+            <a:r>
+              <a:rPr lang="en-US" sz="1800" i="0" dirty="0"/>
+              <a:t>X-ray:      SRW, Shadow3</a:t>
+            </a:r>
+          </a:p>
+          <a:p>
+            <a:pPr lvl="1"/>
+            <a:r>
+              <a:rPr lang="en-US" sz="1800" i="0" dirty="0"/>
+              <a:t>Beams:   Synergia, Warp, Elegant/SDDS, Hellweg</a:t>
+            </a:r>
+          </a:p>
+          <a:p>
+            <a:pPr lvl="2"/>
+            <a:r>
+              <a:rPr lang="en-US" sz="1600" b="1" i="0" dirty="0"/>
+              <a:t>coming soon:  MAD-X, PTC</a:t>
+            </a:r>
+          </a:p>
+          <a:p>
+            <a:pPr lvl="1"/>
+            <a:r>
+              <a:rPr lang="en-US" sz="1800" i="0" dirty="0"/>
+              <a:t>FELs:        Genesis v.2</a:t>
+            </a:r>
+          </a:p>
+          <a:p>
+            <a:r>
+              <a:rPr lang="en-US" sz="2000" i="0" dirty="0"/>
+              <a:t>Three user interface (UI) modes are supported: </a:t>
+            </a:r>
+          </a:p>
+          <a:p>
+            <a:pPr lvl="1"/>
+            <a:r>
+              <a:rPr lang="en-US" sz="1800" i="0" dirty="0"/>
+              <a:t>Sirepo (GUI);  Jupyter (IPython notebooks);  command-line (CLI)</a:t>
+            </a:r>
+          </a:p>
+          <a:p>
+            <a:r>
+              <a:rPr lang="en-US" sz="2000" i="0" dirty="0"/>
+              <a:t>Automated build/test/release to Docker Hub and to PyPI</a:t>
+            </a:r>
+          </a:p>
+          <a:p>
+            <a:r>
+              <a:rPr lang="en-US" sz="2000" i="0" dirty="0"/>
+              <a:t>One command to download/install/run:</a:t>
+            </a:r>
+            <a:endParaRPr lang="en-US" i="0" dirty="0"/>
+          </a:p>
+          <a:p>
+            <a:pPr marL="0" indent="0">
+              <a:spcBef>
+                <a:spcPts val="600"/>
+              </a:spcBef>
+              <a:buNone/>
+            </a:pPr>
+            <a:r>
+              <a:rPr lang="en-US" sz="2000" i="0" dirty="0">
+                <a:latin typeface="Courier New" panose="02070309020205020404" pitchFamily="49" charset="0"/>
+                <a:cs typeface="Courier New" panose="02070309020205020404" pitchFamily="49" charset="0"/>
+              </a:rPr>
+              <a:t>         &gt;  docker run –p 8000:8000 radiasoft/sirepo</a:t>
+            </a:r>
+            <a:endParaRPr lang="en-US" i="0" dirty="0">
+              <a:latin typeface="Courier New" panose="02070309020205020404" pitchFamily="49" charset="0"/>
+              <a:cs typeface="Courier New" panose="02070309020205020404" pitchFamily="49" charset="0"/>
+            </a:endParaRPr>
+          </a:p>
+          <a:p>
+            <a:pPr lvl="2"/>
+            <a:endParaRPr lang="en-US" sz="1400" i="0" dirty="0"/>
+          </a:p>
+          <a:p>
+            <a:r>
+              <a:rPr lang="en-US" sz="2000" i="0" dirty="0"/>
+              <a:t>RadiaSoft code on GitHub:    </a:t>
+            </a:r>
+            <a:r>
+              <a:rPr lang="en-US" sz="1600" i="0" u="sng" dirty="0">
+                <a:solidFill>
+                  <a:srgbClr val="000000"/>
+                </a:solidFill>
+                <a:latin typeface="Courier New" panose="02070309020205020404" pitchFamily="49" charset="0"/>
+                <a:hlinkClick r:id="rId3"/>
+              </a:rPr>
+              <a:t>http://sirepo.com</a:t>
+            </a:r>
+            <a:r>
+              <a:rPr lang="en-US" sz="1600" i="0" dirty="0">
+                <a:solidFill>
+                  <a:srgbClr val="000000"/>
+                </a:solidFill>
+              </a:rPr>
+              <a:t>          </a:t>
+            </a:r>
+            <a:r>
+              <a:rPr lang="en-US" sz="1600" i="0" dirty="0">
+                <a:solidFill>
+                  <a:srgbClr val="0070C0"/>
+                </a:solidFill>
+              </a:rPr>
+              <a:t>(primary repo)</a:t>
+            </a:r>
+            <a:endParaRPr lang="en-US" sz="2000" i="0" dirty="0">
+              <a:solidFill>
+                <a:srgbClr val="0070C0"/>
+              </a:solidFill>
+            </a:endParaRPr>
+          </a:p>
+          <a:p>
+            <a:pPr marL="457200" lvl="1" indent="0">
+              <a:buNone/>
+            </a:pPr>
+            <a:r>
+              <a:rPr lang="en-US" sz="1600" i="0" dirty="0">
+                <a:cs typeface="Courier New" panose="02070309020205020404" pitchFamily="49" charset="0"/>
+              </a:rPr>
+              <a:t>                                                               </a:t>
+            </a:r>
+            <a:r>
+              <a:rPr lang="en-US" sz="1600" i="0" dirty="0">
+                <a:latin typeface="Courier New" panose="02070309020205020404" pitchFamily="49" charset="0"/>
+                <a:cs typeface="Courier New" panose="02070309020205020404" pitchFamily="49" charset="0"/>
+                <a:hlinkClick r:id="rId4"/>
+              </a:rPr>
+              <a:t>https://github.com/radiasoft</a:t>
+            </a:r>
+            <a:r>
+              <a:rPr lang="en-US" sz="1600" i="0" dirty="0">
+                <a:latin typeface="Courier New" panose="02070309020205020404" pitchFamily="49" charset="0"/>
+                <a:cs typeface="Courier New" panose="02070309020205020404" pitchFamily="49" charset="0"/>
+              </a:rPr>
+              <a:t>  </a:t>
+            </a:r>
+            <a:r>
+              <a:rPr lang="en-US" sz="1600" i="0" dirty="0">
+                <a:cs typeface="Courier New" panose="02070309020205020404" pitchFamily="49" charset="0"/>
+              </a:rPr>
+              <a:t>(all)</a:t>
+            </a:r>
+          </a:p>
+          <a:p>
+            <a:pPr lvl="3"/>
+            <a:endParaRPr lang="en-US" sz="1400" i="0" dirty="0">
+              <a:cs typeface="Courier New" panose="02070309020205020404" pitchFamily="49" charset="0"/>
+            </a:endParaRPr>
+          </a:p>
+          <a:p>
+            <a:r>
+              <a:rPr lang="en-US" sz="2000" i="0" dirty="0"/>
+              <a:t>Try it yourself on RadiaSoft servers:  </a:t>
+            </a:r>
+            <a:r>
+              <a:rPr lang="en-US" sz="1600" i="0" dirty="0">
+                <a:latin typeface="Courier New" panose="02070309020205020404" pitchFamily="49" charset="0"/>
+                <a:cs typeface="Courier New" panose="02070309020205020404" pitchFamily="49" charset="0"/>
+                <a:hlinkClick r:id="rId5"/>
+              </a:rPr>
+              <a:t>https://beta.sirepo.com</a:t>
+            </a:r>
+            <a:r>
+              <a:rPr lang="en-US" sz="1800" i="0" dirty="0">
+                <a:latin typeface="Courier New" panose="02070309020205020404" pitchFamily="49" charset="0"/>
+                <a:cs typeface="Courier New" panose="02070309020205020404" pitchFamily="49" charset="0"/>
+              </a:rPr>
+              <a:t> </a:t>
+            </a:r>
+            <a:endParaRPr lang="en-US" sz="2000" i="0" dirty="0"/>
+          </a:p>
+          <a:p>
+            <a:pPr marL="457200" lvl="1" indent="0">
+              <a:buNone/>
+            </a:pPr>
+            <a:r>
+              <a:rPr lang="en-US" sz="1600" i="0" dirty="0"/>
+              <a:t>                                                                           </a:t>
+            </a:r>
+            <a:r>
+              <a:rPr lang="en-US" sz="1600" i="0" dirty="0">
+                <a:latin typeface="Courier New" panose="02070309020205020404" pitchFamily="49" charset="0"/>
+                <a:cs typeface="Courier New" panose="02070309020205020404" pitchFamily="49" charset="0"/>
+                <a:hlinkClick r:id="rId6"/>
+              </a:rPr>
+              <a:t>https://jupyter.radiasoft.org</a:t>
+            </a:r>
+            <a:r>
+              <a:rPr lang="en-US" sz="1600" i="0" dirty="0"/>
+              <a:t> </a:t>
+            </a:r>
+            <a:endParaRPr lang="en-US" sz="1400" i="0" dirty="0">
+              <a:latin typeface="Courier New" panose="02070309020205020404" pitchFamily="49" charset="0"/>
+              <a:cs typeface="Courier New" panose="02070309020205020404" pitchFamily="49" charset="0"/>
+            </a:endParaRPr>
+          </a:p>
+        </p:txBody>
+      </p:sp>
+      <p:sp>
+        <p:nvSpPr>
+          <p:cNvPr id="4" name="TextBox 3"/>
+          <p:cNvSpPr txBox="1"/>
+          <p:nvPr/>
+        </p:nvSpPr>
+        <p:spPr>
+          <a:xfrm>
+            <a:off x="2822331" y="791301"/>
+            <a:ext cx="5284177" cy="369332"/>
+          </a:xfrm>
+          <a:prstGeom prst="rect">
+            <a:avLst/>
+          </a:prstGeom>
+          <a:noFill/>
+        </p:spPr>
+        <p:txBody>
+          <a:bodyPr wrap="square" rtlCol="0">
+            <a:spAutoFit/>
+          </a:bodyPr>
+          <a:lstStyle/>
+          <a:p>
+            <a:r>
+              <a:rPr lang="en-US" dirty="0">
+                <a:latin typeface="Courier New" panose="02070309020205020404" pitchFamily="49" charset="0"/>
+                <a:cs typeface="Courier New" panose="02070309020205020404" pitchFamily="49" charset="0"/>
+                <a:hlinkClick r:id="rId7"/>
+              </a:rPr>
+              <a:t>https://hub.docker.com/r/radiasoft/</a:t>
+            </a:r>
+            <a:r>
+              <a:rPr lang="en-US" dirty="0">
+                <a:latin typeface="Courier New" panose="02070309020205020404" pitchFamily="49" charset="0"/>
+                <a:cs typeface="Courier New" panose="02070309020205020404" pitchFamily="49" charset="0"/>
+              </a:rPr>
+              <a:t> </a:t>
+            </a:r>
+          </a:p>
+        </p:txBody>
+      </p:sp>
+    </p:spTree>
+    <p:extLst>
+      <p:ext uri="{BB962C8B-B14F-4D97-AF65-F5344CB8AC3E}">
+        <p14:creationId xmlns:p14="http://schemas.microsoft.com/office/powerpoint/2010/main" val="1528542507"/>
+      </p:ext>
+    </p:extLst>
+  </p:cSld>
+  <p:clrMapOvr>
+    <a:masterClrMapping/>
+  </p:clrMapOvr>
+</p:sld>
+</file>
+
+<file path=ppt/slides/slide21.xml><?xml version="1.0" encoding="utf-8"?>
+<p:sld xmlns:a="http://schemas.openxmlformats.org/drawingml/2006/main" xmlns:r="http://schemas.openxmlformats.org/officeDocument/2006/relationships" xmlns:p="http://schemas.openxmlformats.org/presentationml/2006/main">
+  <p:cSld>
+    <p:spTree>
+      <p:nvGrpSpPr>
+        <p:cNvPr id="1" name=""/>
+        <p:cNvGrpSpPr/>
+        <p:nvPr/>
+      </p:nvGrpSpPr>
+      <p:grpSpPr>
+        <a:xfrm>
+          <a:off x="0" y="0"/>
+          <a:ext cx="0" cy="0"/>
+          <a:chOff x="0" y="0"/>
+          <a:chExt cx="0" cy="0"/>
+        </a:xfrm>
+      </p:grpSpPr>
+      <p:sp>
+        <p:nvSpPr>
+          <p:cNvPr id="2" name="Title 1"/>
+          <p:cNvSpPr>
+            <a:spLocks noGrp="1"/>
+          </p:cNvSpPr>
+          <p:nvPr>
+            <p:ph type="title"/>
+          </p:nvPr>
+        </p:nvSpPr>
+        <p:spPr>
+          <a:xfrm>
+            <a:off x="0" y="6946"/>
+            <a:ext cx="9144000" cy="589085"/>
+          </a:xfrm>
+        </p:spPr>
+        <p:txBody>
+          <a:bodyPr>
+            <a:normAutofit/>
+          </a:bodyPr>
+          <a:lstStyle/>
+          <a:p>
+            <a:r>
+              <a:rPr lang="en-US" dirty="0"/>
+              <a:t>…more on version management</a:t>
+            </a:r>
+            <a:endParaRPr lang="en-US" b="0" dirty="0"/>
+          </a:p>
+        </p:txBody>
+      </p:sp>
+      <p:sp>
+        <p:nvSpPr>
+          <p:cNvPr id="3" name="Content Placeholder 2"/>
+          <p:cNvSpPr>
+            <a:spLocks noGrp="1"/>
+          </p:cNvSpPr>
+          <p:nvPr>
+            <p:ph idx="1"/>
+          </p:nvPr>
+        </p:nvSpPr>
+        <p:spPr>
+          <a:xfrm>
+            <a:off x="476250" y="816248"/>
+            <a:ext cx="8191500" cy="5227501"/>
+          </a:xfrm>
+        </p:spPr>
+        <p:txBody>
+          <a:bodyPr>
+            <a:normAutofit/>
+          </a:bodyPr>
+          <a:lstStyle/>
+          <a:p>
+            <a:r>
+              <a:rPr lang="en-US" dirty="0"/>
+              <a:t>We also implemented automatic and uniform version management through a channel update mechanism similar to CoreOS[ ]. Instead of the usual system of having major version numbers, we deliver the entire application atomically on a channel. Each software release (embedded in a Docker image) is given a chronological version, and enters the staging pipeline. Only those releases which pass the development and alpha channels reach public beta, and those that pass beta become available generally.</a:t>
+            </a:r>
+          </a:p>
+          <a:p>
+            <a:r>
+              <a:rPr lang="en-US" dirty="0"/>
+              <a:t>The Sirepo platform implements three containers running separate services to provide web-based access to Warp. On Linux, the container components are run as independent services. This enables scaling the web service over multiple computers, thus allowing multiple jobs to run simultaneously on independent compute nodes. Within a single instance of one container, Warp runs in parallel using MPI. The job queue is managed by a different container running RabbitMQ [ ].</a:t>
+            </a:r>
+          </a:p>
+        </p:txBody>
+      </p:sp>
+    </p:spTree>
+    <p:extLst>
+      <p:ext uri="{BB962C8B-B14F-4D97-AF65-F5344CB8AC3E}">
+        <p14:creationId xmlns:p14="http://schemas.microsoft.com/office/powerpoint/2010/main" val="440473678"/>
+      </p:ext>
+    </p:extLst>
+  </p:cSld>
+  <p:clrMapOvr>
+    <a:masterClrMapping/>
+  </p:clrMapOvr>
+</p:sld>
+</file>
+
+<file path=ppt/slides/slide22.xml><?xml version="1.0" encoding="utf-8"?>
+<p:sld xmlns:a="http://schemas.openxmlformats.org/drawingml/2006/main" xmlns:r="http://schemas.openxmlformats.org/officeDocument/2006/relationships" xmlns:p="http://schemas.openxmlformats.org/presentationml/2006/main">
+  <p:cSld>
+    <p:spTree>
+      <p:nvGrpSpPr>
+        <p:cNvPr id="1" name=""/>
+        <p:cNvGrpSpPr/>
+        <p:nvPr/>
+      </p:nvGrpSpPr>
+      <p:grpSpPr>
+        <a:xfrm>
+          <a:off x="0" y="0"/>
+          <a:ext cx="0" cy="0"/>
+          <a:chOff x="0" y="0"/>
+          <a:chExt cx="0" cy="0"/>
+        </a:xfrm>
+      </p:grpSpPr>
+      <p:sp>
+        <p:nvSpPr>
+          <p:cNvPr id="2" name="Title 1"/>
+          <p:cNvSpPr>
+            <a:spLocks noGrp="1"/>
+          </p:cNvSpPr>
+          <p:nvPr>
+            <p:ph type="title"/>
+          </p:nvPr>
+        </p:nvSpPr>
+        <p:spPr>
+          <a:xfrm>
+            <a:off x="975946" y="298936"/>
+            <a:ext cx="8015654" cy="589085"/>
+          </a:xfrm>
+        </p:spPr>
+        <p:txBody>
+          <a:bodyPr>
+            <a:normAutofit/>
+          </a:bodyPr>
+          <a:lstStyle/>
+          <a:p>
+            <a:r>
+              <a:rPr lang="en-US" dirty="0"/>
+              <a:t>Version Management</a:t>
+            </a:r>
+          </a:p>
+        </p:txBody>
+      </p:sp>
+      <p:sp>
+        <p:nvSpPr>
+          <p:cNvPr id="3" name="Content Placeholder 2"/>
+          <p:cNvSpPr>
+            <a:spLocks noGrp="1"/>
+          </p:cNvSpPr>
+          <p:nvPr>
+            <p:ph idx="1"/>
+          </p:nvPr>
+        </p:nvSpPr>
+        <p:spPr>
+          <a:xfrm>
+            <a:off x="152400" y="1002323"/>
+            <a:ext cx="8839200" cy="5161086"/>
+          </a:xfrm>
+        </p:spPr>
+        <p:txBody>
+          <a:bodyPr>
+            <a:normAutofit/>
+          </a:bodyPr>
+          <a:lstStyle/>
+          <a:p>
+            <a:r>
+              <a:rPr lang="en-US" i="0" dirty="0"/>
+              <a:t>Images are identified by chronological version</a:t>
+            </a:r>
+          </a:p>
+          <a:p>
+            <a:pPr lvl="1"/>
+            <a:r>
+              <a:rPr lang="en-US" i="0" dirty="0"/>
+              <a:t>does not interfere with systems used by the code developers</a:t>
+            </a:r>
+          </a:p>
+          <a:p>
+            <a:pPr lvl="1"/>
+            <a:r>
+              <a:rPr lang="en-US" i="0" dirty="0"/>
+              <a:t>provides meaningful versioning, as necessary for reproducibility</a:t>
+            </a:r>
+          </a:p>
+          <a:p>
+            <a:r>
+              <a:rPr lang="en-US" i="0" dirty="0"/>
+              <a:t>Channels are declared for the main git branch:</a:t>
+            </a:r>
+          </a:p>
+          <a:p>
+            <a:pPr lvl="1"/>
+            <a:r>
+              <a:rPr lang="en-US" i="0" dirty="0"/>
+              <a:t>dev    (latest, specified by default)</a:t>
+            </a:r>
+          </a:p>
+          <a:p>
+            <a:pPr lvl="1"/>
+            <a:r>
+              <a:rPr lang="en-US" i="0" dirty="0"/>
+              <a:t>alpha (internal testing)</a:t>
+            </a:r>
+          </a:p>
+          <a:p>
+            <a:pPr lvl="1"/>
+            <a:r>
+              <a:rPr lang="en-US" i="0" dirty="0"/>
+              <a:t>beta   (external testing)</a:t>
+            </a:r>
+          </a:p>
+          <a:p>
+            <a:pPr lvl="1"/>
+            <a:r>
+              <a:rPr lang="en-US" i="0" dirty="0"/>
+              <a:t>prod   (ready for production release)</a:t>
+            </a:r>
+          </a:p>
+          <a:p>
+            <a:r>
+              <a:rPr lang="en-US" i="0" dirty="0"/>
+              <a:t>Each container image includes a ‘manifest’</a:t>
+            </a:r>
+          </a:p>
+          <a:p>
+            <a:pPr lvl="1"/>
+            <a:r>
+              <a:rPr lang="en-US" i="0" dirty="0"/>
+              <a:t>describes the image &amp; codes,   rsmanifest.json</a:t>
+            </a:r>
+          </a:p>
+          <a:p>
+            <a:r>
+              <a:rPr lang="en-US" i="0" dirty="0"/>
+              <a:t>Source code for each application is stored in the image</a:t>
+            </a:r>
+          </a:p>
+          <a:p>
+            <a:r>
+              <a:rPr lang="en-US" i="0" dirty="0"/>
+              <a:t>Code versions/commits can be queried by simulations</a:t>
+            </a:r>
+          </a:p>
+        </p:txBody>
+      </p:sp>
+    </p:spTree>
+    <p:extLst>
+      <p:ext uri="{BB962C8B-B14F-4D97-AF65-F5344CB8AC3E}">
+        <p14:creationId xmlns:p14="http://schemas.microsoft.com/office/powerpoint/2010/main" val="2525692851"/>
+      </p:ext>
+    </p:extLst>
+  </p:cSld>
+  <p:clrMapOvr>
+    <a:masterClrMapping/>
+  </p:clrMapOvr>
+</p:sld>
+</file>
+
+<file path=ppt/slides/slide23.xml><?xml version="1.0" encoding="utf-8"?>
+<p:sld xmlns:a="http://schemas.openxmlformats.org/drawingml/2006/main" xmlns:r="http://schemas.openxmlformats.org/officeDocument/2006/relationships" xmlns:p="http://schemas.openxmlformats.org/presentationml/2006/main">
+  <p:cSld>
+    <p:spTree>
+      <p:nvGrpSpPr>
+        <p:cNvPr id="1" name=""/>
+        <p:cNvGrpSpPr/>
+        <p:nvPr/>
+      </p:nvGrpSpPr>
+      <p:grpSpPr>
+        <a:xfrm>
+          <a:off x="0" y="0"/>
+          <a:ext cx="0" cy="0"/>
+          <a:chOff x="0" y="0"/>
+          <a:chExt cx="0" cy="0"/>
+        </a:xfrm>
+      </p:grpSpPr>
+      <p:sp>
+        <p:nvSpPr>
+          <p:cNvPr id="2" name="Title 1"/>
+          <p:cNvSpPr>
+            <a:spLocks noGrp="1"/>
+          </p:cNvSpPr>
+          <p:nvPr>
+            <p:ph type="title"/>
+          </p:nvPr>
+        </p:nvSpPr>
+        <p:spPr>
+          <a:xfrm>
+            <a:off x="0" y="6946"/>
+            <a:ext cx="9144000" cy="589085"/>
+          </a:xfrm>
+        </p:spPr>
+        <p:txBody>
+          <a:bodyPr>
+            <a:normAutofit/>
+          </a:bodyPr>
+          <a:lstStyle/>
+          <a:p>
+            <a:r>
+              <a:rPr lang="en-US" dirty="0"/>
+              <a:t>What is an application container?</a:t>
+            </a:r>
+            <a:endParaRPr lang="en-US" b="0" dirty="0"/>
+          </a:p>
+        </p:txBody>
+      </p:sp>
+      <p:sp>
+        <p:nvSpPr>
+          <p:cNvPr id="3" name="Content Placeholder 2"/>
+          <p:cNvSpPr>
+            <a:spLocks noGrp="1"/>
+          </p:cNvSpPr>
+          <p:nvPr>
+            <p:ph idx="1"/>
+          </p:nvPr>
+        </p:nvSpPr>
+        <p:spPr>
+          <a:xfrm>
+            <a:off x="476250" y="816248"/>
+            <a:ext cx="8191500" cy="5227501"/>
+          </a:xfrm>
+        </p:spPr>
+        <p:txBody>
+          <a:bodyPr>
+            <a:normAutofit/>
+          </a:bodyPr>
+          <a:lstStyle/>
+          <a:p>
+            <a:r>
+              <a:rPr lang="en-US" dirty="0"/>
+              <a:t>Essential technology for cloud computing</a:t>
+            </a:r>
+          </a:p>
+          <a:p>
+            <a:pPr lvl="1"/>
+            <a:r>
+              <a:rPr lang="en-US" dirty="0"/>
+              <a:t>enables automated distribution of applications to remote servers</a:t>
+            </a:r>
+          </a:p>
+          <a:p>
+            <a:r>
+              <a:rPr lang="en-US" dirty="0"/>
+              <a:t>An abstraction of relevant resources used by a code </a:t>
+            </a:r>
+          </a:p>
+          <a:p>
+            <a:r>
+              <a:rPr lang="en-US" dirty="0"/>
+              <a:t>LXC (LinuX Container) [ ] isolates kernel resources for a collection of processes</a:t>
+            </a:r>
+          </a:p>
+          <a:p>
+            <a:pPr lvl="1"/>
+            <a:r>
+              <a:rPr lang="en-US" dirty="0"/>
+              <a:t>it is a lightweight, hosted hypervisor without the need for emulation</a:t>
+            </a:r>
+          </a:p>
+          <a:p>
+            <a:r>
+              <a:rPr lang="en-US" dirty="0"/>
+              <a:t>Vagrant [ ] is a program for configuring headless VMs and containers.</a:t>
+            </a:r>
+          </a:p>
+          <a:p>
+            <a:r>
+              <a:rPr lang="en-US" dirty="0"/>
+              <a:t>Like Vagrant, Docker [ ] is a productivity enhancer for LXC. </a:t>
+            </a:r>
+          </a:p>
+          <a:p>
+            <a:pPr lvl="1"/>
+            <a:r>
+              <a:rPr lang="en-US" dirty="0"/>
+              <a:t>It’s native on Linux</a:t>
+            </a:r>
+          </a:p>
+          <a:p>
+            <a:pPr lvl="1"/>
+            <a:r>
+              <a:rPr lang="en-US" dirty="0"/>
+              <a:t>It provides a lightweight VM on Mac and Windows</a:t>
+            </a:r>
+          </a:p>
+        </p:txBody>
+      </p:sp>
+    </p:spTree>
+    <p:extLst>
+      <p:ext uri="{BB962C8B-B14F-4D97-AF65-F5344CB8AC3E}">
+        <p14:creationId xmlns:p14="http://schemas.microsoft.com/office/powerpoint/2010/main" val="302440063"/>
       </p:ext>
     </p:extLst>
   </p:cSld>

</xml_diff>

<commit_message>
first draft more or less finished
</commit_message>
<xml_diff>
--- a/computational_reproducibility/lecture/2018_ComputationalReproducibility_Bruhwiler_USPAS.pptx
+++ b/computational_reproducibility/lecture/2018_ComputationalReproducibility_Bruhwiler_USPAS.pptx
@@ -5,7 +5,7 @@
     <p:sldMasterId id="2147483696" r:id="rId1"/>
   </p:sldMasterIdLst>
   <p:notesMasterIdLst>
-    <p:notesMasterId r:id="rId25"/>
+    <p:notesMasterId r:id="rId22"/>
   </p:notesMasterIdLst>
   <p:sldIdLst>
     <p:sldId id="297" r:id="rId2"/>
@@ -28,9 +28,6 @@
     <p:sldId id="422" r:id="rId19"/>
     <p:sldId id="394" r:id="rId20"/>
     <p:sldId id="395" r:id="rId21"/>
-    <p:sldId id="414" r:id="rId22"/>
-    <p:sldId id="396" r:id="rId23"/>
-    <p:sldId id="416" r:id="rId24"/>
   </p:sldIdLst>
   <p:sldSz cx="9144000" cy="6858000" type="screen4x3"/>
   <p:notesSz cx="6858000" cy="9144000"/>
@@ -237,7 +234,7 @@
           <a:p>
             <a:fld id="{C5D37280-896D-453C-A8B2-790CBDCE44E5}" type="datetimeFigureOut">
               <a:rPr lang="en-US" smtClean="0"/>
-              <a:t>1/7/2018</a:t>
+              <a:t>1/8/2018</a:t>
             </a:fld>
             <a:endParaRPr lang="en-US"/>
           </a:p>
@@ -1596,258 +1593,6 @@
     <p:extLst>
       <p:ext uri="{BB962C8B-B14F-4D97-AF65-F5344CB8AC3E}">
         <p14:creationId xmlns:p14="http://schemas.microsoft.com/office/powerpoint/2010/main" val="2620879761"/>
-      </p:ext>
-    </p:extLst>
-  </p:cSld>
-  <p:clrMapOvr>
-    <a:masterClrMapping/>
-  </p:clrMapOvr>
-</p:notes>
-</file>
-
-<file path=ppt/notesSlides/notesSlide21.xml><?xml version="1.0" encoding="utf-8"?>
-<p:notes xmlns:a="http://schemas.openxmlformats.org/drawingml/2006/main" xmlns:r="http://schemas.openxmlformats.org/officeDocument/2006/relationships" xmlns:p="http://schemas.openxmlformats.org/presentationml/2006/main">
-  <p:cSld>
-    <p:spTree>
-      <p:nvGrpSpPr>
-        <p:cNvPr id="1" name=""/>
-        <p:cNvGrpSpPr/>
-        <p:nvPr/>
-      </p:nvGrpSpPr>
-      <p:grpSpPr>
-        <a:xfrm>
-          <a:off x="0" y="0"/>
-          <a:ext cx="0" cy="0"/>
-          <a:chOff x="0" y="0"/>
-          <a:chExt cx="0" cy="0"/>
-        </a:xfrm>
-      </p:grpSpPr>
-      <p:sp>
-        <p:nvSpPr>
-          <p:cNvPr id="2" name="Slide Image Placeholder 1"/>
-          <p:cNvSpPr>
-            <a:spLocks noGrp="1" noRot="1" noChangeAspect="1"/>
-          </p:cNvSpPr>
-          <p:nvPr>
-            <p:ph type="sldImg"/>
-          </p:nvPr>
-        </p:nvSpPr>
-        <p:spPr/>
-      </p:sp>
-      <p:sp>
-        <p:nvSpPr>
-          <p:cNvPr id="3" name="Notes Placeholder 2"/>
-          <p:cNvSpPr>
-            <a:spLocks noGrp="1"/>
-          </p:cNvSpPr>
-          <p:nvPr>
-            <p:ph type="body" idx="1"/>
-          </p:nvPr>
-        </p:nvSpPr>
-        <p:spPr/>
-        <p:txBody>
-          <a:bodyPr/>
-          <a:lstStyle/>
-          <a:p>
-            <a:endParaRPr lang="en-US"/>
-          </a:p>
-        </p:txBody>
-      </p:sp>
-      <p:sp>
-        <p:nvSpPr>
-          <p:cNvPr id="4" name="Slide Number Placeholder 3"/>
-          <p:cNvSpPr>
-            <a:spLocks noGrp="1"/>
-          </p:cNvSpPr>
-          <p:nvPr>
-            <p:ph type="sldNum" sz="quarter" idx="10"/>
-          </p:nvPr>
-        </p:nvSpPr>
-        <p:spPr/>
-        <p:txBody>
-          <a:bodyPr/>
-          <a:lstStyle/>
-          <a:p>
-            <a:fld id="{4E0E9D85-81CD-44C8-8F15-3AA06C34AF8C}" type="slidenum">
-              <a:rPr lang="en-US" smtClean="0"/>
-              <a:t>21</a:t>
-            </a:fld>
-            <a:endParaRPr lang="en-US"/>
-          </a:p>
-        </p:txBody>
-      </p:sp>
-    </p:spTree>
-    <p:extLst>
-      <p:ext uri="{BB962C8B-B14F-4D97-AF65-F5344CB8AC3E}">
-        <p14:creationId xmlns:p14="http://schemas.microsoft.com/office/powerpoint/2010/main" val="2375859216"/>
-      </p:ext>
-    </p:extLst>
-  </p:cSld>
-  <p:clrMapOvr>
-    <a:masterClrMapping/>
-  </p:clrMapOvr>
-</p:notes>
-</file>
-
-<file path=ppt/notesSlides/notesSlide22.xml><?xml version="1.0" encoding="utf-8"?>
-<p:notes xmlns:a="http://schemas.openxmlformats.org/drawingml/2006/main" xmlns:r="http://schemas.openxmlformats.org/officeDocument/2006/relationships" xmlns:p="http://schemas.openxmlformats.org/presentationml/2006/main">
-  <p:cSld>
-    <p:spTree>
-      <p:nvGrpSpPr>
-        <p:cNvPr id="1" name=""/>
-        <p:cNvGrpSpPr/>
-        <p:nvPr/>
-      </p:nvGrpSpPr>
-      <p:grpSpPr>
-        <a:xfrm>
-          <a:off x="0" y="0"/>
-          <a:ext cx="0" cy="0"/>
-          <a:chOff x="0" y="0"/>
-          <a:chExt cx="0" cy="0"/>
-        </a:xfrm>
-      </p:grpSpPr>
-      <p:sp>
-        <p:nvSpPr>
-          <p:cNvPr id="2" name="Slide Image Placeholder 1"/>
-          <p:cNvSpPr>
-            <a:spLocks noGrp="1" noRot="1" noChangeAspect="1"/>
-          </p:cNvSpPr>
-          <p:nvPr>
-            <p:ph type="sldImg"/>
-          </p:nvPr>
-        </p:nvSpPr>
-        <p:spPr/>
-      </p:sp>
-      <p:sp>
-        <p:nvSpPr>
-          <p:cNvPr id="3" name="Notes Placeholder 2"/>
-          <p:cNvSpPr>
-            <a:spLocks noGrp="1"/>
-          </p:cNvSpPr>
-          <p:nvPr>
-            <p:ph type="body" idx="1"/>
-          </p:nvPr>
-        </p:nvSpPr>
-        <p:spPr/>
-        <p:txBody>
-          <a:bodyPr/>
-          <a:lstStyle/>
-          <a:p>
-            <a:endParaRPr lang="en-US"/>
-          </a:p>
-        </p:txBody>
-      </p:sp>
-      <p:sp>
-        <p:nvSpPr>
-          <p:cNvPr id="4" name="Slide Number Placeholder 3"/>
-          <p:cNvSpPr>
-            <a:spLocks noGrp="1"/>
-          </p:cNvSpPr>
-          <p:nvPr>
-            <p:ph type="sldNum" sz="quarter" idx="10"/>
-          </p:nvPr>
-        </p:nvSpPr>
-        <p:spPr/>
-        <p:txBody>
-          <a:bodyPr/>
-          <a:lstStyle/>
-          <a:p>
-            <a:fld id="{4E0E9D85-81CD-44C8-8F15-3AA06C34AF8C}" type="slidenum">
-              <a:rPr lang="en-US" smtClean="0"/>
-              <a:t>22</a:t>
-            </a:fld>
-            <a:endParaRPr lang="en-US"/>
-          </a:p>
-        </p:txBody>
-      </p:sp>
-    </p:spTree>
-    <p:extLst>
-      <p:ext uri="{BB962C8B-B14F-4D97-AF65-F5344CB8AC3E}">
-        <p14:creationId xmlns:p14="http://schemas.microsoft.com/office/powerpoint/2010/main" val="2480711367"/>
-      </p:ext>
-    </p:extLst>
-  </p:cSld>
-  <p:clrMapOvr>
-    <a:masterClrMapping/>
-  </p:clrMapOvr>
-</p:notes>
-</file>
-
-<file path=ppt/notesSlides/notesSlide23.xml><?xml version="1.0" encoding="utf-8"?>
-<p:notes xmlns:a="http://schemas.openxmlformats.org/drawingml/2006/main" xmlns:r="http://schemas.openxmlformats.org/officeDocument/2006/relationships" xmlns:p="http://schemas.openxmlformats.org/presentationml/2006/main">
-  <p:cSld>
-    <p:spTree>
-      <p:nvGrpSpPr>
-        <p:cNvPr id="1" name=""/>
-        <p:cNvGrpSpPr/>
-        <p:nvPr/>
-      </p:nvGrpSpPr>
-      <p:grpSpPr>
-        <a:xfrm>
-          <a:off x="0" y="0"/>
-          <a:ext cx="0" cy="0"/>
-          <a:chOff x="0" y="0"/>
-          <a:chExt cx="0" cy="0"/>
-        </a:xfrm>
-      </p:grpSpPr>
-      <p:sp>
-        <p:nvSpPr>
-          <p:cNvPr id="2" name="Slide Image Placeholder 1"/>
-          <p:cNvSpPr>
-            <a:spLocks noGrp="1" noRot="1" noChangeAspect="1"/>
-          </p:cNvSpPr>
-          <p:nvPr>
-            <p:ph type="sldImg"/>
-          </p:nvPr>
-        </p:nvSpPr>
-        <p:spPr/>
-      </p:sp>
-      <p:sp>
-        <p:nvSpPr>
-          <p:cNvPr id="3" name="Notes Placeholder 2"/>
-          <p:cNvSpPr>
-            <a:spLocks noGrp="1"/>
-          </p:cNvSpPr>
-          <p:nvPr>
-            <p:ph type="body" idx="1"/>
-          </p:nvPr>
-        </p:nvSpPr>
-        <p:spPr/>
-        <p:txBody>
-          <a:bodyPr/>
-          <a:lstStyle/>
-          <a:p>
-            <a:endParaRPr lang="en-US"/>
-          </a:p>
-        </p:txBody>
-      </p:sp>
-      <p:sp>
-        <p:nvSpPr>
-          <p:cNvPr id="4" name="Slide Number Placeholder 3"/>
-          <p:cNvSpPr>
-            <a:spLocks noGrp="1"/>
-          </p:cNvSpPr>
-          <p:nvPr>
-            <p:ph type="sldNum" sz="quarter" idx="10"/>
-          </p:nvPr>
-        </p:nvSpPr>
-        <p:spPr/>
-        <p:txBody>
-          <a:bodyPr/>
-          <a:lstStyle/>
-          <a:p>
-            <a:fld id="{4E0E9D85-81CD-44C8-8F15-3AA06C34AF8C}" type="slidenum">
-              <a:rPr lang="en-US" smtClean="0"/>
-              <a:t>23</a:t>
-            </a:fld>
-            <a:endParaRPr lang="en-US"/>
-          </a:p>
-        </p:txBody>
-      </p:sp>
-    </p:spTree>
-    <p:extLst>
-      <p:ext uri="{BB962C8B-B14F-4D97-AF65-F5344CB8AC3E}">
-        <p14:creationId xmlns:p14="http://schemas.microsoft.com/office/powerpoint/2010/main" val="1943231743"/>
       </p:ext>
     </p:extLst>
   </p:cSld>
@@ -2984,7 +2729,7 @@
               <a:pPr>
                 <a:defRPr/>
               </a:pPr>
-              <a:t>1/7/2018</a:t>
+              <a:t>1/8/2018</a:t>
             </a:fld>
             <a:endParaRPr lang="en-US"/>
           </a:p>
@@ -3169,7 +2914,7 @@
           <a:p>
             <a:fld id="{DFF43710-F8AB-6840-B03A-23D4C2B2884A}" type="datetimeFigureOut">
               <a:rPr lang="en-US" smtClean="0"/>
-              <a:t>1/7/2018</a:t>
+              <a:t>1/8/2018</a:t>
             </a:fld>
             <a:endParaRPr lang="en-US"/>
           </a:p>
@@ -3414,7 +3159,7 @@
               <a:pPr defTabSz="914400">
                 <a:defRPr/>
               </a:pPr>
-              <a:t>1/7/2018</a:t>
+              <a:t>1/8/2018</a:t>
             </a:fld>
             <a:endParaRPr lang="en-US"/>
           </a:p>
@@ -6319,7 +6064,7 @@
             <a:pPr lvl="1"/>
             <a:r>
               <a:rPr lang="en-US" dirty="0"/>
-              <a:t>DockerHub enables rapid distribution of containers</a:t>
+              <a:t>Docker Hub enables rapid distribution of containers</a:t>
             </a:r>
           </a:p>
         </p:txBody>
@@ -7222,6 +6967,150 @@
           <a:chExt cx="0" cy="0"/>
         </a:xfrm>
       </p:grpSpPr>
+      <p:sp>
+        <p:nvSpPr>
+          <p:cNvPr id="2" name="Title 1"/>
+          <p:cNvSpPr>
+            <a:spLocks noGrp="1"/>
+          </p:cNvSpPr>
+          <p:nvPr>
+            <p:ph type="title"/>
+          </p:nvPr>
+        </p:nvSpPr>
+        <p:spPr>
+          <a:xfrm>
+            <a:off x="0" y="112344"/>
+            <a:ext cx="9144000" cy="589085"/>
+          </a:xfrm>
+        </p:spPr>
+        <p:txBody>
+          <a:bodyPr>
+            <a:normAutofit/>
+          </a:bodyPr>
+          <a:lstStyle/>
+          <a:p>
+            <a:r>
+              <a:rPr lang="en-US" dirty="0"/>
+              <a:t>Running Particle Accelerator Codes inside Docker</a:t>
+            </a:r>
+          </a:p>
+        </p:txBody>
+      </p:sp>
+      <p:sp>
+        <p:nvSpPr>
+          <p:cNvPr id="3" name="Content Placeholder 2"/>
+          <p:cNvSpPr>
+            <a:spLocks noGrp="1"/>
+          </p:cNvSpPr>
+          <p:nvPr>
+            <p:ph idx="1"/>
+          </p:nvPr>
+        </p:nvSpPr>
+        <p:spPr>
+          <a:xfrm>
+            <a:off x="152400" y="879566"/>
+            <a:ext cx="8839200" cy="5283843"/>
+          </a:xfrm>
+        </p:spPr>
+        <p:txBody>
+          <a:bodyPr>
+            <a:normAutofit/>
+          </a:bodyPr>
+          <a:lstStyle/>
+          <a:p>
+            <a:r>
+              <a:rPr lang="en-US" i="0" dirty="0"/>
+              <a:t>RadiaSoft has been running HPC codes via Docker since 2015</a:t>
+            </a:r>
+          </a:p>
+          <a:p>
+            <a:pPr lvl="1"/>
+            <a:r>
+              <a:rPr lang="en-US" sz="1800" dirty="0"/>
+              <a:t>beam physics:   elegant/SDDS,  Warp,  Synergia</a:t>
+            </a:r>
+          </a:p>
+          <a:p>
+            <a:pPr lvl="1"/>
+            <a:r>
+              <a:rPr lang="en-US" sz="1800" dirty="0"/>
+              <a:t>X-ray optics &amp; synchrotron radiation:  SRW,  Shadow</a:t>
+            </a:r>
+          </a:p>
+          <a:p>
+            <a:pPr lvl="1"/>
+            <a:r>
+              <a:rPr lang="en-US" sz="1800" dirty="0"/>
+              <a:t>FELs:  Genesis</a:t>
+            </a:r>
+          </a:p>
+          <a:p>
+            <a:r>
+              <a:rPr lang="en-US" i="0" dirty="0"/>
+              <a:t>Linux</a:t>
+            </a:r>
+          </a:p>
+          <a:p>
+            <a:pPr lvl="1"/>
+            <a:r>
+              <a:rPr lang="en-US" dirty="0"/>
+              <a:t>containers run at native speeds;  MPI works well</a:t>
+            </a:r>
+            <a:endParaRPr lang="en-US" i="0" dirty="0"/>
+          </a:p>
+          <a:p>
+            <a:pPr lvl="1"/>
+            <a:r>
+              <a:rPr lang="en-US" i="0" dirty="0"/>
+              <a:t>large-scale I/O can be slow (similar to NFS; more testing required)</a:t>
+            </a:r>
+          </a:p>
+          <a:p>
+            <a:r>
+              <a:rPr lang="en-US" i="0" dirty="0"/>
+              <a:t>MacOS</a:t>
+            </a:r>
+          </a:p>
+          <a:p>
+            <a:pPr lvl="1"/>
+            <a:r>
+              <a:rPr lang="en-US" i="0" dirty="0"/>
+              <a:t>similar to Linux (we have less experience)</a:t>
+            </a:r>
+          </a:p>
+          <a:p>
+            <a:pPr lvl="1"/>
+            <a:endParaRPr lang="en-US" i="0" dirty="0"/>
+          </a:p>
+          <a:p>
+            <a:r>
+              <a:rPr lang="en-US" dirty="0"/>
+              <a:t>What about supercomputing?</a:t>
+            </a:r>
+          </a:p>
+          <a:p>
+            <a:pPr lvl="1"/>
+            <a:r>
+              <a:rPr lang="en-US" i="0" dirty="0"/>
+              <a:t>Shifter – at the NERSC supercomputing center</a:t>
+            </a:r>
+          </a:p>
+          <a:p>
+            <a:pPr lvl="2"/>
+            <a:r>
+              <a:rPr lang="en-US" dirty="0"/>
+              <a:t>optimized for Linux on the compute nodes</a:t>
+            </a:r>
+          </a:p>
+          <a:p>
+            <a:pPr lvl="2"/>
+            <a:r>
+              <a:rPr lang="en-US" dirty="0"/>
+              <a:t>compatible with Docker</a:t>
+            </a:r>
+          </a:p>
+        </p:txBody>
+      </p:sp>
       <p:pic>
         <p:nvPicPr>
           <p:cNvPr id="7" name="Picture 6" descr="docker.png"/>
@@ -7244,153 +7133,115 @@
         </p:blipFill>
         <p:spPr>
           <a:xfrm>
-            <a:off x="4926787" y="283417"/>
-            <a:ext cx="4217213" cy="1449588"/>
+            <a:off x="6430320" y="1827189"/>
+            <a:ext cx="2464526" cy="847135"/>
           </a:xfrm>
           <a:prstGeom prst="rect">
             <a:avLst/>
           </a:prstGeom>
         </p:spPr>
       </p:pic>
-      <p:sp>
-        <p:nvSpPr>
-          <p:cNvPr id="2" name="Title 1"/>
-          <p:cNvSpPr>
-            <a:spLocks noGrp="1"/>
-          </p:cNvSpPr>
-          <p:nvPr>
-            <p:ph type="title"/>
-          </p:nvPr>
+      <p:pic>
+        <p:nvPicPr>
+          <p:cNvPr id="1026" name="Picture 2" descr="Shifter logo">
+            <a:extLst>
+              <a:ext uri="{FF2B5EF4-FFF2-40B4-BE49-F238E27FC236}">
+                <a16:creationId xmlns:a16="http://schemas.microsoft.com/office/drawing/2014/main" id="{66DA49E9-6E33-4D38-9858-6ADEBD4307E3}"/>
+              </a:ext>
+            </a:extLst>
+          </p:cNvPr>
+          <p:cNvPicPr>
+            <a:picLocks noChangeAspect="1" noChangeArrowheads="1"/>
+          </p:cNvPicPr>
+          <p:nvPr/>
+        </p:nvPicPr>
+        <p:blipFill>
+          <a:blip r:embed="rId4">
+            <a:extLst>
+              <a:ext uri="{28A0092B-C50C-407E-A947-70E740481C1C}">
+                <a14:useLocalDpi xmlns:a14="http://schemas.microsoft.com/office/drawing/2010/main" val="0"/>
+              </a:ext>
+            </a:extLst>
+          </a:blip>
+          <a:srcRect/>
+          <a:stretch>
+            <a:fillRect/>
+          </a:stretch>
+        </p:blipFill>
+        <p:spPr bwMode="auto">
+          <a:xfrm>
+            <a:off x="6435628" y="4458404"/>
+            <a:ext cx="1095375" cy="1400175"/>
+          </a:xfrm>
+          <a:prstGeom prst="rect">
+            <a:avLst/>
+          </a:prstGeom>
+          <a:noFill/>
+          <a:extLst>
+            <a:ext uri="{909E8E84-426E-40DD-AFC4-6F175D3DCCD1}">
+              <a14:hiddenFill xmlns:a14="http://schemas.microsoft.com/office/drawing/2010/main">
+                <a:solidFill>
+                  <a:srgbClr val="FFFFFF"/>
+                </a:solidFill>
+              </a14:hiddenFill>
+            </a:ext>
+          </a:extLst>
+        </p:spPr>
+      </p:pic>
+      <p:sp>
+        <p:nvSpPr>
+          <p:cNvPr id="6" name="TextBox 5">
+            <a:extLst>
+              <a:ext uri="{FF2B5EF4-FFF2-40B4-BE49-F238E27FC236}">
+                <a16:creationId xmlns:a16="http://schemas.microsoft.com/office/drawing/2014/main" id="{1DE7DDFE-E229-4C3B-87E8-E52E3770DC0C}"/>
+              </a:ext>
+            </a:extLst>
+          </p:cNvPr>
+          <p:cNvSpPr txBox="1"/>
+          <p:nvPr/>
         </p:nvSpPr>
         <p:spPr>
           <a:xfrm>
-            <a:off x="0" y="112344"/>
-            <a:ext cx="9144000" cy="589085"/>
+            <a:off x="574759" y="5294862"/>
+            <a:ext cx="5975501" cy="523220"/>
           </a:xfrm>
+          <a:prstGeom prst="rect">
+            <a:avLst/>
+          </a:prstGeom>
+          <a:noFill/>
         </p:spPr>
         <p:txBody>
-          <a:bodyPr>
-            <a:normAutofit/>
+          <a:bodyPr wrap="square" rtlCol="0">
+            <a:spAutoFit/>
           </a:bodyPr>
           <a:lstStyle/>
           <a:p>
-            <a:pPr algn="l"/>
-            <a:r>
-              <a:rPr lang="en-US" dirty="0"/>
-              <a:t>          HPC Application Containers</a:t>
-            </a:r>
-          </a:p>
-        </p:txBody>
-      </p:sp>
-      <p:sp>
-        <p:nvSpPr>
-          <p:cNvPr id="3" name="Content Placeholder 2"/>
-          <p:cNvSpPr>
-            <a:spLocks noGrp="1"/>
-          </p:cNvSpPr>
-          <p:nvPr>
-            <p:ph idx="1"/>
-          </p:nvPr>
-        </p:nvSpPr>
-        <p:spPr>
-          <a:xfrm>
-            <a:off x="152400" y="1558834"/>
-            <a:ext cx="8839200" cy="4604575"/>
-          </a:xfrm>
-        </p:spPr>
-        <p:txBody>
-          <a:bodyPr>
-            <a:normAutofit/>
-          </a:bodyPr>
-          <a:lstStyle/>
-          <a:p>
-            <a:r>
-              <a:rPr lang="en-US" i="0" dirty="0"/>
-              <a:t>Executable, portable archive of code and all dependencies</a:t>
-            </a:r>
-          </a:p>
-          <a:p>
-            <a:pPr lvl="1"/>
-            <a:r>
-              <a:rPr lang="en-US" i="0" dirty="0"/>
-              <a:t>except the OS kernel</a:t>
-            </a:r>
-          </a:p>
-          <a:p>
-            <a:pPr lvl="1"/>
-            <a:r>
-              <a:rPr lang="en-US" i="0" dirty="0"/>
-              <a:t>most popular container platform for Linux, Windows, and Mac</a:t>
-            </a:r>
-          </a:p>
-          <a:p>
-            <a:r>
-              <a:rPr lang="en-US" i="0" dirty="0"/>
-              <a:t>Linux – containers run at native speeds</a:t>
-            </a:r>
-          </a:p>
-          <a:p>
-            <a:r>
-              <a:rPr lang="en-US" i="0" dirty="0"/>
-              <a:t>Mac OS X and Windows:</a:t>
-            </a:r>
-          </a:p>
-          <a:p>
-            <a:pPr lvl="1"/>
-            <a:r>
-              <a:rPr lang="en-US" i="0" dirty="0"/>
-              <a:t>containers can run at near-native speed for CPU-intensive codes</a:t>
-            </a:r>
-          </a:p>
-          <a:p>
-            <a:pPr lvl="2"/>
-            <a:r>
-              <a:rPr lang="en-US" b="1" i="0" dirty="0"/>
-              <a:t>a couple of good examples on Mac;  more testing required on Windows</a:t>
-            </a:r>
-          </a:p>
-          <a:p>
-            <a:pPr lvl="1"/>
-            <a:r>
-              <a:rPr lang="en-US" i="0" dirty="0"/>
-              <a:t>large-scale I/O can be slow (similar to NFS, more testing required)</a:t>
-            </a:r>
-          </a:p>
-          <a:p>
-            <a:pPr lvl="1"/>
-            <a:r>
-              <a:rPr lang="en-US" i="0" dirty="0"/>
-              <a:t>MPI works well</a:t>
-            </a:r>
-          </a:p>
-          <a:p>
-            <a:pPr lvl="2"/>
-            <a:r>
-              <a:rPr lang="en-US" b="1" i="0" dirty="0"/>
-              <a:t>seems to work well on Mac;  more testing required on Windows</a:t>
-            </a:r>
-          </a:p>
-          <a:p>
-            <a:endParaRPr lang="en-US" sz="2000" b="1" dirty="0"/>
-          </a:p>
-          <a:p>
-            <a:r>
-              <a:rPr lang="en-US" i="0" dirty="0"/>
-              <a:t>Shifter – a recent initiative at the NERSC supercomputing center</a:t>
-            </a:r>
-          </a:p>
-          <a:p>
-            <a:pPr lvl="1"/>
-            <a:r>
-              <a:rPr lang="en-US" dirty="0"/>
-              <a:t>optimized for Linux on the compute nodes</a:t>
-            </a:r>
-          </a:p>
-          <a:p>
-            <a:pPr lvl="1"/>
-            <a:r>
-              <a:rPr lang="en-US" sz="1400" dirty="0"/>
-              <a:t>compatible with Docker</a:t>
+            <a:pPr marL="227013" indent="-227013">
+              <a:spcBef>
+                <a:spcPts val="300"/>
+              </a:spcBef>
+            </a:pPr>
+            <a:r>
+              <a:rPr lang="en-US" sz="1400" dirty="0">
+                <a:latin typeface="Times New Roman" panose="02020603050405020304" pitchFamily="18" charset="0"/>
+                <a:cs typeface="Times New Roman" panose="02020603050405020304" pitchFamily="18" charset="0"/>
+              </a:rPr>
+              <a:t>K. Kincade (2015), </a:t>
+            </a:r>
+            <a:r>
+              <a:rPr lang="en-US" sz="1400" dirty="0">
+                <a:latin typeface="Times New Roman" panose="02020603050405020304" pitchFamily="18" charset="0"/>
+                <a:cs typeface="Times New Roman" panose="02020603050405020304" pitchFamily="18" charset="0"/>
+                <a:hlinkClick r:id="rId5"/>
+              </a:rPr>
+              <a:t>http://www.nersc.gov/news-publications/nersc-news/nersc-center-news/2015/shifter-makes-container-based-hpc-a-breeze/</a:t>
+            </a:r>
+            <a:r>
+              <a:rPr lang="en-US" sz="1400" dirty="0">
+                <a:latin typeface="Times New Roman" panose="02020603050405020304" pitchFamily="18" charset="0"/>
+                <a:cs typeface="Times New Roman" panose="02020603050405020304" pitchFamily="18" charset="0"/>
+              </a:rPr>
+              <a:t> </a:t>
             </a:r>
           </a:p>
         </p:txBody>
@@ -7688,266 +7539,184 @@
         </p:nvSpPr>
         <p:spPr>
           <a:xfrm>
-            <a:off x="152400" y="1292464"/>
-            <a:ext cx="8839200" cy="5011617"/>
+            <a:off x="152400" y="862150"/>
+            <a:ext cx="8839200" cy="5441932"/>
           </a:xfrm>
         </p:spPr>
         <p:txBody>
           <a:bodyPr>
-            <a:normAutofit lnSpcReduction="10000"/>
+            <a:normAutofit/>
           </a:bodyPr>
           <a:lstStyle/>
           <a:p>
             <a:r>
-              <a:rPr lang="en-US" sz="2000" i="0" dirty="0"/>
-              <a:t>Seven particle accelerator codes are available </a:t>
-            </a:r>
-            <a:r>
-              <a:rPr lang="en-US" sz="2000" i="0" dirty="0">
-                <a:solidFill>
-                  <a:srgbClr val="FF0000"/>
-                </a:solidFill>
-              </a:rPr>
-              <a:t>(more on the way)</a:t>
-            </a:r>
-          </a:p>
-          <a:p>
-            <a:pPr lvl="1"/>
-            <a:r>
-              <a:rPr lang="en-US" sz="1800" i="0" dirty="0"/>
-              <a:t>X-ray:      SRW, Shadow3</a:t>
-            </a:r>
-          </a:p>
-          <a:p>
-            <a:pPr lvl="1"/>
-            <a:r>
-              <a:rPr lang="en-US" sz="1800" i="0" dirty="0"/>
-              <a:t>Beams:   Synergia, Warp, Elegant/SDDS, Hellweg</a:t>
-            </a:r>
-          </a:p>
-          <a:p>
-            <a:pPr lvl="2"/>
-            <a:r>
-              <a:rPr lang="en-US" sz="1600" b="1" i="0" dirty="0"/>
-              <a:t>coming soon:  MAD-X, PTC</a:t>
-            </a:r>
-          </a:p>
-          <a:p>
-            <a:pPr lvl="1"/>
-            <a:r>
-              <a:rPr lang="en-US" sz="1800" i="0" dirty="0"/>
-              <a:t>FELs:        Genesis v.2</a:t>
-            </a:r>
-          </a:p>
-          <a:p>
-            <a:r>
-              <a:rPr lang="en-US" sz="2000" i="0" dirty="0"/>
-              <a:t>Three user interface (UI) modes are supported: </a:t>
-            </a:r>
-          </a:p>
-          <a:p>
-            <a:pPr lvl="1"/>
-            <a:r>
-              <a:rPr lang="en-US" sz="1800" i="0" dirty="0"/>
-              <a:t>Sirepo (GUI);  Jupyter (IPython notebooks);  command-line (CLI)</a:t>
-            </a:r>
-          </a:p>
-          <a:p>
-            <a:r>
-              <a:rPr lang="en-US" sz="2000" i="0" dirty="0"/>
-              <a:t>Automated build/test/release to Docker Hub and to PyPI</a:t>
-            </a:r>
-          </a:p>
-          <a:p>
-            <a:r>
-              <a:rPr lang="en-US" sz="2000" i="0" dirty="0"/>
+              <a:rPr lang="en-US" i="0" dirty="0"/>
+              <a:t>Docker images can be uploaded to a public repository</a:t>
+            </a:r>
+          </a:p>
+          <a:p>
+            <a:pPr lvl="1"/>
+            <a:r>
+              <a:rPr lang="en-US" dirty="0">
+                <a:hlinkClick r:id="rId3"/>
+              </a:rPr>
+              <a:t>https://hub.docker.com</a:t>
+            </a:r>
+            <a:r>
+              <a:rPr lang="en-US" dirty="0"/>
+              <a:t> </a:t>
+            </a:r>
+          </a:p>
+          <a:p>
+            <a:r>
+              <a:rPr lang="en-US" i="0" dirty="0"/>
+              <a:t>RadiaSoft distributes our containers from Docker Hub</a:t>
+            </a:r>
+          </a:p>
+          <a:p>
+            <a:pPr lvl="1"/>
+            <a:r>
+              <a:rPr lang="en-US" dirty="0">
+                <a:hlinkClick r:id="rId4"/>
+              </a:rPr>
+              <a:t>https://hub.docker.com/r/radiasoft</a:t>
+            </a:r>
+            <a:r>
+              <a:rPr lang="en-US" dirty="0"/>
+              <a:t> </a:t>
+            </a:r>
+            <a:endParaRPr lang="en-US" i="0" dirty="0"/>
+          </a:p>
+          <a:p>
+            <a:pPr lvl="1"/>
+            <a:r>
+              <a:rPr lang="en-US" i="0" dirty="0"/>
+              <a:t>automated build/test/release</a:t>
+            </a:r>
+          </a:p>
+          <a:p>
+            <a:r>
+              <a:rPr lang="en-US" i="0" dirty="0"/>
               <a:t>One command to download/install/run:</a:t>
             </a:r>
-            <a:endParaRPr lang="en-US" i="0" dirty="0"/>
-          </a:p>
-          <a:p>
-            <a:pPr marL="0" indent="0">
+          </a:p>
+          <a:p>
+            <a:pPr marL="0" lvl="1" indent="0">
               <a:spcBef>
                 <a:spcPts val="600"/>
               </a:spcBef>
+              <a:spcAft>
+                <a:spcPts val="600"/>
+              </a:spcAft>
               <a:buNone/>
             </a:pPr>
             <a:r>
-              <a:rPr lang="en-US" sz="2000" i="0" dirty="0">
+              <a:rPr lang="en-US" sz="1800" i="0" dirty="0">
+                <a:solidFill>
+                  <a:schemeClr val="tx1"/>
+                </a:solidFill>
                 <a:latin typeface="Courier New" panose="02070309020205020404" pitchFamily="49" charset="0"/>
                 <a:cs typeface="Courier New" panose="02070309020205020404" pitchFamily="49" charset="0"/>
               </a:rPr>
-              <a:t>         &gt;  docker run –p 8000:8000 radiasoft/sirepo</a:t>
-            </a:r>
-            <a:endParaRPr lang="en-US" i="0" dirty="0">
-              <a:latin typeface="Courier New" panose="02070309020205020404" pitchFamily="49" charset="0"/>
-              <a:cs typeface="Courier New" panose="02070309020205020404" pitchFamily="49" charset="0"/>
+              <a:t>    &gt; docker run –p 8000:8000 radiasoft/beamsim</a:t>
+            </a:r>
+            <a:endParaRPr lang="en-US" sz="1400" dirty="0">
+              <a:solidFill>
+                <a:schemeClr val="tx1"/>
+              </a:solidFill>
             </a:endParaRPr>
           </a:p>
           <a:p>
-            <a:pPr lvl="2"/>
-            <a:endParaRPr lang="en-US" sz="1400" i="0" dirty="0"/>
-          </a:p>
-          <a:p>
-            <a:r>
-              <a:rPr lang="en-US" sz="2000" i="0" dirty="0"/>
-              <a:t>RadiaSoft code on GitHub:    </a:t>
-            </a:r>
-            <a:r>
-              <a:rPr lang="en-US" sz="1600" i="0" u="sng" dirty="0">
+            <a:pPr lvl="1"/>
+            <a:r>
+              <a:rPr lang="en-US" dirty="0"/>
+              <a:t>assumes Docker is already installed and you know how to use it</a:t>
+            </a:r>
+          </a:p>
+          <a:p>
+            <a:pPr lvl="1"/>
+            <a:endParaRPr lang="en-US" dirty="0"/>
+          </a:p>
+          <a:p>
+            <a:r>
+              <a:rPr lang="en-US" dirty="0"/>
+              <a:t>JupyterHub servers provide cloud-based access to containerized codes</a:t>
+            </a:r>
+          </a:p>
+          <a:p>
+            <a:pPr lvl="1"/>
+            <a:r>
+              <a:rPr lang="en-US" dirty="0"/>
+              <a:t>GitHub repository &amp; docs,  </a:t>
+            </a:r>
+            <a:r>
+              <a:rPr lang="en-US" dirty="0">
+                <a:hlinkClick r:id="rId5"/>
+              </a:rPr>
+              <a:t>https://github.com/jupyterhub/jupyterhub</a:t>
+            </a:r>
+            <a:r>
+              <a:rPr lang="en-US" dirty="0"/>
+              <a:t> </a:t>
+            </a:r>
+          </a:p>
+          <a:p>
+            <a:r>
+              <a:rPr lang="en-US" dirty="0"/>
+              <a:t>RadiaSoft provides a public server,  </a:t>
+            </a:r>
+            <a:r>
+              <a:rPr lang="en-US" sz="1600" dirty="0">
+                <a:hlinkClick r:id="rId6"/>
+              </a:rPr>
+              <a:t>https://jupyter.radiasoft.org</a:t>
+            </a:r>
+            <a:r>
+              <a:rPr lang="en-US" sz="1600" dirty="0"/>
+              <a:t> </a:t>
+            </a:r>
+            <a:endParaRPr lang="en-US" dirty="0"/>
+          </a:p>
+          <a:p>
+            <a:pPr lvl="1"/>
+            <a:r>
+              <a:rPr lang="en-US" dirty="0"/>
+              <a:t>many accelerator physics codes are pre-installed</a:t>
+            </a:r>
+          </a:p>
+          <a:p>
+            <a:pPr lvl="1"/>
+            <a:r>
+              <a:rPr lang="en-US" dirty="0"/>
+              <a:t>made available via the  </a:t>
+            </a:r>
+            <a:r>
+              <a:rPr lang="en-US" dirty="0">
                 <a:solidFill>
-                  <a:srgbClr val="000000"/>
+                  <a:schemeClr val="tx1"/>
                 </a:solidFill>
                 <a:latin typeface="Courier New" panose="02070309020205020404" pitchFamily="49" charset="0"/>
-                <a:hlinkClick r:id="rId3"/>
-              </a:rPr>
-              <a:t>http://sirepo.com</a:t>
-            </a:r>
-            <a:r>
-              <a:rPr lang="en-US" sz="1600" i="0" dirty="0">
-                <a:solidFill>
-                  <a:srgbClr val="000000"/>
-                </a:solidFill>
-              </a:rPr>
-              <a:t>          </a:t>
-            </a:r>
-            <a:r>
-              <a:rPr lang="en-US" sz="1600" i="0" dirty="0">
-                <a:solidFill>
-                  <a:srgbClr val="0070C0"/>
-                </a:solidFill>
-              </a:rPr>
-              <a:t>(primary repo)</a:t>
-            </a:r>
-            <a:endParaRPr lang="en-US" sz="2000" i="0" dirty="0">
-              <a:solidFill>
-                <a:srgbClr val="0070C0"/>
-              </a:solidFill>
-            </a:endParaRPr>
-          </a:p>
-          <a:p>
-            <a:pPr marL="457200" lvl="1" indent="0">
-              <a:buNone/>
-            </a:pPr>
-            <a:r>
-              <a:rPr lang="en-US" sz="1600" i="0" dirty="0">
                 <a:cs typeface="Courier New" panose="02070309020205020404" pitchFamily="49" charset="0"/>
               </a:rPr>
-              <a:t>                                                               </a:t>
-            </a:r>
-            <a:r>
-              <a:rPr lang="en-US" sz="1600" i="0" dirty="0">
-                <a:latin typeface="Courier New" panose="02070309020205020404" pitchFamily="49" charset="0"/>
-                <a:cs typeface="Courier New" panose="02070309020205020404" pitchFamily="49" charset="0"/>
-                <a:hlinkClick r:id="rId4"/>
-              </a:rPr>
-              <a:t>https://github.com/radiasoft</a:t>
-            </a:r>
-            <a:r>
-              <a:rPr lang="en-US" sz="1600" i="0" dirty="0">
-                <a:latin typeface="Courier New" panose="02070309020205020404" pitchFamily="49" charset="0"/>
-                <a:cs typeface="Courier New" panose="02070309020205020404" pitchFamily="49" charset="0"/>
-              </a:rPr>
-              <a:t>  </a:t>
-            </a:r>
-            <a:r>
-              <a:rPr lang="en-US" sz="1600" i="0" dirty="0">
-                <a:cs typeface="Courier New" panose="02070309020205020404" pitchFamily="49" charset="0"/>
-              </a:rPr>
-              <a:t>(all)</a:t>
-            </a:r>
-          </a:p>
-          <a:p>
-            <a:pPr lvl="3"/>
-            <a:endParaRPr lang="en-US" sz="1400" i="0" dirty="0">
-              <a:cs typeface="Courier New" panose="02070309020205020404" pitchFamily="49" charset="0"/>
-            </a:endParaRPr>
-          </a:p>
-          <a:p>
-            <a:r>
-              <a:rPr lang="en-US" sz="2000" i="0" dirty="0"/>
-              <a:t>Try it yourself on RadiaSoft servers:  </a:t>
-            </a:r>
-            <a:r>
-              <a:rPr lang="en-US" sz="1600" i="0" dirty="0">
-                <a:latin typeface="Courier New" panose="02070309020205020404" pitchFamily="49" charset="0"/>
-                <a:cs typeface="Courier New" panose="02070309020205020404" pitchFamily="49" charset="0"/>
-                <a:hlinkClick r:id="rId5"/>
-              </a:rPr>
-              <a:t>https://beta.sirepo.com</a:t>
-            </a:r>
-            <a:r>
-              <a:rPr lang="en-US" sz="1800" i="0" dirty="0">
-                <a:latin typeface="Courier New" panose="02070309020205020404" pitchFamily="49" charset="0"/>
-                <a:cs typeface="Courier New" panose="02070309020205020404" pitchFamily="49" charset="0"/>
-              </a:rPr>
-              <a:t> </a:t>
-            </a:r>
-            <a:endParaRPr lang="en-US" sz="2000" i="0" dirty="0"/>
-          </a:p>
-          <a:p>
-            <a:pPr marL="457200" lvl="1" indent="0">
-              <a:buNone/>
-            </a:pPr>
-            <a:r>
-              <a:rPr lang="en-US" sz="1600" i="0" dirty="0"/>
-              <a:t>                                                                           </a:t>
-            </a:r>
-            <a:r>
-              <a:rPr lang="en-US" sz="1600" i="0" dirty="0">
-                <a:latin typeface="Courier New" panose="02070309020205020404" pitchFamily="49" charset="0"/>
-                <a:cs typeface="Courier New" panose="02070309020205020404" pitchFamily="49" charset="0"/>
-                <a:hlinkClick r:id="rId6"/>
-              </a:rPr>
-              <a:t>https://jupyter.radiasoft.org</a:t>
-            </a:r>
-            <a:r>
-              <a:rPr lang="en-US" sz="1600" i="0" dirty="0"/>
-              <a:t> </a:t>
-            </a:r>
-            <a:endParaRPr lang="en-US" sz="1400" i="0" dirty="0">
-              <a:latin typeface="Courier New" panose="02070309020205020404" pitchFamily="49" charset="0"/>
-              <a:cs typeface="Courier New" panose="02070309020205020404" pitchFamily="49" charset="0"/>
-            </a:endParaRPr>
-          </a:p>
-        </p:txBody>
-      </p:sp>
-      <p:sp>
-        <p:nvSpPr>
-          <p:cNvPr id="4" name="TextBox 3"/>
-          <p:cNvSpPr txBox="1"/>
-          <p:nvPr/>
-        </p:nvSpPr>
-        <p:spPr>
-          <a:xfrm>
-            <a:off x="2822331" y="791301"/>
-            <a:ext cx="5284177" cy="369332"/>
-          </a:xfrm>
-          <a:prstGeom prst="rect">
-            <a:avLst/>
-          </a:prstGeom>
-          <a:noFill/>
-        </p:spPr>
-        <p:txBody>
-          <a:bodyPr wrap="square" rtlCol="0">
-            <a:spAutoFit/>
-          </a:bodyPr>
-          <a:lstStyle/>
-          <a:p>
-            <a:r>
-              <a:rPr lang="en-US" dirty="0">
-                <a:latin typeface="Courier New" panose="02070309020205020404" pitchFamily="49" charset="0"/>
-                <a:cs typeface="Courier New" panose="02070309020205020404" pitchFamily="49" charset="0"/>
-                <a:hlinkClick r:id="rId7"/>
-              </a:rPr>
-              <a:t>https://hub.docker.com/r/radiasoft/</a:t>
-            </a:r>
-            <a:r>
-              <a:rPr lang="en-US" dirty="0">
-                <a:latin typeface="Courier New" panose="02070309020205020404" pitchFamily="49" charset="0"/>
-                <a:cs typeface="Courier New" panose="02070309020205020404" pitchFamily="49" charset="0"/>
-              </a:rPr>
-              <a:t> </a:t>
+              <a:t>radiasoft/beamsim-jupyter</a:t>
+            </a:r>
+            <a:r>
+              <a:rPr lang="en-US" dirty="0"/>
+              <a:t> container</a:t>
+            </a:r>
+          </a:p>
+          <a:p>
+            <a:pPr lvl="1"/>
+            <a:r>
+              <a:rPr lang="en-US" dirty="0"/>
+              <a:t>supports Jupyter/IPython notebooks</a:t>
+            </a:r>
+          </a:p>
+          <a:p>
+            <a:pPr lvl="1"/>
+            <a:r>
+              <a:rPr lang="en-US" dirty="0"/>
+              <a:t>also supports browser-based terminal window (bash, without X11)</a:t>
             </a:r>
           </a:p>
         </p:txBody>
@@ -7956,403 +7725,6 @@
     <p:extLst>
       <p:ext uri="{BB962C8B-B14F-4D97-AF65-F5344CB8AC3E}">
         <p14:creationId xmlns:p14="http://schemas.microsoft.com/office/powerpoint/2010/main" val="1528542507"/>
-      </p:ext>
-    </p:extLst>
-  </p:cSld>
-  <p:clrMapOvr>
-    <a:masterClrMapping/>
-  </p:clrMapOvr>
-</p:sld>
-</file>
-
-<file path=ppt/slides/slide21.xml><?xml version="1.0" encoding="utf-8"?>
-<p:sld xmlns:a="http://schemas.openxmlformats.org/drawingml/2006/main" xmlns:r="http://schemas.openxmlformats.org/officeDocument/2006/relationships" xmlns:p="http://schemas.openxmlformats.org/presentationml/2006/main">
-  <p:cSld>
-    <p:spTree>
-      <p:nvGrpSpPr>
-        <p:cNvPr id="1" name=""/>
-        <p:cNvGrpSpPr/>
-        <p:nvPr/>
-      </p:nvGrpSpPr>
-      <p:grpSpPr>
-        <a:xfrm>
-          <a:off x="0" y="0"/>
-          <a:ext cx="0" cy="0"/>
-          <a:chOff x="0" y="0"/>
-          <a:chExt cx="0" cy="0"/>
-        </a:xfrm>
-      </p:grpSpPr>
-      <p:sp>
-        <p:nvSpPr>
-          <p:cNvPr id="2" name="Title 1"/>
-          <p:cNvSpPr>
-            <a:spLocks noGrp="1"/>
-          </p:cNvSpPr>
-          <p:nvPr>
-            <p:ph type="title"/>
-          </p:nvPr>
-        </p:nvSpPr>
-        <p:spPr>
-          <a:xfrm>
-            <a:off x="0" y="6946"/>
-            <a:ext cx="9144000" cy="589085"/>
-          </a:xfrm>
-        </p:spPr>
-        <p:txBody>
-          <a:bodyPr>
-            <a:normAutofit/>
-          </a:bodyPr>
-          <a:lstStyle/>
-          <a:p>
-            <a:r>
-              <a:rPr lang="en-US" dirty="0"/>
-              <a:t>…more on version management</a:t>
-            </a:r>
-            <a:endParaRPr lang="en-US" b="0" dirty="0"/>
-          </a:p>
-        </p:txBody>
-      </p:sp>
-      <p:sp>
-        <p:nvSpPr>
-          <p:cNvPr id="3" name="Content Placeholder 2"/>
-          <p:cNvSpPr>
-            <a:spLocks noGrp="1"/>
-          </p:cNvSpPr>
-          <p:nvPr>
-            <p:ph idx="1"/>
-          </p:nvPr>
-        </p:nvSpPr>
-        <p:spPr>
-          <a:xfrm>
-            <a:off x="476250" y="816248"/>
-            <a:ext cx="8191500" cy="5227501"/>
-          </a:xfrm>
-        </p:spPr>
-        <p:txBody>
-          <a:bodyPr>
-            <a:normAutofit/>
-          </a:bodyPr>
-          <a:lstStyle/>
-          <a:p>
-            <a:r>
-              <a:rPr lang="en-US" dirty="0"/>
-              <a:t>We also implemented automatic and uniform version management through a channel update mechanism similar to CoreOS[ ]. Instead of the usual system of having major version numbers, we deliver the entire application atomically on a channel. Each software release (embedded in a Docker image) is given a chronological version, and enters the staging pipeline. Only those releases which pass the development and alpha channels reach public beta, and those that pass beta become available generally.</a:t>
-            </a:r>
-          </a:p>
-          <a:p>
-            <a:r>
-              <a:rPr lang="en-US" dirty="0"/>
-              <a:t>The Sirepo platform implements three containers running separate services to provide web-based access to Warp. On Linux, the container components are run as independent services. This enables scaling the web service over multiple computers, thus allowing multiple jobs to run simultaneously on independent compute nodes. Within a single instance of one container, Warp runs in parallel using MPI. The job queue is managed by a different container running RabbitMQ [ ].</a:t>
-            </a:r>
-          </a:p>
-        </p:txBody>
-      </p:sp>
-    </p:spTree>
-    <p:extLst>
-      <p:ext uri="{BB962C8B-B14F-4D97-AF65-F5344CB8AC3E}">
-        <p14:creationId xmlns:p14="http://schemas.microsoft.com/office/powerpoint/2010/main" val="440473678"/>
-      </p:ext>
-    </p:extLst>
-  </p:cSld>
-  <p:clrMapOvr>
-    <a:masterClrMapping/>
-  </p:clrMapOvr>
-</p:sld>
-</file>
-
-<file path=ppt/slides/slide22.xml><?xml version="1.0" encoding="utf-8"?>
-<p:sld xmlns:a="http://schemas.openxmlformats.org/drawingml/2006/main" xmlns:r="http://schemas.openxmlformats.org/officeDocument/2006/relationships" xmlns:p="http://schemas.openxmlformats.org/presentationml/2006/main">
-  <p:cSld>
-    <p:spTree>
-      <p:nvGrpSpPr>
-        <p:cNvPr id="1" name=""/>
-        <p:cNvGrpSpPr/>
-        <p:nvPr/>
-      </p:nvGrpSpPr>
-      <p:grpSpPr>
-        <a:xfrm>
-          <a:off x="0" y="0"/>
-          <a:ext cx="0" cy="0"/>
-          <a:chOff x="0" y="0"/>
-          <a:chExt cx="0" cy="0"/>
-        </a:xfrm>
-      </p:grpSpPr>
-      <p:sp>
-        <p:nvSpPr>
-          <p:cNvPr id="2" name="Title 1"/>
-          <p:cNvSpPr>
-            <a:spLocks noGrp="1"/>
-          </p:cNvSpPr>
-          <p:nvPr>
-            <p:ph type="title"/>
-          </p:nvPr>
-        </p:nvSpPr>
-        <p:spPr>
-          <a:xfrm>
-            <a:off x="975946" y="298936"/>
-            <a:ext cx="8015654" cy="589085"/>
-          </a:xfrm>
-        </p:spPr>
-        <p:txBody>
-          <a:bodyPr>
-            <a:normAutofit/>
-          </a:bodyPr>
-          <a:lstStyle/>
-          <a:p>
-            <a:r>
-              <a:rPr lang="en-US" dirty="0"/>
-              <a:t>Version Management</a:t>
-            </a:r>
-          </a:p>
-        </p:txBody>
-      </p:sp>
-      <p:sp>
-        <p:nvSpPr>
-          <p:cNvPr id="3" name="Content Placeholder 2"/>
-          <p:cNvSpPr>
-            <a:spLocks noGrp="1"/>
-          </p:cNvSpPr>
-          <p:nvPr>
-            <p:ph idx="1"/>
-          </p:nvPr>
-        </p:nvSpPr>
-        <p:spPr>
-          <a:xfrm>
-            <a:off x="152400" y="1002323"/>
-            <a:ext cx="8839200" cy="5161086"/>
-          </a:xfrm>
-        </p:spPr>
-        <p:txBody>
-          <a:bodyPr>
-            <a:normAutofit/>
-          </a:bodyPr>
-          <a:lstStyle/>
-          <a:p>
-            <a:r>
-              <a:rPr lang="en-US" i="0" dirty="0"/>
-              <a:t>Images are identified by chronological version</a:t>
-            </a:r>
-          </a:p>
-          <a:p>
-            <a:pPr lvl="1"/>
-            <a:r>
-              <a:rPr lang="en-US" i="0" dirty="0"/>
-              <a:t>does not interfere with systems used by the code developers</a:t>
-            </a:r>
-          </a:p>
-          <a:p>
-            <a:pPr lvl="1"/>
-            <a:r>
-              <a:rPr lang="en-US" i="0" dirty="0"/>
-              <a:t>provides meaningful versioning, as necessary for reproducibility</a:t>
-            </a:r>
-          </a:p>
-          <a:p>
-            <a:r>
-              <a:rPr lang="en-US" i="0" dirty="0"/>
-              <a:t>Channels are declared for the main git branch:</a:t>
-            </a:r>
-          </a:p>
-          <a:p>
-            <a:pPr lvl="1"/>
-            <a:r>
-              <a:rPr lang="en-US" i="0" dirty="0"/>
-              <a:t>dev    (latest, specified by default)</a:t>
-            </a:r>
-          </a:p>
-          <a:p>
-            <a:pPr lvl="1"/>
-            <a:r>
-              <a:rPr lang="en-US" i="0" dirty="0"/>
-              <a:t>alpha (internal testing)</a:t>
-            </a:r>
-          </a:p>
-          <a:p>
-            <a:pPr lvl="1"/>
-            <a:r>
-              <a:rPr lang="en-US" i="0" dirty="0"/>
-              <a:t>beta   (external testing)</a:t>
-            </a:r>
-          </a:p>
-          <a:p>
-            <a:pPr lvl="1"/>
-            <a:r>
-              <a:rPr lang="en-US" i="0" dirty="0"/>
-              <a:t>prod   (ready for production release)</a:t>
-            </a:r>
-          </a:p>
-          <a:p>
-            <a:r>
-              <a:rPr lang="en-US" i="0" dirty="0"/>
-              <a:t>Each container image includes a ‘manifest’</a:t>
-            </a:r>
-          </a:p>
-          <a:p>
-            <a:pPr lvl="1"/>
-            <a:r>
-              <a:rPr lang="en-US" i="0" dirty="0"/>
-              <a:t>describes the image &amp; codes,   rsmanifest.json</a:t>
-            </a:r>
-          </a:p>
-          <a:p>
-            <a:r>
-              <a:rPr lang="en-US" i="0" dirty="0"/>
-              <a:t>Source code for each application is stored in the image</a:t>
-            </a:r>
-          </a:p>
-          <a:p>
-            <a:r>
-              <a:rPr lang="en-US" i="0" dirty="0"/>
-              <a:t>Code versions/commits can be queried by simulations</a:t>
-            </a:r>
-          </a:p>
-        </p:txBody>
-      </p:sp>
-    </p:spTree>
-    <p:extLst>
-      <p:ext uri="{BB962C8B-B14F-4D97-AF65-F5344CB8AC3E}">
-        <p14:creationId xmlns:p14="http://schemas.microsoft.com/office/powerpoint/2010/main" val="2525692851"/>
-      </p:ext>
-    </p:extLst>
-  </p:cSld>
-  <p:clrMapOvr>
-    <a:masterClrMapping/>
-  </p:clrMapOvr>
-</p:sld>
-</file>
-
-<file path=ppt/slides/slide23.xml><?xml version="1.0" encoding="utf-8"?>
-<p:sld xmlns:a="http://schemas.openxmlformats.org/drawingml/2006/main" xmlns:r="http://schemas.openxmlformats.org/officeDocument/2006/relationships" xmlns:p="http://schemas.openxmlformats.org/presentationml/2006/main">
-  <p:cSld>
-    <p:spTree>
-      <p:nvGrpSpPr>
-        <p:cNvPr id="1" name=""/>
-        <p:cNvGrpSpPr/>
-        <p:nvPr/>
-      </p:nvGrpSpPr>
-      <p:grpSpPr>
-        <a:xfrm>
-          <a:off x="0" y="0"/>
-          <a:ext cx="0" cy="0"/>
-          <a:chOff x="0" y="0"/>
-          <a:chExt cx="0" cy="0"/>
-        </a:xfrm>
-      </p:grpSpPr>
-      <p:sp>
-        <p:nvSpPr>
-          <p:cNvPr id="2" name="Title 1"/>
-          <p:cNvSpPr>
-            <a:spLocks noGrp="1"/>
-          </p:cNvSpPr>
-          <p:nvPr>
-            <p:ph type="title"/>
-          </p:nvPr>
-        </p:nvSpPr>
-        <p:spPr>
-          <a:xfrm>
-            <a:off x="0" y="6946"/>
-            <a:ext cx="9144000" cy="589085"/>
-          </a:xfrm>
-        </p:spPr>
-        <p:txBody>
-          <a:bodyPr>
-            <a:normAutofit/>
-          </a:bodyPr>
-          <a:lstStyle/>
-          <a:p>
-            <a:r>
-              <a:rPr lang="en-US" dirty="0"/>
-              <a:t>What is an application container?</a:t>
-            </a:r>
-            <a:endParaRPr lang="en-US" b="0" dirty="0"/>
-          </a:p>
-        </p:txBody>
-      </p:sp>
-      <p:sp>
-        <p:nvSpPr>
-          <p:cNvPr id="3" name="Content Placeholder 2"/>
-          <p:cNvSpPr>
-            <a:spLocks noGrp="1"/>
-          </p:cNvSpPr>
-          <p:nvPr>
-            <p:ph idx="1"/>
-          </p:nvPr>
-        </p:nvSpPr>
-        <p:spPr>
-          <a:xfrm>
-            <a:off x="476250" y="816248"/>
-            <a:ext cx="8191500" cy="5227501"/>
-          </a:xfrm>
-        </p:spPr>
-        <p:txBody>
-          <a:bodyPr>
-            <a:normAutofit/>
-          </a:bodyPr>
-          <a:lstStyle/>
-          <a:p>
-            <a:r>
-              <a:rPr lang="en-US" dirty="0"/>
-              <a:t>Essential technology for cloud computing</a:t>
-            </a:r>
-          </a:p>
-          <a:p>
-            <a:pPr lvl="1"/>
-            <a:r>
-              <a:rPr lang="en-US" dirty="0"/>
-              <a:t>enables automated distribution of applications to remote servers</a:t>
-            </a:r>
-          </a:p>
-          <a:p>
-            <a:r>
-              <a:rPr lang="en-US" dirty="0"/>
-              <a:t>An abstraction of relevant resources used by a code </a:t>
-            </a:r>
-          </a:p>
-          <a:p>
-            <a:r>
-              <a:rPr lang="en-US" dirty="0"/>
-              <a:t>LXC (LinuX Container) [ ] isolates kernel resources for a collection of processes</a:t>
-            </a:r>
-          </a:p>
-          <a:p>
-            <a:pPr lvl="1"/>
-            <a:r>
-              <a:rPr lang="en-US" dirty="0"/>
-              <a:t>it is a lightweight, hosted hypervisor without the need for emulation</a:t>
-            </a:r>
-          </a:p>
-          <a:p>
-            <a:r>
-              <a:rPr lang="en-US" dirty="0"/>
-              <a:t>Vagrant [ ] is a program for configuring headless VMs and containers.</a:t>
-            </a:r>
-          </a:p>
-          <a:p>
-            <a:r>
-              <a:rPr lang="en-US" dirty="0"/>
-              <a:t>Like Vagrant, Docker [ ] is a productivity enhancer for LXC. </a:t>
-            </a:r>
-          </a:p>
-          <a:p>
-            <a:pPr lvl="1"/>
-            <a:r>
-              <a:rPr lang="en-US" dirty="0"/>
-              <a:t>It’s native on Linux</a:t>
-            </a:r>
-          </a:p>
-          <a:p>
-            <a:pPr lvl="1"/>
-            <a:r>
-              <a:rPr lang="en-US" dirty="0"/>
-              <a:t>It provides a lightweight VM on Mac and Windows</a:t>
-            </a:r>
-          </a:p>
-        </p:txBody>
-      </p:sp>
-    </p:spTree>
-    <p:extLst>
-      <p:ext uri="{BB962C8B-B14F-4D97-AF65-F5344CB8AC3E}">
-        <p14:creationId xmlns:p14="http://schemas.microsoft.com/office/powerpoint/2010/main" val="302440063"/>
       </p:ext>
     </p:extLst>
   </p:cSld>

</xml_diff>

<commit_message>
added a wrap up slide
</commit_message>
<xml_diff>
--- a/computational_reproducibility/lecture/2018_ComputationalReproducibility_Bruhwiler_USPAS.pptx
+++ b/computational_reproducibility/lecture/2018_ComputationalReproducibility_Bruhwiler_USPAS.pptx
@@ -5,7 +5,7 @@
     <p:sldMasterId id="2147483696" r:id="rId1"/>
   </p:sldMasterIdLst>
   <p:notesMasterIdLst>
-    <p:notesMasterId r:id="rId22"/>
+    <p:notesMasterId r:id="rId23"/>
   </p:notesMasterIdLst>
   <p:sldIdLst>
     <p:sldId id="297" r:id="rId2"/>
@@ -28,6 +28,7 @@
     <p:sldId id="422" r:id="rId19"/>
     <p:sldId id="394" r:id="rId20"/>
     <p:sldId id="395" r:id="rId21"/>
+    <p:sldId id="424" r:id="rId22"/>
   </p:sldIdLst>
   <p:sldSz cx="9144000" cy="6858000" type="screen4x3"/>
   <p:notesSz cx="6858000" cy="9144000"/>
@@ -1593,6 +1594,90 @@
     <p:extLst>
       <p:ext uri="{BB962C8B-B14F-4D97-AF65-F5344CB8AC3E}">
         <p14:creationId xmlns:p14="http://schemas.microsoft.com/office/powerpoint/2010/main" val="2620879761"/>
+      </p:ext>
+    </p:extLst>
+  </p:cSld>
+  <p:clrMapOvr>
+    <a:masterClrMapping/>
+  </p:clrMapOvr>
+</p:notes>
+</file>
+
+<file path=ppt/notesSlides/notesSlide21.xml><?xml version="1.0" encoding="utf-8"?>
+<p:notes xmlns:a="http://schemas.openxmlformats.org/drawingml/2006/main" xmlns:r="http://schemas.openxmlformats.org/officeDocument/2006/relationships" xmlns:p="http://schemas.openxmlformats.org/presentationml/2006/main">
+  <p:cSld>
+    <p:spTree>
+      <p:nvGrpSpPr>
+        <p:cNvPr id="1" name=""/>
+        <p:cNvGrpSpPr/>
+        <p:nvPr/>
+      </p:nvGrpSpPr>
+      <p:grpSpPr>
+        <a:xfrm>
+          <a:off x="0" y="0"/>
+          <a:ext cx="0" cy="0"/>
+          <a:chOff x="0" y="0"/>
+          <a:chExt cx="0" cy="0"/>
+        </a:xfrm>
+      </p:grpSpPr>
+      <p:sp>
+        <p:nvSpPr>
+          <p:cNvPr id="2" name="Slide Image Placeholder 1"/>
+          <p:cNvSpPr>
+            <a:spLocks noGrp="1" noRot="1" noChangeAspect="1"/>
+          </p:cNvSpPr>
+          <p:nvPr>
+            <p:ph type="sldImg"/>
+          </p:nvPr>
+        </p:nvSpPr>
+        <p:spPr/>
+      </p:sp>
+      <p:sp>
+        <p:nvSpPr>
+          <p:cNvPr id="3" name="Notes Placeholder 2"/>
+          <p:cNvSpPr>
+            <a:spLocks noGrp="1"/>
+          </p:cNvSpPr>
+          <p:nvPr>
+            <p:ph type="body" idx="1"/>
+          </p:nvPr>
+        </p:nvSpPr>
+        <p:spPr/>
+        <p:txBody>
+          <a:bodyPr/>
+          <a:lstStyle/>
+          <a:p>
+            <a:endParaRPr lang="en-US"/>
+          </a:p>
+        </p:txBody>
+      </p:sp>
+      <p:sp>
+        <p:nvSpPr>
+          <p:cNvPr id="4" name="Slide Number Placeholder 3"/>
+          <p:cNvSpPr>
+            <a:spLocks noGrp="1"/>
+          </p:cNvSpPr>
+          <p:nvPr>
+            <p:ph type="sldNum" sz="quarter" idx="10"/>
+          </p:nvPr>
+        </p:nvSpPr>
+        <p:spPr/>
+        <p:txBody>
+          <a:bodyPr/>
+          <a:lstStyle/>
+          <a:p>
+            <a:fld id="{4E0E9D85-81CD-44C8-8F15-3AA06C34AF8C}" type="slidenum">
+              <a:rPr lang="en-US" smtClean="0"/>
+              <a:t>21</a:t>
+            </a:fld>
+            <a:endParaRPr lang="en-US"/>
+          </a:p>
+        </p:txBody>
+      </p:sp>
+    </p:spTree>
+    <p:extLst>
+      <p:ext uri="{BB962C8B-B14F-4D97-AF65-F5344CB8AC3E}">
+        <p14:creationId xmlns:p14="http://schemas.microsoft.com/office/powerpoint/2010/main" val="3157502160"/>
       </p:ext>
     </p:extLst>
   </p:cSld>
@@ -7522,7 +7607,7 @@
           <a:p>
             <a:r>
               <a:rPr lang="en-US" dirty="0"/>
-              <a:t>Delivering Codes via Docker Images</a:t>
+              <a:t>Delivering codes via the Docker Hub repository</a:t>
             </a:r>
           </a:p>
         </p:txBody>
@@ -7591,13 +7676,13 @@
             <a:pPr lvl="1"/>
             <a:r>
               <a:rPr lang="en-US" i="0" dirty="0"/>
-              <a:t>automated build/test/release</a:t>
+              <a:t>automated build/test/release is used to ensure working containers</a:t>
             </a:r>
           </a:p>
           <a:p>
             <a:r>
               <a:rPr lang="en-US" i="0" dirty="0"/>
-              <a:t>One command to download/install/run:</a:t>
+              <a:t>One command can be used to download/install/run:</a:t>
             </a:r>
           </a:p>
           <a:p>
@@ -7725,6 +7810,179 @@
     <p:extLst>
       <p:ext uri="{BB962C8B-B14F-4D97-AF65-F5344CB8AC3E}">
         <p14:creationId xmlns:p14="http://schemas.microsoft.com/office/powerpoint/2010/main" val="1528542507"/>
+      </p:ext>
+    </p:extLst>
+  </p:cSld>
+  <p:clrMapOvr>
+    <a:masterClrMapping/>
+  </p:clrMapOvr>
+</p:sld>
+</file>
+
+<file path=ppt/slides/slide21.xml><?xml version="1.0" encoding="utf-8"?>
+<p:sld xmlns:a="http://schemas.openxmlformats.org/drawingml/2006/main" xmlns:r="http://schemas.openxmlformats.org/officeDocument/2006/relationships" xmlns:p="http://schemas.openxmlformats.org/presentationml/2006/main">
+  <p:cSld>
+    <p:spTree>
+      <p:nvGrpSpPr>
+        <p:cNvPr id="1" name=""/>
+        <p:cNvGrpSpPr/>
+        <p:nvPr/>
+      </p:nvGrpSpPr>
+      <p:grpSpPr>
+        <a:xfrm>
+          <a:off x="0" y="0"/>
+          <a:ext cx="0" cy="0"/>
+          <a:chOff x="0" y="0"/>
+          <a:chExt cx="0" cy="0"/>
+        </a:xfrm>
+      </p:grpSpPr>
+      <p:sp>
+        <p:nvSpPr>
+          <p:cNvPr id="2" name="Title 1"/>
+          <p:cNvSpPr>
+            <a:spLocks noGrp="1"/>
+          </p:cNvSpPr>
+          <p:nvPr>
+            <p:ph type="title"/>
+          </p:nvPr>
+        </p:nvSpPr>
+        <p:spPr>
+          <a:xfrm>
+            <a:off x="0" y="70385"/>
+            <a:ext cx="9144000" cy="589085"/>
+          </a:xfrm>
+        </p:spPr>
+        <p:txBody>
+          <a:bodyPr>
+            <a:normAutofit/>
+          </a:bodyPr>
+          <a:lstStyle/>
+          <a:p>
+            <a:r>
+              <a:rPr lang="en-US" dirty="0"/>
+              <a:t>Wrap up</a:t>
+            </a:r>
+          </a:p>
+        </p:txBody>
+      </p:sp>
+      <p:sp>
+        <p:nvSpPr>
+          <p:cNvPr id="3" name="Content Placeholder 2"/>
+          <p:cNvSpPr>
+            <a:spLocks noGrp="1"/>
+          </p:cNvSpPr>
+          <p:nvPr>
+            <p:ph idx="1"/>
+          </p:nvPr>
+        </p:nvSpPr>
+        <p:spPr>
+          <a:xfrm>
+            <a:off x="152400" y="862150"/>
+            <a:ext cx="8839200" cy="5441932"/>
+          </a:xfrm>
+        </p:spPr>
+        <p:txBody>
+          <a:bodyPr>
+            <a:normAutofit/>
+          </a:bodyPr>
+          <a:lstStyle/>
+          <a:p>
+            <a:r>
+              <a:rPr lang="en-US" dirty="0"/>
+              <a:t>Some aspects of computational reproducibility have been discussed</a:t>
+            </a:r>
+          </a:p>
+          <a:p>
+            <a:pPr lvl="1"/>
+            <a:r>
+              <a:rPr lang="en-US" dirty="0"/>
+              <a:t>you have not been provided with a recipe to follow</a:t>
+            </a:r>
+          </a:p>
+          <a:p>
+            <a:pPr lvl="1"/>
+            <a:r>
+              <a:rPr lang="en-US" dirty="0"/>
+              <a:t>it’s not yet clear how to meet the near-term goals of slide #13 above</a:t>
+            </a:r>
+          </a:p>
+          <a:p>
+            <a:pPr lvl="1"/>
+            <a:r>
+              <a:rPr lang="en-US" dirty="0"/>
+              <a:t>we haven’t yet introduced all the necessary tools</a:t>
+            </a:r>
+          </a:p>
+          <a:p>
+            <a:pPr lvl="1"/>
+            <a:r>
+              <a:rPr lang="en-US" dirty="0"/>
+              <a:t>reproducibility will be a recurring theme in upcoming lectures</a:t>
+            </a:r>
+          </a:p>
+          <a:p>
+            <a:pPr lvl="1"/>
+            <a:r>
+              <a:rPr lang="en-US" dirty="0"/>
+              <a:t>by the end of the class, you should have your own ideas on how to achieve it</a:t>
+            </a:r>
+          </a:p>
+          <a:p>
+            <a:pPr lvl="1"/>
+            <a:endParaRPr lang="en-US" dirty="0"/>
+          </a:p>
+          <a:p>
+            <a:r>
+              <a:rPr lang="en-US" dirty="0"/>
+              <a:t>Any final questions regarding the material in this lecture?</a:t>
+            </a:r>
+          </a:p>
+          <a:p>
+            <a:endParaRPr lang="en-US" dirty="0"/>
+          </a:p>
+          <a:p>
+            <a:r>
+              <a:rPr lang="en-US" dirty="0"/>
+              <a:t>Computer Lab this afternoon – </a:t>
+            </a:r>
+          </a:p>
+          <a:p>
+            <a:pPr lvl="1"/>
+            <a:r>
+              <a:rPr lang="en-US" dirty="0"/>
+              <a:t>you will run the elegant code from Argonne National Lab (M. Borland)</a:t>
+            </a:r>
+          </a:p>
+          <a:p>
+            <a:pPr lvl="2"/>
+            <a:r>
+              <a:rPr lang="en-US" dirty="0"/>
+              <a:t>using a public JupyterHub server,  </a:t>
+            </a:r>
+            <a:r>
+              <a:rPr lang="en-US" b="0" dirty="0">
+                <a:hlinkClick r:id="rId3"/>
+              </a:rPr>
+              <a:t>https://jupyter.radiasoft.org</a:t>
+            </a:r>
+            <a:r>
+              <a:rPr lang="en-US" b="0" dirty="0"/>
+              <a:t> </a:t>
+            </a:r>
+          </a:p>
+          <a:p>
+            <a:pPr lvl="2"/>
+            <a:r>
+              <a:rPr lang="en-US" dirty="0"/>
+              <a:t>running from the command line</a:t>
+            </a:r>
+          </a:p>
+        </p:txBody>
+      </p:sp>
+    </p:spTree>
+    <p:extLst>
+      <p:ext uri="{BB962C8B-B14F-4D97-AF65-F5344CB8AC3E}">
+        <p14:creationId xmlns:p14="http://schemas.microsoft.com/office/powerpoint/2010/main" val="12542219"/>
       </p:ext>
     </p:extLst>
   </p:cSld>

</xml_diff>

<commit_message>
adding some of Rob's suggestions
</commit_message>
<xml_diff>
--- a/computational_reproducibility/lecture/2018_ComputationalReproducibility_Bruhwiler_USPAS.pptx
+++ b/computational_reproducibility/lecture/2018_ComputationalReproducibility_Bruhwiler_USPAS.pptx
@@ -3779,8 +3779,8 @@
         </p:nvSpPr>
         <p:spPr>
           <a:xfrm>
-            <a:off x="0" y="134430"/>
-            <a:ext cx="9135531" cy="592114"/>
+            <a:off x="1258957" y="139146"/>
+            <a:ext cx="7876574" cy="1000539"/>
           </a:xfrm>
         </p:spPr>
         <p:txBody>
@@ -3790,18 +3790,83 @@
           <a:lstStyle/>
           <a:p>
             <a:pPr>
+              <a:lnSpc>
+                <a:spcPct val="150000"/>
+              </a:lnSpc>
               <a:spcBef>
                 <a:spcPts val="0"/>
               </a:spcBef>
             </a:pPr>
             <a:r>
+              <a:rPr lang="en-US" sz="2800" dirty="0">
+                <a:latin typeface="Times New Roman" panose="02020603050405020304" pitchFamily="18" charset="0"/>
+                <a:cs typeface="Times New Roman" panose="02020603050405020304" pitchFamily="18" charset="0"/>
+              </a:rPr>
+              <a:t>USPAS</a:t>
+            </a:r>
+            <a:r>
               <a:rPr lang="en-US" sz="2800" i="1" dirty="0">
                 <a:latin typeface="Times New Roman" panose="02020603050405020304" pitchFamily="18" charset="0"/>
                 <a:cs typeface="Times New Roman" panose="02020603050405020304" pitchFamily="18" charset="0"/>
               </a:rPr>
-              <a:t>USPAS – Simulation of Beam and Plasma Systems</a:t>
-            </a:r>
-            <a:endParaRPr lang="en-US" sz="2800" dirty="0">
+              <a:t> – Simulation of Beam and </a:t>
+            </a:r>
+            <a:r>
+              <a:rPr lang="en-US" sz="2800" i="1">
+                <a:latin typeface="Times New Roman" panose="02020603050405020304" pitchFamily="18" charset="0"/>
+                <a:cs typeface="Times New Roman" panose="02020603050405020304" pitchFamily="18" charset="0"/>
+              </a:rPr>
+              <a:t>Plasma </a:t>
+            </a:r>
+            <a:r>
+              <a:rPr lang="en-US" sz="2800" i="1" smtClean="0">
+                <a:latin typeface="Times New Roman" panose="02020603050405020304" pitchFamily="18" charset="0"/>
+                <a:cs typeface="Times New Roman" panose="02020603050405020304" pitchFamily="18" charset="0"/>
+              </a:rPr>
+              <a:t>Systems</a:t>
+            </a:r>
+            <a:br>
+              <a:rPr lang="en-US" sz="2800" i="1" smtClean="0">
+                <a:latin typeface="Times New Roman" panose="02020603050405020304" pitchFamily="18" charset="0"/>
+                <a:cs typeface="Times New Roman" panose="02020603050405020304" pitchFamily="18" charset="0"/>
+              </a:rPr>
+            </a:br>
+            <a:r>
+              <a:rPr lang="en-US" sz="1600">
+                <a:latin typeface="Times New Roman" panose="02020603050405020304" pitchFamily="18" charset="0"/>
+                <a:cs typeface="Times New Roman" panose="02020603050405020304" pitchFamily="18" charset="0"/>
+              </a:rPr>
+              <a:t>Steven M. Lund, Jean-Luc Vay, Remi </a:t>
+            </a:r>
+            <a:r>
+              <a:rPr lang="en-US" sz="1600">
+                <a:latin typeface="Times New Roman" panose="02020603050405020304" pitchFamily="18" charset="0"/>
+                <a:cs typeface="Times New Roman" panose="02020603050405020304" pitchFamily="18" charset="0"/>
+              </a:rPr>
+              <a:t>Lehe</a:t>
+            </a:r>
+            <a:r>
+              <a:rPr lang="en-US" sz="1600" smtClean="0">
+                <a:latin typeface="Times New Roman" panose="02020603050405020304" pitchFamily="18" charset="0"/>
+                <a:cs typeface="Times New Roman" panose="02020603050405020304" pitchFamily="18" charset="0"/>
+              </a:rPr>
+              <a:t>, </a:t>
+            </a:r>
+            <a:r>
+              <a:rPr lang="en-US" sz="1600">
+                <a:latin typeface="Times New Roman" panose="02020603050405020304" pitchFamily="18" charset="0"/>
+                <a:cs typeface="Times New Roman" panose="02020603050405020304" pitchFamily="18" charset="0"/>
+              </a:rPr>
+              <a:t>Daniel </a:t>
+            </a:r>
+            <a:r>
+              <a:rPr lang="en-US" sz="1600" smtClean="0">
+                <a:latin typeface="Times New Roman" panose="02020603050405020304" pitchFamily="18" charset="0"/>
+                <a:cs typeface="Times New Roman" panose="02020603050405020304" pitchFamily="18" charset="0"/>
+              </a:rPr>
+              <a:t>Winklehner and David L. Bruhwiler</a:t>
+            </a:r>
+            <a:endParaRPr lang="en-US" sz="2400" dirty="0">
               <a:solidFill>
                 <a:srgbClr val="0070C0"/>
               </a:solidFill>
@@ -3821,7 +3886,7 @@
         </p:nvSpPr>
         <p:spPr>
           <a:xfrm>
-            <a:off x="342670" y="3419064"/>
+            <a:off x="342670" y="3544958"/>
             <a:ext cx="8542914" cy="1715133"/>
           </a:xfrm>
           <a:prstGeom prst="rect">
@@ -4054,7 +4119,7 @@
         </p:nvSpPr>
         <p:spPr bwMode="auto">
           <a:xfrm>
-            <a:off x="342670" y="1843267"/>
+            <a:off x="342670" y="2134811"/>
             <a:ext cx="8809053" cy="859183"/>
           </a:xfrm>
           <a:prstGeom prst="rect">
@@ -4229,7 +4294,7 @@
         </p:blipFill>
         <p:spPr>
           <a:xfrm>
-            <a:off x="6018080" y="1796498"/>
+            <a:off x="5945193" y="2246221"/>
             <a:ext cx="2754553" cy="535992"/>
           </a:xfrm>
           <a:prstGeom prst="rect">
@@ -4247,7 +4312,7 @@
         </p:nvSpPr>
         <p:spPr bwMode="auto">
           <a:xfrm>
-            <a:off x="342669" y="775503"/>
+            <a:off x="342669" y="1558064"/>
             <a:ext cx="8542915" cy="527924"/>
           </a:xfrm>
           <a:prstGeom prst="rect">
@@ -4424,6 +4489,36 @@
           </a:p>
         </p:txBody>
       </p:sp>
+      <p:pic>
+        <p:nvPicPr>
+          <p:cNvPr id="3" name="Picture 2"/>
+          <p:cNvPicPr>
+            <a:picLocks noChangeAspect="1"/>
+          </p:cNvPicPr>
+          <p:nvPr/>
+        </p:nvPicPr>
+        <p:blipFill>
+          <a:blip r:embed="rId6">
+            <a:extLst>
+              <a:ext uri="{28A0092B-C50C-407E-A947-70E740481C1C}">
+                <a14:useLocalDpi xmlns:a14="http://schemas.microsoft.com/office/drawing/2010/main" val="0"/>
+              </a:ext>
+            </a:extLst>
+          </a:blip>
+          <a:stretch>
+            <a:fillRect/>
+          </a:stretch>
+        </p:blipFill>
+        <p:spPr>
+          <a:xfrm>
+            <a:off x="92765" y="65245"/>
+            <a:ext cx="1310754" cy="1310754"/>
+          </a:xfrm>
+          <a:prstGeom prst="rect">
+            <a:avLst/>
+          </a:prstGeom>
+        </p:spPr>
+      </p:pic>
     </p:spTree>
     <p:extLst>
       <p:ext uri="{BB962C8B-B14F-4D97-AF65-F5344CB8AC3E}">
@@ -4495,13 +4590,13 @@
         </p:nvSpPr>
         <p:spPr>
           <a:xfrm>
-            <a:off x="276639" y="791301"/>
-            <a:ext cx="8608944" cy="3597820"/>
+            <a:off x="276639" y="791300"/>
+            <a:ext cx="8608944" cy="3952977"/>
           </a:xfrm>
         </p:spPr>
         <p:txBody>
           <a:bodyPr>
-            <a:normAutofit/>
+            <a:normAutofit lnSpcReduction="10000"/>
           </a:bodyPr>
           <a:lstStyle/>
           <a:p>
@@ -4561,9 +4656,21 @@
             <a:endParaRPr lang="en-US" sz="1600" dirty="0"/>
           </a:p>
           <a:p>
-            <a:r>
-              <a:rPr lang="en-US" dirty="0"/>
-              <a:t>Reproducibility, reusability, etc. – what is it?  …why do it?</a:t>
+            <a:pPr lvl="2"/>
+            <a:endParaRPr lang="en-US" smtClean="0"/>
+          </a:p>
+          <a:p>
+            <a:pPr lvl="2"/>
+            <a:endParaRPr lang="en-US" smtClean="0"/>
+          </a:p>
+          <a:p>
+            <a:r>
+              <a:rPr lang="en-US" smtClean="0"/>
+              <a:t>Reproducibility</a:t>
+            </a:r>
+            <a:r>
+              <a:rPr lang="en-US" dirty="0"/>
+              <a:t>, reusability, etc. – what is it?  …why do it?</a:t>
             </a:r>
           </a:p>
         </p:txBody>
@@ -4577,7 +4684,7 @@
         <p:spPr>
           <a:xfrm>
             <a:off x="601317" y="2243062"/>
-            <a:ext cx="8542683" cy="1538883"/>
+            <a:ext cx="8542683" cy="1792798"/>
           </a:xfrm>
           <a:prstGeom prst="rect">
             <a:avLst/>
@@ -4596,27 +4703,47 @@
               </a:spcBef>
             </a:pPr>
             <a:r>
-              <a:rPr lang="sv-SE" sz="1400" dirty="0">
-                <a:latin typeface="Times New Roman" panose="02020603050405020304" pitchFamily="18" charset="0"/>
-                <a:cs typeface="Times New Roman" panose="02020603050405020304" pitchFamily="18" charset="0"/>
-              </a:rPr>
-              <a:t>V. Stodden (2017), </a:t>
-            </a:r>
-            <a:r>
-              <a:rPr lang="sv-SE" sz="1400" dirty="0">
+              <a:rPr lang="sv-SE" sz="1400">
+                <a:latin typeface="Times New Roman" panose="02020603050405020304" pitchFamily="18" charset="0"/>
+                <a:cs typeface="Times New Roman" panose="02020603050405020304" pitchFamily="18" charset="0"/>
+              </a:rPr>
+              <a:t>The Software Sustainability Institute, </a:t>
+            </a:r>
+            <a:r>
+              <a:rPr lang="sv-SE" sz="1400">
                 <a:latin typeface="Times New Roman" panose="02020603050405020304" pitchFamily="18" charset="0"/>
                 <a:cs typeface="Times New Roman" panose="02020603050405020304" pitchFamily="18" charset="0"/>
                 <a:hlinkClick r:id="rId3"/>
               </a:rPr>
-              <a:t>https://codeocean.com/workshops/computational-reproducibility</a:t>
-            </a:r>
-            <a:r>
-              <a:rPr lang="sv-SE" sz="1400" dirty="0">
+              <a:t>https</a:t>
+            </a:r>
+            <a:r>
+              <a:rPr lang="sv-SE" sz="1400">
+                <a:latin typeface="Times New Roman" panose="02020603050405020304" pitchFamily="18" charset="0"/>
+                <a:cs typeface="Times New Roman" panose="02020603050405020304" pitchFamily="18" charset="0"/>
+                <a:hlinkClick r:id="rId3"/>
+              </a:rPr>
+              <a:t>://</a:t>
+            </a:r>
+            <a:r>
+              <a:rPr lang="sv-SE" sz="1400" smtClean="0">
+                <a:latin typeface="Times New Roman" panose="02020603050405020304" pitchFamily="18" charset="0"/>
+                <a:cs typeface="Times New Roman" panose="02020603050405020304" pitchFamily="18" charset="0"/>
+                <a:hlinkClick r:id="rId3"/>
+              </a:rPr>
+              <a:t>www.software.ac.uk/ssisearch?search_api_fulltext_1=reproducible</a:t>
+            </a:r>
+            <a:r>
+              <a:rPr lang="sv-SE" sz="1400" smtClean="0">
                 <a:latin typeface="Times New Roman" panose="02020603050405020304" pitchFamily="18" charset="0"/>
                 <a:cs typeface="Times New Roman" panose="02020603050405020304" pitchFamily="18" charset="0"/>
               </a:rPr>
               <a:t> </a:t>
             </a:r>
+            <a:endParaRPr lang="sv-SE" sz="1400">
+              <a:latin typeface="Times New Roman" panose="02020603050405020304" pitchFamily="18" charset="0"/>
+              <a:cs typeface="Times New Roman" panose="02020603050405020304" pitchFamily="18" charset="0"/>
+            </a:endParaRPr>
           </a:p>
           <a:p>
             <a:pPr marL="227013" indent="-227013">
@@ -4625,24 +4752,34 @@
               </a:spcBef>
             </a:pPr>
             <a:r>
-              <a:rPr lang="en-US" sz="1400" dirty="0">
-                <a:latin typeface="Times New Roman" panose="02020603050405020304" pitchFamily="18" charset="0"/>
-                <a:cs typeface="Times New Roman" panose="02020603050405020304" pitchFamily="18" charset="0"/>
-              </a:rPr>
-              <a:t>V. Stodden &amp; S. Miguez (2014), </a:t>
-            </a:r>
-            <a:r>
-              <a:rPr lang="en-US" sz="1400" dirty="0">
+              <a:rPr lang="sv-SE" sz="1400" smtClean="0">
+                <a:latin typeface="Times New Roman" panose="02020603050405020304" pitchFamily="18" charset="0"/>
+                <a:cs typeface="Times New Roman" panose="02020603050405020304" pitchFamily="18" charset="0"/>
+              </a:rPr>
+              <a:t>V</a:t>
+            </a:r>
+            <a:r>
+              <a:rPr lang="sv-SE" sz="1400" dirty="0">
+                <a:latin typeface="Times New Roman" panose="02020603050405020304" pitchFamily="18" charset="0"/>
+                <a:cs typeface="Times New Roman" panose="02020603050405020304" pitchFamily="18" charset="0"/>
+              </a:rPr>
+              <a:t>. Stodden (2017), </a:t>
+            </a:r>
+            <a:r>
+              <a:rPr lang="sv-SE" sz="1400" dirty="0">
                 <a:latin typeface="Times New Roman" panose="02020603050405020304" pitchFamily="18" charset="0"/>
                 <a:cs typeface="Times New Roman" panose="02020603050405020304" pitchFamily="18" charset="0"/>
                 <a:hlinkClick r:id="rId4"/>
               </a:rPr>
-              <a:t>https://openresearchsoftware.metajnl.com/articles/10.5334/jors.ay/</a:t>
-            </a:r>
-            <a:endParaRPr lang="en-US" sz="1400" dirty="0">
-              <a:latin typeface="Times New Roman" panose="02020603050405020304" pitchFamily="18" charset="0"/>
-              <a:cs typeface="Times New Roman" panose="02020603050405020304" pitchFamily="18" charset="0"/>
-            </a:endParaRPr>
+              <a:t>https://codeocean.com/workshops/computational-reproducibility</a:t>
+            </a:r>
+            <a:r>
+              <a:rPr lang="sv-SE" sz="1400" dirty="0">
+                <a:latin typeface="Times New Roman" panose="02020603050405020304" pitchFamily="18" charset="0"/>
+                <a:cs typeface="Times New Roman" panose="02020603050405020304" pitchFamily="18" charset="0"/>
+              </a:rPr>
+              <a:t> </a:t>
+            </a:r>
           </a:p>
           <a:p>
             <a:pPr marL="227013" indent="-227013">
@@ -4651,27 +4788,24 @@
               </a:spcBef>
             </a:pPr>
             <a:r>
-              <a:rPr lang="it-IT" sz="1400" dirty="0">
-                <a:latin typeface="Times New Roman" panose="02020603050405020304" pitchFamily="18" charset="0"/>
-                <a:cs typeface="Times New Roman" panose="02020603050405020304" pitchFamily="18" charset="0"/>
-              </a:rPr>
-              <a:t>S.R. Piccolo &amp; M.B. Frampton (2016), </a:t>
-            </a:r>
-            <a:r>
-              <a:rPr lang="it-IT" sz="1400" dirty="0">
+              <a:rPr lang="en-US" sz="1400" dirty="0">
+                <a:latin typeface="Times New Roman" panose="02020603050405020304" pitchFamily="18" charset="0"/>
+                <a:cs typeface="Times New Roman" panose="02020603050405020304" pitchFamily="18" charset="0"/>
+              </a:rPr>
+              <a:t>V. Stodden &amp; S. Miguez (2014), </a:t>
+            </a:r>
+            <a:r>
+              <a:rPr lang="en-US" sz="1400" dirty="0">
                 <a:latin typeface="Times New Roman" panose="02020603050405020304" pitchFamily="18" charset="0"/>
                 <a:cs typeface="Times New Roman" panose="02020603050405020304" pitchFamily="18" charset="0"/>
                 <a:hlinkClick r:id="rId5"/>
               </a:rPr>
-              <a:t>https://gigascience.biomedcentral.com/articles/10.1186/s13742-016-0135-4</a:t>
-            </a:r>
-            <a:r>
-              <a:rPr lang="it-IT" sz="1400" dirty="0">
-                <a:latin typeface="Times New Roman" panose="02020603050405020304" pitchFamily="18" charset="0"/>
-                <a:cs typeface="Times New Roman" panose="02020603050405020304" pitchFamily="18" charset="0"/>
-              </a:rPr>
-              <a:t>  </a:t>
-            </a:r>
+              <a:t>https://openresearchsoftware.metajnl.com/articles/10.5334/jors.ay/</a:t>
+            </a:r>
+            <a:endParaRPr lang="en-US" sz="1400" dirty="0">
+              <a:latin typeface="Times New Roman" panose="02020603050405020304" pitchFamily="18" charset="0"/>
+              <a:cs typeface="Times New Roman" panose="02020603050405020304" pitchFamily="18" charset="0"/>
+            </a:endParaRPr>
           </a:p>
           <a:p>
             <a:pPr marL="227013" indent="-227013">
@@ -4680,26 +4814,26 @@
               </a:spcBef>
             </a:pPr>
             <a:r>
-              <a:rPr lang="da-DK" sz="1400" dirty="0">
-                <a:latin typeface="Times New Roman" panose="02020603050405020304" pitchFamily="18" charset="0"/>
-                <a:cs typeface="Times New Roman" panose="02020603050405020304" pitchFamily="18" charset="0"/>
-              </a:rPr>
-              <a:t>G.K. Sandve et al. (2013), </a:t>
-            </a:r>
-            <a:r>
-              <a:rPr lang="da-DK" sz="1400" dirty="0">
+              <a:rPr lang="it-IT" sz="1400" dirty="0">
+                <a:latin typeface="Times New Roman" panose="02020603050405020304" pitchFamily="18" charset="0"/>
+                <a:cs typeface="Times New Roman" panose="02020603050405020304" pitchFamily="18" charset="0"/>
+              </a:rPr>
+              <a:t>S.R. Piccolo &amp; M.B. Frampton (2016), </a:t>
+            </a:r>
+            <a:r>
+              <a:rPr lang="it-IT" sz="1400" dirty="0">
                 <a:latin typeface="Times New Roman" panose="02020603050405020304" pitchFamily="18" charset="0"/>
                 <a:cs typeface="Times New Roman" panose="02020603050405020304" pitchFamily="18" charset="0"/>
                 <a:hlinkClick r:id="rId6"/>
               </a:rPr>
-              <a:t>http://journals.plos.org/ploscompbiol/article?id=10.1371/journal.pcbi.1003285</a:t>
-            </a:r>
-            <a:r>
-              <a:rPr lang="da-DK" sz="1400" dirty="0">
-                <a:latin typeface="Times New Roman" panose="02020603050405020304" pitchFamily="18" charset="0"/>
-                <a:cs typeface="Times New Roman" panose="02020603050405020304" pitchFamily="18" charset="0"/>
-              </a:rPr>
-              <a:t> </a:t>
+              <a:t>https://gigascience.biomedcentral.com/articles/10.1186/s13742-016-0135-4</a:t>
+            </a:r>
+            <a:r>
+              <a:rPr lang="it-IT" sz="1400" dirty="0">
+                <a:latin typeface="Times New Roman" panose="02020603050405020304" pitchFamily="18" charset="0"/>
+                <a:cs typeface="Times New Roman" panose="02020603050405020304" pitchFamily="18" charset="0"/>
+              </a:rPr>
+              <a:t>  </a:t>
             </a:r>
           </a:p>
           <a:p>
@@ -4709,6 +4843,35 @@
               </a:spcBef>
             </a:pPr>
             <a:r>
+              <a:rPr lang="da-DK" sz="1400" dirty="0">
+                <a:latin typeface="Times New Roman" panose="02020603050405020304" pitchFamily="18" charset="0"/>
+                <a:cs typeface="Times New Roman" panose="02020603050405020304" pitchFamily="18" charset="0"/>
+              </a:rPr>
+              <a:t>G.K. Sandve et al. (2013), </a:t>
+            </a:r>
+            <a:r>
+              <a:rPr lang="da-DK" sz="1400" dirty="0">
+                <a:latin typeface="Times New Roman" panose="02020603050405020304" pitchFamily="18" charset="0"/>
+                <a:cs typeface="Times New Roman" panose="02020603050405020304" pitchFamily="18" charset="0"/>
+                <a:hlinkClick r:id="rId7"/>
+              </a:rPr>
+              <a:t>http://journals.plos.org/ploscompbiol/article?id=10.1371/journal.pcbi.1003285</a:t>
+            </a:r>
+            <a:r>
+              <a:rPr lang="da-DK" sz="1400" dirty="0">
+                <a:latin typeface="Times New Roman" panose="02020603050405020304" pitchFamily="18" charset="0"/>
+                <a:cs typeface="Times New Roman" panose="02020603050405020304" pitchFamily="18" charset="0"/>
+              </a:rPr>
+              <a:t> </a:t>
+            </a:r>
+          </a:p>
+          <a:p>
+            <a:pPr marL="227013" indent="-227013">
+              <a:spcBef>
+                <a:spcPts val="300"/>
+              </a:spcBef>
+            </a:pPr>
+            <a:r>
               <a:rPr lang="it-IT" sz="1400" dirty="0">
                 <a:latin typeface="Times New Roman" panose="02020603050405020304" pitchFamily="18" charset="0"/>
                 <a:cs typeface="Times New Roman" panose="02020603050405020304" pitchFamily="18" charset="0"/>
@@ -4719,7 +4882,7 @@
               <a:rPr lang="it-IT" sz="1400" dirty="0">
                 <a:latin typeface="Times New Roman" panose="02020603050405020304" pitchFamily="18" charset="0"/>
                 <a:cs typeface="Times New Roman" panose="02020603050405020304" pitchFamily="18" charset="0"/>
-                <a:hlinkClick r:id="rId7"/>
+                <a:hlinkClick r:id="rId8"/>
               </a:rPr>
               <a:t>https://pdfs.semanticscholar.org/57ee/c0917fc84716e5748c2e94139ab156db3ada.pdf</a:t>
             </a:r>
@@ -4738,7 +4901,7 @@
           <p:cNvPr id="5" name="TextBox 4">
             <a:extLst>
               <a:ext uri="{FF2B5EF4-FFF2-40B4-BE49-F238E27FC236}">
-                <a16:creationId xmlns:a16="http://schemas.microsoft.com/office/drawing/2014/main" id="{019BFA61-21A0-4A72-801D-C7C00BAFA17D}"/>
+                <a16:creationId xmlns:a16="http://schemas.microsoft.com/office/drawing/2014/main" xmlns="" id="{019BFA61-21A0-4A72-801D-C7C00BAFA17D}"/>
               </a:ext>
             </a:extLst>
           </p:cNvPr>
@@ -4747,8 +4910,8 @@
         </p:nvSpPr>
         <p:spPr>
           <a:xfrm>
-            <a:off x="601318" y="4356543"/>
-            <a:ext cx="8413474" cy="1754326"/>
+            <a:off x="601318" y="4601709"/>
+            <a:ext cx="8413474" cy="1500411"/>
           </a:xfrm>
           <a:prstGeom prst="rect">
             <a:avLst/>
@@ -4777,7 +4940,7 @@
               <a:rPr lang="en-US" sz="1400" dirty="0">
                 <a:latin typeface="Times New Roman" panose="02020603050405020304" pitchFamily="18" charset="0"/>
                 <a:cs typeface="Times New Roman" panose="02020603050405020304" pitchFamily="18" charset="0"/>
-                <a:hlinkClick r:id="rId8"/>
+                <a:hlinkClick r:id="rId9"/>
               </a:rPr>
               <a:t>https://hal.inria.fr/hal-01358082/file/guest_rougier_2016.pdf</a:t>
             </a:r>
@@ -4820,7 +4983,7 @@
               <a:rPr lang="en-US" sz="1400" dirty="0">
                 <a:latin typeface="Times New Roman" panose="02020603050405020304" pitchFamily="18" charset="0"/>
                 <a:cs typeface="Times New Roman" panose="02020603050405020304" pitchFamily="18" charset="0"/>
-                <a:hlinkClick r:id="rId9"/>
+                <a:hlinkClick r:id="rId10"/>
               </a:rPr>
               <a:t>http://gael-varoquaux.info/programming/beyond-computational-reproducibility-let-us-aim-for-reusability.html</a:t>
             </a:r>
@@ -4856,7 +5019,7 @@
               <a:rPr lang="en-US" sz="1400" dirty="0">
                 <a:latin typeface="Times New Roman" panose="02020603050405020304" pitchFamily="18" charset="0"/>
                 <a:cs typeface="Times New Roman" panose="02020603050405020304" pitchFamily="18" charset="0"/>
-                <a:hlinkClick r:id="rId10"/>
+                <a:hlinkClick r:id="rId11"/>
               </a:rPr>
               <a:t>http://ropensci.github.io/reproducibility-guide/sections/introduction/</a:t>
             </a:r>
@@ -4879,16 +5042,16 @@
                 <a:latin typeface="Times New Roman" panose="02020603050405020304" pitchFamily="18" charset="0"/>
                 <a:cs typeface="Times New Roman" panose="02020603050405020304" pitchFamily="18" charset="0"/>
               </a:rPr>
-              <a:t>L.A. Barba (2017), https://speakerdeck.com/labarba/introduction-to-computational-reproducibility-and-why-we-care </a:t>
-            </a:r>
-          </a:p>
-          <a:p>
-            <a:pPr marL="227013" indent="-227013">
-              <a:spcBef>
-                <a:spcPts val="300"/>
-              </a:spcBef>
-            </a:pPr>
-            <a:endParaRPr lang="en-US" sz="1400" dirty="0">
+              <a:t>L.A. Barba (2017), https://</a:t>
+            </a:r>
+            <a:r>
+              <a:rPr lang="it-IT" sz="1400">
+                <a:latin typeface="Times New Roman" panose="02020603050405020304" pitchFamily="18" charset="0"/>
+                <a:cs typeface="Times New Roman" panose="02020603050405020304" pitchFamily="18" charset="0"/>
+              </a:rPr>
+              <a:t>speakerdeck.com/labarba/introduction-to-computational-reproducibility-and-why-we-care </a:t>
+            </a:r>
+            <a:endParaRPr lang="it-IT" sz="1400" dirty="0">
               <a:latin typeface="Times New Roman" panose="02020603050405020304" pitchFamily="18" charset="0"/>
               <a:cs typeface="Times New Roman" panose="02020603050405020304" pitchFamily="18" charset="0"/>
             </a:endParaRPr>
@@ -4977,23 +5140,24 @@
           <a:lstStyle/>
           <a:p>
             <a:r>
-              <a:rPr lang="en-US" i="0" dirty="0"/>
-              <a:t>The topic cannot be covered completely in a single lecture…</a:t>
-            </a:r>
-          </a:p>
-          <a:p>
-            <a:pPr lvl="1"/>
-            <a:r>
-              <a:rPr lang="en-US" i="0" dirty="0"/>
-              <a:t>so we provide some pointers for further study</a:t>
-            </a:r>
-          </a:p>
-          <a:p>
-            <a:pPr lvl="1"/>
-            <a:r>
-              <a:rPr lang="en-US" dirty="0"/>
-              <a:t>note that this is an active area of research</a:t>
-            </a:r>
+              <a:rPr lang="en-US" smtClean="0"/>
+              <a:t>A few more links</a:t>
+            </a:r>
+          </a:p>
+          <a:p>
+            <a:pPr lvl="1"/>
+            <a:r>
+              <a:rPr lang="en-US" smtClean="0"/>
+              <a:t>these are just a sampling of resources;  not comprehensive</a:t>
+            </a:r>
+          </a:p>
+          <a:p>
+            <a:pPr lvl="1"/>
+            <a:r>
+              <a:rPr lang="en-US" smtClean="0"/>
+              <a:t>don’t read them all;  skim to find ones that interest you</a:t>
+            </a:r>
+            <a:endParaRPr lang="en-US" dirty="0"/>
           </a:p>
           <a:p>
             <a:pPr lvl="2"/>
@@ -5002,8 +5166,19 @@
           <a:p>
             <a:r>
               <a:rPr lang="en-US" dirty="0"/>
-              <a:t>Biology and health sciences:</a:t>
-            </a:r>
+              <a:t>Biology and health </a:t>
+            </a:r>
+            <a:r>
+              <a:rPr lang="en-US"/>
+              <a:t>sciences</a:t>
+            </a:r>
+            <a:r>
+              <a:rPr lang="en-US" smtClean="0"/>
+              <a:t>:</a:t>
+            </a:r>
+          </a:p>
+          <a:p>
+            <a:endParaRPr lang="en-US" dirty="0"/>
           </a:p>
           <a:p>
             <a:pPr lvl="2"/>
@@ -5036,7 +5211,7 @@
           <p:cNvPr id="7" name="TextBox 6">
             <a:extLst>
               <a:ext uri="{FF2B5EF4-FFF2-40B4-BE49-F238E27FC236}">
-                <a16:creationId xmlns:a16="http://schemas.microsoft.com/office/drawing/2014/main" id="{F35A1A89-FB8A-4F5B-8BD2-9EE4EA8B8583}"/>
+                <a16:creationId xmlns:a16="http://schemas.microsoft.com/office/drawing/2014/main" xmlns="" id="{F35A1A89-FB8A-4F5B-8BD2-9EE4EA8B8583}"/>
               </a:ext>
             </a:extLst>
           </p:cNvPr>
@@ -5046,7 +5221,7 @@
         <p:spPr>
           <a:xfrm>
             <a:off x="583096" y="2346910"/>
-            <a:ext cx="8284265" cy="954107"/>
+            <a:ext cx="8284265" cy="1069524"/>
           </a:xfrm>
           <a:prstGeom prst="rect">
             <a:avLst/>
@@ -5059,6 +5234,11 @@
           </a:bodyPr>
           <a:lstStyle/>
           <a:p>
+            <a:pPr>
+              <a:spcBef>
+                <a:spcPts val="300"/>
+              </a:spcBef>
+            </a:pPr>
             <a:r>
               <a:rPr lang="en-US" sz="1400" dirty="0">
                 <a:latin typeface="Times New Roman" panose="02020603050405020304" pitchFamily="18" charset="0"/>
@@ -5097,6 +5277,11 @@
             </a:r>
           </a:p>
           <a:p>
+            <a:pPr>
+              <a:spcBef>
+                <a:spcPts val="300"/>
+              </a:spcBef>
+            </a:pPr>
             <a:r>
               <a:rPr lang="en-US" sz="1400" dirty="0">
                 <a:latin typeface="Times New Roman" panose="02020603050405020304" pitchFamily="18" charset="0"/>
@@ -5135,6 +5320,11 @@
             </a:r>
           </a:p>
           <a:p>
+            <a:pPr>
+              <a:spcBef>
+                <a:spcPts val="300"/>
+              </a:spcBef>
+            </a:pPr>
             <a:r>
               <a:rPr lang="fr-FR" sz="1400" dirty="0">
                 <a:latin typeface="Times New Roman" panose="02020603050405020304" pitchFamily="18" charset="0"/>
@@ -5173,6 +5363,11 @@
             </a:r>
           </a:p>
           <a:p>
+            <a:pPr>
+              <a:spcBef>
+                <a:spcPts val="300"/>
+              </a:spcBef>
+            </a:pPr>
             <a:r>
               <a:rPr lang="fr-FR" sz="1400" dirty="0">
                 <a:latin typeface="Times New Roman" panose="02020603050405020304" pitchFamily="18" charset="0"/>
@@ -5203,7 +5398,7 @@
           <p:cNvPr id="8" name="TextBox 7">
             <a:extLst>
               <a:ext uri="{FF2B5EF4-FFF2-40B4-BE49-F238E27FC236}">
-                <a16:creationId xmlns:a16="http://schemas.microsoft.com/office/drawing/2014/main" id="{B8371A57-1138-419D-832A-1FE059D9EF9A}"/>
+                <a16:creationId xmlns:a16="http://schemas.microsoft.com/office/drawing/2014/main" xmlns="" id="{B8371A57-1138-419D-832A-1FE059D9EF9A}"/>
               </a:ext>
             </a:extLst>
           </p:cNvPr>
@@ -5212,8 +5407,8 @@
         </p:nvSpPr>
         <p:spPr>
           <a:xfrm>
-            <a:off x="583095" y="3744567"/>
-            <a:ext cx="8284265" cy="523220"/>
+            <a:off x="601318" y="4075872"/>
+            <a:ext cx="8284265" cy="561692"/>
           </a:xfrm>
           <a:prstGeom prst="rect">
             <a:avLst/>
@@ -5226,6 +5421,11 @@
           </a:bodyPr>
           <a:lstStyle/>
           <a:p>
+            <a:pPr>
+              <a:spcBef>
+                <a:spcPts val="300"/>
+              </a:spcBef>
+            </a:pPr>
             <a:r>
               <a:rPr lang="it-IT" sz="1400" dirty="0">
                 <a:latin typeface="Times New Roman" panose="02020603050405020304" pitchFamily="18" charset="0"/>
@@ -5250,6 +5450,11 @@
             </a:r>
           </a:p>
           <a:p>
+            <a:pPr>
+              <a:spcBef>
+                <a:spcPts val="300"/>
+              </a:spcBef>
+            </a:pPr>
             <a:r>
               <a:rPr lang="en-US" sz="1400" dirty="0">
                 <a:latin typeface="Times New Roman" panose="02020603050405020304" pitchFamily="18" charset="0"/>
@@ -5324,7 +5529,7 @@
           <p:cNvPr id="6" name="Content Placeholder 2">
             <a:extLst>
               <a:ext uri="{FF2B5EF4-FFF2-40B4-BE49-F238E27FC236}">
-                <a16:creationId xmlns:a16="http://schemas.microsoft.com/office/drawing/2014/main" id="{9081FF26-7AD5-4767-AF65-A27F1769E1FC}"/>
+                <a16:creationId xmlns:a16="http://schemas.microsoft.com/office/drawing/2014/main" xmlns="" id="{9081FF26-7AD5-4767-AF65-A27F1769E1FC}"/>
               </a:ext>
             </a:extLst>
           </p:cNvPr>
@@ -6159,7 +6364,7 @@
           <p:cNvPr id="4" name="TextBox 3">
             <a:extLst>
               <a:ext uri="{FF2B5EF4-FFF2-40B4-BE49-F238E27FC236}">
-                <a16:creationId xmlns:a16="http://schemas.microsoft.com/office/drawing/2014/main" id="{FE4820D9-EBD7-4753-BD2A-404C67F2A4D8}"/>
+                <a16:creationId xmlns:a16="http://schemas.microsoft.com/office/drawing/2014/main" xmlns="" id="{FE4820D9-EBD7-4753-BD2A-404C67F2A4D8}"/>
               </a:ext>
             </a:extLst>
           </p:cNvPr>
@@ -6326,7 +6531,7 @@
           <p:cNvPr id="4" name="Picture 3">
             <a:extLst>
               <a:ext uri="{FF2B5EF4-FFF2-40B4-BE49-F238E27FC236}">
-                <a16:creationId xmlns:a16="http://schemas.microsoft.com/office/drawing/2014/main" id="{6A8E0E4A-675D-4335-B1B6-0B78D0B7ADC8}"/>
+                <a16:creationId xmlns:a16="http://schemas.microsoft.com/office/drawing/2014/main" xmlns="" id="{6A8E0E4A-675D-4335-B1B6-0B78D0B7ADC8}"/>
               </a:ext>
             </a:extLst>
           </p:cNvPr>
@@ -6356,7 +6561,7 @@
           <p:cNvPr id="5" name="Picture 4">
             <a:extLst>
               <a:ext uri="{FF2B5EF4-FFF2-40B4-BE49-F238E27FC236}">
-                <a16:creationId xmlns:a16="http://schemas.microsoft.com/office/drawing/2014/main" id="{94974CB9-5BFD-42F0-8E4B-A8ECDFDFF4D2}"/>
+                <a16:creationId xmlns:a16="http://schemas.microsoft.com/office/drawing/2014/main" xmlns="" id="{94974CB9-5BFD-42F0-8E4B-A8ECDFDFF4D2}"/>
               </a:ext>
             </a:extLst>
           </p:cNvPr>
@@ -6386,7 +6591,7 @@
           <p:cNvPr id="6" name="TextBox 5">
             <a:extLst>
               <a:ext uri="{FF2B5EF4-FFF2-40B4-BE49-F238E27FC236}">
-                <a16:creationId xmlns:a16="http://schemas.microsoft.com/office/drawing/2014/main" id="{61328A6C-5F57-4BFC-984C-4E43AA9106BF}"/>
+                <a16:creationId xmlns:a16="http://schemas.microsoft.com/office/drawing/2014/main" xmlns="" id="{61328A6C-5F57-4BFC-984C-4E43AA9106BF}"/>
               </a:ext>
             </a:extLst>
           </p:cNvPr>
@@ -6568,7 +6773,7 @@
           <p:cNvPr id="5" name="TextBox 4">
             <a:extLst>
               <a:ext uri="{FF2B5EF4-FFF2-40B4-BE49-F238E27FC236}">
-                <a16:creationId xmlns:a16="http://schemas.microsoft.com/office/drawing/2014/main" id="{019BFA61-21A0-4A72-801D-C7C00BAFA17D}"/>
+                <a16:creationId xmlns:a16="http://schemas.microsoft.com/office/drawing/2014/main" xmlns="" id="{019BFA61-21A0-4A72-801D-C7C00BAFA17D}"/>
               </a:ext>
             </a:extLst>
           </p:cNvPr>
@@ -6883,7 +7088,7 @@
           <p:cNvPr id="6" name="Content Placeholder 2">
             <a:extLst>
               <a:ext uri="{FF2B5EF4-FFF2-40B4-BE49-F238E27FC236}">
-                <a16:creationId xmlns:a16="http://schemas.microsoft.com/office/drawing/2014/main" id="{9081FF26-7AD5-4767-AF65-A27F1769E1FC}"/>
+                <a16:creationId xmlns:a16="http://schemas.microsoft.com/office/drawing/2014/main" xmlns="" id="{9081FF26-7AD5-4767-AF65-A27F1769E1FC}"/>
               </a:ext>
             </a:extLst>
           </p:cNvPr>
@@ -7231,7 +7436,7 @@
           <p:cNvPr id="1026" name="Picture 2" descr="Shifter logo">
             <a:extLst>
               <a:ext uri="{FF2B5EF4-FFF2-40B4-BE49-F238E27FC236}">
-                <a16:creationId xmlns:a16="http://schemas.microsoft.com/office/drawing/2014/main" id="{66DA49E9-6E33-4D38-9858-6ADEBD4307E3}"/>
+                <a16:creationId xmlns:a16="http://schemas.microsoft.com/office/drawing/2014/main" xmlns="" id="{66DA49E9-6E33-4D38-9858-6ADEBD4307E3}"/>
               </a:ext>
             </a:extLst>
           </p:cNvPr>
@@ -7278,7 +7483,7 @@
           <p:cNvPr id="6" name="TextBox 5">
             <a:extLst>
               <a:ext uri="{FF2B5EF4-FFF2-40B4-BE49-F238E27FC236}">
-                <a16:creationId xmlns:a16="http://schemas.microsoft.com/office/drawing/2014/main" id="{1DE7DDFE-E229-4C3B-87E8-E52E3770DC0C}"/>
+                <a16:creationId xmlns:a16="http://schemas.microsoft.com/office/drawing/2014/main" xmlns="" id="{1DE7DDFE-E229-4C3B-87E8-E52E3770DC0C}"/>
               </a:ext>
             </a:extLst>
           </p:cNvPr>
@@ -7496,7 +7701,19 @@
             <a:pPr lvl="1"/>
             <a:r>
               <a:rPr lang="en-US" sz="1600" i="0" dirty="0"/>
-              <a:t>US Department of Energy requires a Digital Management Plan</a:t>
+              <a:t>US Department of Energy requires </a:t>
+            </a:r>
+            <a:r>
+              <a:rPr lang="en-US" sz="1600" i="0"/>
+              <a:t>a </a:t>
+            </a:r>
+            <a:r>
+              <a:rPr lang="en-US" sz="1600" i="0" smtClean="0"/>
+              <a:t>Data </a:t>
+            </a:r>
+            <a:r>
+              <a:rPr lang="en-US" sz="1600" i="0" dirty="0"/>
+              <a:t>Management Plan</a:t>
             </a:r>
           </a:p>
           <a:p>
@@ -7516,7 +7733,7 @@
           <p:cNvPr id="4" name="TextBox 3">
             <a:extLst>
               <a:ext uri="{FF2B5EF4-FFF2-40B4-BE49-F238E27FC236}">
-                <a16:creationId xmlns:a16="http://schemas.microsoft.com/office/drawing/2014/main" id="{7513C421-393B-4FF0-932C-5CBCC33C43BF}"/>
+                <a16:creationId xmlns:a16="http://schemas.microsoft.com/office/drawing/2014/main" xmlns="" id="{7513C421-393B-4FF0-932C-5CBCC33C43BF}"/>
               </a:ext>
             </a:extLst>
           </p:cNvPr>
@@ -8043,7 +8260,7 @@
           <p:cNvPr id="6" name="Content Placeholder 2">
             <a:extLst>
               <a:ext uri="{FF2B5EF4-FFF2-40B4-BE49-F238E27FC236}">
-                <a16:creationId xmlns:a16="http://schemas.microsoft.com/office/drawing/2014/main" id="{9081FF26-7AD5-4767-AF65-A27F1769E1FC}"/>
+                <a16:creationId xmlns:a16="http://schemas.microsoft.com/office/drawing/2014/main" xmlns="" id="{9081FF26-7AD5-4767-AF65-A27F1769E1FC}"/>
               </a:ext>
             </a:extLst>
           </p:cNvPr>
@@ -8151,7 +8368,15 @@
             <a:pPr lvl="1"/>
             <a:r>
               <a:rPr lang="en-US" dirty="0"/>
-              <a:t>replicability is the essential first step (but more difficult to say…)</a:t>
+              <a:t>replicability is the essential </a:t>
+            </a:r>
+            <a:r>
+              <a:rPr lang="en-US"/>
+              <a:t>first </a:t>
+            </a:r>
+            <a:r>
+              <a:rPr lang="en-US" smtClean="0"/>
+              <a:t>step</a:t>
             </a:r>
             <a:endParaRPr lang="en-US" sz="1600" i="0" dirty="0"/>
           </a:p>
@@ -8168,7 +8393,7 @@
           <p:cNvPr id="7" name="TextBox 6">
             <a:extLst>
               <a:ext uri="{FF2B5EF4-FFF2-40B4-BE49-F238E27FC236}">
-                <a16:creationId xmlns:a16="http://schemas.microsoft.com/office/drawing/2014/main" id="{FD17F330-126A-4302-ABDD-998D38C067B6}"/>
+                <a16:creationId xmlns:a16="http://schemas.microsoft.com/office/drawing/2014/main" xmlns="" id="{FD17F330-126A-4302-ABDD-998D38C067B6}"/>
               </a:ext>
             </a:extLst>
           </p:cNvPr>
@@ -8401,7 +8626,7 @@
           <p:cNvPr id="6" name="Content Placeholder 2">
             <a:extLst>
               <a:ext uri="{FF2B5EF4-FFF2-40B4-BE49-F238E27FC236}">
-                <a16:creationId xmlns:a16="http://schemas.microsoft.com/office/drawing/2014/main" id="{9081FF26-7AD5-4767-AF65-A27F1769E1FC}"/>
+                <a16:creationId xmlns:a16="http://schemas.microsoft.com/office/drawing/2014/main" xmlns="" id="{9081FF26-7AD5-4767-AF65-A27F1769E1FC}"/>
               </a:ext>
             </a:extLst>
           </p:cNvPr>
@@ -8466,15 +8691,40 @@
           <a:p>
             <a:r>
               <a:rPr lang="en-US" sz="1800" i="0" dirty="0"/>
-              <a:t>Political and social reasons</a:t>
-            </a:r>
+              <a:t>Political and </a:t>
+            </a:r>
+            <a:r>
+              <a:rPr lang="en-US" sz="1800" i="0"/>
+              <a:t>social </a:t>
+            </a:r>
+            <a:r>
+              <a:rPr lang="en-US" sz="1800" i="0" smtClean="0"/>
+              <a:t>reasons (incomplete list)</a:t>
+            </a:r>
+            <a:endParaRPr lang="en-US" sz="1800" i="0" dirty="0"/>
           </a:p>
           <a:p>
             <a:pPr lvl="1"/>
             <a:r>
               <a:rPr lang="en-US" sz="1600" i="0" dirty="0"/>
-              <a:t>don’t want to share years of effort with others, who would directly benefit</a:t>
-            </a:r>
+              <a:t>don’t want to share years of effort with others, who would </a:t>
+            </a:r>
+            <a:r>
+              <a:rPr lang="en-US" sz="1600" i="0"/>
+              <a:t>directly </a:t>
+            </a:r>
+            <a:r>
+              <a:rPr lang="en-US" sz="1600" i="0" smtClean="0"/>
+              <a:t>benefit</a:t>
+            </a:r>
+          </a:p>
+          <a:p>
+            <a:pPr lvl="1"/>
+            <a:r>
+              <a:rPr lang="en-US" smtClean="0"/>
+              <a:t>software license may forbid sharing</a:t>
+            </a:r>
+            <a:endParaRPr lang="en-US" sz="1600" i="0" dirty="0"/>
           </a:p>
           <a:p>
             <a:pPr lvl="1"/>
@@ -8510,23 +8760,57 @@
           <a:p>
             <a:pPr lvl="1"/>
             <a:r>
+              <a:rPr lang="en-US" sz="1600" i="0" smtClean="0"/>
+              <a:t>the software may be </a:t>
+            </a:r>
+            <a:r>
               <a:rPr lang="en-US" sz="1600" i="0" dirty="0"/>
-              <a:t>it can be very difficult to build/install the software</a:t>
-            </a:r>
+              <a:t>difficult </a:t>
+            </a:r>
+            <a:r>
+              <a:rPr lang="en-US" sz="1600" i="0"/>
+              <a:t>to </a:t>
+            </a:r>
+            <a:r>
+              <a:rPr lang="en-US" sz="1600" i="0" smtClean="0"/>
+              <a:t>build/install</a:t>
+            </a:r>
+            <a:endParaRPr lang="en-US" sz="1600" i="0" dirty="0"/>
           </a:p>
           <a:p>
             <a:pPr lvl="1"/>
             <a:r>
               <a:rPr lang="en-US" sz="1600" i="0" dirty="0"/>
-              <a:t>the software may be very difficult to use</a:t>
-            </a:r>
-          </a:p>
-          <a:p>
-            <a:pPr lvl="1"/>
+              <a:t>the software may </a:t>
+            </a:r>
+            <a:r>
+              <a:rPr lang="en-US" sz="1600" i="0"/>
+              <a:t>be </a:t>
+            </a:r>
+            <a:r>
+              <a:rPr lang="en-US" sz="1600" i="0" smtClean="0"/>
+              <a:t>difficult </a:t>
+            </a:r>
             <a:r>
               <a:rPr lang="en-US" sz="1600" i="0" dirty="0"/>
-              <a:t>the simulations may require many processors</a:t>
-            </a:r>
+              <a:t>to use</a:t>
+            </a:r>
+          </a:p>
+          <a:p>
+            <a:pPr lvl="1"/>
+            <a:r>
+              <a:rPr lang="en-US" sz="1600" i="0" dirty="0"/>
+              <a:t>the simulations may require </a:t>
+            </a:r>
+            <a:r>
+              <a:rPr lang="en-US" sz="1600" i="0"/>
+              <a:t>many </a:t>
+            </a:r>
+            <a:r>
+              <a:rPr lang="en-US" sz="1600" i="0" smtClean="0"/>
+              <a:t>processors, generate large data sets, etc.</a:t>
+            </a:r>
+            <a:endParaRPr lang="en-US" sz="1600" i="0" dirty="0"/>
           </a:p>
           <a:p>
             <a:pPr lvl="1"/>
@@ -8579,7 +8863,7 @@
         </p:nvSpPr>
         <p:spPr>
           <a:xfrm>
-            <a:off x="0" y="140672"/>
+            <a:off x="0" y="887"/>
             <a:ext cx="9144000" cy="589085"/>
           </a:xfrm>
         </p:spPr>
@@ -8601,7 +8885,7 @@
           <p:cNvPr id="6" name="Content Placeholder 2">
             <a:extLst>
               <a:ext uri="{FF2B5EF4-FFF2-40B4-BE49-F238E27FC236}">
-                <a16:creationId xmlns:a16="http://schemas.microsoft.com/office/drawing/2014/main" id="{9081FF26-7AD5-4767-AF65-A27F1769E1FC}"/>
+                <a16:creationId xmlns:a16="http://schemas.microsoft.com/office/drawing/2014/main" xmlns="" id="{9081FF26-7AD5-4767-AF65-A27F1769E1FC}"/>
               </a:ext>
             </a:extLst>
           </p:cNvPr>
@@ -8614,8 +8898,8 @@
         </p:nvSpPr>
         <p:spPr>
           <a:xfrm>
-            <a:off x="152400" y="827314"/>
-            <a:ext cx="8839200" cy="5146766"/>
+            <a:off x="152400" y="649357"/>
+            <a:ext cx="8839200" cy="5592417"/>
           </a:xfrm>
         </p:spPr>
         <p:txBody>
@@ -8700,8 +8984,75 @@
             <a:pPr lvl="1"/>
             <a:r>
               <a:rPr lang="en-US" sz="1600" i="0" dirty="0"/>
-              <a:t>Is it appropriate for funding agencies to require reproducibility?</a:t>
-            </a:r>
+              <a:t>Is it appropriate for funding agencies to require </a:t>
+            </a:r>
+            <a:r>
+              <a:rPr lang="en-US" sz="1600" i="0"/>
+              <a:t>reproducibility</a:t>
+            </a:r>
+            <a:r>
+              <a:rPr lang="en-US" sz="1600" i="0" smtClean="0"/>
+              <a:t>?</a:t>
+            </a:r>
+          </a:p>
+          <a:p>
+            <a:pPr lvl="1"/>
+            <a:r>
+              <a:rPr lang="en-US"/>
+              <a:t>Should journals require access to source code</a:t>
+            </a:r>
+            <a:r>
+              <a:rPr lang="en-US"/>
+              <a:t>? </a:t>
+            </a:r>
+            <a:endParaRPr lang="en-US" smtClean="0"/>
+          </a:p>
+          <a:p>
+            <a:pPr lvl="1"/>
+            <a:r>
+              <a:rPr lang="en-US" smtClean="0"/>
+              <a:t>Should </a:t>
+            </a:r>
+            <a:r>
+              <a:rPr lang="en-US"/>
+              <a:t>all code be open </a:t>
+            </a:r>
+            <a:r>
+              <a:rPr lang="en-US"/>
+              <a:t>source</a:t>
+            </a:r>
+            <a:r>
+              <a:rPr lang="en-US" smtClean="0"/>
+              <a:t>?</a:t>
+            </a:r>
+          </a:p>
+          <a:p>
+            <a:pPr lvl="1"/>
+            <a:endParaRPr lang="en-US"/>
+          </a:p>
+          <a:p>
+            <a:r>
+              <a:rPr lang="en-US"/>
+              <a:t>Who should bear the cost of reproducibility?</a:t>
+            </a:r>
+          </a:p>
+          <a:p>
+            <a:pPr lvl="1"/>
+            <a:r>
+              <a:rPr lang="en-US"/>
+              <a:t>Should the journal have an editor dedicated to reproducibility?</a:t>
+            </a:r>
+          </a:p>
+          <a:p>
+            <a:pPr lvl="1"/>
+            <a:r>
+              <a:rPr lang="en-US"/>
+              <a:t>Should the research project have to demonstrate reproducibility?</a:t>
+            </a:r>
+          </a:p>
+          <a:p>
+            <a:pPr lvl="1"/>
+            <a:endParaRPr lang="en-US" sz="1600" i="0" dirty="0"/>
           </a:p>
         </p:txBody>
       </p:sp>
@@ -8774,7 +9125,7 @@
           <p:cNvPr id="7" name="Content Placeholder 2">
             <a:extLst>
               <a:ext uri="{FF2B5EF4-FFF2-40B4-BE49-F238E27FC236}">
-                <a16:creationId xmlns:a16="http://schemas.microsoft.com/office/drawing/2014/main" id="{496BB089-B99F-4F8D-ABB1-4F20546276A3}"/>
+                <a16:creationId xmlns:a16="http://schemas.microsoft.com/office/drawing/2014/main" xmlns="" id="{496BB089-B99F-4F8D-ABB1-4F20546276A3}"/>
               </a:ext>
             </a:extLst>
           </p:cNvPr>
@@ -8812,8 +9163,24 @@
           <a:p>
             <a:pPr lvl="1"/>
             <a:r>
+              <a:rPr lang="en-US" i="0" smtClean="0"/>
+              <a:t>need </a:t>
+            </a:r>
+            <a:r>
               <a:rPr lang="en-US" i="0" dirty="0"/>
-              <a:t>we want confidence that published/presented results are correct</a:t>
+              <a:t>confidence </a:t>
+            </a:r>
+            <a:r>
+              <a:rPr lang="en-US" i="0"/>
+              <a:t>that </a:t>
+            </a:r>
+            <a:r>
+              <a:rPr lang="en-US" i="0" smtClean="0"/>
+              <a:t>other published/presented </a:t>
+            </a:r>
+            <a:r>
+              <a:rPr lang="en-US" i="0" dirty="0"/>
+              <a:t>results are correct</a:t>
             </a:r>
           </a:p>
           <a:p>
@@ -8979,7 +9346,15 @@
             </a:r>
             <a:r>
               <a:rPr lang="en-US" sz="2000" b="0" dirty="0"/>
-              <a:t>without it, reproducibility loses a lot of its value</a:t>
+              <a:t>without it, reproducibility loses a lot </a:t>
+            </a:r>
+            <a:r>
+              <a:rPr lang="en-US" sz="2000" b="0"/>
+              <a:t>of </a:t>
+            </a:r>
+            <a:r>
+              <a:rPr lang="en-US" sz="2000" b="0" smtClean="0"/>
+              <a:t>value</a:t>
             </a:r>
             <a:endParaRPr lang="en-US" b="0" dirty="0"/>
           </a:p>
@@ -8990,7 +9365,7 @@
           <p:cNvPr id="7" name="Content Placeholder 2">
             <a:extLst>
               <a:ext uri="{FF2B5EF4-FFF2-40B4-BE49-F238E27FC236}">
-                <a16:creationId xmlns:a16="http://schemas.microsoft.com/office/drawing/2014/main" id="{496BB089-B99F-4F8D-ABB1-4F20546276A3}"/>
+                <a16:creationId xmlns:a16="http://schemas.microsoft.com/office/drawing/2014/main" xmlns="" id="{496BB089-B99F-4F8D-ABB1-4F20546276A3}"/>
               </a:ext>
             </a:extLst>
           </p:cNvPr>
@@ -9097,14 +9472,42 @@
           <a:p>
             <a:r>
               <a:rPr lang="en-US" i="0" dirty="0"/>
-              <a:t>If a code is very difficult to use, what does reproducibility really mean?</a:t>
-            </a:r>
-          </a:p>
-          <a:p>
-            <a:pPr lvl="1"/>
-            <a:r>
-              <a:rPr lang="en-US" dirty="0"/>
-              <a:t>if you are given a replicated environment to work in, what do you do next?</a:t>
+              <a:t>If a </a:t>
+            </a:r>
+            <a:r>
+              <a:rPr lang="en-US" i="0"/>
+              <a:t>code </a:t>
+            </a:r>
+            <a:r>
+              <a:rPr lang="en-US" i="0" smtClean="0"/>
+              <a:t>is </a:t>
+            </a:r>
+            <a:r>
+              <a:rPr lang="en-US" i="0" dirty="0"/>
+              <a:t>difficult to use, what </a:t>
+            </a:r>
+            <a:r>
+              <a:rPr lang="en-US" i="0"/>
+              <a:t>does </a:t>
+            </a:r>
+            <a:r>
+              <a:rPr lang="en-US" i="0" smtClean="0"/>
+              <a:t>reproducibility </a:t>
+            </a:r>
+            <a:r>
+              <a:rPr lang="en-US" i="0" dirty="0"/>
+              <a:t>mean?</a:t>
+            </a:r>
+          </a:p>
+          <a:p>
+            <a:pPr lvl="1"/>
+            <a:r>
+              <a:rPr lang="en-US" smtClean="0"/>
+              <a:t>given </a:t>
+            </a:r>
+            <a:r>
+              <a:rPr lang="en-US" dirty="0"/>
+              <a:t>a replicated environment to work in, what do you do next?</a:t>
             </a:r>
           </a:p>
           <a:p>
@@ -9212,7 +9615,7 @@
           <p:cNvPr id="8" name="Content Placeholder 2">
             <a:extLst>
               <a:ext uri="{FF2B5EF4-FFF2-40B4-BE49-F238E27FC236}">
-                <a16:creationId xmlns:a16="http://schemas.microsoft.com/office/drawing/2014/main" id="{B23837A6-5E62-48BD-8241-836D8AC802E1}"/>
+                <a16:creationId xmlns:a16="http://schemas.microsoft.com/office/drawing/2014/main" xmlns="" id="{B23837A6-5E62-48BD-8241-836D8AC802E1}"/>
               </a:ext>
             </a:extLst>
           </p:cNvPr>
@@ -9243,7 +9646,19 @@
           <a:p>
             <a:r>
               <a:rPr lang="en-US" i="0" dirty="0"/>
-              <a:t>This approach can be very powerful:</a:t>
+              <a:t>This approach </a:t>
+            </a:r>
+            <a:r>
+              <a:rPr lang="en-US" i="0"/>
+              <a:t>can </a:t>
+            </a:r>
+            <a:r>
+              <a:rPr lang="en-US" i="0" smtClean="0"/>
+              <a:t>be </a:t>
+            </a:r>
+            <a:r>
+              <a:rPr lang="en-US" i="0" dirty="0"/>
+              <a:t>powerful:</a:t>
             </a:r>
           </a:p>
           <a:p>
@@ -9277,8 +9692,37 @@
             <a:pPr lvl="1"/>
             <a:r>
               <a:rPr lang="en-US" i="0" dirty="0"/>
-              <a:t>Python 2.7.x is not compatible with Python 3.x</a:t>
-            </a:r>
+              <a:t>Python </a:t>
+            </a:r>
+            <a:r>
+              <a:rPr lang="en-US" i="0"/>
+              <a:t>2.7.x </a:t>
+            </a:r>
+            <a:r>
+              <a:rPr lang="en-US" i="0" smtClean="0"/>
+              <a:t>code is </a:t>
+            </a:r>
+            <a:r>
+              <a:rPr lang="en-US" i="0"/>
+              <a:t>not </a:t>
+            </a:r>
+            <a:r>
+              <a:rPr lang="en-US" i="0" smtClean="0"/>
+              <a:t>always compatible </a:t>
+            </a:r>
+            <a:r>
+              <a:rPr lang="en-US" i="0" dirty="0"/>
+              <a:t>with </a:t>
+            </a:r>
+            <a:r>
+              <a:rPr lang="en-US" i="0"/>
+              <a:t>Python </a:t>
+            </a:r>
+            <a:r>
+              <a:rPr lang="en-US" i="0" smtClean="0"/>
+              <a:t>3.x code</a:t>
+            </a:r>
+            <a:endParaRPr lang="en-US" i="0" dirty="0"/>
           </a:p>
           <a:p>
             <a:pPr lvl="1"/>
@@ -9319,26 +9763,48 @@
             <a:pPr lvl="2"/>
             <a:r>
               <a:rPr lang="en-US" b="1" i="0" dirty="0"/>
-              <a:t> C/C++ and Fortran libraries and compilers are not</a:t>
-            </a:r>
-          </a:p>
-          <a:p>
-            <a:pPr lvl="1"/>
+              <a:t> C/C++ and Fortran libraries and </a:t>
+            </a:r>
+            <a:r>
+              <a:rPr lang="en-US" b="1" i="0"/>
+              <a:t>compilers </a:t>
+            </a:r>
+            <a:r>
+              <a:rPr lang="en-US" smtClean="0"/>
+              <a:t>less so</a:t>
+            </a:r>
+            <a:endParaRPr lang="en-US" b="1" i="0" dirty="0"/>
+          </a:p>
+          <a:p>
+            <a:pPr lvl="1"/>
+            <a:r>
+              <a:rPr lang="en-US" i="0" smtClean="0"/>
+              <a:t>a computer may have </a:t>
+            </a:r>
             <a:r>
               <a:rPr lang="en-US" i="0" dirty="0"/>
-              <a:t>one frequently has multiple versions of installed Python </a:t>
+              <a:t>multiple versions of installed Python </a:t>
             </a:r>
           </a:p>
           <a:p>
             <a:pPr lvl="2"/>
             <a:r>
               <a:rPr lang="en-US" b="1" i="0" dirty="0"/>
-              <a:t> this creates confusion</a:t>
-            </a:r>
-            <a:r>
-              <a:rPr lang="en-US" dirty="0"/>
+              <a:t> this </a:t>
+            </a:r>
+            <a:r>
+              <a:rPr lang="en-US" b="1" i="0"/>
+              <a:t>creates </a:t>
+            </a:r>
+            <a:r>
+              <a:rPr lang="en-US" b="1" i="0" smtClean="0"/>
+              <a:t>additional complexity</a:t>
+            </a:r>
+            <a:r>
+              <a:rPr lang="en-US" smtClean="0"/>
               <a:t> </a:t>
             </a:r>
+            <a:endParaRPr lang="en-US" dirty="0"/>
           </a:p>
         </p:txBody>
       </p:sp>
@@ -9406,7 +9872,7 @@
           <p:cNvPr id="6" name="Content Placeholder 2">
             <a:extLst>
               <a:ext uri="{FF2B5EF4-FFF2-40B4-BE49-F238E27FC236}">
-                <a16:creationId xmlns:a16="http://schemas.microsoft.com/office/drawing/2014/main" id="{9081FF26-7AD5-4767-AF65-A27F1769E1FC}"/>
+                <a16:creationId xmlns:a16="http://schemas.microsoft.com/office/drawing/2014/main" xmlns="" id="{9081FF26-7AD5-4767-AF65-A27F1769E1FC}"/>
               </a:ext>
             </a:extLst>
           </p:cNvPr>

</xml_diff>

<commit_message>
implemented more of Rob's suggestions
</commit_message>
<xml_diff>
--- a/computational_reproducibility/lecture/2018_ComputationalReproducibility_Bruhwiler_USPAS.pptx
+++ b/computational_reproducibility/lecture/2018_ComputationalReproducibility_Bruhwiler_USPAS.pptx
@@ -5,7 +5,7 @@
     <p:sldMasterId id="2147483696" r:id="rId1"/>
   </p:sldMasterIdLst>
   <p:notesMasterIdLst>
-    <p:notesMasterId r:id="rId23"/>
+    <p:notesMasterId r:id="rId22"/>
   </p:notesMasterIdLst>
   <p:sldIdLst>
     <p:sldId id="297" r:id="rId2"/>
@@ -22,13 +22,12 @@
     <p:sldId id="412" r:id="rId13"/>
     <p:sldId id="401" r:id="rId14"/>
     <p:sldId id="420" r:id="rId15"/>
-    <p:sldId id="421" r:id="rId16"/>
-    <p:sldId id="413" r:id="rId17"/>
-    <p:sldId id="423" r:id="rId18"/>
-    <p:sldId id="422" r:id="rId19"/>
-    <p:sldId id="394" r:id="rId20"/>
-    <p:sldId id="395" r:id="rId21"/>
-    <p:sldId id="424" r:id="rId22"/>
+    <p:sldId id="413" r:id="rId16"/>
+    <p:sldId id="423" r:id="rId17"/>
+    <p:sldId id="422" r:id="rId18"/>
+    <p:sldId id="394" r:id="rId19"/>
+    <p:sldId id="395" r:id="rId20"/>
+    <p:sldId id="424" r:id="rId21"/>
   </p:sldIdLst>
   <p:sldSz cx="9144000" cy="6858000" type="screen4x3"/>
   <p:notesSz cx="6858000" cy="9144000"/>
@@ -235,7 +234,7 @@
           <a:p>
             <a:fld id="{C5D37280-896D-453C-A8B2-790CBDCE44E5}" type="datetimeFigureOut">
               <a:rPr lang="en-US" smtClean="0"/>
-              <a:t>1/8/2018</a:t>
+              <a:t>1/9/2018</a:t>
             </a:fld>
             <a:endParaRPr lang="en-US"/>
           </a:p>
@@ -1089,7 +1088,7 @@
     </p:spTree>
     <p:extLst>
       <p:ext uri="{BB962C8B-B14F-4D97-AF65-F5344CB8AC3E}">
-        <p14:creationId xmlns:p14="http://schemas.microsoft.com/office/powerpoint/2010/main" val="3758923356"/>
+        <p14:creationId xmlns:p14="http://schemas.microsoft.com/office/powerpoint/2010/main" val="1265170844"/>
       </p:ext>
     </p:extLst>
   </p:cSld>
@@ -1173,7 +1172,7 @@
     </p:spTree>
     <p:extLst>
       <p:ext uri="{BB962C8B-B14F-4D97-AF65-F5344CB8AC3E}">
-        <p14:creationId xmlns:p14="http://schemas.microsoft.com/office/powerpoint/2010/main" val="1265170844"/>
+        <p14:creationId xmlns:p14="http://schemas.microsoft.com/office/powerpoint/2010/main" val="1361812418"/>
       </p:ext>
     </p:extLst>
   </p:cSld>
@@ -1257,7 +1256,7 @@
     </p:spTree>
     <p:extLst>
       <p:ext uri="{BB962C8B-B14F-4D97-AF65-F5344CB8AC3E}">
-        <p14:creationId xmlns:p14="http://schemas.microsoft.com/office/powerpoint/2010/main" val="1361812418"/>
+        <p14:creationId xmlns:p14="http://schemas.microsoft.com/office/powerpoint/2010/main" val="3182110801"/>
       </p:ext>
     </p:extLst>
   </p:cSld>
@@ -1341,7 +1340,7 @@
     </p:spTree>
     <p:extLst>
       <p:ext uri="{BB962C8B-B14F-4D97-AF65-F5344CB8AC3E}">
-        <p14:creationId xmlns:p14="http://schemas.microsoft.com/office/powerpoint/2010/main" val="3182110801"/>
+        <p14:creationId xmlns:p14="http://schemas.microsoft.com/office/powerpoint/2010/main" val="384814357"/>
       </p:ext>
     </p:extLst>
   </p:cSld>
@@ -1425,7 +1424,7 @@
     </p:spTree>
     <p:extLst>
       <p:ext uri="{BB962C8B-B14F-4D97-AF65-F5344CB8AC3E}">
-        <p14:creationId xmlns:p14="http://schemas.microsoft.com/office/powerpoint/2010/main" val="384814357"/>
+        <p14:creationId xmlns:p14="http://schemas.microsoft.com/office/powerpoint/2010/main" val="2620879761"/>
       </p:ext>
     </p:extLst>
   </p:cSld>
@@ -1585,90 +1584,6 @@
             <a:fld id="{4E0E9D85-81CD-44C8-8F15-3AA06C34AF8C}" type="slidenum">
               <a:rPr lang="en-US" smtClean="0"/>
               <a:t>20</a:t>
-            </a:fld>
-            <a:endParaRPr lang="en-US"/>
-          </a:p>
-        </p:txBody>
-      </p:sp>
-    </p:spTree>
-    <p:extLst>
-      <p:ext uri="{BB962C8B-B14F-4D97-AF65-F5344CB8AC3E}">
-        <p14:creationId xmlns:p14="http://schemas.microsoft.com/office/powerpoint/2010/main" val="2620879761"/>
-      </p:ext>
-    </p:extLst>
-  </p:cSld>
-  <p:clrMapOvr>
-    <a:masterClrMapping/>
-  </p:clrMapOvr>
-</p:notes>
-</file>
-
-<file path=ppt/notesSlides/notesSlide21.xml><?xml version="1.0" encoding="utf-8"?>
-<p:notes xmlns:a="http://schemas.openxmlformats.org/drawingml/2006/main" xmlns:r="http://schemas.openxmlformats.org/officeDocument/2006/relationships" xmlns:p="http://schemas.openxmlformats.org/presentationml/2006/main">
-  <p:cSld>
-    <p:spTree>
-      <p:nvGrpSpPr>
-        <p:cNvPr id="1" name=""/>
-        <p:cNvGrpSpPr/>
-        <p:nvPr/>
-      </p:nvGrpSpPr>
-      <p:grpSpPr>
-        <a:xfrm>
-          <a:off x="0" y="0"/>
-          <a:ext cx="0" cy="0"/>
-          <a:chOff x="0" y="0"/>
-          <a:chExt cx="0" cy="0"/>
-        </a:xfrm>
-      </p:grpSpPr>
-      <p:sp>
-        <p:nvSpPr>
-          <p:cNvPr id="2" name="Slide Image Placeholder 1"/>
-          <p:cNvSpPr>
-            <a:spLocks noGrp="1" noRot="1" noChangeAspect="1"/>
-          </p:cNvSpPr>
-          <p:nvPr>
-            <p:ph type="sldImg"/>
-          </p:nvPr>
-        </p:nvSpPr>
-        <p:spPr/>
-      </p:sp>
-      <p:sp>
-        <p:nvSpPr>
-          <p:cNvPr id="3" name="Notes Placeholder 2"/>
-          <p:cNvSpPr>
-            <a:spLocks noGrp="1"/>
-          </p:cNvSpPr>
-          <p:nvPr>
-            <p:ph type="body" idx="1"/>
-          </p:nvPr>
-        </p:nvSpPr>
-        <p:spPr/>
-        <p:txBody>
-          <a:bodyPr/>
-          <a:lstStyle/>
-          <a:p>
-            <a:endParaRPr lang="en-US"/>
-          </a:p>
-        </p:txBody>
-      </p:sp>
-      <p:sp>
-        <p:nvSpPr>
-          <p:cNvPr id="4" name="Slide Number Placeholder 3"/>
-          <p:cNvSpPr>
-            <a:spLocks noGrp="1"/>
-          </p:cNvSpPr>
-          <p:nvPr>
-            <p:ph type="sldNum" sz="quarter" idx="10"/>
-          </p:nvPr>
-        </p:nvSpPr>
-        <p:spPr/>
-        <p:txBody>
-          <a:bodyPr/>
-          <a:lstStyle/>
-          <a:p>
-            <a:fld id="{4E0E9D85-81CD-44C8-8F15-3AA06C34AF8C}" type="slidenum">
-              <a:rPr lang="en-US" smtClean="0"/>
-              <a:t>21</a:t>
             </a:fld>
             <a:endParaRPr lang="en-US"/>
           </a:p>
@@ -2814,7 +2729,7 @@
               <a:pPr>
                 <a:defRPr/>
               </a:pPr>
-              <a:t>1/8/2018</a:t>
+              <a:t>1/9/2018</a:t>
             </a:fld>
             <a:endParaRPr lang="en-US"/>
           </a:p>
@@ -2999,7 +2914,7 @@
           <a:p>
             <a:fld id="{DFF43710-F8AB-6840-B03A-23D4C2B2884A}" type="datetimeFigureOut">
               <a:rPr lang="en-US" smtClean="0"/>
-              <a:t>1/8/2018</a:t>
+              <a:t>1/9/2018</a:t>
             </a:fld>
             <a:endParaRPr lang="en-US"/>
           </a:p>
@@ -3244,7 +3159,7 @@
               <a:pPr defTabSz="914400">
                 <a:defRPr/>
               </a:pPr>
-              <a:t>1/8/2018</a:t>
+              <a:t>1/9/2018</a:t>
             </a:fld>
             <a:endParaRPr lang="en-US"/>
           </a:p>
@@ -3816,17 +3731,10 @@
                 <a:latin typeface="Times New Roman" panose="02020603050405020304" pitchFamily="18" charset="0"/>
                 <a:cs typeface="Times New Roman" panose="02020603050405020304" pitchFamily="18" charset="0"/>
               </a:rPr>
-              <a:t>Plasma </a:t>
-            </a:r>
-            <a:r>
-              <a:rPr lang="en-US" sz="2800" i="1" smtClean="0">
-                <a:latin typeface="Times New Roman" panose="02020603050405020304" pitchFamily="18" charset="0"/>
-                <a:cs typeface="Times New Roman" panose="02020603050405020304" pitchFamily="18" charset="0"/>
-              </a:rPr>
-              <a:t>Systems</a:t>
+              <a:t>Plasma Systems</a:t>
             </a:r>
             <a:br>
-              <a:rPr lang="en-US" sz="2800" i="1" smtClean="0">
+              <a:rPr lang="en-US" sz="2800" i="1">
                 <a:latin typeface="Times New Roman" panose="02020603050405020304" pitchFamily="18" charset="0"/>
                 <a:cs typeface="Times New Roman" panose="02020603050405020304" pitchFamily="18" charset="0"/>
               </a:rPr>
@@ -3836,35 +3744,7 @@
                 <a:latin typeface="Times New Roman" panose="02020603050405020304" pitchFamily="18" charset="0"/>
                 <a:cs typeface="Times New Roman" panose="02020603050405020304" pitchFamily="18" charset="0"/>
               </a:rPr>
-              <a:t>Steven M. Lund, Jean-Luc Vay, Remi </a:t>
-            </a:r>
-            <a:r>
-              <a:rPr lang="en-US" sz="1600">
-                <a:latin typeface="Times New Roman" panose="02020603050405020304" pitchFamily="18" charset="0"/>
-                <a:cs typeface="Times New Roman" panose="02020603050405020304" pitchFamily="18" charset="0"/>
-              </a:rPr>
-              <a:t>Lehe</a:t>
-            </a:r>
-            <a:r>
-              <a:rPr lang="en-US" sz="1600" smtClean="0">
-                <a:latin typeface="Times New Roman" panose="02020603050405020304" pitchFamily="18" charset="0"/>
-                <a:cs typeface="Times New Roman" panose="02020603050405020304" pitchFamily="18" charset="0"/>
-              </a:rPr>
-              <a:t>, </a:t>
-            </a:r>
-            <a:r>
-              <a:rPr lang="en-US" sz="1600">
-                <a:latin typeface="Times New Roman" panose="02020603050405020304" pitchFamily="18" charset="0"/>
-                <a:cs typeface="Times New Roman" panose="02020603050405020304" pitchFamily="18" charset="0"/>
-              </a:rPr>
-              <a:t>Daniel </a:t>
-            </a:r>
-            <a:r>
-              <a:rPr lang="en-US" sz="1600" smtClean="0">
-                <a:latin typeface="Times New Roman" panose="02020603050405020304" pitchFamily="18" charset="0"/>
-                <a:cs typeface="Times New Roman" panose="02020603050405020304" pitchFamily="18" charset="0"/>
-              </a:rPr>
-              <a:t>Winklehner and David L. Bruhwiler</a:t>
+              <a:t>Steven M. Lund, Jean-Luc Vay, Remi Lehe, Daniel Winklehner and David L. Bruhwiler</a:t>
             </a:r>
             <a:endParaRPr lang="en-US" sz="2400" dirty="0">
               <a:solidFill>
@@ -4657,15 +4537,15 @@
           </a:p>
           <a:p>
             <a:pPr lvl="2"/>
-            <a:endParaRPr lang="en-US" smtClean="0"/>
+            <a:endParaRPr lang="en-US"/>
           </a:p>
           <a:p>
             <a:pPr lvl="2"/>
-            <a:endParaRPr lang="en-US" smtClean="0"/>
-          </a:p>
-          <a:p>
-            <a:r>
-              <a:rPr lang="en-US" smtClean="0"/>
+            <a:endParaRPr lang="en-US"/>
+          </a:p>
+          <a:p>
+            <a:r>
+              <a:rPr lang="en-US"/>
               <a:t>Reproducibility</a:t>
             </a:r>
             <a:r>
@@ -4715,35 +4595,15 @@
                 <a:cs typeface="Times New Roman" panose="02020603050405020304" pitchFamily="18" charset="0"/>
                 <a:hlinkClick r:id="rId3"/>
               </a:rPr>
-              <a:t>https</a:t>
+              <a:t>https://www.software.ac.uk/ssisearch?search_api_fulltext_1=reproducible</a:t>
             </a:r>
             <a:r>
               <a:rPr lang="sv-SE" sz="1400">
                 <a:latin typeface="Times New Roman" panose="02020603050405020304" pitchFamily="18" charset="0"/>
                 <a:cs typeface="Times New Roman" panose="02020603050405020304" pitchFamily="18" charset="0"/>
-                <a:hlinkClick r:id="rId3"/>
-              </a:rPr>
-              <a:t>://</a:t>
-            </a:r>
-            <a:r>
-              <a:rPr lang="sv-SE" sz="1400" smtClean="0">
-                <a:latin typeface="Times New Roman" panose="02020603050405020304" pitchFamily="18" charset="0"/>
-                <a:cs typeface="Times New Roman" panose="02020603050405020304" pitchFamily="18" charset="0"/>
-                <a:hlinkClick r:id="rId3"/>
-              </a:rPr>
-              <a:t>www.software.ac.uk/ssisearch?search_api_fulltext_1=reproducible</a:t>
-            </a:r>
-            <a:r>
-              <a:rPr lang="sv-SE" sz="1400" smtClean="0">
-                <a:latin typeface="Times New Roman" panose="02020603050405020304" pitchFamily="18" charset="0"/>
-                <a:cs typeface="Times New Roman" panose="02020603050405020304" pitchFamily="18" charset="0"/>
               </a:rPr>
               <a:t> </a:t>
             </a:r>
-            <a:endParaRPr lang="sv-SE" sz="1400">
-              <a:latin typeface="Times New Roman" panose="02020603050405020304" pitchFamily="18" charset="0"/>
-              <a:cs typeface="Times New Roman" panose="02020603050405020304" pitchFamily="18" charset="0"/>
-            </a:endParaRPr>
           </a:p>
           <a:p>
             <a:pPr marL="227013" indent="-227013">
@@ -4752,7 +4612,7 @@
               </a:spcBef>
             </a:pPr>
             <a:r>
-              <a:rPr lang="sv-SE" sz="1400" smtClean="0">
+              <a:rPr lang="sv-SE" sz="1400">
                 <a:latin typeface="Times New Roman" panose="02020603050405020304" pitchFamily="18" charset="0"/>
                 <a:cs typeface="Times New Roman" panose="02020603050405020304" pitchFamily="18" charset="0"/>
               </a:rPr>
@@ -4901,7 +4761,7 @@
           <p:cNvPr id="5" name="TextBox 4">
             <a:extLst>
               <a:ext uri="{FF2B5EF4-FFF2-40B4-BE49-F238E27FC236}">
-                <a16:creationId xmlns:a16="http://schemas.microsoft.com/office/drawing/2014/main" xmlns="" id="{019BFA61-21A0-4A72-801D-C7C00BAFA17D}"/>
+                <a16:creationId xmlns:a16="http://schemas.microsoft.com/office/drawing/2014/main" id="{019BFA61-21A0-4A72-801D-C7C00BAFA17D}"/>
               </a:ext>
             </a:extLst>
           </p:cNvPr>
@@ -5140,21 +5000,21 @@
           <a:lstStyle/>
           <a:p>
             <a:r>
-              <a:rPr lang="en-US" smtClean="0"/>
+              <a:rPr lang="en-US"/>
               <a:t>A few more links</a:t>
             </a:r>
           </a:p>
           <a:p>
             <a:pPr lvl="1"/>
             <a:r>
-              <a:rPr lang="en-US" smtClean="0"/>
+              <a:rPr lang="en-US"/>
               <a:t>these are just a sampling of resources;  not comprehensive</a:t>
             </a:r>
           </a:p>
           <a:p>
             <a:pPr lvl="1"/>
             <a:r>
-              <a:rPr lang="en-US" smtClean="0"/>
+              <a:rPr lang="en-US"/>
               <a:t>don’t read them all;  skim to find ones that interest you</a:t>
             </a:r>
             <a:endParaRPr lang="en-US" dirty="0"/>
@@ -5170,11 +5030,7 @@
             </a:r>
             <a:r>
               <a:rPr lang="en-US"/>
-              <a:t>sciences</a:t>
-            </a:r>
-            <a:r>
-              <a:rPr lang="en-US" smtClean="0"/>
-              <a:t>:</a:t>
+              <a:t>sciences:</a:t>
             </a:r>
           </a:p>
           <a:p>
@@ -5211,7 +5067,7 @@
           <p:cNvPr id="7" name="TextBox 6">
             <a:extLst>
               <a:ext uri="{FF2B5EF4-FFF2-40B4-BE49-F238E27FC236}">
-                <a16:creationId xmlns:a16="http://schemas.microsoft.com/office/drawing/2014/main" xmlns="" id="{F35A1A89-FB8A-4F5B-8BD2-9EE4EA8B8583}"/>
+                <a16:creationId xmlns:a16="http://schemas.microsoft.com/office/drawing/2014/main" id="{F35A1A89-FB8A-4F5B-8BD2-9EE4EA8B8583}"/>
               </a:ext>
             </a:extLst>
           </p:cNvPr>
@@ -5398,7 +5254,7 @@
           <p:cNvPr id="8" name="TextBox 7">
             <a:extLst>
               <a:ext uri="{FF2B5EF4-FFF2-40B4-BE49-F238E27FC236}">
-                <a16:creationId xmlns:a16="http://schemas.microsoft.com/office/drawing/2014/main" xmlns="" id="{B8371A57-1138-419D-832A-1FE059D9EF9A}"/>
+                <a16:creationId xmlns:a16="http://schemas.microsoft.com/office/drawing/2014/main" id="{B8371A57-1138-419D-832A-1FE059D9EF9A}"/>
               </a:ext>
             </a:extLst>
           </p:cNvPr>
@@ -5529,7 +5385,7 @@
           <p:cNvPr id="6" name="Content Placeholder 2">
             <a:extLst>
               <a:ext uri="{FF2B5EF4-FFF2-40B4-BE49-F238E27FC236}">
-                <a16:creationId xmlns:a16="http://schemas.microsoft.com/office/drawing/2014/main" xmlns="" id="{9081FF26-7AD5-4767-AF65-A27F1769E1FC}"/>
+                <a16:creationId xmlns:a16="http://schemas.microsoft.com/office/drawing/2014/main" id="{9081FF26-7AD5-4767-AF65-A27F1769E1FC}"/>
               </a:ext>
             </a:extLst>
           </p:cNvPr>
@@ -5733,13 +5589,13 @@
         </p:nvSpPr>
         <p:spPr>
           <a:xfrm>
-            <a:off x="476250" y="816248"/>
-            <a:ext cx="8191500" cy="5227501"/>
+            <a:off x="476250" y="687977"/>
+            <a:ext cx="8191500" cy="5643153"/>
           </a:xfrm>
         </p:spPr>
         <p:txBody>
           <a:bodyPr>
-            <a:normAutofit/>
+            <a:normAutofit lnSpcReduction="10000"/>
           </a:bodyPr>
           <a:lstStyle/>
           <a:p>
@@ -5771,17 +5627,6 @@
             </a:r>
           </a:p>
           <a:p>
-            <a:pPr lvl="1"/>
-            <a:r>
-              <a:rPr lang="en-US" dirty="0"/>
-              <a:t>and it can be easy</a:t>
-            </a:r>
-          </a:p>
-          <a:p>
-            <a:pPr lvl="1"/>
-            <a:endParaRPr lang="en-US" dirty="0"/>
-          </a:p>
-          <a:p>
             <a:r>
               <a:rPr lang="en-US" i="0" dirty="0"/>
               <a:t>What is required?</a:t>
@@ -5818,16 +5663,16 @@
             <a:pPr lvl="2"/>
             <a:r>
               <a:rPr lang="en-US" dirty="0"/>
-              <a:t>Docker, </a:t>
-            </a:r>
-            <a:r>
-              <a:rPr lang="en-US" sz="1200" b="0" dirty="0">
+              <a:t>Docker (commercial, most widely used), </a:t>
+            </a:r>
+            <a:r>
+              <a:rPr lang="en-US" sz="1100" b="0" dirty="0">
                 <a:hlinkClick r:id="rId3"/>
               </a:rPr>
               <a:t>https://www.docker.com/what-docker</a:t>
             </a:r>
             <a:r>
-              <a:rPr lang="en-US" sz="1200" b="0" dirty="0"/>
+              <a:rPr lang="en-US" sz="1100" b="0" dirty="0"/>
               <a:t> </a:t>
             </a:r>
           </a:p>
@@ -5835,23 +5680,66 @@
             <a:pPr lvl="2"/>
             <a:r>
               <a:rPr lang="en-US" dirty="0"/>
-              <a:t>Shifter, </a:t>
-            </a:r>
-            <a:r>
-              <a:rPr lang="en-US" sz="1200" b="0" dirty="0">
+              <a:t>Singularity, Shifter (newer, HPC), </a:t>
+            </a:r>
+            <a:r>
+              <a:rPr lang="en-US" sz="1100" b="0" dirty="0">
+                <a:solidFill>
+                  <a:schemeClr val="tx1"/>
+                </a:solidFill>
                 <a:hlinkClick r:id="rId4"/>
               </a:rPr>
-              <a:t>http://www.nersc.gov/users/software/using-shifter-and-docker/using-shifter-at-nersc</a:t>
-            </a:r>
-            <a:r>
-              <a:rPr lang="en-US" sz="1200" b="0" dirty="0"/>
-              <a:t>  </a:t>
-            </a:r>
-            <a:endParaRPr lang="en-US" b="0" dirty="0"/>
+              <a:t>https://tin6150.github.io/psg/blogger_container_hpc.html</a:t>
+            </a:r>
+            <a:r>
+              <a:rPr lang="en-US" sz="1100" b="0" dirty="0">
+                <a:solidFill>
+                  <a:schemeClr val="tx1"/>
+                </a:solidFill>
+              </a:rPr>
+              <a:t> </a:t>
+            </a:r>
+          </a:p>
+          <a:p>
+            <a:r>
+              <a:rPr lang="en-US" i="0" dirty="0"/>
+              <a:t>Caveat</a:t>
+            </a:r>
+          </a:p>
+          <a:p>
+            <a:pPr lvl="1"/>
+            <a:r>
+              <a:rPr lang="en-US" dirty="0"/>
+              <a:t>there are other approaches to reproducibility; not just containers</a:t>
+            </a:r>
           </a:p>
           <a:p>
             <a:pPr lvl="2"/>
-            <a:endParaRPr lang="en-US" i="0" dirty="0"/>
+            <a:r>
+              <a:rPr lang="en-US" dirty="0"/>
+              <a:t>these can require significant infrastructure and constrained workflows</a:t>
+            </a:r>
+          </a:p>
+          <a:p>
+            <a:pPr lvl="1"/>
+            <a:r>
+              <a:rPr lang="en-US" i="0" dirty="0"/>
+              <a:t>we are focusing on community codes and individual scientists</a:t>
+            </a:r>
+          </a:p>
+          <a:p>
+            <a:pPr lvl="2"/>
+            <a:r>
+              <a:rPr lang="en-US" i="0" dirty="0"/>
+              <a:t>developers are independent &amp; busy</a:t>
+            </a:r>
+          </a:p>
+          <a:p>
+            <a:pPr lvl="2"/>
+            <a:r>
+              <a:rPr lang="en-US" i="0" dirty="0"/>
+              <a:t>there are many codes with diverse applications</a:t>
+            </a:r>
           </a:p>
           <a:p>
             <a:r>
@@ -6141,332 +6029,6 @@
           <a:p>
             <a:r>
               <a:rPr lang="en-US" dirty="0"/>
-              <a:t>Partial History of Containerization</a:t>
-            </a:r>
-            <a:endParaRPr lang="en-US" b="0" dirty="0"/>
-          </a:p>
-        </p:txBody>
-      </p:sp>
-      <p:sp>
-        <p:nvSpPr>
-          <p:cNvPr id="3" name="Content Placeholder 2"/>
-          <p:cNvSpPr>
-            <a:spLocks noGrp="1"/>
-          </p:cNvSpPr>
-          <p:nvPr>
-            <p:ph idx="1"/>
-          </p:nvPr>
-        </p:nvSpPr>
-        <p:spPr>
-          <a:xfrm>
-            <a:off x="476250" y="596032"/>
-            <a:ext cx="8191500" cy="5447718"/>
-          </a:xfrm>
-        </p:spPr>
-        <p:txBody>
-          <a:bodyPr>
-            <a:normAutofit lnSpcReduction="10000"/>
-          </a:bodyPr>
-          <a:lstStyle/>
-          <a:p>
-            <a:r>
-              <a:rPr lang="en-US" dirty="0"/>
-              <a:t>1979:  the </a:t>
-            </a:r>
-            <a:r>
-              <a:rPr lang="en-US" dirty="0">
-                <a:latin typeface="Courier New" panose="02070309020205020404" pitchFamily="49" charset="0"/>
-                <a:cs typeface="Courier New" panose="02070309020205020404" pitchFamily="49" charset="0"/>
-              </a:rPr>
-              <a:t>chroot</a:t>
-            </a:r>
-            <a:r>
-              <a:rPr lang="en-US" dirty="0"/>
-              <a:t> system call is added to Unix V7     </a:t>
-            </a:r>
-          </a:p>
-          <a:p>
-            <a:pPr lvl="1"/>
-            <a:r>
-              <a:rPr lang="en-US" dirty="0"/>
-              <a:t>changes root directory of a process and its children</a:t>
-            </a:r>
-          </a:p>
-          <a:p>
-            <a:pPr lvl="1"/>
-            <a:r>
-              <a:rPr lang="en-US" dirty="0"/>
-              <a:t>the beginning of process isolation:</a:t>
-            </a:r>
-          </a:p>
-          <a:p>
-            <a:pPr lvl="2"/>
-            <a:r>
-              <a:rPr lang="en-US" dirty="0"/>
-              <a:t>segregating file access for each process</a:t>
-            </a:r>
-          </a:p>
-          <a:p>
-            <a:pPr lvl="1"/>
-            <a:r>
-              <a:rPr lang="en-US" dirty="0">
-                <a:solidFill>
-                  <a:schemeClr val="tx1"/>
-                </a:solidFill>
-                <a:latin typeface="Courier New" panose="02070309020205020404" pitchFamily="49" charset="0"/>
-                <a:cs typeface="Courier New" panose="02070309020205020404" pitchFamily="49" charset="0"/>
-              </a:rPr>
-              <a:t>chroot</a:t>
-            </a:r>
-            <a:r>
-              <a:rPr lang="en-US" dirty="0"/>
-              <a:t> was added to BSD in 1982</a:t>
-            </a:r>
-          </a:p>
-          <a:p>
-            <a:r>
-              <a:rPr lang="en-US" dirty="0"/>
-              <a:t>2006:  process containers (Google)</a:t>
-            </a:r>
-          </a:p>
-          <a:p>
-            <a:pPr lvl="1"/>
-            <a:r>
-              <a:rPr lang="en-US" dirty="0"/>
-              <a:t>limits and isolates resource usage of a collection of processes</a:t>
-            </a:r>
-          </a:p>
-          <a:p>
-            <a:pPr lvl="1"/>
-            <a:r>
-              <a:rPr lang="en-US" dirty="0"/>
-              <a:t>renamed “Control Groups” or </a:t>
-            </a:r>
-            <a:r>
-              <a:rPr lang="en-US" dirty="0">
-                <a:solidFill>
-                  <a:schemeClr val="tx1"/>
-                </a:solidFill>
-                <a:latin typeface="Courier New" panose="02070309020205020404" pitchFamily="49" charset="0"/>
-                <a:cs typeface="Courier New" panose="02070309020205020404" pitchFamily="49" charset="0"/>
-              </a:rPr>
-              <a:t>cgroups</a:t>
-            </a:r>
-            <a:r>
-              <a:rPr lang="en-US" dirty="0"/>
-              <a:t> in 2007</a:t>
-            </a:r>
-          </a:p>
-          <a:p>
-            <a:pPr lvl="1"/>
-            <a:r>
-              <a:rPr lang="en-US" dirty="0"/>
-              <a:t>merged into Linux kernel 2.6.24</a:t>
-            </a:r>
-          </a:p>
-          <a:p>
-            <a:r>
-              <a:rPr lang="en-US" dirty="0"/>
-              <a:t>2008:  LXC (LinuX Containers) </a:t>
-            </a:r>
-          </a:p>
-          <a:p>
-            <a:pPr lvl="1"/>
-            <a:r>
-              <a:rPr lang="en-US" dirty="0"/>
-              <a:t>first, most complete implementation of a Linux container manager</a:t>
-            </a:r>
-          </a:p>
-          <a:p>
-            <a:pPr lvl="1"/>
-            <a:r>
-              <a:rPr lang="en-US" dirty="0"/>
-              <a:t>uses </a:t>
-            </a:r>
-            <a:r>
-              <a:rPr lang="en-US" dirty="0">
-                <a:solidFill>
-                  <a:schemeClr val="tx1"/>
-                </a:solidFill>
-                <a:latin typeface="Courier New" panose="02070309020205020404" pitchFamily="49" charset="0"/>
-                <a:cs typeface="Courier New" panose="02070309020205020404" pitchFamily="49" charset="0"/>
-              </a:rPr>
-              <a:t>cgroups</a:t>
-            </a:r>
-            <a:r>
-              <a:rPr lang="en-US" dirty="0"/>
-              <a:t> and Linux namespaces</a:t>
-            </a:r>
-          </a:p>
-          <a:p>
-            <a:pPr lvl="1"/>
-            <a:r>
-              <a:rPr lang="en-US" dirty="0"/>
-              <a:t>works on a single Linux kernel with no patches</a:t>
-            </a:r>
-          </a:p>
-          <a:p>
-            <a:r>
-              <a:rPr lang="en-US" dirty="0"/>
-              <a:t>2013:  Docker</a:t>
-            </a:r>
-          </a:p>
-          <a:p>
-            <a:pPr lvl="1"/>
-            <a:r>
-              <a:rPr lang="en-US" dirty="0"/>
-              <a:t>used LXC originally, but now uses its own </a:t>
-            </a:r>
-            <a:r>
-              <a:rPr lang="en-US" dirty="0">
-                <a:solidFill>
-                  <a:schemeClr val="tx1"/>
-                </a:solidFill>
-                <a:latin typeface="Courier New" panose="02070309020205020404" pitchFamily="49" charset="0"/>
-                <a:cs typeface="Courier New" panose="02070309020205020404" pitchFamily="49" charset="0"/>
-              </a:rPr>
-              <a:t>libcontainer</a:t>
-            </a:r>
-            <a:endParaRPr lang="en-US" dirty="0"/>
-          </a:p>
-          <a:p>
-            <a:pPr lvl="1"/>
-            <a:r>
-              <a:rPr lang="en-US" dirty="0"/>
-              <a:t>offers an entire ecosystem for container management</a:t>
-            </a:r>
-          </a:p>
-          <a:p>
-            <a:pPr lvl="2"/>
-            <a:r>
-              <a:rPr lang="en-US" dirty="0"/>
-              <a:t>resulted in widespread adoption of containerization</a:t>
-            </a:r>
-          </a:p>
-          <a:p>
-            <a:pPr lvl="2"/>
-            <a:r>
-              <a:rPr lang="en-US" dirty="0"/>
-              <a:t>developers can create and run application containers quickly</a:t>
-            </a:r>
-          </a:p>
-          <a:p>
-            <a:pPr lvl="1"/>
-            <a:r>
-              <a:rPr lang="en-US" dirty="0"/>
-              <a:t>Docker Hub enables rapid distribution of containers</a:t>
-            </a:r>
-          </a:p>
-        </p:txBody>
-      </p:sp>
-      <p:sp>
-        <p:nvSpPr>
-          <p:cNvPr id="4" name="TextBox 3">
-            <a:extLst>
-              <a:ext uri="{FF2B5EF4-FFF2-40B4-BE49-F238E27FC236}">
-                <a16:creationId xmlns:a16="http://schemas.microsoft.com/office/drawing/2014/main" xmlns="" id="{FE4820D9-EBD7-4753-BD2A-404C67F2A4D8}"/>
-              </a:ext>
-            </a:extLst>
-          </p:cNvPr>
-          <p:cNvSpPr txBox="1"/>
-          <p:nvPr/>
-        </p:nvSpPr>
-        <p:spPr>
-          <a:xfrm>
-            <a:off x="3980125" y="5861254"/>
-            <a:ext cx="5163875" cy="523220"/>
-          </a:xfrm>
-          <a:prstGeom prst="rect">
-            <a:avLst/>
-          </a:prstGeom>
-          <a:noFill/>
-        </p:spPr>
-        <p:txBody>
-          <a:bodyPr wrap="square" rtlCol="0">
-            <a:spAutoFit/>
-          </a:bodyPr>
-          <a:lstStyle/>
-          <a:p>
-            <a:pPr marL="227013" indent="-227013"/>
-            <a:r>
-              <a:rPr lang="en-US" sz="1400" dirty="0">
-                <a:latin typeface="Times New Roman" panose="02020603050405020304" pitchFamily="18" charset="0"/>
-                <a:cs typeface="Times New Roman" panose="02020603050405020304" pitchFamily="18" charset="0"/>
-              </a:rPr>
-              <a:t>Material taken from R. Osnat (2016), </a:t>
-            </a:r>
-            <a:r>
-              <a:rPr lang="en-US" sz="1400" dirty="0">
-                <a:latin typeface="Times New Roman" panose="02020603050405020304" pitchFamily="18" charset="0"/>
-                <a:cs typeface="Times New Roman" panose="02020603050405020304" pitchFamily="18" charset="0"/>
-                <a:hlinkClick r:id="rId3"/>
-              </a:rPr>
-              <a:t>https://blog.aquasec.com/a-brief-history-of-containers-from-1970s-chroot-to-docker-2016</a:t>
-            </a:r>
-            <a:r>
-              <a:rPr lang="en-US" sz="1400" dirty="0">
-                <a:latin typeface="Times New Roman" panose="02020603050405020304" pitchFamily="18" charset="0"/>
-                <a:cs typeface="Times New Roman" panose="02020603050405020304" pitchFamily="18" charset="0"/>
-              </a:rPr>
-              <a:t> </a:t>
-            </a:r>
-          </a:p>
-        </p:txBody>
-      </p:sp>
-    </p:spTree>
-    <p:extLst>
-      <p:ext uri="{BB962C8B-B14F-4D97-AF65-F5344CB8AC3E}">
-        <p14:creationId xmlns:p14="http://schemas.microsoft.com/office/powerpoint/2010/main" val="3112759213"/>
-      </p:ext>
-    </p:extLst>
-  </p:cSld>
-  <p:clrMapOvr>
-    <a:masterClrMapping/>
-  </p:clrMapOvr>
-</p:sld>
-</file>
-
-<file path=ppt/slides/slide16.xml><?xml version="1.0" encoding="utf-8"?>
-<p:sld xmlns:a="http://schemas.openxmlformats.org/drawingml/2006/main" xmlns:r="http://schemas.openxmlformats.org/officeDocument/2006/relationships" xmlns:p="http://schemas.openxmlformats.org/presentationml/2006/main">
-  <p:cSld>
-    <p:spTree>
-      <p:nvGrpSpPr>
-        <p:cNvPr id="1" name=""/>
-        <p:cNvGrpSpPr/>
-        <p:nvPr/>
-      </p:nvGrpSpPr>
-      <p:grpSpPr>
-        <a:xfrm>
-          <a:off x="0" y="0"/>
-          <a:ext cx="0" cy="0"/>
-          <a:chOff x="0" y="0"/>
-          <a:chExt cx="0" cy="0"/>
-        </a:xfrm>
-      </p:grpSpPr>
-      <p:sp>
-        <p:nvSpPr>
-          <p:cNvPr id="2" name="Title 1"/>
-          <p:cNvSpPr>
-            <a:spLocks noGrp="1"/>
-          </p:cNvSpPr>
-          <p:nvPr>
-            <p:ph type="title"/>
-          </p:nvPr>
-        </p:nvSpPr>
-        <p:spPr>
-          <a:xfrm>
-            <a:off x="0" y="6946"/>
-            <a:ext cx="9144000" cy="589085"/>
-          </a:xfrm>
-        </p:spPr>
-        <p:txBody>
-          <a:bodyPr>
-            <a:normAutofit/>
-          </a:bodyPr>
-          <a:lstStyle/>
-          <a:p>
-            <a:r>
-              <a:rPr lang="en-US" dirty="0"/>
               <a:t>Container vs. Virtual Machine (VM)</a:t>
             </a:r>
             <a:endParaRPr lang="en-US" b="0" i="0" dirty="0"/>
@@ -6531,7 +6093,7 @@
           <p:cNvPr id="4" name="Picture 3">
             <a:extLst>
               <a:ext uri="{FF2B5EF4-FFF2-40B4-BE49-F238E27FC236}">
-                <a16:creationId xmlns:a16="http://schemas.microsoft.com/office/drawing/2014/main" xmlns="" id="{6A8E0E4A-675D-4335-B1B6-0B78D0B7ADC8}"/>
+                <a16:creationId xmlns:a16="http://schemas.microsoft.com/office/drawing/2014/main" id="{6A8E0E4A-675D-4335-B1B6-0B78D0B7ADC8}"/>
               </a:ext>
             </a:extLst>
           </p:cNvPr>
@@ -6561,7 +6123,7 @@
           <p:cNvPr id="5" name="Picture 4">
             <a:extLst>
               <a:ext uri="{FF2B5EF4-FFF2-40B4-BE49-F238E27FC236}">
-                <a16:creationId xmlns:a16="http://schemas.microsoft.com/office/drawing/2014/main" xmlns="" id="{94974CB9-5BFD-42F0-8E4B-A8ECDFDFF4D2}"/>
+                <a16:creationId xmlns:a16="http://schemas.microsoft.com/office/drawing/2014/main" id="{94974CB9-5BFD-42F0-8E4B-A8ECDFDFF4D2}"/>
               </a:ext>
             </a:extLst>
           </p:cNvPr>
@@ -6591,7 +6153,7 @@
           <p:cNvPr id="6" name="TextBox 5">
             <a:extLst>
               <a:ext uri="{FF2B5EF4-FFF2-40B4-BE49-F238E27FC236}">
-                <a16:creationId xmlns:a16="http://schemas.microsoft.com/office/drawing/2014/main" xmlns="" id="{61328A6C-5F57-4BFC-984C-4E43AA9106BF}"/>
+                <a16:creationId xmlns:a16="http://schemas.microsoft.com/office/drawing/2014/main" id="{61328A6C-5F57-4BFC-984C-4E43AA9106BF}"/>
               </a:ext>
             </a:extLst>
           </p:cNvPr>
@@ -6643,6 +6205,490 @@
     <p:extLst>
       <p:ext uri="{BB962C8B-B14F-4D97-AF65-F5344CB8AC3E}">
         <p14:creationId xmlns:p14="http://schemas.microsoft.com/office/powerpoint/2010/main" val="3108475844"/>
+      </p:ext>
+    </p:extLst>
+  </p:cSld>
+  <p:clrMapOvr>
+    <a:masterClrMapping/>
+  </p:clrMapOvr>
+</p:sld>
+</file>
+
+<file path=ppt/slides/slide16.xml><?xml version="1.0" encoding="utf-8"?>
+<p:sld xmlns:a="http://schemas.openxmlformats.org/drawingml/2006/main" xmlns:r="http://schemas.openxmlformats.org/officeDocument/2006/relationships" xmlns:p="http://schemas.openxmlformats.org/presentationml/2006/main">
+  <p:cSld>
+    <p:spTree>
+      <p:nvGrpSpPr>
+        <p:cNvPr id="1" name=""/>
+        <p:cNvGrpSpPr/>
+        <p:nvPr/>
+      </p:nvGrpSpPr>
+      <p:grpSpPr>
+        <a:xfrm>
+          <a:off x="0" y="0"/>
+          <a:ext cx="0" cy="0"/>
+          <a:chOff x="0" y="0"/>
+          <a:chExt cx="0" cy="0"/>
+        </a:xfrm>
+      </p:grpSpPr>
+      <p:sp>
+        <p:nvSpPr>
+          <p:cNvPr id="2" name="Title 1"/>
+          <p:cNvSpPr>
+            <a:spLocks noGrp="1"/>
+          </p:cNvSpPr>
+          <p:nvPr>
+            <p:ph type="title"/>
+          </p:nvPr>
+        </p:nvSpPr>
+        <p:spPr>
+          <a:xfrm>
+            <a:off x="0" y="6946"/>
+            <a:ext cx="9144000" cy="589085"/>
+          </a:xfrm>
+        </p:spPr>
+        <p:txBody>
+          <a:bodyPr>
+            <a:normAutofit/>
+          </a:bodyPr>
+          <a:lstStyle/>
+          <a:p>
+            <a:r>
+              <a:rPr lang="en-US" dirty="0"/>
+              <a:t>Application Containers for Reproducibility</a:t>
+            </a:r>
+          </a:p>
+        </p:txBody>
+      </p:sp>
+      <p:sp>
+        <p:nvSpPr>
+          <p:cNvPr id="3" name="Content Placeholder 2"/>
+          <p:cNvSpPr>
+            <a:spLocks noGrp="1"/>
+          </p:cNvSpPr>
+          <p:nvPr>
+            <p:ph idx="1"/>
+          </p:nvPr>
+        </p:nvSpPr>
+        <p:spPr>
+          <a:xfrm>
+            <a:off x="276639" y="791301"/>
+            <a:ext cx="8608944" cy="2396036"/>
+          </a:xfrm>
+        </p:spPr>
+        <p:txBody>
+          <a:bodyPr>
+            <a:normAutofit lnSpcReduction="10000"/>
+          </a:bodyPr>
+          <a:lstStyle/>
+          <a:p>
+            <a:r>
+              <a:rPr lang="en-US" i="0" dirty="0"/>
+              <a:t>Containerization has become a key technology for reproducibility</a:t>
+            </a:r>
+          </a:p>
+          <a:p>
+            <a:pPr lvl="1"/>
+            <a:r>
+              <a:rPr lang="en-US" dirty="0"/>
+              <a:t>not the only approach (see ‘caveat’ on slide #13 above)</a:t>
+            </a:r>
+          </a:p>
+          <a:p>
+            <a:pPr lvl="1"/>
+            <a:r>
+              <a:rPr lang="en-US" i="0" dirty="0"/>
+              <a:t>it is a practical approach for replicating a simulation result in the future</a:t>
+            </a:r>
+          </a:p>
+          <a:p>
+            <a:r>
+              <a:rPr lang="en-US" dirty="0"/>
+              <a:t>The colleague you are sharing with could by yourself in 6 months or 6 years</a:t>
+            </a:r>
+          </a:p>
+          <a:p>
+            <a:pPr lvl="1"/>
+            <a:r>
+              <a:rPr lang="en-US" dirty="0"/>
+              <a:t>an application container can be archived indefinitely and then reused</a:t>
+            </a:r>
+          </a:p>
+          <a:p>
+            <a:pPr lvl="1"/>
+            <a:r>
+              <a:rPr lang="en-US" dirty="0"/>
+              <a:t>assuming Docker or a compatible technology is still supported</a:t>
+            </a:r>
+          </a:p>
+          <a:p>
+            <a:r>
+              <a:rPr lang="en-US" dirty="0"/>
+              <a:t>Some pointers for further study:</a:t>
+            </a:r>
+          </a:p>
+        </p:txBody>
+      </p:sp>
+      <p:sp>
+        <p:nvSpPr>
+          <p:cNvPr id="5" name="TextBox 4">
+            <a:extLst>
+              <a:ext uri="{FF2B5EF4-FFF2-40B4-BE49-F238E27FC236}">
+                <a16:creationId xmlns:a16="http://schemas.microsoft.com/office/drawing/2014/main" id="{019BFA61-21A0-4A72-801D-C7C00BAFA17D}"/>
+              </a:ext>
+            </a:extLst>
+          </p:cNvPr>
+          <p:cNvSpPr txBox="1"/>
+          <p:nvPr/>
+        </p:nvSpPr>
+        <p:spPr>
+          <a:xfrm>
+            <a:off x="601318" y="3187337"/>
+            <a:ext cx="8413474" cy="2085186"/>
+          </a:xfrm>
+          <a:prstGeom prst="rect">
+            <a:avLst/>
+          </a:prstGeom>
+          <a:noFill/>
+        </p:spPr>
+        <p:txBody>
+          <a:bodyPr wrap="square" rtlCol="0">
+            <a:spAutoFit/>
+          </a:bodyPr>
+          <a:lstStyle/>
+          <a:p>
+            <a:pPr marL="227013" indent="-227013">
+              <a:spcBef>
+                <a:spcPts val="300"/>
+              </a:spcBef>
+            </a:pPr>
+            <a:r>
+              <a:rPr lang="en-US" sz="1400" dirty="0">
+                <a:latin typeface="Times New Roman" panose="02020603050405020304" pitchFamily="18" charset="0"/>
+                <a:cs typeface="Times New Roman" panose="02020603050405020304" pitchFamily="18" charset="0"/>
+              </a:rPr>
+              <a:t>Docker Containers for Reproducible Research Workshop (2017), </a:t>
+            </a:r>
+            <a:r>
+              <a:rPr lang="en-US" sz="1400" dirty="0">
+                <a:latin typeface="Times New Roman" panose="02020603050405020304" pitchFamily="18" charset="0"/>
+                <a:cs typeface="Times New Roman" panose="02020603050405020304" pitchFamily="18" charset="0"/>
+                <a:hlinkClick r:id="rId3"/>
+              </a:rPr>
+              <a:t>https://www.software.ac.uk/c4rr</a:t>
+            </a:r>
+            <a:r>
+              <a:rPr lang="en-US" sz="1400" dirty="0">
+                <a:latin typeface="Times New Roman" panose="02020603050405020304" pitchFamily="18" charset="0"/>
+                <a:cs typeface="Times New Roman" panose="02020603050405020304" pitchFamily="18" charset="0"/>
+              </a:rPr>
+              <a:t> </a:t>
+            </a:r>
+          </a:p>
+          <a:p>
+            <a:pPr marL="227013" indent="-227013">
+              <a:spcBef>
+                <a:spcPts val="300"/>
+              </a:spcBef>
+            </a:pPr>
+            <a:r>
+              <a:rPr lang="en-US" sz="1400" dirty="0">
+                <a:latin typeface="Times New Roman" panose="02020603050405020304" pitchFamily="18" charset="0"/>
+                <a:cs typeface="Times New Roman" panose="02020603050405020304" pitchFamily="18" charset="0"/>
+              </a:rPr>
+              <a:t>G.M. </a:t>
+            </a:r>
+            <a:r>
+              <a:rPr lang="en-US" sz="1400" dirty="0" err="1">
+                <a:latin typeface="Times New Roman" panose="02020603050405020304" pitchFamily="18" charset="0"/>
+                <a:cs typeface="Times New Roman" panose="02020603050405020304" pitchFamily="18" charset="0"/>
+              </a:rPr>
+              <a:t>Kurtzer</a:t>
+            </a:r>
+            <a:r>
+              <a:rPr lang="en-US" sz="1400" dirty="0">
+                <a:latin typeface="Times New Roman" panose="02020603050405020304" pitchFamily="18" charset="0"/>
+                <a:cs typeface="Times New Roman" panose="02020603050405020304" pitchFamily="18" charset="0"/>
+              </a:rPr>
+              <a:t>, V. </a:t>
+            </a:r>
+            <a:r>
+              <a:rPr lang="en-US" sz="1400" dirty="0" err="1">
+                <a:latin typeface="Times New Roman" panose="02020603050405020304" pitchFamily="18" charset="0"/>
+                <a:cs typeface="Times New Roman" panose="02020603050405020304" pitchFamily="18" charset="0"/>
+              </a:rPr>
+              <a:t>Sochat</a:t>
+            </a:r>
+            <a:r>
+              <a:rPr lang="en-US" sz="1400" dirty="0">
+                <a:latin typeface="Times New Roman" panose="02020603050405020304" pitchFamily="18" charset="0"/>
+                <a:cs typeface="Times New Roman" panose="02020603050405020304" pitchFamily="18" charset="0"/>
+              </a:rPr>
+              <a:t> and M.W. Bauer (2017), </a:t>
+            </a:r>
+            <a:r>
+              <a:rPr lang="en-US" sz="1400" dirty="0">
+                <a:latin typeface="Times New Roman" panose="02020603050405020304" pitchFamily="18" charset="0"/>
+                <a:cs typeface="Times New Roman" panose="02020603050405020304" pitchFamily="18" charset="0"/>
+                <a:hlinkClick r:id="rId4"/>
+              </a:rPr>
+              <a:t>https://www.ncbi.nlm.nih.gov/pmc/articles/PMC5426675/</a:t>
+            </a:r>
+            <a:r>
+              <a:rPr lang="en-US" sz="1400" dirty="0">
+                <a:latin typeface="Times New Roman" panose="02020603050405020304" pitchFamily="18" charset="0"/>
+                <a:cs typeface="Times New Roman" panose="02020603050405020304" pitchFamily="18" charset="0"/>
+              </a:rPr>
+              <a:t> </a:t>
+            </a:r>
+          </a:p>
+          <a:p>
+            <a:pPr marL="227013" indent="-227013">
+              <a:spcBef>
+                <a:spcPts val="300"/>
+              </a:spcBef>
+            </a:pPr>
+            <a:r>
+              <a:rPr lang="en-US" sz="1400" dirty="0">
+                <a:latin typeface="Times New Roman" panose="02020603050405020304" pitchFamily="18" charset="0"/>
+                <a:cs typeface="Times New Roman" panose="02020603050405020304" pitchFamily="18" charset="0"/>
+              </a:rPr>
+              <a:t>D. Nüst &amp; M. Hinz (2017), </a:t>
+            </a:r>
+            <a:r>
+              <a:rPr lang="en-US" sz="1400" dirty="0">
+                <a:latin typeface="Times New Roman" panose="02020603050405020304" pitchFamily="18" charset="0"/>
+                <a:cs typeface="Times New Roman" panose="02020603050405020304" pitchFamily="18" charset="0"/>
+                <a:hlinkClick r:id="rId5"/>
+              </a:rPr>
+              <a:t>http://o2r.info/2017/05/30/containerit-package/</a:t>
+            </a:r>
+            <a:r>
+              <a:rPr lang="en-US" sz="1400" dirty="0">
+                <a:latin typeface="Times New Roman" panose="02020603050405020304" pitchFamily="18" charset="0"/>
+                <a:cs typeface="Times New Roman" panose="02020603050405020304" pitchFamily="18" charset="0"/>
+              </a:rPr>
+              <a:t> </a:t>
+            </a:r>
+          </a:p>
+          <a:p>
+            <a:pPr marL="227013" indent="-227013">
+              <a:spcBef>
+                <a:spcPts val="300"/>
+              </a:spcBef>
+            </a:pPr>
+            <a:r>
+              <a:rPr lang="en-US" sz="1400" dirty="0">
+                <a:latin typeface="Times New Roman" panose="02020603050405020304" pitchFamily="18" charset="0"/>
+                <a:cs typeface="Times New Roman" panose="02020603050405020304" pitchFamily="18" charset="0"/>
+              </a:rPr>
+              <a:t>J. </a:t>
+            </a:r>
+            <a:r>
+              <a:rPr lang="en-US" sz="1400" dirty="0" err="1">
+                <a:latin typeface="Times New Roman" panose="02020603050405020304" pitchFamily="18" charset="0"/>
+                <a:cs typeface="Times New Roman" panose="02020603050405020304" pitchFamily="18" charset="0"/>
+              </a:rPr>
+              <a:t>Cito</a:t>
+            </a:r>
+            <a:r>
+              <a:rPr lang="en-US" sz="1400" dirty="0">
+                <a:latin typeface="Times New Roman" panose="02020603050405020304" pitchFamily="18" charset="0"/>
+                <a:cs typeface="Times New Roman" panose="02020603050405020304" pitchFamily="18" charset="0"/>
+              </a:rPr>
+              <a:t>, V. </a:t>
+            </a:r>
+            <a:r>
+              <a:rPr lang="en-US" sz="1400" dirty="0" err="1">
+                <a:latin typeface="Times New Roman" panose="02020603050405020304" pitchFamily="18" charset="0"/>
+                <a:cs typeface="Times New Roman" panose="02020603050405020304" pitchFamily="18" charset="0"/>
+              </a:rPr>
+              <a:t>Ferme</a:t>
+            </a:r>
+            <a:r>
+              <a:rPr lang="en-US" sz="1400" dirty="0">
+                <a:latin typeface="Times New Roman" panose="02020603050405020304" pitchFamily="18" charset="0"/>
+                <a:cs typeface="Times New Roman" panose="02020603050405020304" pitchFamily="18" charset="0"/>
+              </a:rPr>
+              <a:t> and H.C. Gall (2016), </a:t>
+            </a:r>
+            <a:r>
+              <a:rPr lang="en-US" sz="1400" dirty="0">
+                <a:latin typeface="Times New Roman" panose="02020603050405020304" pitchFamily="18" charset="0"/>
+                <a:cs typeface="Times New Roman" panose="02020603050405020304" pitchFamily="18" charset="0"/>
+                <a:hlinkClick r:id="rId6"/>
+              </a:rPr>
+              <a:t>https://link.springer.com/chapter/10.1007/978-3-319-38791-8_58</a:t>
+            </a:r>
+            <a:r>
+              <a:rPr lang="en-US" sz="1400" dirty="0">
+                <a:latin typeface="Times New Roman" panose="02020603050405020304" pitchFamily="18" charset="0"/>
+                <a:cs typeface="Times New Roman" panose="02020603050405020304" pitchFamily="18" charset="0"/>
+              </a:rPr>
+              <a:t> </a:t>
+            </a:r>
+          </a:p>
+          <a:p>
+            <a:pPr marL="227013" indent="-227013">
+              <a:spcBef>
+                <a:spcPts val="300"/>
+              </a:spcBef>
+            </a:pPr>
+            <a:r>
+              <a:rPr lang="en-US" sz="1400" dirty="0">
+                <a:latin typeface="Times New Roman" panose="02020603050405020304" pitchFamily="18" charset="0"/>
+                <a:cs typeface="Times New Roman" panose="02020603050405020304" pitchFamily="18" charset="0"/>
+              </a:rPr>
+              <a:t>N. </a:t>
+            </a:r>
+            <a:r>
+              <a:rPr lang="en-US" sz="1400" dirty="0" err="1">
+                <a:latin typeface="Times New Roman" panose="02020603050405020304" pitchFamily="18" charset="0"/>
+                <a:cs typeface="Times New Roman" panose="02020603050405020304" pitchFamily="18" charset="0"/>
+              </a:rPr>
+              <a:t>Hemsoth</a:t>
+            </a:r>
+            <a:r>
+              <a:rPr lang="en-US" sz="1400" dirty="0">
+                <a:latin typeface="Times New Roman" panose="02020603050405020304" pitchFamily="18" charset="0"/>
+                <a:cs typeface="Times New Roman" panose="02020603050405020304" pitchFamily="18" charset="0"/>
+              </a:rPr>
+              <a:t> (2016), </a:t>
+            </a:r>
+            <a:r>
+              <a:rPr lang="en-US" sz="1400" dirty="0">
+                <a:latin typeface="Times New Roman" panose="02020603050405020304" pitchFamily="18" charset="0"/>
+                <a:cs typeface="Times New Roman" panose="02020603050405020304" pitchFamily="18" charset="0"/>
+                <a:hlinkClick r:id="rId7"/>
+              </a:rPr>
+              <a:t>https://www.nextplatform.com/2016/09/13/will-containers-total-package-hpc/</a:t>
+            </a:r>
+            <a:r>
+              <a:rPr lang="en-US" sz="1400" dirty="0">
+                <a:latin typeface="Times New Roman" panose="02020603050405020304" pitchFamily="18" charset="0"/>
+                <a:cs typeface="Times New Roman" panose="02020603050405020304" pitchFamily="18" charset="0"/>
+              </a:rPr>
+              <a:t> </a:t>
+            </a:r>
+          </a:p>
+          <a:p>
+            <a:pPr marL="227013" indent="-227013">
+              <a:spcBef>
+                <a:spcPts val="300"/>
+              </a:spcBef>
+            </a:pPr>
+            <a:r>
+              <a:rPr lang="en-US" sz="1400" dirty="0">
+                <a:latin typeface="Times New Roman" panose="02020603050405020304" pitchFamily="18" charset="0"/>
+                <a:cs typeface="Times New Roman" panose="02020603050405020304" pitchFamily="18" charset="0"/>
+              </a:rPr>
+              <a:t>D.L. Bruhwiler, R. Nagler </a:t>
+            </a:r>
+            <a:r>
+              <a:rPr lang="en-US" sz="1400" i="1" dirty="0">
+                <a:latin typeface="Times New Roman" panose="02020603050405020304" pitchFamily="18" charset="0"/>
+                <a:cs typeface="Times New Roman" panose="02020603050405020304" pitchFamily="18" charset="0"/>
+              </a:rPr>
+              <a:t>et al</a:t>
+            </a:r>
+            <a:r>
+              <a:rPr lang="en-US" sz="1400" dirty="0">
+                <a:latin typeface="Times New Roman" panose="02020603050405020304" pitchFamily="18" charset="0"/>
+                <a:cs typeface="Times New Roman" panose="02020603050405020304" pitchFamily="18" charset="0"/>
+              </a:rPr>
+              <a:t>. (2015), </a:t>
+            </a:r>
+            <a:r>
+              <a:rPr lang="en-US" sz="1400" dirty="0">
+                <a:latin typeface="Times New Roman" panose="02020603050405020304" pitchFamily="18" charset="0"/>
+                <a:cs typeface="Times New Roman" panose="02020603050405020304" pitchFamily="18" charset="0"/>
+                <a:hlinkClick r:id="rId8"/>
+              </a:rPr>
+              <a:t>http://accelconf.web.cern.ch/AccelConf/IPAC2015/papers/mopmn009.pdf</a:t>
+            </a:r>
+            <a:r>
+              <a:rPr lang="en-US" sz="1400" dirty="0">
+                <a:latin typeface="Times New Roman" panose="02020603050405020304" pitchFamily="18" charset="0"/>
+                <a:cs typeface="Times New Roman" panose="02020603050405020304" pitchFamily="18" charset="0"/>
+              </a:rPr>
+              <a:t> </a:t>
+            </a:r>
+          </a:p>
+          <a:p>
+            <a:pPr marL="227013" indent="-227013">
+              <a:spcBef>
+                <a:spcPts val="300"/>
+              </a:spcBef>
+            </a:pPr>
+            <a:r>
+              <a:rPr lang="en-US" sz="1400" dirty="0">
+                <a:latin typeface="Times New Roman" panose="02020603050405020304" pitchFamily="18" charset="0"/>
+                <a:cs typeface="Times New Roman" panose="02020603050405020304" pitchFamily="18" charset="0"/>
+              </a:rPr>
+              <a:t>R. Nagler, D.L. Bruhwiler </a:t>
+            </a:r>
+            <a:r>
+              <a:rPr lang="en-US" sz="1400" i="1" dirty="0">
+                <a:latin typeface="Times New Roman" panose="02020603050405020304" pitchFamily="18" charset="0"/>
+                <a:cs typeface="Times New Roman" panose="02020603050405020304" pitchFamily="18" charset="0"/>
+              </a:rPr>
+              <a:t>et al</a:t>
+            </a:r>
+            <a:r>
+              <a:rPr lang="en-US" sz="1400" dirty="0">
+                <a:latin typeface="Times New Roman" panose="02020603050405020304" pitchFamily="18" charset="0"/>
+                <a:cs typeface="Times New Roman" panose="02020603050405020304" pitchFamily="18" charset="0"/>
+              </a:rPr>
+              <a:t>. (2015), </a:t>
+            </a:r>
+            <a:r>
+              <a:rPr lang="en-US" sz="1400" dirty="0">
+                <a:latin typeface="Times New Roman" panose="02020603050405020304" pitchFamily="18" charset="0"/>
+                <a:cs typeface="Times New Roman" panose="02020603050405020304" pitchFamily="18" charset="0"/>
+                <a:hlinkClick r:id="rId9"/>
+              </a:rPr>
+              <a:t>https://arxiv.org/abs/1509.08789</a:t>
+            </a:r>
+            <a:endParaRPr lang="en-US" sz="1400" dirty="0">
+              <a:latin typeface="Times New Roman" panose="02020603050405020304" pitchFamily="18" charset="0"/>
+              <a:cs typeface="Times New Roman" panose="02020603050405020304" pitchFamily="18" charset="0"/>
+            </a:endParaRPr>
+          </a:p>
+          <a:p>
+            <a:pPr marL="227013" indent="-227013">
+              <a:spcBef>
+                <a:spcPts val="300"/>
+              </a:spcBef>
+            </a:pPr>
+            <a:r>
+              <a:rPr lang="en-US" sz="1400" dirty="0">
+                <a:latin typeface="Times New Roman" panose="02020603050405020304" pitchFamily="18" charset="0"/>
+                <a:cs typeface="Times New Roman" panose="02020603050405020304" pitchFamily="18" charset="0"/>
+              </a:rPr>
+              <a:t>C. Boettiger (2014), </a:t>
+            </a:r>
+            <a:r>
+              <a:rPr lang="en-US" sz="1400" dirty="0">
+                <a:latin typeface="Times New Roman" panose="02020603050405020304" pitchFamily="18" charset="0"/>
+                <a:cs typeface="Times New Roman" panose="02020603050405020304" pitchFamily="18" charset="0"/>
+                <a:hlinkClick r:id="rId10"/>
+              </a:rPr>
+              <a:t>https://arxiv.org/abs/1410.0846</a:t>
+            </a:r>
+            <a:r>
+              <a:rPr lang="en-US" sz="1400" dirty="0">
+                <a:latin typeface="Times New Roman" panose="02020603050405020304" pitchFamily="18" charset="0"/>
+                <a:cs typeface="Times New Roman" panose="02020603050405020304" pitchFamily="18" charset="0"/>
+              </a:rPr>
+              <a:t> </a:t>
+            </a:r>
+          </a:p>
+        </p:txBody>
+      </p:sp>
+    </p:spTree>
+    <p:extLst>
+      <p:ext uri="{BB962C8B-B14F-4D97-AF65-F5344CB8AC3E}">
+        <p14:creationId xmlns:p14="http://schemas.microsoft.com/office/powerpoint/2010/main" val="4169432088"/>
       </p:ext>
     </p:extLst>
   </p:cSld>
@@ -6681,7 +6727,7 @@
         </p:nvSpPr>
         <p:spPr>
           <a:xfrm>
-            <a:off x="0" y="6946"/>
+            <a:off x="0" y="140672"/>
             <a:ext cx="9144000" cy="589085"/>
           </a:xfrm>
         </p:spPr>
@@ -6693,14 +6739,20 @@
           <a:p>
             <a:r>
               <a:rPr lang="en-US" dirty="0"/>
-              <a:t>Application Containers for Reproducibility</a:t>
-            </a:r>
-          </a:p>
-        </p:txBody>
-      </p:sp>
-      <p:sp>
-        <p:nvSpPr>
-          <p:cNvPr id="3" name="Content Placeholder 2"/>
+              <a:t>Class discussion:</a:t>
+            </a:r>
+          </a:p>
+        </p:txBody>
+      </p:sp>
+      <p:sp>
+        <p:nvSpPr>
+          <p:cNvPr id="6" name="Content Placeholder 2">
+            <a:extLst>
+              <a:ext uri="{FF2B5EF4-FFF2-40B4-BE49-F238E27FC236}">
+                <a16:creationId xmlns:a16="http://schemas.microsoft.com/office/drawing/2014/main" id="{9081FF26-7AD5-4767-AF65-A27F1769E1FC}"/>
+              </a:ext>
+            </a:extLst>
+          </p:cNvPr>
           <p:cNvSpPr>
             <a:spLocks noGrp="1"/>
           </p:cNvSpPr>
@@ -6710,8 +6762,8 @@
         </p:nvSpPr>
         <p:spPr>
           <a:xfrm>
-            <a:off x="276639" y="791301"/>
-            <a:ext cx="8608944" cy="2396036"/>
+            <a:off x="152400" y="827314"/>
+            <a:ext cx="8839200" cy="5146766"/>
           </a:xfrm>
         </p:spPr>
         <p:txBody>
@@ -6721,305 +6773,117 @@
           <a:lstStyle/>
           <a:p>
             <a:r>
+              <a:rPr lang="en-US" sz="1800" i="0" dirty="0"/>
+              <a:t>Do you have experience working with VMs?</a:t>
+            </a:r>
+          </a:p>
+          <a:p>
+            <a:pPr lvl="1"/>
+            <a:r>
+              <a:rPr lang="en-US" dirty="0"/>
+              <a:t>If so, what are the advantages and disadvantages?</a:t>
+            </a:r>
+          </a:p>
+          <a:p>
+            <a:r>
               <a:rPr lang="en-US" i="0" dirty="0"/>
-              <a:t>Containerization has become a key technology for reproducibility</a:t>
-            </a:r>
-          </a:p>
-          <a:p>
-            <a:pPr lvl="1"/>
+              <a:t>Explain at least one difference between VMs and containers</a:t>
+            </a:r>
+          </a:p>
+          <a:p>
             <a:r>
               <a:rPr lang="en-US" i="0" dirty="0"/>
-              <a:t>it is the only practical approach for replicating a simulation result in the future</a:t>
-            </a:r>
-          </a:p>
-          <a:p>
-            <a:pPr lvl="1"/>
-            <a:r>
-              <a:rPr lang="en-US" dirty="0"/>
-              <a:t>the colleague you are sharing with could by yourself in 6 months or 6 years</a:t>
+              <a:t>A VM is to a house as a container is to an apartment:  explain the analogy</a:t>
+            </a:r>
+          </a:p>
+          <a:p>
+            <a:r>
+              <a:rPr lang="en-US" dirty="0"/>
+              <a:t>Reproducibility vs Replication:  which is more difficult?   …more important?</a:t>
+            </a:r>
+          </a:p>
+          <a:p>
+            <a:r>
+              <a:rPr lang="en-US" dirty="0"/>
+              <a:t>How does Docker help with replicating a physics simulation?</a:t>
+            </a:r>
+            <a:r>
+              <a:rPr lang="en-US" i="0" dirty="0"/>
+              <a:t> </a:t>
+            </a:r>
+          </a:p>
+          <a:p>
+            <a:pPr lvl="1"/>
+            <a:endParaRPr lang="en-US" i="0" dirty="0"/>
+          </a:p>
+          <a:p>
+            <a:r>
+              <a:rPr lang="en-US" dirty="0"/>
+              <a:t>Maybe revisit previous discussion points – </a:t>
+            </a:r>
+            <a:endParaRPr lang="en-US" i="0" dirty="0"/>
+          </a:p>
+          <a:p>
+            <a:pPr lvl="1"/>
+            <a:r>
+              <a:rPr lang="en-US" dirty="0"/>
+              <a:t>When you run a simulation how confident are you in the results?</a:t>
+            </a:r>
+          </a:p>
+          <a:p>
+            <a:pPr lvl="1"/>
+            <a:r>
+              <a:rPr lang="en-US" dirty="0"/>
+              <a:t>Are you skeptical of results presented by others in talks or papers?</a:t>
             </a:r>
           </a:p>
           <a:p>
             <a:pPr lvl="2"/>
             <a:r>
               <a:rPr lang="en-US" dirty="0"/>
-              <a:t>an application container can be archived indefinitely and then reused</a:t>
+              <a:t>have you ever wanted to rerun someone else’s simulation?</a:t>
+            </a:r>
+          </a:p>
+          <a:p>
+            <a:pPr lvl="1"/>
+            <a:r>
+              <a:rPr lang="en-US" dirty="0"/>
+              <a:t>How do you validate your own results?</a:t>
             </a:r>
           </a:p>
           <a:p>
             <a:pPr lvl="2"/>
             <a:r>
               <a:rPr lang="en-US" dirty="0"/>
-              <a:t>assuming Docker or a compatible technology is still supported</a:t>
-            </a:r>
-          </a:p>
-          <a:p>
-            <a:r>
-              <a:rPr lang="en-US" dirty="0"/>
-              <a:t>The topic cannot be covered completely in a single lecture…</a:t>
-            </a:r>
-          </a:p>
-          <a:p>
-            <a:pPr lvl="1"/>
-            <a:r>
-              <a:rPr lang="en-US" dirty="0"/>
-              <a:t>so we provide some pointers for further study</a:t>
-            </a:r>
-          </a:p>
-        </p:txBody>
-      </p:sp>
-      <p:sp>
-        <p:nvSpPr>
-          <p:cNvPr id="5" name="TextBox 4">
-            <a:extLst>
-              <a:ext uri="{FF2B5EF4-FFF2-40B4-BE49-F238E27FC236}">
-                <a16:creationId xmlns:a16="http://schemas.microsoft.com/office/drawing/2014/main" xmlns="" id="{019BFA61-21A0-4A72-801D-C7C00BAFA17D}"/>
-              </a:ext>
-            </a:extLst>
-          </p:cNvPr>
-          <p:cNvSpPr txBox="1"/>
-          <p:nvPr/>
-        </p:nvSpPr>
-        <p:spPr>
-          <a:xfrm>
-            <a:off x="601318" y="3058966"/>
-            <a:ext cx="8413474" cy="1577355"/>
-          </a:xfrm>
-          <a:prstGeom prst="rect">
-            <a:avLst/>
-          </a:prstGeom>
-          <a:noFill/>
-        </p:spPr>
-        <p:txBody>
-          <a:bodyPr wrap="square" rtlCol="0">
-            <a:spAutoFit/>
-          </a:bodyPr>
-          <a:lstStyle/>
-          <a:p>
-            <a:pPr marL="227013" indent="-227013">
-              <a:spcBef>
-                <a:spcPts val="300"/>
-              </a:spcBef>
-            </a:pPr>
-            <a:r>
-              <a:rPr lang="en-US" sz="1400" dirty="0">
-                <a:latin typeface="Times New Roman" panose="02020603050405020304" pitchFamily="18" charset="0"/>
-                <a:cs typeface="Times New Roman" panose="02020603050405020304" pitchFamily="18" charset="0"/>
-              </a:rPr>
-              <a:t>Docker Containers for Reproducible Research Workshop (2017), </a:t>
-            </a:r>
-            <a:r>
-              <a:rPr lang="en-US" sz="1400" dirty="0">
-                <a:latin typeface="Times New Roman" panose="02020603050405020304" pitchFamily="18" charset="0"/>
-                <a:cs typeface="Times New Roman" panose="02020603050405020304" pitchFamily="18" charset="0"/>
-                <a:hlinkClick r:id="rId3"/>
-              </a:rPr>
-              <a:t>https://www.software.ac.uk/c4rr</a:t>
-            </a:r>
-            <a:r>
-              <a:rPr lang="en-US" sz="1400" dirty="0">
-                <a:latin typeface="Times New Roman" panose="02020603050405020304" pitchFamily="18" charset="0"/>
-                <a:cs typeface="Times New Roman" panose="02020603050405020304" pitchFamily="18" charset="0"/>
-              </a:rPr>
-              <a:t> </a:t>
-            </a:r>
-          </a:p>
-          <a:p>
-            <a:pPr marL="227013" indent="-227013">
-              <a:spcBef>
-                <a:spcPts val="300"/>
-              </a:spcBef>
-            </a:pPr>
-            <a:r>
-              <a:rPr lang="en-US" sz="1400" dirty="0">
-                <a:latin typeface="Times New Roman" panose="02020603050405020304" pitchFamily="18" charset="0"/>
-                <a:cs typeface="Times New Roman" panose="02020603050405020304" pitchFamily="18" charset="0"/>
-              </a:rPr>
-              <a:t>D. Nüst &amp; M. Hinz (2017), </a:t>
-            </a:r>
-            <a:r>
-              <a:rPr lang="en-US" sz="1400" dirty="0">
-                <a:latin typeface="Times New Roman" panose="02020603050405020304" pitchFamily="18" charset="0"/>
-                <a:cs typeface="Times New Roman" panose="02020603050405020304" pitchFamily="18" charset="0"/>
-                <a:hlinkClick r:id="rId4"/>
-              </a:rPr>
-              <a:t>http://o2r.info/2017/05/30/containerit-package/</a:t>
-            </a:r>
-            <a:r>
-              <a:rPr lang="en-US" sz="1400" dirty="0">
-                <a:latin typeface="Times New Roman" panose="02020603050405020304" pitchFamily="18" charset="0"/>
-                <a:cs typeface="Times New Roman" panose="02020603050405020304" pitchFamily="18" charset="0"/>
-              </a:rPr>
-              <a:t> </a:t>
-            </a:r>
-          </a:p>
-          <a:p>
-            <a:pPr marL="227013" indent="-227013">
-              <a:spcBef>
-                <a:spcPts val="300"/>
-              </a:spcBef>
-            </a:pPr>
-            <a:r>
-              <a:rPr lang="en-US" sz="1400" dirty="0">
-                <a:latin typeface="Times New Roman" panose="02020603050405020304" pitchFamily="18" charset="0"/>
-                <a:cs typeface="Times New Roman" panose="02020603050405020304" pitchFamily="18" charset="0"/>
-              </a:rPr>
-              <a:t>J. </a:t>
-            </a:r>
-            <a:r>
-              <a:rPr lang="en-US" sz="1400" dirty="0" err="1">
-                <a:latin typeface="Times New Roman" panose="02020603050405020304" pitchFamily="18" charset="0"/>
-                <a:cs typeface="Times New Roman" panose="02020603050405020304" pitchFamily="18" charset="0"/>
-              </a:rPr>
-              <a:t>Cito</a:t>
-            </a:r>
-            <a:r>
-              <a:rPr lang="en-US" sz="1400" dirty="0">
-                <a:latin typeface="Times New Roman" panose="02020603050405020304" pitchFamily="18" charset="0"/>
-                <a:cs typeface="Times New Roman" panose="02020603050405020304" pitchFamily="18" charset="0"/>
-              </a:rPr>
-              <a:t>, V. </a:t>
-            </a:r>
-            <a:r>
-              <a:rPr lang="en-US" sz="1400" dirty="0" err="1">
-                <a:latin typeface="Times New Roman" panose="02020603050405020304" pitchFamily="18" charset="0"/>
-                <a:cs typeface="Times New Roman" panose="02020603050405020304" pitchFamily="18" charset="0"/>
-              </a:rPr>
-              <a:t>Ferme</a:t>
-            </a:r>
-            <a:r>
-              <a:rPr lang="en-US" sz="1400" dirty="0">
-                <a:latin typeface="Times New Roman" panose="02020603050405020304" pitchFamily="18" charset="0"/>
-                <a:cs typeface="Times New Roman" panose="02020603050405020304" pitchFamily="18" charset="0"/>
-              </a:rPr>
-              <a:t> and H.C. Gall (2016), </a:t>
-            </a:r>
-            <a:r>
-              <a:rPr lang="en-US" sz="1400" dirty="0">
-                <a:latin typeface="Times New Roman" panose="02020603050405020304" pitchFamily="18" charset="0"/>
-                <a:cs typeface="Times New Roman" panose="02020603050405020304" pitchFamily="18" charset="0"/>
-                <a:hlinkClick r:id="rId5"/>
-              </a:rPr>
-              <a:t>https://link.springer.com/chapter/10.1007/978-3-319-38791-8_58</a:t>
-            </a:r>
-            <a:r>
-              <a:rPr lang="en-US" sz="1400" dirty="0">
-                <a:latin typeface="Times New Roman" panose="02020603050405020304" pitchFamily="18" charset="0"/>
-                <a:cs typeface="Times New Roman" panose="02020603050405020304" pitchFamily="18" charset="0"/>
-              </a:rPr>
-              <a:t> </a:t>
-            </a:r>
-          </a:p>
-          <a:p>
-            <a:pPr marL="227013" indent="-227013">
-              <a:spcBef>
-                <a:spcPts val="300"/>
-              </a:spcBef>
-            </a:pPr>
-            <a:r>
-              <a:rPr lang="en-US" sz="1400" dirty="0">
-                <a:latin typeface="Times New Roman" panose="02020603050405020304" pitchFamily="18" charset="0"/>
-                <a:cs typeface="Times New Roman" panose="02020603050405020304" pitchFamily="18" charset="0"/>
-              </a:rPr>
-              <a:t>D.L. Bruhwiler, R. Nagler </a:t>
-            </a:r>
-            <a:r>
-              <a:rPr lang="en-US" sz="1400" i="1" dirty="0">
-                <a:latin typeface="Times New Roman" panose="02020603050405020304" pitchFamily="18" charset="0"/>
-                <a:cs typeface="Times New Roman" panose="02020603050405020304" pitchFamily="18" charset="0"/>
-              </a:rPr>
-              <a:t>et al</a:t>
-            </a:r>
-            <a:r>
-              <a:rPr lang="en-US" sz="1400" dirty="0">
-                <a:latin typeface="Times New Roman" panose="02020603050405020304" pitchFamily="18" charset="0"/>
-                <a:cs typeface="Times New Roman" panose="02020603050405020304" pitchFamily="18" charset="0"/>
-              </a:rPr>
-              <a:t>. (2015), </a:t>
-            </a:r>
-            <a:r>
-              <a:rPr lang="en-US" sz="1400" dirty="0">
-                <a:latin typeface="Times New Roman" panose="02020603050405020304" pitchFamily="18" charset="0"/>
-                <a:cs typeface="Times New Roman" panose="02020603050405020304" pitchFamily="18" charset="0"/>
-                <a:hlinkClick r:id="rId6"/>
-              </a:rPr>
-              <a:t>http://accelconf.web.cern.ch/AccelConf/IPAC2015/papers/mopmn009.pdf</a:t>
-            </a:r>
-            <a:r>
-              <a:rPr lang="en-US" sz="1400" dirty="0">
-                <a:latin typeface="Times New Roman" panose="02020603050405020304" pitchFamily="18" charset="0"/>
-                <a:cs typeface="Times New Roman" panose="02020603050405020304" pitchFamily="18" charset="0"/>
-              </a:rPr>
-              <a:t> </a:t>
-            </a:r>
-          </a:p>
-          <a:p>
-            <a:pPr marL="227013" indent="-227013">
-              <a:spcBef>
-                <a:spcPts val="300"/>
-              </a:spcBef>
-            </a:pPr>
-            <a:r>
-              <a:rPr lang="en-US" sz="1400" dirty="0">
-                <a:latin typeface="Times New Roman" panose="02020603050405020304" pitchFamily="18" charset="0"/>
-                <a:cs typeface="Times New Roman" panose="02020603050405020304" pitchFamily="18" charset="0"/>
-              </a:rPr>
-              <a:t>R. Nagler, D.L. Bruhwiler </a:t>
-            </a:r>
-            <a:r>
-              <a:rPr lang="en-US" sz="1400" i="1" dirty="0">
-                <a:latin typeface="Times New Roman" panose="02020603050405020304" pitchFamily="18" charset="0"/>
-                <a:cs typeface="Times New Roman" panose="02020603050405020304" pitchFamily="18" charset="0"/>
-              </a:rPr>
-              <a:t>et al</a:t>
-            </a:r>
-            <a:r>
-              <a:rPr lang="en-US" sz="1400" dirty="0">
-                <a:latin typeface="Times New Roman" panose="02020603050405020304" pitchFamily="18" charset="0"/>
-                <a:cs typeface="Times New Roman" panose="02020603050405020304" pitchFamily="18" charset="0"/>
-              </a:rPr>
-              <a:t>. (2015), </a:t>
-            </a:r>
-            <a:r>
-              <a:rPr lang="en-US" sz="1400" dirty="0">
-                <a:latin typeface="Times New Roman" panose="02020603050405020304" pitchFamily="18" charset="0"/>
-                <a:cs typeface="Times New Roman" panose="02020603050405020304" pitchFamily="18" charset="0"/>
-                <a:hlinkClick r:id="rId7"/>
-              </a:rPr>
-              <a:t>https://arxiv.org/abs/1509.08789</a:t>
-            </a:r>
-            <a:endParaRPr lang="en-US" sz="1400" dirty="0">
-              <a:latin typeface="Times New Roman" panose="02020603050405020304" pitchFamily="18" charset="0"/>
-              <a:cs typeface="Times New Roman" panose="02020603050405020304" pitchFamily="18" charset="0"/>
-            </a:endParaRPr>
-          </a:p>
-          <a:p>
-            <a:pPr marL="227013" indent="-227013">
-              <a:spcBef>
-                <a:spcPts val="300"/>
-              </a:spcBef>
-            </a:pPr>
-            <a:r>
-              <a:rPr lang="en-US" sz="1400" dirty="0">
-                <a:latin typeface="Times New Roman" panose="02020603050405020304" pitchFamily="18" charset="0"/>
-                <a:cs typeface="Times New Roman" panose="02020603050405020304" pitchFamily="18" charset="0"/>
-              </a:rPr>
-              <a:t>C. Boettiger (2014), </a:t>
-            </a:r>
-            <a:r>
-              <a:rPr lang="en-US" sz="1400" dirty="0">
-                <a:latin typeface="Times New Roman" panose="02020603050405020304" pitchFamily="18" charset="0"/>
-                <a:cs typeface="Times New Roman" panose="02020603050405020304" pitchFamily="18" charset="0"/>
-                <a:hlinkClick r:id="rId8"/>
-              </a:rPr>
-              <a:t>https://arxiv.org/abs/1410.0846</a:t>
-            </a:r>
-            <a:r>
-              <a:rPr lang="en-US" sz="1400" dirty="0">
-                <a:latin typeface="Times New Roman" panose="02020603050405020304" pitchFamily="18" charset="0"/>
-                <a:cs typeface="Times New Roman" panose="02020603050405020304" pitchFamily="18" charset="0"/>
-              </a:rPr>
-              <a:t> </a:t>
+              <a:t>compare with your physical intuition?</a:t>
+            </a:r>
+          </a:p>
+          <a:p>
+            <a:pPr lvl="2"/>
+            <a:r>
+              <a:rPr lang="en-US" dirty="0"/>
+              <a:t>compare with your previous work?</a:t>
+            </a:r>
+          </a:p>
+          <a:p>
+            <a:pPr lvl="2"/>
+            <a:r>
+              <a:rPr lang="en-US" dirty="0"/>
+              <a:t>compare with publicly available papers and presentations?</a:t>
+            </a:r>
+          </a:p>
+          <a:p>
+            <a:pPr lvl="2"/>
+            <a:r>
+              <a:rPr lang="en-US" dirty="0"/>
+              <a:t>rerun the same case with a different code (or ask a colleague to do it…)?</a:t>
+            </a:r>
+          </a:p>
+          <a:p>
+            <a:pPr lvl="2"/>
+            <a:r>
+              <a:rPr lang="en-US" dirty="0"/>
+              <a:t>discuss the plots with a colleague…?</a:t>
             </a:r>
           </a:p>
         </p:txBody>
@@ -7027,7 +6891,7 @@
     </p:spTree>
     <p:extLst>
       <p:ext uri="{BB962C8B-B14F-4D97-AF65-F5344CB8AC3E}">
-        <p14:creationId xmlns:p14="http://schemas.microsoft.com/office/powerpoint/2010/main" val="4169432088"/>
+        <p14:creationId xmlns:p14="http://schemas.microsoft.com/office/powerpoint/2010/main" val="163359359"/>
       </p:ext>
     </p:extLst>
   </p:cSld>
@@ -7066,7 +6930,7 @@
         </p:nvSpPr>
         <p:spPr>
           <a:xfrm>
-            <a:off x="0" y="140672"/>
+            <a:off x="0" y="112344"/>
             <a:ext cx="9144000" cy="589085"/>
           </a:xfrm>
         </p:spPr>
@@ -7078,20 +6942,14 @@
           <a:p>
             <a:r>
               <a:rPr lang="en-US" dirty="0"/>
-              <a:t>Class discussion:</a:t>
-            </a:r>
-          </a:p>
-        </p:txBody>
-      </p:sp>
-      <p:sp>
-        <p:nvSpPr>
-          <p:cNvPr id="6" name="Content Placeholder 2">
-            <a:extLst>
-              <a:ext uri="{FF2B5EF4-FFF2-40B4-BE49-F238E27FC236}">
-                <a16:creationId xmlns:a16="http://schemas.microsoft.com/office/drawing/2014/main" xmlns="" id="{9081FF26-7AD5-4767-AF65-A27F1769E1FC}"/>
-              </a:ext>
-            </a:extLst>
-          </p:cNvPr>
+              <a:t>Running Particle Accelerator Codes inside Docker</a:t>
+            </a:r>
+          </a:p>
+        </p:txBody>
+      </p:sp>
+      <p:sp>
+        <p:nvSpPr>
+          <p:cNvPr id="3" name="Content Placeholder 2"/>
           <p:cNvSpPr>
             <a:spLocks noGrp="1"/>
           </p:cNvSpPr>
@@ -7101,8 +6959,8 @@
         </p:nvSpPr>
         <p:spPr>
           <a:xfrm>
-            <a:off x="152400" y="827314"/>
-            <a:ext cx="8839200" cy="5146766"/>
+            <a:off x="152400" y="879566"/>
+            <a:ext cx="8839200" cy="5364480"/>
           </a:xfrm>
         </p:spPr>
         <p:txBody>
@@ -7112,117 +6970,328 @@
           <a:lstStyle/>
           <a:p>
             <a:r>
-              <a:rPr lang="en-US" sz="1800" i="0" dirty="0"/>
-              <a:t>Do you have experience working with VMs?</a:t>
-            </a:r>
-          </a:p>
-          <a:p>
-            <a:pPr lvl="1"/>
-            <a:r>
-              <a:rPr lang="en-US" dirty="0"/>
-              <a:t>If so, what are the advantages and disadvantages?</a:t>
-            </a:r>
-          </a:p>
-          <a:p>
-            <a:r>
               <a:rPr lang="en-US" i="0" dirty="0"/>
-              <a:t>Explain at least one difference between VMs and containers</a:t>
+              <a:t>RadiaSoft has been running HPC codes via Docker since 2015</a:t>
+            </a:r>
+          </a:p>
+          <a:p>
+            <a:pPr lvl="1"/>
+            <a:r>
+              <a:rPr lang="en-US" dirty="0"/>
+              <a:t>beam physics:   elegant/SDDS,  Warp,  Synergia</a:t>
+            </a:r>
+          </a:p>
+          <a:p>
+            <a:pPr lvl="1"/>
+            <a:r>
+              <a:rPr lang="en-US" dirty="0"/>
+              <a:t>X-ray optics &amp; synch. radiation:  SRW,  Shadow</a:t>
+            </a:r>
+          </a:p>
+          <a:p>
+            <a:pPr lvl="1"/>
+            <a:r>
+              <a:rPr lang="en-US" dirty="0"/>
+              <a:t>FELs:  Genesis</a:t>
             </a:r>
           </a:p>
           <a:p>
             <a:r>
               <a:rPr lang="en-US" i="0" dirty="0"/>
-              <a:t>A VM is to a house as a container is to an apartment:  explain the analogy</a:t>
-            </a:r>
-          </a:p>
-          <a:p>
-            <a:r>
-              <a:rPr lang="en-US" dirty="0"/>
-              <a:t>Reproducibility vs Replication:  which is more difficult?   …more important?</a:t>
-            </a:r>
-          </a:p>
-          <a:p>
-            <a:r>
-              <a:rPr lang="en-US" dirty="0"/>
-              <a:t>How does Docker help with replicating a physics simulation?</a:t>
-            </a:r>
+              <a:t>Linux</a:t>
+            </a:r>
+          </a:p>
+          <a:p>
+            <a:pPr lvl="1"/>
+            <a:r>
+              <a:rPr lang="en-US" dirty="0"/>
+              <a:t>containers run at native speeds;  MPI works well</a:t>
+            </a:r>
+            <a:endParaRPr lang="en-US" i="0" dirty="0"/>
+          </a:p>
+          <a:p>
+            <a:pPr lvl="1"/>
             <a:r>
               <a:rPr lang="en-US" i="0" dirty="0"/>
+              <a:t>large-scale I/O can be slow (similar to NFS; more testing required)</a:t>
+            </a:r>
+          </a:p>
+          <a:p>
+            <a:r>
+              <a:rPr lang="en-US" i="0" dirty="0"/>
+              <a:t>MacOS</a:t>
+            </a:r>
+          </a:p>
+          <a:p>
+            <a:pPr lvl="1"/>
+            <a:r>
+              <a:rPr lang="en-US" i="0" dirty="0"/>
+              <a:t>similar to Linux (we have less experience)</a:t>
+            </a:r>
+          </a:p>
+          <a:p>
+            <a:r>
+              <a:rPr lang="en-US" dirty="0"/>
+              <a:t>What about supercomputing? </a:t>
+            </a:r>
+            <a:r>
+              <a:rPr lang="en-US" i="1" dirty="0"/>
               <a:t> </a:t>
             </a:r>
-          </a:p>
-          <a:p>
-            <a:pPr lvl="1"/>
+            <a:r>
+              <a:rPr lang="en-US" sz="1400" i="1" dirty="0"/>
+              <a:t>(don’t know of any experience w/ accelerator codes)</a:t>
+            </a:r>
+            <a:endParaRPr lang="en-US" i="1" dirty="0"/>
+          </a:p>
+          <a:p>
+            <a:pPr lvl="2"/>
             <a:endParaRPr lang="en-US" i="0" dirty="0"/>
           </a:p>
           <a:p>
-            <a:r>
-              <a:rPr lang="en-US" dirty="0"/>
-              <a:t>Maybe revisit previous discussion points – </a:t>
-            </a:r>
+            <a:pPr lvl="1"/>
+            <a:r>
+              <a:rPr lang="en-US" i="0" dirty="0"/>
+              <a:t>Singularity, (LBL)</a:t>
+            </a:r>
+            <a:endParaRPr lang="en-US" dirty="0"/>
+          </a:p>
+          <a:p>
+            <a:pPr lvl="2"/>
             <a:endParaRPr lang="en-US" i="0" dirty="0"/>
           </a:p>
           <a:p>
             <a:pPr lvl="1"/>
             <a:r>
-              <a:rPr lang="en-US" dirty="0"/>
-              <a:t>When you run a simulation how confident are you in the results?</a:t>
-            </a:r>
-          </a:p>
-          <a:p>
-            <a:pPr lvl="1"/>
-            <a:r>
-              <a:rPr lang="en-US" dirty="0"/>
-              <a:t>Are you skeptical of results presented by others in talks or papers?</a:t>
+              <a:rPr lang="en-US" i="0" dirty="0"/>
+              <a:t>Shifter (NERSC)</a:t>
             </a:r>
           </a:p>
           <a:p>
             <a:pPr lvl="2"/>
-            <a:r>
-              <a:rPr lang="en-US" dirty="0"/>
-              <a:t>have you ever wanted to rerun someone else’s simulation?</a:t>
-            </a:r>
-          </a:p>
-          <a:p>
-            <a:pPr lvl="1"/>
-            <a:r>
-              <a:rPr lang="en-US" dirty="0"/>
-              <a:t>How do you validate your own results?</a:t>
+            <a:endParaRPr lang="en-US" i="0" dirty="0"/>
+          </a:p>
+          <a:p>
+            <a:pPr lvl="1"/>
+            <a:r>
+              <a:rPr lang="en-US" dirty="0"/>
+              <a:t>Charliecloud (LANL)</a:t>
             </a:r>
           </a:p>
           <a:p>
             <a:pPr lvl="2"/>
-            <a:r>
-              <a:rPr lang="en-US" dirty="0"/>
-              <a:t>compare with your physical intuition?</a:t>
-            </a:r>
-          </a:p>
-          <a:p>
-            <a:pPr lvl="2"/>
-            <a:r>
-              <a:rPr lang="en-US" dirty="0"/>
-              <a:t>compare with your previous work?</a:t>
-            </a:r>
-          </a:p>
-          <a:p>
-            <a:pPr lvl="2"/>
-            <a:r>
-              <a:rPr lang="en-US" dirty="0"/>
-              <a:t>compare with publicly available papers and presentations?</a:t>
-            </a:r>
-          </a:p>
-          <a:p>
-            <a:pPr lvl="2"/>
-            <a:r>
-              <a:rPr lang="en-US" dirty="0"/>
-              <a:t>rerun the same case with a different code (or ask a colleague to do it…)?</a:t>
-            </a:r>
-          </a:p>
-          <a:p>
-            <a:pPr lvl="2"/>
-            <a:r>
-              <a:rPr lang="en-US" dirty="0"/>
-              <a:t>discuss the plots with a colleague…?</a:t>
+            <a:endParaRPr lang="en-US" i="0" dirty="0"/>
+          </a:p>
+          <a:p>
+            <a:pPr lvl="1"/>
+            <a:r>
+              <a:rPr lang="en-US" dirty="0"/>
+              <a:t>others...?</a:t>
+            </a:r>
+            <a:endParaRPr lang="en-US" i="0" dirty="0"/>
+          </a:p>
+        </p:txBody>
+      </p:sp>
+      <p:pic>
+        <p:nvPicPr>
+          <p:cNvPr id="7" name="Picture 6" descr="docker.png"/>
+          <p:cNvPicPr>
+            <a:picLocks noChangeAspect="1"/>
+          </p:cNvPicPr>
+          <p:nvPr/>
+        </p:nvPicPr>
+        <p:blipFill>
+          <a:blip r:embed="rId3">
+            <a:extLst>
+              <a:ext uri="{28A0092B-C50C-407E-A947-70E740481C1C}">
+                <a14:useLocalDpi xmlns:a14="http://schemas.microsoft.com/office/drawing/2010/main" val="0"/>
+              </a:ext>
+            </a:extLst>
+          </a:blip>
+          <a:stretch>
+            <a:fillRect/>
+          </a:stretch>
+        </p:blipFill>
+        <p:spPr>
+          <a:xfrm>
+            <a:off x="6430320" y="1130504"/>
+            <a:ext cx="2464526" cy="847135"/>
+          </a:xfrm>
+          <a:prstGeom prst="rect">
+            <a:avLst/>
+          </a:prstGeom>
+        </p:spPr>
+      </p:pic>
+      <p:sp>
+        <p:nvSpPr>
+          <p:cNvPr id="6" name="TextBox 5">
+            <a:extLst>
+              <a:ext uri="{FF2B5EF4-FFF2-40B4-BE49-F238E27FC236}">
+                <a16:creationId xmlns:a16="http://schemas.microsoft.com/office/drawing/2014/main" id="{1DE7DDFE-E229-4C3B-87E8-E52E3770DC0C}"/>
+              </a:ext>
+            </a:extLst>
+          </p:cNvPr>
+          <p:cNvSpPr txBox="1"/>
+          <p:nvPr/>
+        </p:nvSpPr>
+        <p:spPr>
+          <a:xfrm>
+            <a:off x="3016099" y="4655137"/>
+            <a:ext cx="5975501" cy="523220"/>
+          </a:xfrm>
+          <a:prstGeom prst="rect">
+            <a:avLst/>
+          </a:prstGeom>
+          <a:noFill/>
+        </p:spPr>
+        <p:txBody>
+          <a:bodyPr wrap="square" rtlCol="0">
+            <a:spAutoFit/>
+          </a:bodyPr>
+          <a:lstStyle/>
+          <a:p>
+            <a:pPr marL="227013" indent="-227013">
+              <a:spcBef>
+                <a:spcPts val="300"/>
+              </a:spcBef>
+            </a:pPr>
+            <a:r>
+              <a:rPr lang="en-US" sz="1400" dirty="0">
+                <a:latin typeface="Times New Roman" panose="02020603050405020304" pitchFamily="18" charset="0"/>
+                <a:cs typeface="Times New Roman" panose="02020603050405020304" pitchFamily="18" charset="0"/>
+              </a:rPr>
+              <a:t>K. Kincade (2015), </a:t>
+            </a:r>
+            <a:r>
+              <a:rPr lang="en-US" sz="1400" dirty="0">
+                <a:latin typeface="Times New Roman" panose="02020603050405020304" pitchFamily="18" charset="0"/>
+                <a:cs typeface="Times New Roman" panose="02020603050405020304" pitchFamily="18" charset="0"/>
+                <a:hlinkClick r:id="rId4"/>
+              </a:rPr>
+              <a:t>http://www.nersc.gov/news-publications/nersc-news/nersc-center-news/2015/shifter-makes-container-based-hpc-a-breeze/</a:t>
+            </a:r>
+            <a:r>
+              <a:rPr lang="en-US" sz="1400" dirty="0">
+                <a:latin typeface="Times New Roman" panose="02020603050405020304" pitchFamily="18" charset="0"/>
+                <a:cs typeface="Times New Roman" panose="02020603050405020304" pitchFamily="18" charset="0"/>
+              </a:rPr>
+              <a:t> </a:t>
+            </a:r>
+          </a:p>
+        </p:txBody>
+      </p:sp>
+      <p:sp>
+        <p:nvSpPr>
+          <p:cNvPr id="9" name="TextBox 8">
+            <a:extLst>
+              <a:ext uri="{FF2B5EF4-FFF2-40B4-BE49-F238E27FC236}">
+                <a16:creationId xmlns:a16="http://schemas.microsoft.com/office/drawing/2014/main" id="{858AF180-993D-4138-8FC7-4811282CA649}"/>
+              </a:ext>
+            </a:extLst>
+          </p:cNvPr>
+          <p:cNvSpPr txBox="1"/>
+          <p:nvPr/>
+        </p:nvSpPr>
+        <p:spPr>
+          <a:xfrm>
+            <a:off x="2993617" y="4176677"/>
+            <a:ext cx="5975501" cy="307777"/>
+          </a:xfrm>
+          <a:prstGeom prst="rect">
+            <a:avLst/>
+          </a:prstGeom>
+          <a:noFill/>
+        </p:spPr>
+        <p:txBody>
+          <a:bodyPr wrap="square" rtlCol="0">
+            <a:spAutoFit/>
+          </a:bodyPr>
+          <a:lstStyle/>
+          <a:p>
+            <a:pPr marL="227013" indent="-227013">
+              <a:spcBef>
+                <a:spcPts val="300"/>
+              </a:spcBef>
+            </a:pPr>
+            <a:r>
+              <a:rPr lang="en-US" sz="1400" dirty="0">
+                <a:latin typeface="Times New Roman" panose="02020603050405020304" pitchFamily="18" charset="0"/>
+                <a:cs typeface="Times New Roman" panose="02020603050405020304" pitchFamily="18" charset="0"/>
+              </a:rPr>
+              <a:t>Singularity, </a:t>
+            </a:r>
+            <a:r>
+              <a:rPr lang="en-US" sz="1400" dirty="0">
+                <a:latin typeface="Times New Roman" panose="02020603050405020304" pitchFamily="18" charset="0"/>
+                <a:cs typeface="Times New Roman" panose="02020603050405020304" pitchFamily="18" charset="0"/>
+                <a:hlinkClick r:id="rId5"/>
+              </a:rPr>
+              <a:t>http://singularity.lbl.gov</a:t>
+            </a:r>
+            <a:r>
+              <a:rPr lang="en-US" sz="1400" dirty="0">
+                <a:latin typeface="Times New Roman" panose="02020603050405020304" pitchFamily="18" charset="0"/>
+                <a:cs typeface="Times New Roman" panose="02020603050405020304" pitchFamily="18" charset="0"/>
+              </a:rPr>
+              <a:t> </a:t>
+            </a:r>
+          </a:p>
+        </p:txBody>
+      </p:sp>
+      <p:sp>
+        <p:nvSpPr>
+          <p:cNvPr id="10" name="TextBox 9">
+            <a:extLst>
+              <a:ext uri="{FF2B5EF4-FFF2-40B4-BE49-F238E27FC236}">
+                <a16:creationId xmlns:a16="http://schemas.microsoft.com/office/drawing/2014/main" id="{F0F78B4D-7974-4AB7-A8FB-839FBD153B46}"/>
+              </a:ext>
+            </a:extLst>
+          </p:cNvPr>
+          <p:cNvSpPr txBox="1"/>
+          <p:nvPr/>
+        </p:nvSpPr>
+        <p:spPr>
+          <a:xfrm>
+            <a:off x="3027188" y="5257538"/>
+            <a:ext cx="6116812" cy="523220"/>
+          </a:xfrm>
+          <a:prstGeom prst="rect">
+            <a:avLst/>
+          </a:prstGeom>
+          <a:noFill/>
+        </p:spPr>
+        <p:txBody>
+          <a:bodyPr wrap="square" rtlCol="0">
+            <a:spAutoFit/>
+          </a:bodyPr>
+          <a:lstStyle/>
+          <a:p>
+            <a:pPr>
+              <a:spcBef>
+                <a:spcPts val="300"/>
+              </a:spcBef>
+            </a:pPr>
+            <a:r>
+              <a:rPr lang="en-US" sz="1400" dirty="0">
+                <a:latin typeface="Times New Roman" panose="02020603050405020304" pitchFamily="18" charset="0"/>
+                <a:cs typeface="Times New Roman" panose="02020603050405020304" pitchFamily="18" charset="0"/>
+              </a:rPr>
+              <a:t>R. Priedhorsky &amp; T.C. Randles (2017), </a:t>
+            </a:r>
+            <a:r>
+              <a:rPr lang="en-US" sz="1400" dirty="0">
+                <a:latin typeface="Times New Roman" panose="02020603050405020304" pitchFamily="18" charset="0"/>
+                <a:cs typeface="Times New Roman" panose="02020603050405020304" pitchFamily="18" charset="0"/>
+                <a:hlinkClick r:id="rId6"/>
+              </a:rPr>
+              <a:t>http://permalink.lanl.gov/object/tr?what=info:lanl-repo/lareport/LA-UR-16-22370</a:t>
+            </a:r>
+            <a:r>
+              <a:rPr lang="en-US" sz="1400" dirty="0">
+                <a:latin typeface="Times New Roman" panose="02020603050405020304" pitchFamily="18" charset="0"/>
+                <a:cs typeface="Times New Roman" panose="02020603050405020304" pitchFamily="18" charset="0"/>
+              </a:rPr>
+              <a:t> </a:t>
             </a:r>
           </a:p>
         </p:txBody>
@@ -7230,7 +7299,7 @@
     </p:spTree>
     <p:extLst>
       <p:ext uri="{BB962C8B-B14F-4D97-AF65-F5344CB8AC3E}">
-        <p14:creationId xmlns:p14="http://schemas.microsoft.com/office/powerpoint/2010/main" val="163359359"/>
+        <p14:creationId xmlns:p14="http://schemas.microsoft.com/office/powerpoint/2010/main" val="3503096055"/>
       </p:ext>
     </p:extLst>
   </p:cSld>
@@ -7269,7 +7338,7 @@
         </p:nvSpPr>
         <p:spPr>
           <a:xfrm>
-            <a:off x="0" y="112344"/>
+            <a:off x="0" y="70385"/>
             <a:ext cx="9144000" cy="589085"/>
           </a:xfrm>
         </p:spPr>
@@ -7281,7 +7350,7 @@
           <a:p>
             <a:r>
               <a:rPr lang="en-US" dirty="0"/>
-              <a:t>Running Particle Accelerator Codes inside Docker</a:t>
+              <a:t>Delivering codes via the Docker Hub repository</a:t>
             </a:r>
           </a:p>
         </p:txBody>
@@ -7298,8 +7367,8 @@
         </p:nvSpPr>
         <p:spPr>
           <a:xfrm>
-            <a:off x="152400" y="879566"/>
-            <a:ext cx="8839200" cy="5283843"/>
+            <a:off x="152400" y="862150"/>
+            <a:ext cx="8839200" cy="5441932"/>
           </a:xfrm>
         </p:spPr>
         <p:txBody>
@@ -7310,41 +7379,39 @@
           <a:p>
             <a:r>
               <a:rPr lang="en-US" i="0" dirty="0"/>
-              <a:t>RadiaSoft has been running HPC codes via Docker since 2015</a:t>
-            </a:r>
-          </a:p>
-          <a:p>
-            <a:pPr lvl="1"/>
-            <a:r>
-              <a:rPr lang="en-US" sz="1800" dirty="0"/>
-              <a:t>beam physics:   elegant/SDDS,  Warp,  Synergia</a:t>
-            </a:r>
-          </a:p>
-          <a:p>
-            <a:pPr lvl="1"/>
-            <a:r>
-              <a:rPr lang="en-US" sz="1800" dirty="0"/>
-              <a:t>X-ray optics &amp; synchrotron radiation:  SRW,  Shadow</a:t>
-            </a:r>
-          </a:p>
-          <a:p>
-            <a:pPr lvl="1"/>
-            <a:r>
-              <a:rPr lang="en-US" sz="1800" dirty="0"/>
-              <a:t>FELs:  Genesis</a:t>
+              <a:t>Docker images can be uploaded to a public repository</a:t>
+            </a:r>
+          </a:p>
+          <a:p>
+            <a:pPr lvl="1"/>
+            <a:r>
+              <a:rPr lang="en-US" dirty="0">
+                <a:hlinkClick r:id="rId3"/>
+              </a:rPr>
+              <a:t>https://hub.docker.com</a:t>
+            </a:r>
+            <a:r>
+              <a:rPr lang="en-US" dirty="0"/>
+              <a:t> </a:t>
             </a:r>
           </a:p>
           <a:p>
             <a:r>
               <a:rPr lang="en-US" i="0" dirty="0"/>
-              <a:t>Linux</a:t>
-            </a:r>
-          </a:p>
-          <a:p>
-            <a:pPr lvl="1"/>
-            <a:r>
-              <a:rPr lang="en-US" dirty="0"/>
-              <a:t>containers run at native speeds;  MPI works well</a:t>
+              <a:t>RadiaSoft distributes our containers from Docker Hub</a:t>
+            </a:r>
+          </a:p>
+          <a:p>
+            <a:pPr lvl="1"/>
+            <a:r>
+              <a:rPr lang="en-US" dirty="0">
+                <a:hlinkClick r:id="rId4"/>
+              </a:rPr>
+              <a:t>https://hub.docker.com/r/radiasoft</a:t>
+            </a:r>
+            <a:r>
+              <a:rPr lang="en-US" dirty="0"/>
+              <a:t> </a:t>
             </a:r>
             <a:endParaRPr lang="en-US" i="0" dirty="0"/>
           </a:p>
@@ -7352,186 +7419,137 @@
             <a:pPr lvl="1"/>
             <a:r>
               <a:rPr lang="en-US" i="0" dirty="0"/>
-              <a:t>large-scale I/O can be slow (similar to NFS; more testing required)</a:t>
+              <a:t>automated build/test/release is used to ensure working containers</a:t>
             </a:r>
           </a:p>
           <a:p>
             <a:r>
               <a:rPr lang="en-US" i="0" dirty="0"/>
-              <a:t>MacOS</a:t>
-            </a:r>
-          </a:p>
-          <a:p>
-            <a:pPr lvl="1"/>
-            <a:r>
-              <a:rPr lang="en-US" i="0" dirty="0"/>
-              <a:t>similar to Linux (we have less experience)</a:t>
-            </a:r>
-          </a:p>
-          <a:p>
-            <a:pPr lvl="1"/>
-            <a:endParaRPr lang="en-US" i="0" dirty="0"/>
-          </a:p>
-          <a:p>
-            <a:r>
-              <a:rPr lang="en-US" dirty="0"/>
-              <a:t>What about supercomputing?</a:t>
-            </a:r>
-          </a:p>
-          <a:p>
-            <a:pPr lvl="1"/>
-            <a:r>
-              <a:rPr lang="en-US" i="0" dirty="0"/>
-              <a:t>Shifter – at the NERSC supercomputing center</a:t>
-            </a:r>
-          </a:p>
-          <a:p>
-            <a:pPr lvl="2"/>
-            <a:r>
-              <a:rPr lang="en-US" dirty="0"/>
-              <a:t>optimized for Linux on the compute nodes</a:t>
-            </a:r>
-          </a:p>
-          <a:p>
-            <a:pPr lvl="2"/>
-            <a:r>
-              <a:rPr lang="en-US" dirty="0"/>
-              <a:t>compatible with Docker</a:t>
-            </a:r>
-          </a:p>
-        </p:txBody>
-      </p:sp>
-      <p:pic>
-        <p:nvPicPr>
-          <p:cNvPr id="7" name="Picture 6" descr="docker.png"/>
-          <p:cNvPicPr>
-            <a:picLocks noChangeAspect="1"/>
-          </p:cNvPicPr>
-          <p:nvPr/>
-        </p:nvPicPr>
-        <p:blipFill>
-          <a:blip r:embed="rId3">
-            <a:extLst>
-              <a:ext uri="{28A0092B-C50C-407E-A947-70E740481C1C}">
-                <a14:useLocalDpi xmlns:a14="http://schemas.microsoft.com/office/drawing/2010/main" val="0"/>
-              </a:ext>
-            </a:extLst>
-          </a:blip>
-          <a:stretch>
-            <a:fillRect/>
-          </a:stretch>
-        </p:blipFill>
-        <p:spPr>
-          <a:xfrm>
-            <a:off x="6430320" y="1827189"/>
-            <a:ext cx="2464526" cy="847135"/>
-          </a:xfrm>
-          <a:prstGeom prst="rect">
-            <a:avLst/>
-          </a:prstGeom>
-        </p:spPr>
-      </p:pic>
-      <p:pic>
-        <p:nvPicPr>
-          <p:cNvPr id="1026" name="Picture 2" descr="Shifter logo">
-            <a:extLst>
-              <a:ext uri="{FF2B5EF4-FFF2-40B4-BE49-F238E27FC236}">
-                <a16:creationId xmlns:a16="http://schemas.microsoft.com/office/drawing/2014/main" xmlns="" id="{66DA49E9-6E33-4D38-9858-6ADEBD4307E3}"/>
-              </a:ext>
-            </a:extLst>
-          </p:cNvPr>
-          <p:cNvPicPr>
-            <a:picLocks noChangeAspect="1" noChangeArrowheads="1"/>
-          </p:cNvPicPr>
-          <p:nvPr/>
-        </p:nvPicPr>
-        <p:blipFill>
-          <a:blip r:embed="rId4">
-            <a:extLst>
-              <a:ext uri="{28A0092B-C50C-407E-A947-70E740481C1C}">
-                <a14:useLocalDpi xmlns:a14="http://schemas.microsoft.com/office/drawing/2010/main" val="0"/>
-              </a:ext>
-            </a:extLst>
-          </a:blip>
-          <a:srcRect/>
-          <a:stretch>
-            <a:fillRect/>
-          </a:stretch>
-        </p:blipFill>
-        <p:spPr bwMode="auto">
-          <a:xfrm>
-            <a:off x="6435628" y="4458404"/>
-            <a:ext cx="1095375" cy="1400175"/>
-          </a:xfrm>
-          <a:prstGeom prst="rect">
-            <a:avLst/>
-          </a:prstGeom>
-          <a:noFill/>
-          <a:extLst>
-            <a:ext uri="{909E8E84-426E-40DD-AFC4-6F175D3DCCD1}">
-              <a14:hiddenFill xmlns:a14="http://schemas.microsoft.com/office/drawing/2010/main">
+              <a:t>One command can be used to download/install/run:</a:t>
+            </a:r>
+          </a:p>
+          <a:p>
+            <a:pPr marL="0" lvl="1" indent="0">
+              <a:spcBef>
+                <a:spcPts val="600"/>
+              </a:spcBef>
+              <a:spcAft>
+                <a:spcPts val="600"/>
+              </a:spcAft>
+              <a:buNone/>
+            </a:pPr>
+            <a:r>
+              <a:rPr lang="en-US" sz="1800" i="0" dirty="0">
                 <a:solidFill>
-                  <a:srgbClr val="FFFFFF"/>
+                  <a:schemeClr val="tx1"/>
                 </a:solidFill>
-              </a14:hiddenFill>
-            </a:ext>
-          </a:extLst>
-        </p:spPr>
-      </p:pic>
-      <p:sp>
-        <p:nvSpPr>
-          <p:cNvPr id="6" name="TextBox 5">
-            <a:extLst>
-              <a:ext uri="{FF2B5EF4-FFF2-40B4-BE49-F238E27FC236}">
-                <a16:creationId xmlns:a16="http://schemas.microsoft.com/office/drawing/2014/main" xmlns="" id="{1DE7DDFE-E229-4C3B-87E8-E52E3770DC0C}"/>
-              </a:ext>
-            </a:extLst>
-          </p:cNvPr>
-          <p:cNvSpPr txBox="1"/>
-          <p:nvPr/>
-        </p:nvSpPr>
-        <p:spPr>
-          <a:xfrm>
-            <a:off x="574759" y="5294862"/>
-            <a:ext cx="5975501" cy="523220"/>
-          </a:xfrm>
-          <a:prstGeom prst="rect">
-            <a:avLst/>
-          </a:prstGeom>
-          <a:noFill/>
-        </p:spPr>
-        <p:txBody>
-          <a:bodyPr wrap="square" rtlCol="0">
-            <a:spAutoFit/>
-          </a:bodyPr>
-          <a:lstStyle/>
-          <a:p>
-            <a:pPr marL="227013" indent="-227013">
-              <a:spcBef>
-                <a:spcPts val="300"/>
-              </a:spcBef>
-            </a:pPr>
-            <a:r>
-              <a:rPr lang="en-US" sz="1400" dirty="0">
-                <a:latin typeface="Times New Roman" panose="02020603050405020304" pitchFamily="18" charset="0"/>
-                <a:cs typeface="Times New Roman" panose="02020603050405020304" pitchFamily="18" charset="0"/>
-              </a:rPr>
-              <a:t>K. Kincade (2015), </a:t>
-            </a:r>
-            <a:r>
-              <a:rPr lang="en-US" sz="1400" dirty="0">
-                <a:latin typeface="Times New Roman" panose="02020603050405020304" pitchFamily="18" charset="0"/>
-                <a:cs typeface="Times New Roman" panose="02020603050405020304" pitchFamily="18" charset="0"/>
+                <a:latin typeface="Courier New" panose="02070309020205020404" pitchFamily="49" charset="0"/>
+                <a:cs typeface="Courier New" panose="02070309020205020404" pitchFamily="49" charset="0"/>
+              </a:rPr>
+              <a:t>    &gt; </a:t>
+            </a:r>
+            <a:r>
+              <a:rPr lang="en-US" sz="1800" dirty="0">
+                <a:solidFill>
+                  <a:schemeClr val="tx1"/>
+                </a:solidFill>
+                <a:latin typeface="Courier New" panose="02070309020205020404" pitchFamily="49" charset="0"/>
+                <a:cs typeface="Courier New" panose="02070309020205020404" pitchFamily="49" charset="0"/>
+              </a:rPr>
+              <a:t>curl radia.run | bash –s beamsim</a:t>
+            </a:r>
+            <a:endParaRPr lang="en-US" sz="1400" dirty="0">
+              <a:solidFill>
+                <a:schemeClr val="tx1"/>
+              </a:solidFill>
+            </a:endParaRPr>
+          </a:p>
+          <a:p>
+            <a:pPr lvl="1"/>
+            <a:r>
+              <a:rPr lang="en-US" dirty="0"/>
+              <a:t>assumes Docker is already installed and you know how to use it</a:t>
+            </a:r>
+          </a:p>
+          <a:p>
+            <a:r>
+              <a:rPr lang="en-US" dirty="0"/>
+              <a:t>JupyterHub servers provide cloud-based access to containerized codes</a:t>
+            </a:r>
+          </a:p>
+          <a:p>
+            <a:pPr lvl="1"/>
+            <a:r>
+              <a:rPr lang="en-US" dirty="0"/>
+              <a:t>GitHub repository &amp; docs,  </a:t>
+            </a:r>
+            <a:r>
+              <a:rPr lang="en-US" dirty="0">
                 <a:hlinkClick r:id="rId5"/>
               </a:rPr>
-              <a:t>http://www.nersc.gov/news-publications/nersc-news/nersc-center-news/2015/shifter-makes-container-based-hpc-a-breeze/</a:t>
-            </a:r>
-            <a:r>
-              <a:rPr lang="en-US" sz="1400" dirty="0">
-                <a:latin typeface="Times New Roman" panose="02020603050405020304" pitchFamily="18" charset="0"/>
-                <a:cs typeface="Times New Roman" panose="02020603050405020304" pitchFamily="18" charset="0"/>
-              </a:rPr>
+              <a:t>https://github.com/jupyterhub/jupyterhub</a:t>
+            </a:r>
+            <a:r>
+              <a:rPr lang="en-US" dirty="0"/>
               <a:t> </a:t>
+            </a:r>
+          </a:p>
+          <a:p>
+            <a:r>
+              <a:rPr lang="en-US" dirty="0"/>
+              <a:t>RadiaSoft provides a public server,  </a:t>
+            </a:r>
+            <a:r>
+              <a:rPr lang="en-US" sz="1600" dirty="0">
+                <a:hlinkClick r:id="rId6"/>
+              </a:rPr>
+              <a:t>https://jupyter.radiasoft.org</a:t>
+            </a:r>
+            <a:r>
+              <a:rPr lang="en-US" sz="1600" dirty="0"/>
+              <a:t> </a:t>
+            </a:r>
+          </a:p>
+          <a:p>
+            <a:pPr lvl="1"/>
+            <a:r>
+              <a:rPr lang="en-US" dirty="0"/>
+              <a:t>many accelerator physics codes are pre-installed</a:t>
+            </a:r>
+          </a:p>
+          <a:p>
+            <a:pPr lvl="1"/>
+            <a:r>
+              <a:rPr lang="en-US" dirty="0"/>
+              <a:t>made available via the  </a:t>
+            </a:r>
+            <a:r>
+              <a:rPr lang="en-US" dirty="0">
+                <a:solidFill>
+                  <a:schemeClr val="tx1"/>
+                </a:solidFill>
+                <a:latin typeface="Courier New" panose="02070309020205020404" pitchFamily="49" charset="0"/>
+                <a:cs typeface="Courier New" panose="02070309020205020404" pitchFamily="49" charset="0"/>
+              </a:rPr>
+              <a:t>radiasoft/beamsim-jupyter</a:t>
+            </a:r>
+            <a:r>
+              <a:rPr lang="en-US" dirty="0"/>
+              <a:t> container</a:t>
+            </a:r>
+          </a:p>
+          <a:p>
+            <a:pPr lvl="1"/>
+            <a:r>
+              <a:rPr lang="en-US" dirty="0"/>
+              <a:t>supports Jupyter/IPython notebooks</a:t>
+            </a:r>
+          </a:p>
+          <a:p>
+            <a:pPr lvl="1"/>
+            <a:r>
+              <a:rPr lang="en-US" dirty="0"/>
+              <a:t>also supports browser-based terminal window (bash, without X11)</a:t>
             </a:r>
           </a:p>
         </p:txBody>
@@ -7539,7 +7557,7 @@
     </p:spTree>
     <p:extLst>
       <p:ext uri="{BB962C8B-B14F-4D97-AF65-F5344CB8AC3E}">
-        <p14:creationId xmlns:p14="http://schemas.microsoft.com/office/powerpoint/2010/main" val="3503096055"/>
+        <p14:creationId xmlns:p14="http://schemas.microsoft.com/office/powerpoint/2010/main" val="1528542507"/>
       </p:ext>
     </p:extLst>
   </p:cSld>
@@ -7705,11 +7723,7 @@
             </a:r>
             <a:r>
               <a:rPr lang="en-US" sz="1600" i="0"/>
-              <a:t>a </a:t>
-            </a:r>
-            <a:r>
-              <a:rPr lang="en-US" sz="1600" i="0" smtClean="0"/>
-              <a:t>Data </a:t>
+              <a:t>a Data </a:t>
             </a:r>
             <a:r>
               <a:rPr lang="en-US" sz="1600" i="0" dirty="0"/>
@@ -7733,7 +7747,7 @@
           <p:cNvPr id="4" name="TextBox 3">
             <a:extLst>
               <a:ext uri="{FF2B5EF4-FFF2-40B4-BE49-F238E27FC236}">
-                <a16:creationId xmlns:a16="http://schemas.microsoft.com/office/drawing/2014/main" xmlns="" id="{7513C421-393B-4FF0-932C-5CBCC33C43BF}"/>
+                <a16:creationId xmlns:a16="http://schemas.microsoft.com/office/drawing/2014/main" id="{7513C421-393B-4FF0-932C-5CBCC33C43BF}"/>
               </a:ext>
             </a:extLst>
           </p:cNvPr>
@@ -7824,259 +7838,6 @@
           <a:p>
             <a:r>
               <a:rPr lang="en-US" dirty="0"/>
-              <a:t>Delivering codes via the Docker Hub repository</a:t>
-            </a:r>
-          </a:p>
-        </p:txBody>
-      </p:sp>
-      <p:sp>
-        <p:nvSpPr>
-          <p:cNvPr id="3" name="Content Placeholder 2"/>
-          <p:cNvSpPr>
-            <a:spLocks noGrp="1"/>
-          </p:cNvSpPr>
-          <p:nvPr>
-            <p:ph idx="1"/>
-          </p:nvPr>
-        </p:nvSpPr>
-        <p:spPr>
-          <a:xfrm>
-            <a:off x="152400" y="862150"/>
-            <a:ext cx="8839200" cy="5441932"/>
-          </a:xfrm>
-        </p:spPr>
-        <p:txBody>
-          <a:bodyPr>
-            <a:normAutofit/>
-          </a:bodyPr>
-          <a:lstStyle/>
-          <a:p>
-            <a:r>
-              <a:rPr lang="en-US" i="0" dirty="0"/>
-              <a:t>Docker images can be uploaded to a public repository</a:t>
-            </a:r>
-          </a:p>
-          <a:p>
-            <a:pPr lvl="1"/>
-            <a:r>
-              <a:rPr lang="en-US" dirty="0">
-                <a:hlinkClick r:id="rId3"/>
-              </a:rPr>
-              <a:t>https://hub.docker.com</a:t>
-            </a:r>
-            <a:r>
-              <a:rPr lang="en-US" dirty="0"/>
-              <a:t> </a:t>
-            </a:r>
-          </a:p>
-          <a:p>
-            <a:r>
-              <a:rPr lang="en-US" i="0" dirty="0"/>
-              <a:t>RadiaSoft distributes our containers from Docker Hub</a:t>
-            </a:r>
-          </a:p>
-          <a:p>
-            <a:pPr lvl="1"/>
-            <a:r>
-              <a:rPr lang="en-US" dirty="0">
-                <a:hlinkClick r:id="rId4"/>
-              </a:rPr>
-              <a:t>https://hub.docker.com/r/radiasoft</a:t>
-            </a:r>
-            <a:r>
-              <a:rPr lang="en-US" dirty="0"/>
-              <a:t> </a:t>
-            </a:r>
-            <a:endParaRPr lang="en-US" i="0" dirty="0"/>
-          </a:p>
-          <a:p>
-            <a:pPr lvl="1"/>
-            <a:r>
-              <a:rPr lang="en-US" i="0" dirty="0"/>
-              <a:t>automated build/test/release is used to ensure working containers</a:t>
-            </a:r>
-          </a:p>
-          <a:p>
-            <a:r>
-              <a:rPr lang="en-US" i="0" dirty="0"/>
-              <a:t>One command can be used to download/install/run:</a:t>
-            </a:r>
-          </a:p>
-          <a:p>
-            <a:pPr marL="0" lvl="1" indent="0">
-              <a:spcBef>
-                <a:spcPts val="600"/>
-              </a:spcBef>
-              <a:spcAft>
-                <a:spcPts val="600"/>
-              </a:spcAft>
-              <a:buNone/>
-            </a:pPr>
-            <a:r>
-              <a:rPr lang="en-US" sz="1800" i="0" dirty="0">
-                <a:solidFill>
-                  <a:schemeClr val="tx1"/>
-                </a:solidFill>
-                <a:latin typeface="Courier New" panose="02070309020205020404" pitchFamily="49" charset="0"/>
-                <a:cs typeface="Courier New" panose="02070309020205020404" pitchFamily="49" charset="0"/>
-              </a:rPr>
-              <a:t>    &gt; docker run –p 8000:8000 radiasoft/beamsim</a:t>
-            </a:r>
-            <a:endParaRPr lang="en-US" sz="1400" dirty="0">
-              <a:solidFill>
-                <a:schemeClr val="tx1"/>
-              </a:solidFill>
-            </a:endParaRPr>
-          </a:p>
-          <a:p>
-            <a:pPr lvl="1"/>
-            <a:r>
-              <a:rPr lang="en-US" dirty="0"/>
-              <a:t>assumes Docker is already installed and you know how to use it</a:t>
-            </a:r>
-          </a:p>
-          <a:p>
-            <a:pPr lvl="1"/>
-            <a:endParaRPr lang="en-US" dirty="0"/>
-          </a:p>
-          <a:p>
-            <a:r>
-              <a:rPr lang="en-US" dirty="0"/>
-              <a:t>JupyterHub servers provide cloud-based access to containerized codes</a:t>
-            </a:r>
-          </a:p>
-          <a:p>
-            <a:pPr lvl="1"/>
-            <a:r>
-              <a:rPr lang="en-US" dirty="0"/>
-              <a:t>GitHub repository &amp; docs,  </a:t>
-            </a:r>
-            <a:r>
-              <a:rPr lang="en-US" dirty="0">
-                <a:hlinkClick r:id="rId5"/>
-              </a:rPr>
-              <a:t>https://github.com/jupyterhub/jupyterhub</a:t>
-            </a:r>
-            <a:r>
-              <a:rPr lang="en-US" dirty="0"/>
-              <a:t> </a:t>
-            </a:r>
-          </a:p>
-          <a:p>
-            <a:r>
-              <a:rPr lang="en-US" dirty="0"/>
-              <a:t>RadiaSoft provides a public server,  </a:t>
-            </a:r>
-            <a:r>
-              <a:rPr lang="en-US" sz="1600" dirty="0">
-                <a:hlinkClick r:id="rId6"/>
-              </a:rPr>
-              <a:t>https://jupyter.radiasoft.org</a:t>
-            </a:r>
-            <a:r>
-              <a:rPr lang="en-US" sz="1600" dirty="0"/>
-              <a:t> </a:t>
-            </a:r>
-            <a:endParaRPr lang="en-US" dirty="0"/>
-          </a:p>
-          <a:p>
-            <a:pPr lvl="1"/>
-            <a:r>
-              <a:rPr lang="en-US" dirty="0"/>
-              <a:t>many accelerator physics codes are pre-installed</a:t>
-            </a:r>
-          </a:p>
-          <a:p>
-            <a:pPr lvl="1"/>
-            <a:r>
-              <a:rPr lang="en-US" dirty="0"/>
-              <a:t>made available via the  </a:t>
-            </a:r>
-            <a:r>
-              <a:rPr lang="en-US" dirty="0">
-                <a:solidFill>
-                  <a:schemeClr val="tx1"/>
-                </a:solidFill>
-                <a:latin typeface="Courier New" panose="02070309020205020404" pitchFamily="49" charset="0"/>
-                <a:cs typeface="Courier New" panose="02070309020205020404" pitchFamily="49" charset="0"/>
-              </a:rPr>
-              <a:t>radiasoft/beamsim-jupyter</a:t>
-            </a:r>
-            <a:r>
-              <a:rPr lang="en-US" dirty="0"/>
-              <a:t> container</a:t>
-            </a:r>
-          </a:p>
-          <a:p>
-            <a:pPr lvl="1"/>
-            <a:r>
-              <a:rPr lang="en-US" dirty="0"/>
-              <a:t>supports Jupyter/IPython notebooks</a:t>
-            </a:r>
-          </a:p>
-          <a:p>
-            <a:pPr lvl="1"/>
-            <a:r>
-              <a:rPr lang="en-US" dirty="0"/>
-              <a:t>also supports browser-based terminal window (bash, without X11)</a:t>
-            </a:r>
-          </a:p>
-        </p:txBody>
-      </p:sp>
-    </p:spTree>
-    <p:extLst>
-      <p:ext uri="{BB962C8B-B14F-4D97-AF65-F5344CB8AC3E}">
-        <p14:creationId xmlns:p14="http://schemas.microsoft.com/office/powerpoint/2010/main" val="1528542507"/>
-      </p:ext>
-    </p:extLst>
-  </p:cSld>
-  <p:clrMapOvr>
-    <a:masterClrMapping/>
-  </p:clrMapOvr>
-</p:sld>
-</file>
-
-<file path=ppt/slides/slide21.xml><?xml version="1.0" encoding="utf-8"?>
-<p:sld xmlns:a="http://schemas.openxmlformats.org/drawingml/2006/main" xmlns:r="http://schemas.openxmlformats.org/officeDocument/2006/relationships" xmlns:p="http://schemas.openxmlformats.org/presentationml/2006/main">
-  <p:cSld>
-    <p:spTree>
-      <p:nvGrpSpPr>
-        <p:cNvPr id="1" name=""/>
-        <p:cNvGrpSpPr/>
-        <p:nvPr/>
-      </p:nvGrpSpPr>
-      <p:grpSpPr>
-        <a:xfrm>
-          <a:off x="0" y="0"/>
-          <a:ext cx="0" cy="0"/>
-          <a:chOff x="0" y="0"/>
-          <a:chExt cx="0" cy="0"/>
-        </a:xfrm>
-      </p:grpSpPr>
-      <p:sp>
-        <p:nvSpPr>
-          <p:cNvPr id="2" name="Title 1"/>
-          <p:cNvSpPr>
-            <a:spLocks noGrp="1"/>
-          </p:cNvSpPr>
-          <p:nvPr>
-            <p:ph type="title"/>
-          </p:nvPr>
-        </p:nvSpPr>
-        <p:spPr>
-          <a:xfrm>
-            <a:off x="0" y="70385"/>
-            <a:ext cx="9144000" cy="589085"/>
-          </a:xfrm>
-        </p:spPr>
-        <p:txBody>
-          <a:bodyPr>
-            <a:normAutofit/>
-          </a:bodyPr>
-          <a:lstStyle/>
-          <a:p>
-            <a:r>
-              <a:rPr lang="en-US" dirty="0"/>
               <a:t>Wrap up</a:t>
             </a:r>
           </a:p>
@@ -8260,7 +8021,7 @@
           <p:cNvPr id="6" name="Content Placeholder 2">
             <a:extLst>
               <a:ext uri="{FF2B5EF4-FFF2-40B4-BE49-F238E27FC236}">
-                <a16:creationId xmlns:a16="http://schemas.microsoft.com/office/drawing/2014/main" xmlns="" id="{9081FF26-7AD5-4767-AF65-A27F1769E1FC}"/>
+                <a16:creationId xmlns:a16="http://schemas.microsoft.com/office/drawing/2014/main" id="{9081FF26-7AD5-4767-AF65-A27F1769E1FC}"/>
               </a:ext>
             </a:extLst>
           </p:cNvPr>
@@ -8372,11 +8133,7 @@
             </a:r>
             <a:r>
               <a:rPr lang="en-US"/>
-              <a:t>first </a:t>
-            </a:r>
-            <a:r>
-              <a:rPr lang="en-US" smtClean="0"/>
-              <a:t>step</a:t>
+              <a:t>first step</a:t>
             </a:r>
             <a:endParaRPr lang="en-US" sz="1600" i="0" dirty="0"/>
           </a:p>
@@ -8393,7 +8150,7 @@
           <p:cNvPr id="7" name="TextBox 6">
             <a:extLst>
               <a:ext uri="{FF2B5EF4-FFF2-40B4-BE49-F238E27FC236}">
-                <a16:creationId xmlns:a16="http://schemas.microsoft.com/office/drawing/2014/main" xmlns="" id="{FD17F330-126A-4302-ABDD-998D38C067B6}"/>
+                <a16:creationId xmlns:a16="http://schemas.microsoft.com/office/drawing/2014/main" id="{FD17F330-126A-4302-ABDD-998D38C067B6}"/>
               </a:ext>
             </a:extLst>
           </p:cNvPr>
@@ -8626,7 +8383,7 @@
           <p:cNvPr id="6" name="Content Placeholder 2">
             <a:extLst>
               <a:ext uri="{FF2B5EF4-FFF2-40B4-BE49-F238E27FC236}">
-                <a16:creationId xmlns:a16="http://schemas.microsoft.com/office/drawing/2014/main" xmlns="" id="{9081FF26-7AD5-4767-AF65-A27F1769E1FC}"/>
+                <a16:creationId xmlns:a16="http://schemas.microsoft.com/office/drawing/2014/main" id="{9081FF26-7AD5-4767-AF65-A27F1769E1FC}"/>
               </a:ext>
             </a:extLst>
           </p:cNvPr>
@@ -8695,11 +8452,7 @@
             </a:r>
             <a:r>
               <a:rPr lang="en-US" sz="1800" i="0"/>
-              <a:t>social </a:t>
-            </a:r>
-            <a:r>
-              <a:rPr lang="en-US" sz="1800" i="0" smtClean="0"/>
-              <a:t>reasons (incomplete list)</a:t>
+              <a:t>social reasons (incomplete list)</a:t>
             </a:r>
             <a:endParaRPr lang="en-US" sz="1800" i="0" dirty="0"/>
           </a:p>
@@ -8711,17 +8464,13 @@
             </a:r>
             <a:r>
               <a:rPr lang="en-US" sz="1600" i="0"/>
-              <a:t>directly </a:t>
-            </a:r>
-            <a:r>
-              <a:rPr lang="en-US" sz="1600" i="0" smtClean="0"/>
-              <a:t>benefit</a:t>
-            </a:r>
-          </a:p>
-          <a:p>
-            <a:pPr lvl="1"/>
-            <a:r>
-              <a:rPr lang="en-US" smtClean="0"/>
+              <a:t>directly benefit</a:t>
+            </a:r>
+          </a:p>
+          <a:p>
+            <a:pPr lvl="1"/>
+            <a:r>
+              <a:rPr lang="en-US"/>
               <a:t>software license may forbid sharing</a:t>
             </a:r>
             <a:endParaRPr lang="en-US" sz="1600" i="0" dirty="0"/>
@@ -8760,7 +8509,7 @@
           <a:p>
             <a:pPr lvl="1"/>
             <a:r>
-              <a:rPr lang="en-US" sz="1600" i="0" smtClean="0"/>
+              <a:rPr lang="en-US" sz="1600" i="0"/>
               <a:t>the software may be </a:t>
             </a:r>
             <a:r>
@@ -8769,11 +8518,7 @@
             </a:r>
             <a:r>
               <a:rPr lang="en-US" sz="1600" i="0"/>
-              <a:t>to </a:t>
-            </a:r>
-            <a:r>
-              <a:rPr lang="en-US" sz="1600" i="0" smtClean="0"/>
-              <a:t>build/install</a:t>
+              <a:t>to build/install</a:t>
             </a:r>
             <a:endParaRPr lang="en-US" sz="1600" i="0" dirty="0"/>
           </a:p>
@@ -8785,11 +8530,7 @@
             </a:r>
             <a:r>
               <a:rPr lang="en-US" sz="1600" i="0"/>
-              <a:t>be </a:t>
-            </a:r>
-            <a:r>
-              <a:rPr lang="en-US" sz="1600" i="0" smtClean="0"/>
-              <a:t>difficult </a:t>
+              <a:t>be difficult </a:t>
             </a:r>
             <a:r>
               <a:rPr lang="en-US" sz="1600" i="0" dirty="0"/>
@@ -8804,11 +8545,7 @@
             </a:r>
             <a:r>
               <a:rPr lang="en-US" sz="1600" i="0"/>
-              <a:t>many </a:t>
-            </a:r>
-            <a:r>
-              <a:rPr lang="en-US" sz="1600" i="0" smtClean="0"/>
-              <a:t>processors, generate large data sets, etc.</a:t>
+              <a:t>many processors, generate large data sets, etc.</a:t>
             </a:r>
             <a:endParaRPr lang="en-US" sz="1600" i="0" dirty="0"/>
           </a:p>
@@ -8885,7 +8622,7 @@
           <p:cNvPr id="6" name="Content Placeholder 2">
             <a:extLst>
               <a:ext uri="{FF2B5EF4-FFF2-40B4-BE49-F238E27FC236}">
-                <a16:creationId xmlns:a16="http://schemas.microsoft.com/office/drawing/2014/main" xmlns="" id="{9081FF26-7AD5-4767-AF65-A27F1769E1FC}"/>
+                <a16:creationId xmlns:a16="http://schemas.microsoft.com/office/drawing/2014/main" id="{9081FF26-7AD5-4767-AF65-A27F1769E1FC}"/>
               </a:ext>
             </a:extLst>
           </p:cNvPr>
@@ -8988,42 +8725,21 @@
             </a:r>
             <a:r>
               <a:rPr lang="en-US" sz="1600" i="0"/>
-              <a:t>reproducibility</a:t>
-            </a:r>
-            <a:r>
-              <a:rPr lang="en-US" sz="1600" i="0" smtClean="0"/>
-              <a:t>?</a:t>
+              <a:t>reproducibility?</a:t>
             </a:r>
           </a:p>
           <a:p>
             <a:pPr lvl="1"/>
             <a:r>
               <a:rPr lang="en-US"/>
-              <a:t>Should journals require access to source code</a:t>
-            </a:r>
+              <a:t>Should journals require access to source code? </a:t>
+            </a:r>
+          </a:p>
+          <a:p>
+            <a:pPr lvl="1"/>
             <a:r>
               <a:rPr lang="en-US"/>
-              <a:t>? </a:t>
-            </a:r>
-            <a:endParaRPr lang="en-US" smtClean="0"/>
-          </a:p>
-          <a:p>
-            <a:pPr lvl="1"/>
-            <a:r>
-              <a:rPr lang="en-US" smtClean="0"/>
-              <a:t>Should </a:t>
-            </a:r>
-            <a:r>
-              <a:rPr lang="en-US"/>
-              <a:t>all code be open </a:t>
-            </a:r>
-            <a:r>
-              <a:rPr lang="en-US"/>
-              <a:t>source</a:t>
-            </a:r>
-            <a:r>
-              <a:rPr lang="en-US" smtClean="0"/>
-              <a:t>?</a:t>
+              <a:t>Should all code be open source?</a:t>
             </a:r>
           </a:p>
           <a:p>
@@ -9125,7 +8841,7 @@
           <p:cNvPr id="7" name="Content Placeholder 2">
             <a:extLst>
               <a:ext uri="{FF2B5EF4-FFF2-40B4-BE49-F238E27FC236}">
-                <a16:creationId xmlns:a16="http://schemas.microsoft.com/office/drawing/2014/main" xmlns="" id="{496BB089-B99F-4F8D-ABB1-4F20546276A3}"/>
+                <a16:creationId xmlns:a16="http://schemas.microsoft.com/office/drawing/2014/main" id="{496BB089-B99F-4F8D-ABB1-4F20546276A3}"/>
               </a:ext>
             </a:extLst>
           </p:cNvPr>
@@ -9163,7 +8879,7 @@
           <a:p>
             <a:pPr lvl="1"/>
             <a:r>
-              <a:rPr lang="en-US" i="0" smtClean="0"/>
+              <a:rPr lang="en-US" i="0"/>
               <a:t>need </a:t>
             </a:r>
             <a:r>
@@ -9172,11 +8888,7 @@
             </a:r>
             <a:r>
               <a:rPr lang="en-US" i="0"/>
-              <a:t>that </a:t>
-            </a:r>
-            <a:r>
-              <a:rPr lang="en-US" i="0" smtClean="0"/>
-              <a:t>other published/presented </a:t>
+              <a:t>that other published/presented </a:t>
             </a:r>
             <a:r>
               <a:rPr lang="en-US" i="0" dirty="0"/>
@@ -9350,11 +9062,7 @@
             </a:r>
             <a:r>
               <a:rPr lang="en-US" sz="2000" b="0"/>
-              <a:t>of </a:t>
-            </a:r>
-            <a:r>
-              <a:rPr lang="en-US" sz="2000" b="0" smtClean="0"/>
-              <a:t>value</a:t>
+              <a:t>of value</a:t>
             </a:r>
             <a:endParaRPr lang="en-US" b="0" dirty="0"/>
           </a:p>
@@ -9365,7 +9073,7 @@
           <p:cNvPr id="7" name="Content Placeholder 2">
             <a:extLst>
               <a:ext uri="{FF2B5EF4-FFF2-40B4-BE49-F238E27FC236}">
-                <a16:creationId xmlns:a16="http://schemas.microsoft.com/office/drawing/2014/main" xmlns="" id="{496BB089-B99F-4F8D-ABB1-4F20546276A3}"/>
+                <a16:creationId xmlns:a16="http://schemas.microsoft.com/office/drawing/2014/main" id="{496BB089-B99F-4F8D-ABB1-4F20546276A3}"/>
               </a:ext>
             </a:extLst>
           </p:cNvPr>
@@ -9476,11 +9184,7 @@
             </a:r>
             <a:r>
               <a:rPr lang="en-US" i="0"/>
-              <a:t>code </a:t>
-            </a:r>
-            <a:r>
-              <a:rPr lang="en-US" i="0" smtClean="0"/>
-              <a:t>is </a:t>
+              <a:t>code is </a:t>
             </a:r>
             <a:r>
               <a:rPr lang="en-US" i="0" dirty="0"/>
@@ -9488,11 +9192,7 @@
             </a:r>
             <a:r>
               <a:rPr lang="en-US" i="0"/>
-              <a:t>does </a:t>
-            </a:r>
-            <a:r>
-              <a:rPr lang="en-US" i="0" smtClean="0"/>
-              <a:t>reproducibility </a:t>
+              <a:t>does reproducibility </a:t>
             </a:r>
             <a:r>
               <a:rPr lang="en-US" i="0" dirty="0"/>
@@ -9502,7 +9202,7 @@
           <a:p>
             <a:pPr lvl="1"/>
             <a:r>
-              <a:rPr lang="en-US" smtClean="0"/>
+              <a:rPr lang="en-US"/>
               <a:t>given </a:t>
             </a:r>
             <a:r>
@@ -9615,7 +9315,7 @@
           <p:cNvPr id="8" name="Content Placeholder 2">
             <a:extLst>
               <a:ext uri="{FF2B5EF4-FFF2-40B4-BE49-F238E27FC236}">
-                <a16:creationId xmlns:a16="http://schemas.microsoft.com/office/drawing/2014/main" xmlns="" id="{B23837A6-5E62-48BD-8241-836D8AC802E1}"/>
+                <a16:creationId xmlns:a16="http://schemas.microsoft.com/office/drawing/2014/main" id="{B23837A6-5E62-48BD-8241-836D8AC802E1}"/>
               </a:ext>
             </a:extLst>
           </p:cNvPr>
@@ -9650,11 +9350,7 @@
             </a:r>
             <a:r>
               <a:rPr lang="en-US" i="0"/>
-              <a:t>can </a:t>
-            </a:r>
-            <a:r>
-              <a:rPr lang="en-US" i="0" smtClean="0"/>
-              <a:t>be </a:t>
+              <a:t>can be </a:t>
             </a:r>
             <a:r>
               <a:rPr lang="en-US" i="0" dirty="0"/>
@@ -9696,19 +9392,7 @@
             </a:r>
             <a:r>
               <a:rPr lang="en-US" i="0"/>
-              <a:t>2.7.x </a:t>
-            </a:r>
-            <a:r>
-              <a:rPr lang="en-US" i="0" smtClean="0"/>
-              <a:t>code is </a:t>
-            </a:r>
-            <a:r>
-              <a:rPr lang="en-US" i="0"/>
-              <a:t>not </a:t>
-            </a:r>
-            <a:r>
-              <a:rPr lang="en-US" i="0" smtClean="0"/>
-              <a:t>always compatible </a:t>
+              <a:t>2.7.x code is not always compatible </a:t>
             </a:r>
             <a:r>
               <a:rPr lang="en-US" i="0" dirty="0"/>
@@ -9716,11 +9400,7 @@
             </a:r>
             <a:r>
               <a:rPr lang="en-US" i="0"/>
-              <a:t>Python </a:t>
-            </a:r>
-            <a:r>
-              <a:rPr lang="en-US" i="0" smtClean="0"/>
-              <a:t>3.x code</a:t>
+              <a:t>Python 3.x code</a:t>
             </a:r>
             <a:endParaRPr lang="en-US" i="0" dirty="0"/>
           </a:p>
@@ -9770,7 +9450,7 @@
               <a:t>compilers </a:t>
             </a:r>
             <a:r>
-              <a:rPr lang="en-US" smtClean="0"/>
+              <a:rPr lang="en-US"/>
               <a:t>less so</a:t>
             </a:r>
             <a:endParaRPr lang="en-US" b="1" i="0" dirty="0"/>
@@ -9778,7 +9458,7 @@
           <a:p>
             <a:pPr lvl="1"/>
             <a:r>
-              <a:rPr lang="en-US" i="0" smtClean="0"/>
+              <a:rPr lang="en-US" i="0"/>
               <a:t>a computer may have </a:t>
             </a:r>
             <a:r>
@@ -9794,14 +9474,10 @@
             </a:r>
             <a:r>
               <a:rPr lang="en-US" b="1" i="0"/>
-              <a:t>creates </a:t>
-            </a:r>
-            <a:r>
-              <a:rPr lang="en-US" b="1" i="0" smtClean="0"/>
-              <a:t>additional complexity</a:t>
-            </a:r>
-            <a:r>
-              <a:rPr lang="en-US" smtClean="0"/>
+              <a:t>creates additional complexity</a:t>
+            </a:r>
+            <a:r>
+              <a:rPr lang="en-US"/>
               <a:t> </a:t>
             </a:r>
             <a:endParaRPr lang="en-US" dirty="0"/>
@@ -9872,7 +9548,7 @@
           <p:cNvPr id="6" name="Content Placeholder 2">
             <a:extLst>
               <a:ext uri="{FF2B5EF4-FFF2-40B4-BE49-F238E27FC236}">
-                <a16:creationId xmlns:a16="http://schemas.microsoft.com/office/drawing/2014/main" xmlns="" id="{9081FF26-7AD5-4767-AF65-A27F1769E1FC}"/>
+                <a16:creationId xmlns:a16="http://schemas.microsoft.com/office/drawing/2014/main" id="{9081FF26-7AD5-4767-AF65-A27F1769E1FC}"/>
               </a:ext>
             </a:extLst>
           </p:cNvPr>

</xml_diff>

<commit_message>
fixed link on final slide
</commit_message>
<xml_diff>
--- a/computational_reproducibility/lecture/2018_ComputationalReproducibility_Bruhwiler_USPAS.pptx
+++ b/computational_reproducibility/lecture/2018_ComputationalReproducibility_Bruhwiler_USPAS.pptx
@@ -8100,12 +8100,23 @@
             </a:r>
             <a:r>
               <a:rPr lang="en-US" b="0" dirty="0">
+                <a:solidFill>
+                  <a:schemeClr val="tx1"/>
+                </a:solidFill>
+                <a:latin typeface="Courier New" panose="02070309020205020404" pitchFamily="49" charset="0"/>
+                <a:cs typeface="Courier New" panose="02070309020205020404" pitchFamily="49" charset="0"/>
                 <a:hlinkClick r:id="rId3"/>
               </a:rPr>
-              <a:t>https://jupyter.radiasoft.org</a:t>
-            </a:r>
-            <a:r>
-              <a:rPr lang="en-US" b="0" dirty="0"/>
+              <a:t>https://uspas-jupyter.radiasoft.org</a:t>
+            </a:r>
+            <a:r>
+              <a:rPr lang="en-US" b="0" dirty="0">
+                <a:solidFill>
+                  <a:schemeClr val="tx1"/>
+                </a:solidFill>
+                <a:latin typeface="Courier New" panose="02070309020205020404" pitchFamily="49" charset="0"/>
+                <a:cs typeface="Courier New" panose="02070309020205020404" pitchFamily="49" charset="0"/>
+              </a:rPr>
               <a:t> </a:t>
             </a:r>
           </a:p>

</xml_diff>